<commit_message>
Changed remaining figure in Results and incorporated Rob's comments into text
</commit_message>
<xml_diff>
--- a/SEC_Writings/SEC_Manuscript-Figures.pptx
+++ b/SEC_Writings/SEC_Manuscript-Figures.pptx
@@ -11,8 +11,9 @@
     <p:sldId id="264" r:id="rId5"/>
     <p:sldId id="265" r:id="rId6"/>
     <p:sldId id="260" r:id="rId7"/>
-    <p:sldId id="261" r:id="rId8"/>
-    <p:sldId id="262" r:id="rId9"/>
+    <p:sldId id="266" r:id="rId8"/>
+    <p:sldId id="267" r:id="rId9"/>
+    <p:sldId id="262" r:id="rId10"/>
   </p:sldIdLst>
   <p:sldSz cx="14400213" cy="14400213"/>
   <p:notesSz cx="6858000" cy="9144000"/>
@@ -9726,7 +9727,7 @@
       </p:grpSpPr>
       <p:grpSp>
         <p:nvGrpSpPr>
-          <p:cNvPr id="49" name="Group 48"/>
+          <p:cNvPr id="52" name="Group 51"/>
           <p:cNvGrpSpPr/>
           <p:nvPr/>
         </p:nvGrpSpPr>
@@ -12437,160 +12438,354 @@
       </p:grpSpPr>
       <p:grpSp>
         <p:nvGrpSpPr>
-          <p:cNvPr id="3" name="Group 2"/>
+          <p:cNvPr id="59" name="Group 58"/>
           <p:cNvGrpSpPr/>
           <p:nvPr/>
         </p:nvGrpSpPr>
         <p:grpSpPr>
           <a:xfrm>
-            <a:off x="1067911" y="2796288"/>
-            <a:ext cx="11065178" cy="8766348"/>
-            <a:chOff x="1067911" y="2796288"/>
-            <a:chExt cx="11065178" cy="8766348"/>
+            <a:off x="496463" y="1966993"/>
+            <a:ext cx="10920837" cy="8775550"/>
+            <a:chOff x="496463" y="1966993"/>
+            <a:chExt cx="10920837" cy="8775550"/>
           </a:xfrm>
         </p:grpSpPr>
+        <p:pic>
+          <p:nvPicPr>
+            <p:cNvPr id="31" name="Picture 30"/>
+            <p:cNvPicPr>
+              <a:picLocks noChangeAspect="1"/>
+            </p:cNvPicPr>
+            <p:nvPr/>
+          </p:nvPicPr>
+          <p:blipFill rotWithShape="1">
+            <a:blip r:embed="rId2">
+              <a:extLst>
+                <a:ext uri="{28A0092B-C50C-407E-A947-70E740481C1C}">
+                  <a14:useLocalDpi xmlns:a14="http://schemas.microsoft.com/office/drawing/2010/main" val="0"/>
+                </a:ext>
+              </a:extLst>
+            </a:blip>
+            <a:srcRect l="5093" t="12847" b="16089"/>
+            <a:stretch/>
+          </p:blipFill>
+          <p:spPr>
+            <a:xfrm>
+              <a:off x="6438900" y="6492784"/>
+              <a:ext cx="4978400" cy="3898900"/>
+            </a:xfrm>
+            <a:prstGeom prst="rect">
+              <a:avLst/>
+            </a:prstGeom>
+          </p:spPr>
+        </p:pic>
+        <p:pic>
+          <p:nvPicPr>
+            <p:cNvPr id="30" name="Picture 29"/>
+            <p:cNvPicPr>
+              <a:picLocks noChangeAspect="1"/>
+            </p:cNvPicPr>
+            <p:nvPr/>
+          </p:nvPicPr>
+          <p:blipFill rotWithShape="1">
+            <a:blip r:embed="rId3">
+              <a:extLst>
+                <a:ext uri="{28A0092B-C50C-407E-A947-70E740481C1C}">
+                  <a14:useLocalDpi xmlns:a14="http://schemas.microsoft.com/office/drawing/2010/main" val="0"/>
+                </a:ext>
+              </a:extLst>
+            </a:blip>
+            <a:srcRect l="4977" t="12731" b="16204"/>
+            <a:stretch/>
+          </p:blipFill>
+          <p:spPr>
+            <a:xfrm>
+              <a:off x="1003300" y="6490139"/>
+              <a:ext cx="5105400" cy="3898900"/>
+            </a:xfrm>
+            <a:prstGeom prst="rect">
+              <a:avLst/>
+            </a:prstGeom>
+          </p:spPr>
+        </p:pic>
+        <p:pic>
+          <p:nvPicPr>
+            <p:cNvPr id="4" name="Picture 3"/>
+            <p:cNvPicPr>
+              <a:picLocks noChangeAspect="1"/>
+            </p:cNvPicPr>
+            <p:nvPr/>
+          </p:nvPicPr>
+          <p:blipFill rotWithShape="1">
+            <a:blip r:embed="rId4">
+              <a:extLst>
+                <a:ext uri="{28A0092B-C50C-407E-A947-70E740481C1C}">
+                  <a14:useLocalDpi xmlns:a14="http://schemas.microsoft.com/office/drawing/2010/main" val="0"/>
+                </a:ext>
+              </a:extLst>
+            </a:blip>
+            <a:srcRect l="4861" t="13658" b="16898"/>
+            <a:stretch/>
+          </p:blipFill>
+          <p:spPr>
+            <a:xfrm>
+              <a:off x="889000" y="2362200"/>
+              <a:ext cx="5219700" cy="3810000"/>
+            </a:xfrm>
+            <a:prstGeom prst="rect">
+              <a:avLst/>
+            </a:prstGeom>
+          </p:spPr>
+        </p:pic>
+        <p:pic>
+          <p:nvPicPr>
+            <p:cNvPr id="5" name="Picture 4"/>
+            <p:cNvPicPr>
+              <a:picLocks noChangeAspect="1"/>
+            </p:cNvPicPr>
+            <p:nvPr/>
+          </p:nvPicPr>
+          <p:blipFill rotWithShape="1">
+            <a:blip r:embed="rId5">
+              <a:extLst>
+                <a:ext uri="{28A0092B-C50C-407E-A947-70E740481C1C}">
+                  <a14:useLocalDpi xmlns:a14="http://schemas.microsoft.com/office/drawing/2010/main" val="0"/>
+                </a:ext>
+              </a:extLst>
+            </a:blip>
+            <a:srcRect l="4861" t="14352" b="17362"/>
+            <a:stretch/>
+          </p:blipFill>
+          <p:spPr>
+            <a:xfrm>
+              <a:off x="6197600" y="2387600"/>
+              <a:ext cx="5219700" cy="3784600"/>
+            </a:xfrm>
+            <a:prstGeom prst="rect">
+              <a:avLst/>
+            </a:prstGeom>
+          </p:spPr>
+        </p:pic>
+        <p:sp>
+          <p:nvSpPr>
+            <p:cNvPr id="12" name="TextBox 11"/>
+            <p:cNvSpPr txBox="1"/>
+            <p:nvPr/>
+          </p:nvSpPr>
+          <p:spPr>
+            <a:xfrm rot="16200000">
+              <a:off x="-2389" y="3870522"/>
+              <a:ext cx="1351652" cy="353943"/>
+            </a:xfrm>
+            <a:prstGeom prst="rect">
+              <a:avLst/>
+            </a:prstGeom>
+            <a:solidFill>
+              <a:schemeClr val="bg1"/>
+            </a:solidFill>
+          </p:spPr>
+          <p:txBody>
+            <a:bodyPr wrap="none" rtlCol="0">
+              <a:spAutoFit/>
+            </a:bodyPr>
+            <a:lstStyle/>
+            <a:p>
+              <a:r>
+                <a:rPr lang="en-US" sz="1700" dirty="0" smtClean="0">
+                  <a:latin typeface="Helvetica" charset="0"/>
+                  <a:ea typeface="Helvetica" charset="0"/>
+                  <a:cs typeface="Helvetica" charset="0"/>
+                </a:rPr>
+                <a:t>Mean Slope</a:t>
+              </a:r>
+              <a:endParaRPr lang="en-US" sz="1700" dirty="0">
+                <a:latin typeface="Helvetica" charset="0"/>
+                <a:ea typeface="Helvetica" charset="0"/>
+                <a:cs typeface="Helvetica" charset="0"/>
+              </a:endParaRPr>
+            </a:p>
+          </p:txBody>
+        </p:sp>
+        <p:sp>
+          <p:nvSpPr>
+            <p:cNvPr id="13" name="TextBox 12"/>
+            <p:cNvSpPr txBox="1"/>
+            <p:nvPr/>
+          </p:nvSpPr>
+          <p:spPr>
+            <a:xfrm rot="16200000">
+              <a:off x="-907287" y="7961939"/>
+              <a:ext cx="3161443" cy="353943"/>
+            </a:xfrm>
+            <a:prstGeom prst="rect">
+              <a:avLst/>
+            </a:prstGeom>
+            <a:solidFill>
+              <a:schemeClr val="bg1"/>
+            </a:solidFill>
+          </p:spPr>
+          <p:txBody>
+            <a:bodyPr wrap="none" rtlCol="0">
+              <a:spAutoFit/>
+            </a:bodyPr>
+            <a:lstStyle/>
+            <a:p>
+              <a:r>
+                <a:rPr lang="en-US" sz="1700" dirty="0" smtClean="0">
+                  <a:latin typeface="Helvetica" charset="0"/>
+                  <a:ea typeface="Helvetica" charset="0"/>
+                  <a:cs typeface="Helvetica" charset="0"/>
+                </a:rPr>
+                <a:t>Proportion of significant slopes</a:t>
+              </a:r>
+              <a:endParaRPr lang="en-US" sz="1700" dirty="0">
+                <a:latin typeface="Helvetica" charset="0"/>
+                <a:ea typeface="Helvetica" charset="0"/>
+                <a:cs typeface="Helvetica" charset="0"/>
+              </a:endParaRPr>
+            </a:p>
+          </p:txBody>
+        </p:sp>
+        <p:sp>
+          <p:nvSpPr>
+            <p:cNvPr id="14" name="TextBox 13"/>
+            <p:cNvSpPr txBox="1"/>
+            <p:nvPr/>
+          </p:nvSpPr>
+          <p:spPr>
+            <a:xfrm>
+              <a:off x="2564221" y="10388600"/>
+              <a:ext cx="2439579" cy="353943"/>
+            </a:xfrm>
+            <a:prstGeom prst="rect">
+              <a:avLst/>
+            </a:prstGeom>
+            <a:solidFill>
+              <a:schemeClr val="bg1"/>
+            </a:solidFill>
+          </p:spPr>
+          <p:txBody>
+            <a:bodyPr wrap="none" rtlCol="0">
+              <a:spAutoFit/>
+            </a:bodyPr>
+            <a:lstStyle/>
+            <a:p>
+              <a:pPr algn="ctr"/>
+              <a:r>
+                <a:rPr lang="en-US" sz="1700" smtClean="0">
+                  <a:latin typeface="Helvetica" charset="0"/>
+                  <a:ea typeface="Helvetica" charset="0"/>
+                  <a:cs typeface="Helvetica" charset="0"/>
+                </a:rPr>
+                <a:t>Selection coefficient (</a:t>
+              </a:r>
+              <a:r>
+                <a:rPr lang="en-US" sz="1700" i="1" smtClean="0">
+                  <a:latin typeface="Helvetica" charset="0"/>
+                  <a:ea typeface="Helvetica" charset="0"/>
+                  <a:cs typeface="Helvetica" charset="0"/>
+                </a:rPr>
+                <a:t>s</a:t>
+              </a:r>
+              <a:r>
+                <a:rPr lang="en-US" sz="1700" smtClean="0">
+                  <a:latin typeface="Helvetica" charset="0"/>
+                  <a:ea typeface="Helvetica" charset="0"/>
+                  <a:cs typeface="Helvetica" charset="0"/>
+                </a:rPr>
+                <a:t>)</a:t>
+              </a:r>
+              <a:endParaRPr lang="en-US" sz="1700" dirty="0">
+                <a:latin typeface="Helvetica" charset="0"/>
+                <a:ea typeface="Helvetica" charset="0"/>
+                <a:cs typeface="Helvetica" charset="0"/>
+              </a:endParaRPr>
+            </a:p>
+          </p:txBody>
+        </p:sp>
+        <p:sp>
+          <p:nvSpPr>
+            <p:cNvPr id="15" name="TextBox 14"/>
+            <p:cNvSpPr txBox="1"/>
+            <p:nvPr/>
+          </p:nvSpPr>
+          <p:spPr>
+            <a:xfrm>
+              <a:off x="7949021" y="10388600"/>
+              <a:ext cx="2439579" cy="353943"/>
+            </a:xfrm>
+            <a:prstGeom prst="rect">
+              <a:avLst/>
+            </a:prstGeom>
+            <a:solidFill>
+              <a:schemeClr val="bg1"/>
+            </a:solidFill>
+          </p:spPr>
+          <p:txBody>
+            <a:bodyPr wrap="none" rtlCol="0">
+              <a:spAutoFit/>
+            </a:bodyPr>
+            <a:lstStyle/>
+            <a:p>
+              <a:pPr algn="ctr"/>
+              <a:r>
+                <a:rPr lang="en-US" sz="1700" smtClean="0">
+                  <a:latin typeface="Helvetica" charset="0"/>
+                  <a:ea typeface="Helvetica" charset="0"/>
+                  <a:cs typeface="Helvetica" charset="0"/>
+                </a:rPr>
+                <a:t>Selection coefficient (</a:t>
+              </a:r>
+              <a:r>
+                <a:rPr lang="en-US" sz="1700" i="1" smtClean="0">
+                  <a:latin typeface="Helvetica" charset="0"/>
+                  <a:ea typeface="Helvetica" charset="0"/>
+                  <a:cs typeface="Helvetica" charset="0"/>
+                </a:rPr>
+                <a:t>s</a:t>
+              </a:r>
+              <a:r>
+                <a:rPr lang="en-US" sz="1700" smtClean="0">
+                  <a:latin typeface="Helvetica" charset="0"/>
+                  <a:ea typeface="Helvetica" charset="0"/>
+                  <a:cs typeface="Helvetica" charset="0"/>
+                </a:rPr>
+                <a:t>)</a:t>
+              </a:r>
+              <a:endParaRPr lang="en-US" sz="1700" dirty="0">
+                <a:latin typeface="Helvetica" charset="0"/>
+                <a:ea typeface="Helvetica" charset="0"/>
+                <a:cs typeface="Helvetica" charset="0"/>
+              </a:endParaRPr>
+            </a:p>
+          </p:txBody>
+        </p:sp>
         <p:grpSp>
           <p:nvGrpSpPr>
-            <p:cNvPr id="35" name="Group 34"/>
+            <p:cNvPr id="22" name="Group 21"/>
             <p:cNvGrpSpPr/>
             <p:nvPr/>
           </p:nvGrpSpPr>
           <p:grpSpPr>
             <a:xfrm>
-              <a:off x="1067911" y="2796288"/>
-              <a:ext cx="11065178" cy="8766348"/>
-              <a:chOff x="1067911" y="2796288"/>
-              <a:chExt cx="11065178" cy="8766348"/>
+              <a:off x="6846508" y="6464300"/>
+              <a:ext cx="1319592" cy="938624"/>
+              <a:chOff x="8497508" y="6819900"/>
+              <a:chExt cx="1319592" cy="938624"/>
             </a:xfrm>
           </p:grpSpPr>
-          <p:pic>
-            <p:nvPicPr>
-              <p:cNvPr id="4" name="Picture 3"/>
-              <p:cNvPicPr>
-                <a:picLocks noChangeAspect="1"/>
-              </p:cNvPicPr>
-              <p:nvPr/>
-            </p:nvPicPr>
-            <p:blipFill rotWithShape="1">
-              <a:blip r:embed="rId2">
-                <a:extLst>
-                  <a:ext uri="{28A0092B-C50C-407E-A947-70E740481C1C}">
-                    <a14:useLocalDpi xmlns:a14="http://schemas.microsoft.com/office/drawing/2010/main" val="0"/>
-                  </a:ext>
-                </a:extLst>
-              </a:blip>
-              <a:srcRect l="4518" t="12553" b="12037"/>
-              <a:stretch/>
-            </p:blipFill>
-            <p:spPr>
-              <a:xfrm>
-                <a:off x="6993983" y="7313362"/>
-                <a:ext cx="5139106" cy="4137285"/>
-              </a:xfrm>
-              <a:prstGeom prst="rect">
-                <a:avLst/>
-              </a:prstGeom>
-            </p:spPr>
-          </p:pic>
-          <p:pic>
-            <p:nvPicPr>
-              <p:cNvPr id="5" name="Picture 4"/>
-              <p:cNvPicPr>
-                <a:picLocks noChangeAspect="1"/>
-              </p:cNvPicPr>
-              <p:nvPr/>
-            </p:nvPicPr>
-            <p:blipFill rotWithShape="1">
-              <a:blip r:embed="rId3">
-                <a:extLst>
-                  <a:ext uri="{28A0092B-C50C-407E-A947-70E740481C1C}">
-                    <a14:useLocalDpi xmlns:a14="http://schemas.microsoft.com/office/drawing/2010/main" val="0"/>
-                  </a:ext>
-                </a:extLst>
-              </a:blip>
-              <a:srcRect l="4645" t="12279" b="12311"/>
-              <a:stretch/>
-            </p:blipFill>
-            <p:spPr>
-              <a:xfrm>
-                <a:off x="1670985" y="7306039"/>
-                <a:ext cx="5036698" cy="4137285"/>
-              </a:xfrm>
-              <a:prstGeom prst="rect">
-                <a:avLst/>
-              </a:prstGeom>
-            </p:spPr>
-          </p:pic>
-          <p:pic>
-            <p:nvPicPr>
-              <p:cNvPr id="6" name="Picture 5"/>
-              <p:cNvPicPr>
-                <a:picLocks noChangeAspect="1"/>
-              </p:cNvPicPr>
-              <p:nvPr/>
-            </p:nvPicPr>
-            <p:blipFill rotWithShape="1">
-              <a:blip r:embed="rId4">
-                <a:extLst>
-                  <a:ext uri="{28A0092B-C50C-407E-A947-70E740481C1C}">
-                    <a14:useLocalDpi xmlns:a14="http://schemas.microsoft.com/office/drawing/2010/main" val="0"/>
-                  </a:ext>
-                </a:extLst>
-              </a:blip>
-              <a:srcRect l="5191" t="13798" b="17623"/>
-              <a:stretch/>
-            </p:blipFill>
-            <p:spPr>
-              <a:xfrm>
-                <a:off x="6850510" y="3222885"/>
-                <a:ext cx="5201588" cy="3822492"/>
-              </a:xfrm>
-              <a:prstGeom prst="rect">
-                <a:avLst/>
-              </a:prstGeom>
-            </p:spPr>
-          </p:pic>
-          <p:pic>
-            <p:nvPicPr>
-              <p:cNvPr id="7" name="Picture 6"/>
-              <p:cNvPicPr>
-                <a:picLocks noChangeAspect="1"/>
-              </p:cNvPicPr>
-              <p:nvPr/>
-            </p:nvPicPr>
-            <p:blipFill rotWithShape="1">
-              <a:blip r:embed="rId5">
-                <a:extLst>
-                  <a:ext uri="{28A0092B-C50C-407E-A947-70E740481C1C}">
-                    <a14:useLocalDpi xmlns:a14="http://schemas.microsoft.com/office/drawing/2010/main" val="0"/>
-                  </a:ext>
-                </a:extLst>
-              </a:blip>
-              <a:srcRect t="13244" b="17084"/>
-              <a:stretch/>
-            </p:blipFill>
-            <p:spPr>
-              <a:xfrm>
-                <a:off x="1289986" y="3222885"/>
-                <a:ext cx="5486400" cy="3822492"/>
-              </a:xfrm>
-              <a:prstGeom prst="rect">
-                <a:avLst/>
-              </a:prstGeom>
-            </p:spPr>
-          </p:pic>
           <p:sp>
             <p:nvSpPr>
-              <p:cNvPr id="14" name="Rectangle 13"/>
+              <p:cNvPr id="16" name="Triangle 15"/>
               <p:cNvSpPr/>
               <p:nvPr/>
             </p:nvSpPr>
             <p:spPr>
               <a:xfrm>
-                <a:off x="1067911" y="7406855"/>
-                <a:ext cx="539750" cy="3263900"/>
+                <a:off x="8642026" y="7137901"/>
+                <a:ext cx="218072" cy="187993"/>
               </a:xfrm>
-              <a:prstGeom prst="rect">
+              <a:prstGeom prst="triangle">
                 <a:avLst/>
               </a:prstGeom>
               <a:solidFill>
@@ -12598,7 +12793,7 @@
               </a:solidFill>
               <a:ln>
                 <a:solidFill>
-                  <a:schemeClr val="bg1"/>
+                  <a:schemeClr val="tx1"/>
                 </a:solidFill>
               </a:ln>
             </p:spPr>
@@ -12629,256 +12824,62 @@
           </p:sp>
           <p:sp>
             <p:nvSpPr>
-              <p:cNvPr id="12" name="TextBox 11"/>
-              <p:cNvSpPr txBox="1"/>
+              <p:cNvPr id="17" name="Triangle 16"/>
+              <p:cNvSpPr/>
               <p:nvPr/>
             </p:nvSpPr>
             <p:spPr>
-              <a:xfrm rot="16200000">
-                <a:off x="-148591" y="8869528"/>
-                <a:ext cx="2977097" cy="338554"/>
+              <a:xfrm rot="10800000">
+                <a:off x="8638414" y="7461007"/>
+                <a:ext cx="219600" cy="187200"/>
               </a:xfrm>
-              <a:prstGeom prst="rect">
+              <a:prstGeom prst="triangle">
                 <a:avLst/>
               </a:prstGeom>
               <a:solidFill>
-                <a:schemeClr val="bg1"/>
+                <a:schemeClr val="tx1"/>
               </a:solidFill>
+              <a:ln>
+                <a:solidFill>
+                  <a:schemeClr val="tx1"/>
+                </a:solidFill>
+              </a:ln>
             </p:spPr>
+            <p:style>
+              <a:lnRef idx="2">
+                <a:schemeClr val="accent1">
+                  <a:shade val="50000"/>
+                </a:schemeClr>
+              </a:lnRef>
+              <a:fillRef idx="1">
+                <a:schemeClr val="accent1"/>
+              </a:fillRef>
+              <a:effectRef idx="0">
+                <a:schemeClr val="accent1"/>
+              </a:effectRef>
+              <a:fontRef idx="minor">
+                <a:schemeClr val="lt1"/>
+              </a:fontRef>
+            </p:style>
             <p:txBody>
-              <a:bodyPr wrap="none" rtlCol="0">
-                <a:spAutoFit/>
-              </a:bodyPr>
+              <a:bodyPr rtlCol="0" anchor="ctr"/>
               <a:lstStyle/>
               <a:p>
-                <a:r>
-                  <a:rPr lang="en-US" sz="1600" dirty="0" smtClean="0">
-                    <a:latin typeface="Helvetica" charset="0"/>
-                    <a:ea typeface="Helvetica" charset="0"/>
-                    <a:cs typeface="Helvetica" charset="0"/>
-                  </a:rPr>
-                  <a:t>Proportion of significant slopes</a:t>
-                </a:r>
-                <a:endParaRPr lang="en-US" sz="1600" dirty="0">
-                  <a:latin typeface="Helvetica" charset="0"/>
-                  <a:ea typeface="Helvetica" charset="0"/>
-                  <a:cs typeface="Helvetica" charset="0"/>
-                </a:endParaRPr>
+                <a:pPr algn="ctr"/>
+                <a:endParaRPr lang="en-US"/>
               </a:p>
             </p:txBody>
           </p:sp>
           <p:sp>
             <p:nvSpPr>
-              <p:cNvPr id="13" name="TextBox 12"/>
-              <p:cNvSpPr txBox="1"/>
-              <p:nvPr/>
-            </p:nvSpPr>
-            <p:spPr>
-              <a:xfrm rot="16200000">
-                <a:off x="715661" y="4723138"/>
-                <a:ext cx="1244251" cy="338554"/>
-              </a:xfrm>
-              <a:prstGeom prst="rect">
-                <a:avLst/>
-              </a:prstGeom>
-              <a:solidFill>
-                <a:schemeClr val="bg1"/>
-              </a:solidFill>
-            </p:spPr>
-            <p:txBody>
-              <a:bodyPr wrap="none" rtlCol="0">
-                <a:spAutoFit/>
-              </a:bodyPr>
-              <a:lstStyle/>
-              <a:p>
-                <a:r>
-                  <a:rPr lang="en-US" sz="1600" dirty="0" smtClean="0">
-                    <a:latin typeface="Helvetica" charset="0"/>
-                    <a:ea typeface="Helvetica" charset="0"/>
-                    <a:cs typeface="Helvetica" charset="0"/>
-                  </a:rPr>
-                  <a:t>Mean slope</a:t>
-                </a:r>
-                <a:endParaRPr lang="en-US" sz="1600" dirty="0">
-                  <a:latin typeface="Helvetica" charset="0"/>
-                  <a:ea typeface="Helvetica" charset="0"/>
-                  <a:cs typeface="Helvetica" charset="0"/>
-                </a:endParaRPr>
-              </a:p>
-            </p:txBody>
-          </p:sp>
-          <p:sp>
-            <p:nvSpPr>
-              <p:cNvPr id="16" name="TextBox 15"/>
+              <p:cNvPr id="18" name="TextBox 17"/>
               <p:cNvSpPr txBox="1"/>
               <p:nvPr/>
             </p:nvSpPr>
             <p:spPr>
               <a:xfrm>
-                <a:off x="3253498" y="11221584"/>
-                <a:ext cx="2301977" cy="338554"/>
-              </a:xfrm>
-              <a:prstGeom prst="rect">
-                <a:avLst/>
-              </a:prstGeom>
-              <a:solidFill>
-                <a:schemeClr val="bg1"/>
-              </a:solidFill>
-            </p:spPr>
-            <p:txBody>
-              <a:bodyPr wrap="none" rtlCol="0">
-                <a:spAutoFit/>
-              </a:bodyPr>
-              <a:lstStyle/>
-              <a:p>
-                <a:pPr algn="ctr"/>
-                <a:r>
-                  <a:rPr lang="en-US" sz="1600" smtClean="0">
-                    <a:latin typeface="Helvetica" charset="0"/>
-                    <a:ea typeface="Helvetica" charset="0"/>
-                    <a:cs typeface="Helvetica" charset="0"/>
-                  </a:rPr>
-                  <a:t>Selection coefficient (</a:t>
-                </a:r>
-                <a:r>
-                  <a:rPr lang="en-US" sz="1600" i="1" smtClean="0">
-                    <a:latin typeface="Helvetica" charset="0"/>
-                    <a:ea typeface="Helvetica" charset="0"/>
-                    <a:cs typeface="Helvetica" charset="0"/>
-                  </a:rPr>
-                  <a:t>s</a:t>
-                </a:r>
-                <a:r>
-                  <a:rPr lang="en-US" sz="1600" smtClean="0">
-                    <a:latin typeface="Helvetica" charset="0"/>
-                    <a:ea typeface="Helvetica" charset="0"/>
-                    <a:cs typeface="Helvetica" charset="0"/>
-                  </a:rPr>
-                  <a:t>)</a:t>
-                </a:r>
-                <a:endParaRPr lang="en-US" sz="1600" dirty="0">
-                  <a:latin typeface="Helvetica" charset="0"/>
-                  <a:ea typeface="Helvetica" charset="0"/>
-                  <a:cs typeface="Helvetica" charset="0"/>
-                </a:endParaRPr>
-              </a:p>
-            </p:txBody>
-          </p:sp>
-          <p:sp>
-            <p:nvSpPr>
-              <p:cNvPr id="17" name="TextBox 16"/>
-              <p:cNvSpPr txBox="1"/>
-              <p:nvPr/>
-            </p:nvSpPr>
-            <p:spPr>
-              <a:xfrm>
-                <a:off x="8577505" y="11224082"/>
-                <a:ext cx="2301977" cy="338554"/>
-              </a:xfrm>
-              <a:prstGeom prst="rect">
-                <a:avLst/>
-              </a:prstGeom>
-              <a:solidFill>
-                <a:schemeClr val="bg1"/>
-              </a:solidFill>
-            </p:spPr>
-            <p:txBody>
-              <a:bodyPr wrap="none" rtlCol="0">
-                <a:spAutoFit/>
-              </a:bodyPr>
-              <a:lstStyle/>
-              <a:p>
-                <a:pPr algn="ctr"/>
-                <a:r>
-                  <a:rPr lang="en-US" sz="1600" smtClean="0">
-                    <a:latin typeface="Helvetica" charset="0"/>
-                    <a:ea typeface="Helvetica" charset="0"/>
-                    <a:cs typeface="Helvetica" charset="0"/>
-                  </a:rPr>
-                  <a:t>Selection coefficient (</a:t>
-                </a:r>
-                <a:r>
-                  <a:rPr lang="en-US" sz="1600" i="1" smtClean="0">
-                    <a:latin typeface="Helvetica" charset="0"/>
-                    <a:ea typeface="Helvetica" charset="0"/>
-                    <a:cs typeface="Helvetica" charset="0"/>
-                  </a:rPr>
-                  <a:t>s</a:t>
-                </a:r>
-                <a:r>
-                  <a:rPr lang="en-US" sz="1600" smtClean="0">
-                    <a:latin typeface="Helvetica" charset="0"/>
-                    <a:ea typeface="Helvetica" charset="0"/>
-                    <a:cs typeface="Helvetica" charset="0"/>
-                  </a:rPr>
-                  <a:t>)</a:t>
-                </a:r>
-                <a:endParaRPr lang="en-US" sz="1600" dirty="0">
-                  <a:latin typeface="Helvetica" charset="0"/>
-                  <a:ea typeface="Helvetica" charset="0"/>
-                  <a:cs typeface="Helvetica" charset="0"/>
-                </a:endParaRPr>
-              </a:p>
-            </p:txBody>
-          </p:sp>
-          <p:pic>
-            <p:nvPicPr>
-              <p:cNvPr id="21" name="Picture 20"/>
-              <p:cNvPicPr>
-                <a:picLocks noChangeAspect="1"/>
-              </p:cNvPicPr>
-              <p:nvPr/>
-            </p:nvPicPr>
-            <p:blipFill>
-              <a:blip r:embed="rId6"/>
-              <a:stretch>
-                <a:fillRect/>
-              </a:stretch>
-            </p:blipFill>
-            <p:spPr>
-              <a:xfrm>
-                <a:off x="2040583" y="7321030"/>
-                <a:ext cx="1371600" cy="965200"/>
-              </a:xfrm>
-              <a:prstGeom prst="rect">
-                <a:avLst/>
-              </a:prstGeom>
-            </p:spPr>
-          </p:pic>
-          <p:pic>
-            <p:nvPicPr>
-              <p:cNvPr id="22" name="Picture 21"/>
-              <p:cNvPicPr>
-                <a:picLocks noChangeAspect="1"/>
-              </p:cNvPicPr>
-              <p:nvPr/>
-            </p:nvPicPr>
-            <p:blipFill>
-              <a:blip r:embed="rId6"/>
-              <a:stretch>
-                <a:fillRect/>
-              </a:stretch>
-            </p:blipFill>
-            <p:spPr>
-              <a:xfrm>
-                <a:off x="7374744" y="7307762"/>
-                <a:ext cx="1371600" cy="965200"/>
-              </a:xfrm>
-              <a:prstGeom prst="rect">
-                <a:avLst/>
-              </a:prstGeom>
-            </p:spPr>
-          </p:pic>
-          <p:sp>
-            <p:nvSpPr>
-              <p:cNvPr id="23" name="TextBox 22"/>
-              <p:cNvSpPr txBox="1"/>
-              <p:nvPr/>
-            </p:nvSpPr>
-            <p:spPr>
-              <a:xfrm>
-                <a:off x="1725339" y="2796288"/>
-                <a:ext cx="338554" cy="369332"/>
+                <a:off x="8871129" y="7087904"/>
+                <a:ext cx="721672" cy="276999"/>
               </a:xfrm>
               <a:prstGeom prst="rect">
                 <a:avLst/>
@@ -12892,14 +12893,14 @@
               <a:lstStyle/>
               <a:p>
                 <a:r>
-                  <a:rPr lang="en-US" sz="1800" dirty="0" smtClean="0">
+                  <a:rPr lang="en-US" sz="1200" dirty="0" smtClean="0">
                     <a:latin typeface="Helvetica" charset="0"/>
                     <a:ea typeface="Helvetica" charset="0"/>
                     <a:cs typeface="Helvetica" charset="0"/>
                   </a:rPr>
-                  <a:t>A</a:t>
+                  <a:t>Positive</a:t>
                 </a:r>
-                <a:endParaRPr lang="en-US" sz="1800" dirty="0">
+                <a:endParaRPr lang="en-US" sz="1200" dirty="0">
                   <a:latin typeface="Helvetica" charset="0"/>
                   <a:ea typeface="Helvetica" charset="0"/>
                   <a:cs typeface="Helvetica" charset="0"/>
@@ -12909,14 +12910,14 @@
           </p:sp>
           <p:sp>
             <p:nvSpPr>
-              <p:cNvPr id="24" name="TextBox 23"/>
+              <p:cNvPr id="19" name="TextBox 18"/>
               <p:cNvSpPr txBox="1"/>
               <p:nvPr/>
             </p:nvSpPr>
             <p:spPr>
               <a:xfrm>
-                <a:off x="7103107" y="6856784"/>
-                <a:ext cx="351378" cy="369332"/>
+                <a:off x="8883829" y="7420033"/>
+                <a:ext cx="788999" cy="276999"/>
               </a:xfrm>
               <a:prstGeom prst="rect">
                 <a:avLst/>
@@ -12930,14 +12931,14 @@
               <a:lstStyle/>
               <a:p>
                 <a:r>
-                  <a:rPr lang="en-US" sz="1800" dirty="0" smtClean="0">
+                  <a:rPr lang="en-US" sz="1200" dirty="0" smtClean="0">
                     <a:latin typeface="Helvetica" charset="0"/>
                     <a:ea typeface="Helvetica" charset="0"/>
                     <a:cs typeface="Helvetica" charset="0"/>
                   </a:rPr>
-                  <a:t>D</a:t>
+                  <a:t>Negative</a:t>
                 </a:r>
-                <a:endParaRPr lang="en-US" sz="1800" dirty="0">
+                <a:endParaRPr lang="en-US" sz="1200" dirty="0">
                   <a:latin typeface="Helvetica" charset="0"/>
                   <a:ea typeface="Helvetica" charset="0"/>
                   <a:cs typeface="Helvetica" charset="0"/>
@@ -12947,14 +12948,60 @@
           </p:sp>
           <p:sp>
             <p:nvSpPr>
-              <p:cNvPr id="25" name="TextBox 24"/>
+              <p:cNvPr id="20" name="Rectangle 19"/>
+              <p:cNvSpPr/>
+              <p:nvPr/>
+            </p:nvSpPr>
+            <p:spPr>
+              <a:xfrm>
+                <a:off x="8534999" y="6845739"/>
+                <a:ext cx="1231900" cy="912785"/>
+              </a:xfrm>
+              <a:prstGeom prst="rect">
+                <a:avLst/>
+              </a:prstGeom>
+              <a:noFill/>
+              <a:ln w="19050">
+                <a:solidFill>
+                  <a:schemeClr val="tx1"/>
+                </a:solidFill>
+              </a:ln>
+            </p:spPr>
+            <p:style>
+              <a:lnRef idx="2">
+                <a:schemeClr val="accent1">
+                  <a:shade val="50000"/>
+                </a:schemeClr>
+              </a:lnRef>
+              <a:fillRef idx="1">
+                <a:schemeClr val="accent1"/>
+              </a:fillRef>
+              <a:effectRef idx="0">
+                <a:schemeClr val="accent1"/>
+              </a:effectRef>
+              <a:fontRef idx="minor">
+                <a:schemeClr val="lt1"/>
+              </a:fontRef>
+            </p:style>
+            <p:txBody>
+              <a:bodyPr rtlCol="0" anchor="ctr"/>
+              <a:lstStyle/>
+              <a:p>
+                <a:pPr algn="ctr"/>
+                <a:endParaRPr lang="en-US"/>
+              </a:p>
+            </p:txBody>
+          </p:sp>
+          <p:sp>
+            <p:nvSpPr>
+              <p:cNvPr id="21" name="TextBox 20"/>
               <p:cNvSpPr txBox="1"/>
               <p:nvPr/>
             </p:nvSpPr>
             <p:spPr>
               <a:xfrm>
-                <a:off x="7103107" y="2796288"/>
-                <a:ext cx="351378" cy="369332"/>
+                <a:off x="8497508" y="6819900"/>
+                <a:ext cx="1319592" cy="307777"/>
               </a:xfrm>
               <a:prstGeom prst="rect">
                 <a:avLst/>
@@ -12968,18 +13015,129 @@
               <a:lstStyle/>
               <a:p>
                 <a:r>
-                  <a:rPr lang="en-US" sz="1800" dirty="0" smtClean="0">
+                  <a:rPr lang="en-US" sz="1400" dirty="0" smtClean="0">
                     <a:latin typeface="Helvetica" charset="0"/>
                     <a:ea typeface="Helvetica" charset="0"/>
                     <a:cs typeface="Helvetica" charset="0"/>
                   </a:rPr>
-                  <a:t>C</a:t>
+                  <a:t>Cline direction</a:t>
                 </a:r>
-                <a:endParaRPr lang="en-US" sz="1800" dirty="0">
+                <a:endParaRPr lang="en-US" sz="1400" dirty="0">
                   <a:latin typeface="Helvetica" charset="0"/>
                   <a:ea typeface="Helvetica" charset="0"/>
                   <a:cs typeface="Helvetica" charset="0"/>
                 </a:endParaRPr>
+              </a:p>
+            </p:txBody>
+          </p:sp>
+        </p:grpSp>
+        <p:grpSp>
+          <p:nvGrpSpPr>
+            <p:cNvPr id="23" name="Group 22"/>
+            <p:cNvGrpSpPr/>
+            <p:nvPr/>
+          </p:nvGrpSpPr>
+          <p:grpSpPr>
+            <a:xfrm>
+              <a:off x="1416683" y="6464300"/>
+              <a:ext cx="1319592" cy="938624"/>
+              <a:chOff x="8497508" y="6819900"/>
+              <a:chExt cx="1319592" cy="938624"/>
+            </a:xfrm>
+          </p:grpSpPr>
+          <p:sp>
+            <p:nvSpPr>
+              <p:cNvPr id="24" name="Triangle 23"/>
+              <p:cNvSpPr/>
+              <p:nvPr/>
+            </p:nvSpPr>
+            <p:spPr>
+              <a:xfrm>
+                <a:off x="8642026" y="7137901"/>
+                <a:ext cx="218072" cy="187993"/>
+              </a:xfrm>
+              <a:prstGeom prst="triangle">
+                <a:avLst/>
+              </a:prstGeom>
+              <a:solidFill>
+                <a:schemeClr val="bg1"/>
+              </a:solidFill>
+              <a:ln>
+                <a:solidFill>
+                  <a:schemeClr val="tx1"/>
+                </a:solidFill>
+              </a:ln>
+            </p:spPr>
+            <p:style>
+              <a:lnRef idx="2">
+                <a:schemeClr val="accent1">
+                  <a:shade val="50000"/>
+                </a:schemeClr>
+              </a:lnRef>
+              <a:fillRef idx="1">
+                <a:schemeClr val="accent1"/>
+              </a:fillRef>
+              <a:effectRef idx="0">
+                <a:schemeClr val="accent1"/>
+              </a:effectRef>
+              <a:fontRef idx="minor">
+                <a:schemeClr val="lt1"/>
+              </a:fontRef>
+            </p:style>
+            <p:txBody>
+              <a:bodyPr rtlCol="0" anchor="ctr"/>
+              <a:lstStyle/>
+              <a:p>
+                <a:pPr algn="ctr"/>
+                <a:endParaRPr lang="en-US"/>
+              </a:p>
+            </p:txBody>
+          </p:sp>
+          <p:sp>
+            <p:nvSpPr>
+              <p:cNvPr id="25" name="Triangle 24"/>
+              <p:cNvSpPr/>
+              <p:nvPr/>
+            </p:nvSpPr>
+            <p:spPr>
+              <a:xfrm rot="10800000">
+                <a:off x="8638414" y="7461007"/>
+                <a:ext cx="219600" cy="187200"/>
+              </a:xfrm>
+              <a:prstGeom prst="triangle">
+                <a:avLst/>
+              </a:prstGeom>
+              <a:solidFill>
+                <a:schemeClr val="tx1"/>
+              </a:solidFill>
+              <a:ln>
+                <a:solidFill>
+                  <a:schemeClr val="tx1"/>
+                </a:solidFill>
+              </a:ln>
+            </p:spPr>
+            <p:style>
+              <a:lnRef idx="2">
+                <a:schemeClr val="accent1">
+                  <a:shade val="50000"/>
+                </a:schemeClr>
+              </a:lnRef>
+              <a:fillRef idx="1">
+                <a:schemeClr val="accent1"/>
+              </a:fillRef>
+              <a:effectRef idx="0">
+                <a:schemeClr val="accent1"/>
+              </a:effectRef>
+              <a:fontRef idx="minor">
+                <a:schemeClr val="lt1"/>
+              </a:fontRef>
+            </p:style>
+            <p:txBody>
+              <a:bodyPr rtlCol="0" anchor="ctr"/>
+              <a:lstStyle/>
+              <a:p>
+                <a:pPr algn="ctr"/>
+                <a:endParaRPr lang="en-US"/>
               </a:p>
             </p:txBody>
           </p:sp>
@@ -12991,8 +13149,8 @@
             </p:nvSpPr>
             <p:spPr>
               <a:xfrm>
-                <a:off x="1729000" y="6856784"/>
-                <a:ext cx="338554" cy="369332"/>
+                <a:off x="8871129" y="7087904"/>
+                <a:ext cx="721672" cy="276999"/>
               </a:xfrm>
               <a:prstGeom prst="rect">
                 <a:avLst/>
@@ -13006,14 +13164,136 @@
               <a:lstStyle/>
               <a:p>
                 <a:r>
-                  <a:rPr lang="en-US" sz="1800" dirty="0" smtClean="0">
+                  <a:rPr lang="en-US" sz="1200" dirty="0" smtClean="0">
                     <a:latin typeface="Helvetica" charset="0"/>
                     <a:ea typeface="Helvetica" charset="0"/>
                     <a:cs typeface="Helvetica" charset="0"/>
                   </a:rPr>
-                  <a:t>B</a:t>
+                  <a:t>Positive</a:t>
                 </a:r>
-                <a:endParaRPr lang="en-US" sz="1800" dirty="0">
+                <a:endParaRPr lang="en-US" sz="1200" dirty="0">
+                  <a:latin typeface="Helvetica" charset="0"/>
+                  <a:ea typeface="Helvetica" charset="0"/>
+                  <a:cs typeface="Helvetica" charset="0"/>
+                </a:endParaRPr>
+              </a:p>
+            </p:txBody>
+          </p:sp>
+          <p:sp>
+            <p:nvSpPr>
+              <p:cNvPr id="27" name="TextBox 26"/>
+              <p:cNvSpPr txBox="1"/>
+              <p:nvPr/>
+            </p:nvSpPr>
+            <p:spPr>
+              <a:xfrm>
+                <a:off x="8883829" y="7420033"/>
+                <a:ext cx="788999" cy="276999"/>
+              </a:xfrm>
+              <a:prstGeom prst="rect">
+                <a:avLst/>
+              </a:prstGeom>
+              <a:noFill/>
+            </p:spPr>
+            <p:txBody>
+              <a:bodyPr wrap="none" rtlCol="0">
+                <a:spAutoFit/>
+              </a:bodyPr>
+              <a:lstStyle/>
+              <a:p>
+                <a:r>
+                  <a:rPr lang="en-US" sz="1200" dirty="0" smtClean="0">
+                    <a:latin typeface="Helvetica" charset="0"/>
+                    <a:ea typeface="Helvetica" charset="0"/>
+                    <a:cs typeface="Helvetica" charset="0"/>
+                  </a:rPr>
+                  <a:t>Negative</a:t>
+                </a:r>
+                <a:endParaRPr lang="en-US" sz="1200" dirty="0">
+                  <a:latin typeface="Helvetica" charset="0"/>
+                  <a:ea typeface="Helvetica" charset="0"/>
+                  <a:cs typeface="Helvetica" charset="0"/>
+                </a:endParaRPr>
+              </a:p>
+            </p:txBody>
+          </p:sp>
+          <p:sp>
+            <p:nvSpPr>
+              <p:cNvPr id="28" name="Rectangle 27"/>
+              <p:cNvSpPr/>
+              <p:nvPr/>
+            </p:nvSpPr>
+            <p:spPr>
+              <a:xfrm>
+                <a:off x="8534999" y="6845739"/>
+                <a:ext cx="1231900" cy="912785"/>
+              </a:xfrm>
+              <a:prstGeom prst="rect">
+                <a:avLst/>
+              </a:prstGeom>
+              <a:noFill/>
+              <a:ln w="19050">
+                <a:solidFill>
+                  <a:schemeClr val="tx1"/>
+                </a:solidFill>
+              </a:ln>
+            </p:spPr>
+            <p:style>
+              <a:lnRef idx="2">
+                <a:schemeClr val="accent1">
+                  <a:shade val="50000"/>
+                </a:schemeClr>
+              </a:lnRef>
+              <a:fillRef idx="1">
+                <a:schemeClr val="accent1"/>
+              </a:fillRef>
+              <a:effectRef idx="0">
+                <a:schemeClr val="accent1"/>
+              </a:effectRef>
+              <a:fontRef idx="minor">
+                <a:schemeClr val="lt1"/>
+              </a:fontRef>
+            </p:style>
+            <p:txBody>
+              <a:bodyPr rtlCol="0" anchor="ctr"/>
+              <a:lstStyle/>
+              <a:p>
+                <a:pPr algn="ctr"/>
+                <a:endParaRPr lang="en-US"/>
+              </a:p>
+            </p:txBody>
+          </p:sp>
+          <p:sp>
+            <p:nvSpPr>
+              <p:cNvPr id="29" name="TextBox 28"/>
+              <p:cNvSpPr txBox="1"/>
+              <p:nvPr/>
+            </p:nvSpPr>
+            <p:spPr>
+              <a:xfrm>
+                <a:off x="8497508" y="6819900"/>
+                <a:ext cx="1319592" cy="307777"/>
+              </a:xfrm>
+              <a:prstGeom prst="rect">
+                <a:avLst/>
+              </a:prstGeom>
+              <a:noFill/>
+            </p:spPr>
+            <p:txBody>
+              <a:bodyPr wrap="none" rtlCol="0">
+                <a:spAutoFit/>
+              </a:bodyPr>
+              <a:lstStyle/>
+              <a:p>
+                <a:r>
+                  <a:rPr lang="en-US" sz="1400" dirty="0" smtClean="0">
+                    <a:latin typeface="Helvetica" charset="0"/>
+                    <a:ea typeface="Helvetica" charset="0"/>
+                    <a:cs typeface="Helvetica" charset="0"/>
+                  </a:rPr>
+                  <a:t>Cline direction</a:t>
+                </a:r>
+                <a:endParaRPr lang="en-US" sz="1400" dirty="0">
                   <a:latin typeface="Helvetica" charset="0"/>
                   <a:ea typeface="Helvetica" charset="0"/>
                   <a:cs typeface="Helvetica" charset="0"/>
@@ -13022,59 +13302,1021 @@
             </p:txBody>
           </p:sp>
         </p:grpSp>
-        <p:pic>
-          <p:nvPicPr>
-            <p:cNvPr id="2" name="Picture 1"/>
-            <p:cNvPicPr>
-              <a:picLocks noChangeAspect="1"/>
-            </p:cNvPicPr>
+        <p:sp>
+          <p:nvSpPr>
+            <p:cNvPr id="32" name="TextBox 31"/>
+            <p:cNvSpPr txBox="1"/>
             <p:nvPr/>
-          </p:nvPicPr>
-          <p:blipFill>
-            <a:blip r:embed="rId7"/>
-            <a:stretch>
-              <a:fillRect/>
-            </a:stretch>
-          </p:blipFill>
+          </p:nvSpPr>
           <p:spPr>
             <a:xfrm>
-              <a:off x="7434305" y="3230366"/>
-              <a:ext cx="2247900" cy="952500"/>
+              <a:off x="1188144" y="1968974"/>
+              <a:ext cx="338554" cy="369332"/>
             </a:xfrm>
             <a:prstGeom prst="rect">
               <a:avLst/>
             </a:prstGeom>
+            <a:noFill/>
           </p:spPr>
-        </p:pic>
-        <p:pic>
-          <p:nvPicPr>
-            <p:cNvPr id="27" name="Picture 26"/>
-            <p:cNvPicPr>
-              <a:picLocks noChangeAspect="1"/>
-            </p:cNvPicPr>
+          <p:txBody>
+            <a:bodyPr wrap="none" rtlCol="0">
+              <a:spAutoFit/>
+            </a:bodyPr>
+            <a:lstStyle/>
+            <a:p>
+              <a:r>
+                <a:rPr lang="en-US" sz="1800" dirty="0" smtClean="0">
+                  <a:latin typeface="Helvetica" charset="0"/>
+                  <a:ea typeface="Helvetica" charset="0"/>
+                  <a:cs typeface="Helvetica" charset="0"/>
+                </a:rPr>
+                <a:t>A</a:t>
+              </a:r>
+              <a:endParaRPr lang="en-US" sz="1800" dirty="0">
+                <a:latin typeface="Helvetica" charset="0"/>
+                <a:ea typeface="Helvetica" charset="0"/>
+                <a:cs typeface="Helvetica" charset="0"/>
+              </a:endParaRPr>
+            </a:p>
+          </p:txBody>
+        </p:sp>
+        <p:sp>
+          <p:nvSpPr>
+            <p:cNvPr id="33" name="TextBox 32"/>
+            <p:cNvSpPr txBox="1"/>
             <p:nvPr/>
-          </p:nvPicPr>
-          <p:blipFill>
-            <a:blip r:embed="rId7"/>
-            <a:stretch>
-              <a:fillRect/>
-            </a:stretch>
-          </p:blipFill>
+          </p:nvSpPr>
           <p:spPr>
             <a:xfrm>
-              <a:off x="2065270" y="3232646"/>
-              <a:ext cx="2247900" cy="952500"/>
+              <a:off x="6633207" y="6075446"/>
+              <a:ext cx="351378" cy="369332"/>
             </a:xfrm>
             <a:prstGeom prst="rect">
               <a:avLst/>
             </a:prstGeom>
+            <a:noFill/>
           </p:spPr>
-        </p:pic>
+          <p:txBody>
+            <a:bodyPr wrap="none" rtlCol="0">
+              <a:spAutoFit/>
+            </a:bodyPr>
+            <a:lstStyle/>
+            <a:p>
+              <a:r>
+                <a:rPr lang="en-US" sz="1800" dirty="0" smtClean="0">
+                  <a:latin typeface="Helvetica" charset="0"/>
+                  <a:ea typeface="Helvetica" charset="0"/>
+                  <a:cs typeface="Helvetica" charset="0"/>
+                </a:rPr>
+                <a:t>D</a:t>
+              </a:r>
+              <a:endParaRPr lang="en-US" sz="1800" dirty="0">
+                <a:latin typeface="Helvetica" charset="0"/>
+                <a:ea typeface="Helvetica" charset="0"/>
+                <a:cs typeface="Helvetica" charset="0"/>
+              </a:endParaRPr>
+            </a:p>
+          </p:txBody>
+        </p:sp>
+        <p:sp>
+          <p:nvSpPr>
+            <p:cNvPr id="34" name="TextBox 33"/>
+            <p:cNvSpPr txBox="1"/>
+            <p:nvPr/>
+          </p:nvSpPr>
+          <p:spPr>
+            <a:xfrm>
+              <a:off x="6633207" y="1966993"/>
+              <a:ext cx="351378" cy="369332"/>
+            </a:xfrm>
+            <a:prstGeom prst="rect">
+              <a:avLst/>
+            </a:prstGeom>
+            <a:noFill/>
+          </p:spPr>
+          <p:txBody>
+            <a:bodyPr wrap="none" rtlCol="0">
+              <a:spAutoFit/>
+            </a:bodyPr>
+            <a:lstStyle/>
+            <a:p>
+              <a:r>
+                <a:rPr lang="en-US" sz="1800" dirty="0" smtClean="0">
+                  <a:latin typeface="Helvetica" charset="0"/>
+                  <a:ea typeface="Helvetica" charset="0"/>
+                  <a:cs typeface="Helvetica" charset="0"/>
+                </a:rPr>
+                <a:t>B</a:t>
+              </a:r>
+              <a:endParaRPr lang="en-US" sz="1800" dirty="0">
+                <a:latin typeface="Helvetica" charset="0"/>
+                <a:ea typeface="Helvetica" charset="0"/>
+                <a:cs typeface="Helvetica" charset="0"/>
+              </a:endParaRPr>
+            </a:p>
+          </p:txBody>
+        </p:sp>
+        <p:sp>
+          <p:nvSpPr>
+            <p:cNvPr id="35" name="TextBox 34"/>
+            <p:cNvSpPr txBox="1"/>
+            <p:nvPr/>
+          </p:nvSpPr>
+          <p:spPr>
+            <a:xfrm>
+              <a:off x="1189732" y="6071202"/>
+              <a:ext cx="351378" cy="369332"/>
+            </a:xfrm>
+            <a:prstGeom prst="rect">
+              <a:avLst/>
+            </a:prstGeom>
+            <a:noFill/>
+          </p:spPr>
+          <p:txBody>
+            <a:bodyPr wrap="none" rtlCol="0">
+              <a:spAutoFit/>
+            </a:bodyPr>
+            <a:lstStyle/>
+            <a:p>
+              <a:r>
+                <a:rPr lang="en-US" sz="1800" dirty="0" smtClean="0">
+                  <a:latin typeface="Helvetica" charset="0"/>
+                  <a:ea typeface="Helvetica" charset="0"/>
+                  <a:cs typeface="Helvetica" charset="0"/>
+                </a:rPr>
+                <a:t>C</a:t>
+              </a:r>
+              <a:endParaRPr lang="en-US" sz="1800" dirty="0">
+                <a:latin typeface="Helvetica" charset="0"/>
+                <a:ea typeface="Helvetica" charset="0"/>
+                <a:cs typeface="Helvetica" charset="0"/>
+              </a:endParaRPr>
+            </a:p>
+          </p:txBody>
+        </p:sp>
+        <p:grpSp>
+          <p:nvGrpSpPr>
+            <p:cNvPr id="36" name="Group 35"/>
+            <p:cNvGrpSpPr/>
+            <p:nvPr/>
+          </p:nvGrpSpPr>
+          <p:grpSpPr>
+            <a:xfrm>
+              <a:off x="1477832" y="2371251"/>
+              <a:ext cx="2411350" cy="970956"/>
+              <a:chOff x="5194300" y="2661244"/>
+              <a:chExt cx="2411350" cy="970956"/>
+            </a:xfrm>
+          </p:grpSpPr>
+          <p:cxnSp>
+            <p:nvCxnSpPr>
+              <p:cNvPr id="37" name="Straight Connector 36"/>
+              <p:cNvCxnSpPr/>
+              <p:nvPr/>
+            </p:nvCxnSpPr>
+            <p:spPr>
+              <a:xfrm>
+                <a:off x="5266605" y="3133391"/>
+                <a:ext cx="450000" cy="0"/>
+              </a:xfrm>
+              <a:prstGeom prst="line">
+                <a:avLst/>
+              </a:prstGeom>
+              <a:ln w="28575">
+                <a:solidFill>
+                  <a:schemeClr val="tx1"/>
+                </a:solidFill>
+                <a:prstDash val="dash"/>
+              </a:ln>
+            </p:spPr>
+            <p:style>
+              <a:lnRef idx="1">
+                <a:schemeClr val="accent1"/>
+              </a:lnRef>
+              <a:fillRef idx="0">
+                <a:schemeClr val="accent1"/>
+              </a:fillRef>
+              <a:effectRef idx="0">
+                <a:schemeClr val="accent1"/>
+              </a:effectRef>
+              <a:fontRef idx="minor">
+                <a:schemeClr val="tx1"/>
+              </a:fontRef>
+            </p:style>
+          </p:cxnSp>
+          <p:cxnSp>
+            <p:nvCxnSpPr>
+              <p:cNvPr id="38" name="Straight Connector 37"/>
+              <p:cNvCxnSpPr/>
+              <p:nvPr/>
+            </p:nvCxnSpPr>
+            <p:spPr>
+              <a:xfrm>
+                <a:off x="5270740" y="2835945"/>
+                <a:ext cx="450000" cy="0"/>
+              </a:xfrm>
+              <a:prstGeom prst="line">
+                <a:avLst/>
+              </a:prstGeom>
+              <a:ln w="28575">
+                <a:solidFill>
+                  <a:schemeClr val="tx1"/>
+                </a:solidFill>
+                <a:prstDash val="sysDot"/>
+              </a:ln>
+            </p:spPr>
+            <p:style>
+              <a:lnRef idx="1">
+                <a:schemeClr val="accent1"/>
+              </a:lnRef>
+              <a:fillRef idx="0">
+                <a:schemeClr val="accent1"/>
+              </a:fillRef>
+              <a:effectRef idx="0">
+                <a:schemeClr val="accent1"/>
+              </a:effectRef>
+              <a:fontRef idx="minor">
+                <a:schemeClr val="tx1"/>
+              </a:fontRef>
+            </p:style>
+          </p:cxnSp>
+          <p:sp>
+            <p:nvSpPr>
+              <p:cNvPr id="39" name="TextBox 38"/>
+              <p:cNvSpPr txBox="1"/>
+              <p:nvPr/>
+            </p:nvSpPr>
+            <p:spPr>
+              <a:xfrm>
+                <a:off x="5687649" y="2697446"/>
+                <a:ext cx="1588897" cy="276999"/>
+              </a:xfrm>
+              <a:prstGeom prst="rect">
+                <a:avLst/>
+              </a:prstGeom>
+              <a:noFill/>
+            </p:spPr>
+            <p:txBody>
+              <a:bodyPr wrap="none" rtlCol="0">
+                <a:spAutoFit/>
+              </a:bodyPr>
+              <a:lstStyle/>
+              <a:p>
+                <a:r>
+                  <a:rPr lang="en-US" sz="1200" dirty="0" smtClean="0">
+                    <a:latin typeface="Helvetica" charset="0"/>
+                    <a:ea typeface="Helvetica" charset="0"/>
+                    <a:cs typeface="Helvetica" charset="0"/>
+                  </a:rPr>
+                  <a:t>No migration (m = 0)</a:t>
+                </a:r>
+                <a:endParaRPr lang="en-US" sz="1200" dirty="0">
+                  <a:latin typeface="Helvetica" charset="0"/>
+                  <a:ea typeface="Helvetica" charset="0"/>
+                  <a:cs typeface="Helvetica" charset="0"/>
+                </a:endParaRPr>
+              </a:p>
+            </p:txBody>
+          </p:sp>
+          <p:sp>
+            <p:nvSpPr>
+              <p:cNvPr id="40" name="TextBox 39"/>
+              <p:cNvSpPr txBox="1"/>
+              <p:nvPr/>
+            </p:nvSpPr>
+            <p:spPr>
+              <a:xfrm>
+                <a:off x="5687649" y="2991263"/>
+                <a:ext cx="1887055" cy="276999"/>
+              </a:xfrm>
+              <a:prstGeom prst="rect">
+                <a:avLst/>
+              </a:prstGeom>
+              <a:noFill/>
+            </p:spPr>
+            <p:txBody>
+              <a:bodyPr wrap="none" rtlCol="0">
+                <a:spAutoFit/>
+              </a:bodyPr>
+              <a:lstStyle/>
+              <a:p>
+                <a:r>
+                  <a:rPr lang="en-US" sz="1200" dirty="0" smtClean="0">
+                    <a:latin typeface="Helvetica" charset="0"/>
+                    <a:ea typeface="Helvetica" charset="0"/>
+                    <a:cs typeface="Helvetica" charset="0"/>
+                  </a:rPr>
+                  <a:t>Low migration (m = 0.01)</a:t>
+                </a:r>
+                <a:endParaRPr lang="en-US" sz="1200" dirty="0">
+                  <a:latin typeface="Helvetica" charset="0"/>
+                  <a:ea typeface="Helvetica" charset="0"/>
+                  <a:cs typeface="Helvetica" charset="0"/>
+                </a:endParaRPr>
+              </a:p>
+            </p:txBody>
+          </p:sp>
+          <p:sp>
+            <p:nvSpPr>
+              <p:cNvPr id="41" name="TextBox 40"/>
+              <p:cNvSpPr txBox="1"/>
+              <p:nvPr/>
+            </p:nvSpPr>
+            <p:spPr>
+              <a:xfrm>
+                <a:off x="5684931" y="3319121"/>
+                <a:ext cx="1920719" cy="276999"/>
+              </a:xfrm>
+              <a:prstGeom prst="rect">
+                <a:avLst/>
+              </a:prstGeom>
+              <a:noFill/>
+            </p:spPr>
+            <p:txBody>
+              <a:bodyPr wrap="none" rtlCol="0">
+                <a:spAutoFit/>
+              </a:bodyPr>
+              <a:lstStyle/>
+              <a:p>
+                <a:r>
+                  <a:rPr lang="en-US" sz="1200" dirty="0" smtClean="0">
+                    <a:latin typeface="Helvetica" charset="0"/>
+                    <a:ea typeface="Helvetica" charset="0"/>
+                    <a:cs typeface="Helvetica" charset="0"/>
+                  </a:rPr>
+                  <a:t>High migration (m = 0.05)</a:t>
+                </a:r>
+                <a:endParaRPr lang="en-US" sz="1200" dirty="0">
+                  <a:latin typeface="Helvetica" charset="0"/>
+                  <a:ea typeface="Helvetica" charset="0"/>
+                  <a:cs typeface="Helvetica" charset="0"/>
+                </a:endParaRPr>
+              </a:p>
+            </p:txBody>
+          </p:sp>
+          <p:sp>
+            <p:nvSpPr>
+              <p:cNvPr id="42" name="Rectangle 41"/>
+              <p:cNvSpPr/>
+              <p:nvPr/>
+            </p:nvSpPr>
+            <p:spPr>
+              <a:xfrm>
+                <a:off x="5194300" y="2661244"/>
+                <a:ext cx="2336800" cy="970956"/>
+              </a:xfrm>
+              <a:prstGeom prst="rect">
+                <a:avLst/>
+              </a:prstGeom>
+              <a:noFill/>
+              <a:ln w="19050">
+                <a:solidFill>
+                  <a:schemeClr val="tx1"/>
+                </a:solidFill>
+              </a:ln>
+            </p:spPr>
+            <p:style>
+              <a:lnRef idx="2">
+                <a:schemeClr val="accent1">
+                  <a:shade val="50000"/>
+                </a:schemeClr>
+              </a:lnRef>
+              <a:fillRef idx="1">
+                <a:schemeClr val="accent1"/>
+              </a:fillRef>
+              <a:effectRef idx="0">
+                <a:schemeClr val="accent1"/>
+              </a:effectRef>
+              <a:fontRef idx="minor">
+                <a:schemeClr val="lt1"/>
+              </a:fontRef>
+            </p:style>
+            <p:txBody>
+              <a:bodyPr rtlCol="0" anchor="ctr"/>
+              <a:lstStyle/>
+              <a:p>
+                <a:pPr algn="ctr"/>
+                <a:endParaRPr lang="en-US"/>
+              </a:p>
+            </p:txBody>
+          </p:sp>
+          <p:sp>
+            <p:nvSpPr>
+              <p:cNvPr id="43" name="Rectangle 42"/>
+              <p:cNvSpPr/>
+              <p:nvPr/>
+            </p:nvSpPr>
+            <p:spPr>
+              <a:xfrm>
+                <a:off x="5420857" y="3056103"/>
+                <a:ext cx="154379" cy="154379"/>
+              </a:xfrm>
+              <a:prstGeom prst="rect">
+                <a:avLst/>
+              </a:prstGeom>
+              <a:solidFill>
+                <a:schemeClr val="bg1">
+                  <a:lumMod val="75000"/>
+                </a:schemeClr>
+              </a:solidFill>
+              <a:ln>
+                <a:solidFill>
+                  <a:schemeClr val="tx1"/>
+                </a:solidFill>
+              </a:ln>
+            </p:spPr>
+            <p:style>
+              <a:lnRef idx="2">
+                <a:schemeClr val="accent1">
+                  <a:shade val="50000"/>
+                </a:schemeClr>
+              </a:lnRef>
+              <a:fillRef idx="1">
+                <a:schemeClr val="accent1"/>
+              </a:fillRef>
+              <a:effectRef idx="0">
+                <a:schemeClr val="accent1"/>
+              </a:effectRef>
+              <a:fontRef idx="minor">
+                <a:schemeClr val="lt1"/>
+              </a:fontRef>
+            </p:style>
+            <p:txBody>
+              <a:bodyPr rtlCol="0" anchor="ctr"/>
+              <a:lstStyle/>
+              <a:p>
+                <a:pPr algn="ctr"/>
+                <a:endParaRPr lang="en-US"/>
+              </a:p>
+            </p:txBody>
+          </p:sp>
+          <p:sp>
+            <p:nvSpPr>
+              <p:cNvPr id="44" name="Rectangle 43"/>
+              <p:cNvSpPr/>
+              <p:nvPr/>
+            </p:nvSpPr>
+            <p:spPr>
+              <a:xfrm rot="2700000">
+                <a:off x="5432166" y="3385538"/>
+                <a:ext cx="154800" cy="154800"/>
+              </a:xfrm>
+              <a:prstGeom prst="rect">
+                <a:avLst/>
+              </a:prstGeom>
+              <a:solidFill>
+                <a:schemeClr val="tx1"/>
+              </a:solidFill>
+              <a:ln>
+                <a:solidFill>
+                  <a:schemeClr val="tx1"/>
+                </a:solidFill>
+              </a:ln>
+            </p:spPr>
+            <p:style>
+              <a:lnRef idx="2">
+                <a:schemeClr val="accent1">
+                  <a:shade val="50000"/>
+                </a:schemeClr>
+              </a:lnRef>
+              <a:fillRef idx="1">
+                <a:schemeClr val="accent1"/>
+              </a:fillRef>
+              <a:effectRef idx="0">
+                <a:schemeClr val="accent1"/>
+              </a:effectRef>
+              <a:fontRef idx="minor">
+                <a:schemeClr val="lt1"/>
+              </a:fontRef>
+            </p:style>
+            <p:txBody>
+              <a:bodyPr rtlCol="0" anchor="ctr"/>
+              <a:lstStyle/>
+              <a:p>
+                <a:pPr algn="ctr"/>
+                <a:endParaRPr lang="en-US"/>
+              </a:p>
+            </p:txBody>
+          </p:sp>
+          <p:sp>
+            <p:nvSpPr>
+              <p:cNvPr id="45" name="Oval 44"/>
+              <p:cNvSpPr/>
+              <p:nvPr/>
+            </p:nvSpPr>
+            <p:spPr>
+              <a:xfrm>
+                <a:off x="5414870" y="2758775"/>
+                <a:ext cx="154800" cy="154800"/>
+              </a:xfrm>
+              <a:prstGeom prst="ellipse">
+                <a:avLst/>
+              </a:prstGeom>
+              <a:solidFill>
+                <a:schemeClr val="bg1"/>
+              </a:solidFill>
+              <a:ln>
+                <a:solidFill>
+                  <a:schemeClr val="tx1"/>
+                </a:solidFill>
+              </a:ln>
+            </p:spPr>
+            <p:style>
+              <a:lnRef idx="2">
+                <a:schemeClr val="accent1">
+                  <a:shade val="50000"/>
+                </a:schemeClr>
+              </a:lnRef>
+              <a:fillRef idx="1">
+                <a:schemeClr val="accent1"/>
+              </a:fillRef>
+              <a:effectRef idx="0">
+                <a:schemeClr val="accent1"/>
+              </a:effectRef>
+              <a:fontRef idx="minor">
+                <a:schemeClr val="lt1"/>
+              </a:fontRef>
+            </p:style>
+            <p:txBody>
+              <a:bodyPr rtlCol="0" anchor="ctr"/>
+              <a:lstStyle/>
+              <a:p>
+                <a:pPr algn="ctr"/>
+                <a:endParaRPr lang="en-US"/>
+              </a:p>
+            </p:txBody>
+          </p:sp>
+          <p:cxnSp>
+            <p:nvCxnSpPr>
+              <p:cNvPr id="46" name="Straight Connector 45"/>
+              <p:cNvCxnSpPr/>
+              <p:nvPr/>
+            </p:nvCxnSpPr>
+            <p:spPr>
+              <a:xfrm>
+                <a:off x="5266605" y="3457620"/>
+                <a:ext cx="450000" cy="0"/>
+              </a:xfrm>
+              <a:prstGeom prst="line">
+                <a:avLst/>
+              </a:prstGeom>
+              <a:ln w="28575">
+                <a:solidFill>
+                  <a:schemeClr val="tx1"/>
+                </a:solidFill>
+                <a:prstDash val="solid"/>
+              </a:ln>
+            </p:spPr>
+            <p:style>
+              <a:lnRef idx="1">
+                <a:schemeClr val="accent1"/>
+              </a:lnRef>
+              <a:fillRef idx="0">
+                <a:schemeClr val="accent1"/>
+              </a:fillRef>
+              <a:effectRef idx="0">
+                <a:schemeClr val="accent1"/>
+              </a:effectRef>
+              <a:fontRef idx="minor">
+                <a:schemeClr val="tx1"/>
+              </a:fontRef>
+            </p:style>
+          </p:cxnSp>
+        </p:grpSp>
+        <p:grpSp>
+          <p:nvGrpSpPr>
+            <p:cNvPr id="47" name="Group 46"/>
+            <p:cNvGrpSpPr/>
+            <p:nvPr/>
+          </p:nvGrpSpPr>
+          <p:grpSpPr>
+            <a:xfrm>
+              <a:off x="6888032" y="2371251"/>
+              <a:ext cx="2411350" cy="970956"/>
+              <a:chOff x="5194300" y="2661244"/>
+              <a:chExt cx="2411350" cy="970956"/>
+            </a:xfrm>
+          </p:grpSpPr>
+          <p:cxnSp>
+            <p:nvCxnSpPr>
+              <p:cNvPr id="48" name="Straight Connector 47"/>
+              <p:cNvCxnSpPr/>
+              <p:nvPr/>
+            </p:nvCxnSpPr>
+            <p:spPr>
+              <a:xfrm>
+                <a:off x="5266605" y="3133391"/>
+                <a:ext cx="450000" cy="0"/>
+              </a:xfrm>
+              <a:prstGeom prst="line">
+                <a:avLst/>
+              </a:prstGeom>
+              <a:ln w="28575">
+                <a:solidFill>
+                  <a:schemeClr val="tx1"/>
+                </a:solidFill>
+                <a:prstDash val="dash"/>
+              </a:ln>
+            </p:spPr>
+            <p:style>
+              <a:lnRef idx="1">
+                <a:schemeClr val="accent1"/>
+              </a:lnRef>
+              <a:fillRef idx="0">
+                <a:schemeClr val="accent1"/>
+              </a:fillRef>
+              <a:effectRef idx="0">
+                <a:schemeClr val="accent1"/>
+              </a:effectRef>
+              <a:fontRef idx="minor">
+                <a:schemeClr val="tx1"/>
+              </a:fontRef>
+            </p:style>
+          </p:cxnSp>
+          <p:cxnSp>
+            <p:nvCxnSpPr>
+              <p:cNvPr id="49" name="Straight Connector 48"/>
+              <p:cNvCxnSpPr/>
+              <p:nvPr/>
+            </p:nvCxnSpPr>
+            <p:spPr>
+              <a:xfrm>
+                <a:off x="5270740" y="2835945"/>
+                <a:ext cx="450000" cy="0"/>
+              </a:xfrm>
+              <a:prstGeom prst="line">
+                <a:avLst/>
+              </a:prstGeom>
+              <a:ln w="28575">
+                <a:solidFill>
+                  <a:schemeClr val="tx1"/>
+                </a:solidFill>
+                <a:prstDash val="sysDot"/>
+              </a:ln>
+            </p:spPr>
+            <p:style>
+              <a:lnRef idx="1">
+                <a:schemeClr val="accent1"/>
+              </a:lnRef>
+              <a:fillRef idx="0">
+                <a:schemeClr val="accent1"/>
+              </a:fillRef>
+              <a:effectRef idx="0">
+                <a:schemeClr val="accent1"/>
+              </a:effectRef>
+              <a:fontRef idx="minor">
+                <a:schemeClr val="tx1"/>
+              </a:fontRef>
+            </p:style>
+          </p:cxnSp>
+          <p:sp>
+            <p:nvSpPr>
+              <p:cNvPr id="50" name="TextBox 49"/>
+              <p:cNvSpPr txBox="1"/>
+              <p:nvPr/>
+            </p:nvSpPr>
+            <p:spPr>
+              <a:xfrm>
+                <a:off x="5687649" y="2697446"/>
+                <a:ext cx="1588897" cy="276999"/>
+              </a:xfrm>
+              <a:prstGeom prst="rect">
+                <a:avLst/>
+              </a:prstGeom>
+              <a:noFill/>
+            </p:spPr>
+            <p:txBody>
+              <a:bodyPr wrap="none" rtlCol="0">
+                <a:spAutoFit/>
+              </a:bodyPr>
+              <a:lstStyle/>
+              <a:p>
+                <a:r>
+                  <a:rPr lang="en-US" sz="1200" dirty="0" smtClean="0">
+                    <a:latin typeface="Helvetica" charset="0"/>
+                    <a:ea typeface="Helvetica" charset="0"/>
+                    <a:cs typeface="Helvetica" charset="0"/>
+                  </a:rPr>
+                  <a:t>No migration (m = 0)</a:t>
+                </a:r>
+                <a:endParaRPr lang="en-US" sz="1200" dirty="0">
+                  <a:latin typeface="Helvetica" charset="0"/>
+                  <a:ea typeface="Helvetica" charset="0"/>
+                  <a:cs typeface="Helvetica" charset="0"/>
+                </a:endParaRPr>
+              </a:p>
+            </p:txBody>
+          </p:sp>
+          <p:sp>
+            <p:nvSpPr>
+              <p:cNvPr id="51" name="TextBox 50"/>
+              <p:cNvSpPr txBox="1"/>
+              <p:nvPr/>
+            </p:nvSpPr>
+            <p:spPr>
+              <a:xfrm>
+                <a:off x="5687649" y="2991263"/>
+                <a:ext cx="1887055" cy="276999"/>
+              </a:xfrm>
+              <a:prstGeom prst="rect">
+                <a:avLst/>
+              </a:prstGeom>
+              <a:noFill/>
+            </p:spPr>
+            <p:txBody>
+              <a:bodyPr wrap="none" rtlCol="0">
+                <a:spAutoFit/>
+              </a:bodyPr>
+              <a:lstStyle/>
+              <a:p>
+                <a:r>
+                  <a:rPr lang="en-US" sz="1200" dirty="0" smtClean="0">
+                    <a:latin typeface="Helvetica" charset="0"/>
+                    <a:ea typeface="Helvetica" charset="0"/>
+                    <a:cs typeface="Helvetica" charset="0"/>
+                  </a:rPr>
+                  <a:t>Low migration (m = 0.01)</a:t>
+                </a:r>
+                <a:endParaRPr lang="en-US" sz="1200" dirty="0">
+                  <a:latin typeface="Helvetica" charset="0"/>
+                  <a:ea typeface="Helvetica" charset="0"/>
+                  <a:cs typeface="Helvetica" charset="0"/>
+                </a:endParaRPr>
+              </a:p>
+            </p:txBody>
+          </p:sp>
+          <p:sp>
+            <p:nvSpPr>
+              <p:cNvPr id="52" name="TextBox 51"/>
+              <p:cNvSpPr txBox="1"/>
+              <p:nvPr/>
+            </p:nvSpPr>
+            <p:spPr>
+              <a:xfrm>
+                <a:off x="5684931" y="3319121"/>
+                <a:ext cx="1920719" cy="276999"/>
+              </a:xfrm>
+              <a:prstGeom prst="rect">
+                <a:avLst/>
+              </a:prstGeom>
+              <a:noFill/>
+            </p:spPr>
+            <p:txBody>
+              <a:bodyPr wrap="none" rtlCol="0">
+                <a:spAutoFit/>
+              </a:bodyPr>
+              <a:lstStyle/>
+              <a:p>
+                <a:r>
+                  <a:rPr lang="en-US" sz="1200" dirty="0" smtClean="0">
+                    <a:latin typeface="Helvetica" charset="0"/>
+                    <a:ea typeface="Helvetica" charset="0"/>
+                    <a:cs typeface="Helvetica" charset="0"/>
+                  </a:rPr>
+                  <a:t>High migration (m = 0.05)</a:t>
+                </a:r>
+                <a:endParaRPr lang="en-US" sz="1200" dirty="0">
+                  <a:latin typeface="Helvetica" charset="0"/>
+                  <a:ea typeface="Helvetica" charset="0"/>
+                  <a:cs typeface="Helvetica" charset="0"/>
+                </a:endParaRPr>
+              </a:p>
+            </p:txBody>
+          </p:sp>
+          <p:sp>
+            <p:nvSpPr>
+              <p:cNvPr id="53" name="Rectangle 52"/>
+              <p:cNvSpPr/>
+              <p:nvPr/>
+            </p:nvSpPr>
+            <p:spPr>
+              <a:xfrm>
+                <a:off x="5194300" y="2661244"/>
+                <a:ext cx="2336800" cy="970956"/>
+              </a:xfrm>
+              <a:prstGeom prst="rect">
+                <a:avLst/>
+              </a:prstGeom>
+              <a:noFill/>
+              <a:ln w="19050">
+                <a:solidFill>
+                  <a:schemeClr val="tx1"/>
+                </a:solidFill>
+              </a:ln>
+            </p:spPr>
+            <p:style>
+              <a:lnRef idx="2">
+                <a:schemeClr val="accent1">
+                  <a:shade val="50000"/>
+                </a:schemeClr>
+              </a:lnRef>
+              <a:fillRef idx="1">
+                <a:schemeClr val="accent1"/>
+              </a:fillRef>
+              <a:effectRef idx="0">
+                <a:schemeClr val="accent1"/>
+              </a:effectRef>
+              <a:fontRef idx="minor">
+                <a:schemeClr val="lt1"/>
+              </a:fontRef>
+            </p:style>
+            <p:txBody>
+              <a:bodyPr rtlCol="0" anchor="ctr"/>
+              <a:lstStyle/>
+              <a:p>
+                <a:pPr algn="ctr"/>
+                <a:endParaRPr lang="en-US"/>
+              </a:p>
+            </p:txBody>
+          </p:sp>
+          <p:sp>
+            <p:nvSpPr>
+              <p:cNvPr id="54" name="Rectangle 53"/>
+              <p:cNvSpPr/>
+              <p:nvPr/>
+            </p:nvSpPr>
+            <p:spPr>
+              <a:xfrm>
+                <a:off x="5420857" y="3056103"/>
+                <a:ext cx="154379" cy="154379"/>
+              </a:xfrm>
+              <a:prstGeom prst="rect">
+                <a:avLst/>
+              </a:prstGeom>
+              <a:solidFill>
+                <a:schemeClr val="bg1">
+                  <a:lumMod val="75000"/>
+                </a:schemeClr>
+              </a:solidFill>
+              <a:ln>
+                <a:solidFill>
+                  <a:schemeClr val="tx1"/>
+                </a:solidFill>
+              </a:ln>
+            </p:spPr>
+            <p:style>
+              <a:lnRef idx="2">
+                <a:schemeClr val="accent1">
+                  <a:shade val="50000"/>
+                </a:schemeClr>
+              </a:lnRef>
+              <a:fillRef idx="1">
+                <a:schemeClr val="accent1"/>
+              </a:fillRef>
+              <a:effectRef idx="0">
+                <a:schemeClr val="accent1"/>
+              </a:effectRef>
+              <a:fontRef idx="minor">
+                <a:schemeClr val="lt1"/>
+              </a:fontRef>
+            </p:style>
+            <p:txBody>
+              <a:bodyPr rtlCol="0" anchor="ctr"/>
+              <a:lstStyle/>
+              <a:p>
+                <a:pPr algn="ctr"/>
+                <a:endParaRPr lang="en-US"/>
+              </a:p>
+            </p:txBody>
+          </p:sp>
+          <p:sp>
+            <p:nvSpPr>
+              <p:cNvPr id="55" name="Rectangle 54"/>
+              <p:cNvSpPr/>
+              <p:nvPr/>
+            </p:nvSpPr>
+            <p:spPr>
+              <a:xfrm rot="2700000">
+                <a:off x="5432166" y="3385538"/>
+                <a:ext cx="154800" cy="154800"/>
+              </a:xfrm>
+              <a:prstGeom prst="rect">
+                <a:avLst/>
+              </a:prstGeom>
+              <a:solidFill>
+                <a:schemeClr val="tx1"/>
+              </a:solidFill>
+              <a:ln>
+                <a:solidFill>
+                  <a:schemeClr val="tx1"/>
+                </a:solidFill>
+              </a:ln>
+            </p:spPr>
+            <p:style>
+              <a:lnRef idx="2">
+                <a:schemeClr val="accent1">
+                  <a:shade val="50000"/>
+                </a:schemeClr>
+              </a:lnRef>
+              <a:fillRef idx="1">
+                <a:schemeClr val="accent1"/>
+              </a:fillRef>
+              <a:effectRef idx="0">
+                <a:schemeClr val="accent1"/>
+              </a:effectRef>
+              <a:fontRef idx="minor">
+                <a:schemeClr val="lt1"/>
+              </a:fontRef>
+            </p:style>
+            <p:txBody>
+              <a:bodyPr rtlCol="0" anchor="ctr"/>
+              <a:lstStyle/>
+              <a:p>
+                <a:pPr algn="ctr"/>
+                <a:endParaRPr lang="en-US"/>
+              </a:p>
+            </p:txBody>
+          </p:sp>
+          <p:sp>
+            <p:nvSpPr>
+              <p:cNvPr id="56" name="Oval 55"/>
+              <p:cNvSpPr/>
+              <p:nvPr/>
+            </p:nvSpPr>
+            <p:spPr>
+              <a:xfrm>
+                <a:off x="5414870" y="2758775"/>
+                <a:ext cx="154800" cy="154800"/>
+              </a:xfrm>
+              <a:prstGeom prst="ellipse">
+                <a:avLst/>
+              </a:prstGeom>
+              <a:solidFill>
+                <a:schemeClr val="bg1"/>
+              </a:solidFill>
+              <a:ln>
+                <a:solidFill>
+                  <a:schemeClr val="tx1"/>
+                </a:solidFill>
+              </a:ln>
+            </p:spPr>
+            <p:style>
+              <a:lnRef idx="2">
+                <a:schemeClr val="accent1">
+                  <a:shade val="50000"/>
+                </a:schemeClr>
+              </a:lnRef>
+              <a:fillRef idx="1">
+                <a:schemeClr val="accent1"/>
+              </a:fillRef>
+              <a:effectRef idx="0">
+                <a:schemeClr val="accent1"/>
+              </a:effectRef>
+              <a:fontRef idx="minor">
+                <a:schemeClr val="lt1"/>
+              </a:fontRef>
+            </p:style>
+            <p:txBody>
+              <a:bodyPr rtlCol="0" anchor="ctr"/>
+              <a:lstStyle/>
+              <a:p>
+                <a:pPr algn="ctr"/>
+                <a:endParaRPr lang="en-US"/>
+              </a:p>
+            </p:txBody>
+          </p:sp>
+          <p:cxnSp>
+            <p:nvCxnSpPr>
+              <p:cNvPr id="57" name="Straight Connector 56"/>
+              <p:cNvCxnSpPr/>
+              <p:nvPr/>
+            </p:nvCxnSpPr>
+            <p:spPr>
+              <a:xfrm>
+                <a:off x="5266605" y="3457620"/>
+                <a:ext cx="450000" cy="0"/>
+              </a:xfrm>
+              <a:prstGeom prst="line">
+                <a:avLst/>
+              </a:prstGeom>
+              <a:ln w="28575">
+                <a:solidFill>
+                  <a:schemeClr val="tx1"/>
+                </a:solidFill>
+                <a:prstDash val="solid"/>
+              </a:ln>
+            </p:spPr>
+            <p:style>
+              <a:lnRef idx="1">
+                <a:schemeClr val="accent1"/>
+              </a:lnRef>
+              <a:fillRef idx="0">
+                <a:schemeClr val="accent1"/>
+              </a:fillRef>
+              <a:effectRef idx="0">
+                <a:schemeClr val="accent1"/>
+              </a:effectRef>
+              <a:fontRef idx="minor">
+                <a:schemeClr val="tx1"/>
+              </a:fontRef>
+            </p:style>
+          </p:cxnSp>
+        </p:grpSp>
       </p:grpSp>
     </p:spTree>
     <p:extLst>
       <p:ext uri="{BB962C8B-B14F-4D97-AF65-F5344CB8AC3E}">
-        <p14:creationId xmlns:p14="http://schemas.microsoft.com/office/powerpoint/2010/main" val="510996650"/>
+        <p14:creationId xmlns:p14="http://schemas.microsoft.com/office/powerpoint/2010/main" val="1595524097"/>
       </p:ext>
     </p:extLst>
   </p:cSld>
@@ -13085,6 +14327,1021 @@
 </file>
 
 <file path=ppt/slides/slide8.xml><?xml version="1.0" encoding="utf-8"?>
+<p:sld xmlns:a="http://schemas.openxmlformats.org/drawingml/2006/main" xmlns:r="http://schemas.openxmlformats.org/officeDocument/2006/relationships" xmlns:p="http://schemas.openxmlformats.org/presentationml/2006/main">
+  <p:cSld>
+    <p:spTree>
+      <p:nvGrpSpPr>
+        <p:cNvPr id="1" name=""/>
+        <p:cNvGrpSpPr/>
+        <p:nvPr/>
+      </p:nvGrpSpPr>
+      <p:grpSpPr>
+        <a:xfrm>
+          <a:off x="0" y="0"/>
+          <a:ext cx="0" cy="0"/>
+          <a:chOff x="0" y="0"/>
+          <a:chExt cx="0" cy="0"/>
+        </a:xfrm>
+      </p:grpSpPr>
+      <p:grpSp>
+        <p:nvGrpSpPr>
+          <p:cNvPr id="31" name="Group 30"/>
+          <p:cNvGrpSpPr/>
+          <p:nvPr/>
+        </p:nvGrpSpPr>
+        <p:grpSpPr>
+          <a:xfrm>
+            <a:off x="2960263" y="622774"/>
+            <a:ext cx="5612237" cy="9278880"/>
+            <a:chOff x="2960263" y="622774"/>
+            <a:chExt cx="5612237" cy="9278880"/>
+          </a:xfrm>
+        </p:grpSpPr>
+        <p:pic>
+          <p:nvPicPr>
+            <p:cNvPr id="4" name="Picture 3"/>
+            <p:cNvPicPr>
+              <a:picLocks noChangeAspect="1"/>
+            </p:cNvPicPr>
+            <p:nvPr/>
+          </p:nvPicPr>
+          <p:blipFill rotWithShape="1">
+            <a:blip r:embed="rId2">
+              <a:extLst>
+                <a:ext uri="{28A0092B-C50C-407E-A947-70E740481C1C}">
+                  <a14:useLocalDpi xmlns:a14="http://schemas.microsoft.com/office/drawing/2010/main" val="0"/>
+                </a:ext>
+              </a:extLst>
+            </a:blip>
+            <a:srcRect l="5093" t="12731" b="16436"/>
+            <a:stretch/>
+          </p:blipFill>
+          <p:spPr>
+            <a:xfrm>
+              <a:off x="3365500" y="1028700"/>
+              <a:ext cx="5207000" cy="3886200"/>
+            </a:xfrm>
+            <a:prstGeom prst="rect">
+              <a:avLst/>
+            </a:prstGeom>
+          </p:spPr>
+        </p:pic>
+        <p:pic>
+          <p:nvPicPr>
+            <p:cNvPr id="5" name="Picture 4"/>
+            <p:cNvPicPr>
+              <a:picLocks noChangeAspect="1"/>
+            </p:cNvPicPr>
+            <p:nvPr/>
+          </p:nvPicPr>
+          <p:blipFill rotWithShape="1">
+            <a:blip r:embed="rId3">
+              <a:extLst>
+                <a:ext uri="{28A0092B-C50C-407E-A947-70E740481C1C}">
+                  <a14:useLocalDpi xmlns:a14="http://schemas.microsoft.com/office/drawing/2010/main" val="0"/>
+                </a:ext>
+              </a:extLst>
+            </a:blip>
+            <a:srcRect l="4861" t="11575" b="14815"/>
+            <a:stretch/>
+          </p:blipFill>
+          <p:spPr>
+            <a:xfrm>
+              <a:off x="3568700" y="5511800"/>
+              <a:ext cx="5003800" cy="4038600"/>
+            </a:xfrm>
+            <a:prstGeom prst="rect">
+              <a:avLst/>
+            </a:prstGeom>
+          </p:spPr>
+        </p:pic>
+        <p:sp>
+          <p:nvSpPr>
+            <p:cNvPr id="8" name="TextBox 7"/>
+            <p:cNvSpPr txBox="1"/>
+            <p:nvPr/>
+          </p:nvSpPr>
+          <p:spPr>
+            <a:xfrm rot="16200000">
+              <a:off x="2474112" y="2676723"/>
+              <a:ext cx="1351652" cy="353943"/>
+            </a:xfrm>
+            <a:prstGeom prst="rect">
+              <a:avLst/>
+            </a:prstGeom>
+            <a:solidFill>
+              <a:schemeClr val="bg1"/>
+            </a:solidFill>
+          </p:spPr>
+          <p:txBody>
+            <a:bodyPr wrap="none" rtlCol="0">
+              <a:spAutoFit/>
+            </a:bodyPr>
+            <a:lstStyle/>
+            <a:p>
+              <a:r>
+                <a:rPr lang="en-US" sz="1700" dirty="0" smtClean="0">
+                  <a:latin typeface="Helvetica" charset="0"/>
+                  <a:ea typeface="Helvetica" charset="0"/>
+                  <a:cs typeface="Helvetica" charset="0"/>
+                </a:rPr>
+                <a:t>Mean Slope</a:t>
+              </a:r>
+              <a:endParaRPr lang="en-US" sz="1700" dirty="0">
+                <a:latin typeface="Helvetica" charset="0"/>
+                <a:ea typeface="Helvetica" charset="0"/>
+                <a:cs typeface="Helvetica" charset="0"/>
+              </a:endParaRPr>
+            </a:p>
+          </p:txBody>
+        </p:sp>
+        <p:sp>
+          <p:nvSpPr>
+            <p:cNvPr id="9" name="TextBox 8"/>
+            <p:cNvSpPr txBox="1"/>
+            <p:nvPr/>
+          </p:nvSpPr>
+          <p:spPr>
+            <a:xfrm rot="16200000">
+              <a:off x="1556513" y="7022139"/>
+              <a:ext cx="3161443" cy="353943"/>
+            </a:xfrm>
+            <a:prstGeom prst="rect">
+              <a:avLst/>
+            </a:prstGeom>
+            <a:solidFill>
+              <a:schemeClr val="bg1"/>
+            </a:solidFill>
+          </p:spPr>
+          <p:txBody>
+            <a:bodyPr wrap="none" rtlCol="0">
+              <a:spAutoFit/>
+            </a:bodyPr>
+            <a:lstStyle/>
+            <a:p>
+              <a:r>
+                <a:rPr lang="en-US" sz="1700" dirty="0" smtClean="0">
+                  <a:latin typeface="Helvetica" charset="0"/>
+                  <a:ea typeface="Helvetica" charset="0"/>
+                  <a:cs typeface="Helvetica" charset="0"/>
+                </a:rPr>
+                <a:t>Proportion of significant slopes</a:t>
+              </a:r>
+              <a:endParaRPr lang="en-US" sz="1700" dirty="0">
+                <a:latin typeface="Helvetica" charset="0"/>
+                <a:ea typeface="Helvetica" charset="0"/>
+                <a:cs typeface="Helvetica" charset="0"/>
+              </a:endParaRPr>
+            </a:p>
+          </p:txBody>
+        </p:sp>
+        <p:grpSp>
+          <p:nvGrpSpPr>
+            <p:cNvPr id="10" name="Group 9"/>
+            <p:cNvGrpSpPr/>
+            <p:nvPr/>
+          </p:nvGrpSpPr>
+          <p:grpSpPr>
+            <a:xfrm>
+              <a:off x="3880483" y="5499100"/>
+              <a:ext cx="1319592" cy="938624"/>
+              <a:chOff x="8497508" y="6819900"/>
+              <a:chExt cx="1319592" cy="938624"/>
+            </a:xfrm>
+          </p:grpSpPr>
+          <p:sp>
+            <p:nvSpPr>
+              <p:cNvPr id="11" name="Triangle 10"/>
+              <p:cNvSpPr/>
+              <p:nvPr/>
+            </p:nvSpPr>
+            <p:spPr>
+              <a:xfrm>
+                <a:off x="8642026" y="7137901"/>
+                <a:ext cx="218072" cy="187993"/>
+              </a:xfrm>
+              <a:prstGeom prst="triangle">
+                <a:avLst/>
+              </a:prstGeom>
+              <a:solidFill>
+                <a:schemeClr val="bg1"/>
+              </a:solidFill>
+              <a:ln>
+                <a:solidFill>
+                  <a:schemeClr val="tx1"/>
+                </a:solidFill>
+              </a:ln>
+            </p:spPr>
+            <p:style>
+              <a:lnRef idx="2">
+                <a:schemeClr val="accent1">
+                  <a:shade val="50000"/>
+                </a:schemeClr>
+              </a:lnRef>
+              <a:fillRef idx="1">
+                <a:schemeClr val="accent1"/>
+              </a:fillRef>
+              <a:effectRef idx="0">
+                <a:schemeClr val="accent1"/>
+              </a:effectRef>
+              <a:fontRef idx="minor">
+                <a:schemeClr val="lt1"/>
+              </a:fontRef>
+            </p:style>
+            <p:txBody>
+              <a:bodyPr rtlCol="0" anchor="ctr"/>
+              <a:lstStyle/>
+              <a:p>
+                <a:pPr algn="ctr"/>
+                <a:endParaRPr lang="en-US"/>
+              </a:p>
+            </p:txBody>
+          </p:sp>
+          <p:sp>
+            <p:nvSpPr>
+              <p:cNvPr id="12" name="Triangle 11"/>
+              <p:cNvSpPr/>
+              <p:nvPr/>
+            </p:nvSpPr>
+            <p:spPr>
+              <a:xfrm rot="10800000">
+                <a:off x="8638414" y="7461007"/>
+                <a:ext cx="219600" cy="187200"/>
+              </a:xfrm>
+              <a:prstGeom prst="triangle">
+                <a:avLst/>
+              </a:prstGeom>
+              <a:solidFill>
+                <a:schemeClr val="tx1"/>
+              </a:solidFill>
+              <a:ln>
+                <a:solidFill>
+                  <a:schemeClr val="tx1"/>
+                </a:solidFill>
+              </a:ln>
+            </p:spPr>
+            <p:style>
+              <a:lnRef idx="2">
+                <a:schemeClr val="accent1">
+                  <a:shade val="50000"/>
+                </a:schemeClr>
+              </a:lnRef>
+              <a:fillRef idx="1">
+                <a:schemeClr val="accent1"/>
+              </a:fillRef>
+              <a:effectRef idx="0">
+                <a:schemeClr val="accent1"/>
+              </a:effectRef>
+              <a:fontRef idx="minor">
+                <a:schemeClr val="lt1"/>
+              </a:fontRef>
+            </p:style>
+            <p:txBody>
+              <a:bodyPr rtlCol="0" anchor="ctr"/>
+              <a:lstStyle/>
+              <a:p>
+                <a:pPr algn="ctr"/>
+                <a:endParaRPr lang="en-US"/>
+              </a:p>
+            </p:txBody>
+          </p:sp>
+          <p:sp>
+            <p:nvSpPr>
+              <p:cNvPr id="13" name="TextBox 12"/>
+              <p:cNvSpPr txBox="1"/>
+              <p:nvPr/>
+            </p:nvSpPr>
+            <p:spPr>
+              <a:xfrm>
+                <a:off x="8871129" y="7087904"/>
+                <a:ext cx="721672" cy="276999"/>
+              </a:xfrm>
+              <a:prstGeom prst="rect">
+                <a:avLst/>
+              </a:prstGeom>
+              <a:noFill/>
+            </p:spPr>
+            <p:txBody>
+              <a:bodyPr wrap="none" rtlCol="0">
+                <a:spAutoFit/>
+              </a:bodyPr>
+              <a:lstStyle/>
+              <a:p>
+                <a:r>
+                  <a:rPr lang="en-US" sz="1200" dirty="0" smtClean="0">
+                    <a:latin typeface="Helvetica" charset="0"/>
+                    <a:ea typeface="Helvetica" charset="0"/>
+                    <a:cs typeface="Helvetica" charset="0"/>
+                  </a:rPr>
+                  <a:t>Positive</a:t>
+                </a:r>
+                <a:endParaRPr lang="en-US" sz="1200" dirty="0">
+                  <a:latin typeface="Helvetica" charset="0"/>
+                  <a:ea typeface="Helvetica" charset="0"/>
+                  <a:cs typeface="Helvetica" charset="0"/>
+                </a:endParaRPr>
+              </a:p>
+            </p:txBody>
+          </p:sp>
+          <p:sp>
+            <p:nvSpPr>
+              <p:cNvPr id="14" name="TextBox 13"/>
+              <p:cNvSpPr txBox="1"/>
+              <p:nvPr/>
+            </p:nvSpPr>
+            <p:spPr>
+              <a:xfrm>
+                <a:off x="8883829" y="7420033"/>
+                <a:ext cx="788999" cy="276999"/>
+              </a:xfrm>
+              <a:prstGeom prst="rect">
+                <a:avLst/>
+              </a:prstGeom>
+              <a:noFill/>
+            </p:spPr>
+            <p:txBody>
+              <a:bodyPr wrap="none" rtlCol="0">
+                <a:spAutoFit/>
+              </a:bodyPr>
+              <a:lstStyle/>
+              <a:p>
+                <a:r>
+                  <a:rPr lang="en-US" sz="1200" dirty="0" smtClean="0">
+                    <a:latin typeface="Helvetica" charset="0"/>
+                    <a:ea typeface="Helvetica" charset="0"/>
+                    <a:cs typeface="Helvetica" charset="0"/>
+                  </a:rPr>
+                  <a:t>Negative</a:t>
+                </a:r>
+                <a:endParaRPr lang="en-US" sz="1200" dirty="0">
+                  <a:latin typeface="Helvetica" charset="0"/>
+                  <a:ea typeface="Helvetica" charset="0"/>
+                  <a:cs typeface="Helvetica" charset="0"/>
+                </a:endParaRPr>
+              </a:p>
+            </p:txBody>
+          </p:sp>
+          <p:sp>
+            <p:nvSpPr>
+              <p:cNvPr id="15" name="Rectangle 14"/>
+              <p:cNvSpPr/>
+              <p:nvPr/>
+            </p:nvSpPr>
+            <p:spPr>
+              <a:xfrm>
+                <a:off x="8534999" y="6845739"/>
+                <a:ext cx="1231900" cy="912785"/>
+              </a:xfrm>
+              <a:prstGeom prst="rect">
+                <a:avLst/>
+              </a:prstGeom>
+              <a:noFill/>
+              <a:ln w="19050">
+                <a:solidFill>
+                  <a:schemeClr val="tx1"/>
+                </a:solidFill>
+              </a:ln>
+            </p:spPr>
+            <p:style>
+              <a:lnRef idx="2">
+                <a:schemeClr val="accent1">
+                  <a:shade val="50000"/>
+                </a:schemeClr>
+              </a:lnRef>
+              <a:fillRef idx="1">
+                <a:schemeClr val="accent1"/>
+              </a:fillRef>
+              <a:effectRef idx="0">
+                <a:schemeClr val="accent1"/>
+              </a:effectRef>
+              <a:fontRef idx="minor">
+                <a:schemeClr val="lt1"/>
+              </a:fontRef>
+            </p:style>
+            <p:txBody>
+              <a:bodyPr rtlCol="0" anchor="ctr"/>
+              <a:lstStyle/>
+              <a:p>
+                <a:pPr algn="ctr"/>
+                <a:endParaRPr lang="en-US"/>
+              </a:p>
+            </p:txBody>
+          </p:sp>
+          <p:sp>
+            <p:nvSpPr>
+              <p:cNvPr id="16" name="TextBox 15"/>
+              <p:cNvSpPr txBox="1"/>
+              <p:nvPr/>
+            </p:nvSpPr>
+            <p:spPr>
+              <a:xfrm>
+                <a:off x="8497508" y="6819900"/>
+                <a:ext cx="1319592" cy="307777"/>
+              </a:xfrm>
+              <a:prstGeom prst="rect">
+                <a:avLst/>
+              </a:prstGeom>
+              <a:noFill/>
+            </p:spPr>
+            <p:txBody>
+              <a:bodyPr wrap="none" rtlCol="0">
+                <a:spAutoFit/>
+              </a:bodyPr>
+              <a:lstStyle/>
+              <a:p>
+                <a:r>
+                  <a:rPr lang="en-US" sz="1400" dirty="0" smtClean="0">
+                    <a:latin typeface="Helvetica" charset="0"/>
+                    <a:ea typeface="Helvetica" charset="0"/>
+                    <a:cs typeface="Helvetica" charset="0"/>
+                  </a:rPr>
+                  <a:t>Cline direction</a:t>
+                </a:r>
+                <a:endParaRPr lang="en-US" sz="1400" dirty="0">
+                  <a:latin typeface="Helvetica" charset="0"/>
+                  <a:ea typeface="Helvetica" charset="0"/>
+                  <a:cs typeface="Helvetica" charset="0"/>
+                </a:endParaRPr>
+              </a:p>
+            </p:txBody>
+          </p:sp>
+        </p:grpSp>
+        <p:grpSp>
+          <p:nvGrpSpPr>
+            <p:cNvPr id="17" name="Group 16"/>
+            <p:cNvGrpSpPr/>
+            <p:nvPr/>
+          </p:nvGrpSpPr>
+          <p:grpSpPr>
+            <a:xfrm>
+              <a:off x="3941632" y="1037751"/>
+              <a:ext cx="2411350" cy="970956"/>
+              <a:chOff x="5194300" y="2661244"/>
+              <a:chExt cx="2411350" cy="970956"/>
+            </a:xfrm>
+          </p:grpSpPr>
+          <p:cxnSp>
+            <p:nvCxnSpPr>
+              <p:cNvPr id="18" name="Straight Connector 17"/>
+              <p:cNvCxnSpPr/>
+              <p:nvPr/>
+            </p:nvCxnSpPr>
+            <p:spPr>
+              <a:xfrm>
+                <a:off x="5266605" y="3133391"/>
+                <a:ext cx="450000" cy="0"/>
+              </a:xfrm>
+              <a:prstGeom prst="line">
+                <a:avLst/>
+              </a:prstGeom>
+              <a:ln w="28575">
+                <a:solidFill>
+                  <a:schemeClr val="tx1"/>
+                </a:solidFill>
+                <a:prstDash val="dash"/>
+              </a:ln>
+            </p:spPr>
+            <p:style>
+              <a:lnRef idx="1">
+                <a:schemeClr val="accent1"/>
+              </a:lnRef>
+              <a:fillRef idx="0">
+                <a:schemeClr val="accent1"/>
+              </a:fillRef>
+              <a:effectRef idx="0">
+                <a:schemeClr val="accent1"/>
+              </a:effectRef>
+              <a:fontRef idx="minor">
+                <a:schemeClr val="tx1"/>
+              </a:fontRef>
+            </p:style>
+          </p:cxnSp>
+          <p:cxnSp>
+            <p:nvCxnSpPr>
+              <p:cNvPr id="19" name="Straight Connector 18"/>
+              <p:cNvCxnSpPr/>
+              <p:nvPr/>
+            </p:nvCxnSpPr>
+            <p:spPr>
+              <a:xfrm>
+                <a:off x="5270740" y="2835945"/>
+                <a:ext cx="450000" cy="0"/>
+              </a:xfrm>
+              <a:prstGeom prst="line">
+                <a:avLst/>
+              </a:prstGeom>
+              <a:ln w="28575">
+                <a:solidFill>
+                  <a:schemeClr val="tx1"/>
+                </a:solidFill>
+                <a:prstDash val="sysDot"/>
+              </a:ln>
+            </p:spPr>
+            <p:style>
+              <a:lnRef idx="1">
+                <a:schemeClr val="accent1"/>
+              </a:lnRef>
+              <a:fillRef idx="0">
+                <a:schemeClr val="accent1"/>
+              </a:fillRef>
+              <a:effectRef idx="0">
+                <a:schemeClr val="accent1"/>
+              </a:effectRef>
+              <a:fontRef idx="minor">
+                <a:schemeClr val="tx1"/>
+              </a:fontRef>
+            </p:style>
+          </p:cxnSp>
+          <p:sp>
+            <p:nvSpPr>
+              <p:cNvPr id="20" name="TextBox 19"/>
+              <p:cNvSpPr txBox="1"/>
+              <p:nvPr/>
+            </p:nvSpPr>
+            <p:spPr>
+              <a:xfrm>
+                <a:off x="5687649" y="2697446"/>
+                <a:ext cx="1588897" cy="276999"/>
+              </a:xfrm>
+              <a:prstGeom prst="rect">
+                <a:avLst/>
+              </a:prstGeom>
+              <a:noFill/>
+            </p:spPr>
+            <p:txBody>
+              <a:bodyPr wrap="none" rtlCol="0">
+                <a:spAutoFit/>
+              </a:bodyPr>
+              <a:lstStyle/>
+              <a:p>
+                <a:r>
+                  <a:rPr lang="en-US" sz="1200" dirty="0" smtClean="0">
+                    <a:latin typeface="Helvetica" charset="0"/>
+                    <a:ea typeface="Helvetica" charset="0"/>
+                    <a:cs typeface="Helvetica" charset="0"/>
+                  </a:rPr>
+                  <a:t>No migration (m = 0)</a:t>
+                </a:r>
+                <a:endParaRPr lang="en-US" sz="1200" dirty="0">
+                  <a:latin typeface="Helvetica" charset="0"/>
+                  <a:ea typeface="Helvetica" charset="0"/>
+                  <a:cs typeface="Helvetica" charset="0"/>
+                </a:endParaRPr>
+              </a:p>
+            </p:txBody>
+          </p:sp>
+          <p:sp>
+            <p:nvSpPr>
+              <p:cNvPr id="21" name="TextBox 20"/>
+              <p:cNvSpPr txBox="1"/>
+              <p:nvPr/>
+            </p:nvSpPr>
+            <p:spPr>
+              <a:xfrm>
+                <a:off x="5687649" y="2991263"/>
+                <a:ext cx="1887055" cy="276999"/>
+              </a:xfrm>
+              <a:prstGeom prst="rect">
+                <a:avLst/>
+              </a:prstGeom>
+              <a:noFill/>
+            </p:spPr>
+            <p:txBody>
+              <a:bodyPr wrap="none" rtlCol="0">
+                <a:spAutoFit/>
+              </a:bodyPr>
+              <a:lstStyle/>
+              <a:p>
+                <a:r>
+                  <a:rPr lang="en-US" sz="1200" dirty="0" smtClean="0">
+                    <a:latin typeface="Helvetica" charset="0"/>
+                    <a:ea typeface="Helvetica" charset="0"/>
+                    <a:cs typeface="Helvetica" charset="0"/>
+                  </a:rPr>
+                  <a:t>Low migration (m = 0.01)</a:t>
+                </a:r>
+                <a:endParaRPr lang="en-US" sz="1200" dirty="0">
+                  <a:latin typeface="Helvetica" charset="0"/>
+                  <a:ea typeface="Helvetica" charset="0"/>
+                  <a:cs typeface="Helvetica" charset="0"/>
+                </a:endParaRPr>
+              </a:p>
+            </p:txBody>
+          </p:sp>
+          <p:sp>
+            <p:nvSpPr>
+              <p:cNvPr id="22" name="TextBox 21"/>
+              <p:cNvSpPr txBox="1"/>
+              <p:nvPr/>
+            </p:nvSpPr>
+            <p:spPr>
+              <a:xfrm>
+                <a:off x="5684931" y="3319121"/>
+                <a:ext cx="1920719" cy="276999"/>
+              </a:xfrm>
+              <a:prstGeom prst="rect">
+                <a:avLst/>
+              </a:prstGeom>
+              <a:noFill/>
+            </p:spPr>
+            <p:txBody>
+              <a:bodyPr wrap="none" rtlCol="0">
+                <a:spAutoFit/>
+              </a:bodyPr>
+              <a:lstStyle/>
+              <a:p>
+                <a:r>
+                  <a:rPr lang="en-US" sz="1200" dirty="0" smtClean="0">
+                    <a:latin typeface="Helvetica" charset="0"/>
+                    <a:ea typeface="Helvetica" charset="0"/>
+                    <a:cs typeface="Helvetica" charset="0"/>
+                  </a:rPr>
+                  <a:t>High migration (m = 0.05)</a:t>
+                </a:r>
+                <a:endParaRPr lang="en-US" sz="1200" dirty="0">
+                  <a:latin typeface="Helvetica" charset="0"/>
+                  <a:ea typeface="Helvetica" charset="0"/>
+                  <a:cs typeface="Helvetica" charset="0"/>
+                </a:endParaRPr>
+              </a:p>
+            </p:txBody>
+          </p:sp>
+          <p:sp>
+            <p:nvSpPr>
+              <p:cNvPr id="23" name="Rectangle 22"/>
+              <p:cNvSpPr/>
+              <p:nvPr/>
+            </p:nvSpPr>
+            <p:spPr>
+              <a:xfrm>
+                <a:off x="5194300" y="2661244"/>
+                <a:ext cx="2336800" cy="970956"/>
+              </a:xfrm>
+              <a:prstGeom prst="rect">
+                <a:avLst/>
+              </a:prstGeom>
+              <a:noFill/>
+              <a:ln w="19050">
+                <a:solidFill>
+                  <a:schemeClr val="tx1"/>
+                </a:solidFill>
+              </a:ln>
+            </p:spPr>
+            <p:style>
+              <a:lnRef idx="2">
+                <a:schemeClr val="accent1">
+                  <a:shade val="50000"/>
+                </a:schemeClr>
+              </a:lnRef>
+              <a:fillRef idx="1">
+                <a:schemeClr val="accent1"/>
+              </a:fillRef>
+              <a:effectRef idx="0">
+                <a:schemeClr val="accent1"/>
+              </a:effectRef>
+              <a:fontRef idx="minor">
+                <a:schemeClr val="lt1"/>
+              </a:fontRef>
+            </p:style>
+            <p:txBody>
+              <a:bodyPr rtlCol="0" anchor="ctr"/>
+              <a:lstStyle/>
+              <a:p>
+                <a:pPr algn="ctr"/>
+                <a:endParaRPr lang="en-US"/>
+              </a:p>
+            </p:txBody>
+          </p:sp>
+          <p:sp>
+            <p:nvSpPr>
+              <p:cNvPr id="24" name="Rectangle 23"/>
+              <p:cNvSpPr/>
+              <p:nvPr/>
+            </p:nvSpPr>
+            <p:spPr>
+              <a:xfrm>
+                <a:off x="5420857" y="3056103"/>
+                <a:ext cx="154379" cy="154379"/>
+              </a:xfrm>
+              <a:prstGeom prst="rect">
+                <a:avLst/>
+              </a:prstGeom>
+              <a:solidFill>
+                <a:schemeClr val="bg1">
+                  <a:lumMod val="75000"/>
+                </a:schemeClr>
+              </a:solidFill>
+              <a:ln>
+                <a:solidFill>
+                  <a:schemeClr val="tx1"/>
+                </a:solidFill>
+              </a:ln>
+            </p:spPr>
+            <p:style>
+              <a:lnRef idx="2">
+                <a:schemeClr val="accent1">
+                  <a:shade val="50000"/>
+                </a:schemeClr>
+              </a:lnRef>
+              <a:fillRef idx="1">
+                <a:schemeClr val="accent1"/>
+              </a:fillRef>
+              <a:effectRef idx="0">
+                <a:schemeClr val="accent1"/>
+              </a:effectRef>
+              <a:fontRef idx="minor">
+                <a:schemeClr val="lt1"/>
+              </a:fontRef>
+            </p:style>
+            <p:txBody>
+              <a:bodyPr rtlCol="0" anchor="ctr"/>
+              <a:lstStyle/>
+              <a:p>
+                <a:pPr algn="ctr"/>
+                <a:endParaRPr lang="en-US"/>
+              </a:p>
+            </p:txBody>
+          </p:sp>
+          <p:sp>
+            <p:nvSpPr>
+              <p:cNvPr id="25" name="Rectangle 24"/>
+              <p:cNvSpPr/>
+              <p:nvPr/>
+            </p:nvSpPr>
+            <p:spPr>
+              <a:xfrm rot="2700000">
+                <a:off x="5432166" y="3385538"/>
+                <a:ext cx="154800" cy="154800"/>
+              </a:xfrm>
+              <a:prstGeom prst="rect">
+                <a:avLst/>
+              </a:prstGeom>
+              <a:solidFill>
+                <a:schemeClr val="tx1"/>
+              </a:solidFill>
+              <a:ln>
+                <a:solidFill>
+                  <a:schemeClr val="tx1"/>
+                </a:solidFill>
+              </a:ln>
+            </p:spPr>
+            <p:style>
+              <a:lnRef idx="2">
+                <a:schemeClr val="accent1">
+                  <a:shade val="50000"/>
+                </a:schemeClr>
+              </a:lnRef>
+              <a:fillRef idx="1">
+                <a:schemeClr val="accent1"/>
+              </a:fillRef>
+              <a:effectRef idx="0">
+                <a:schemeClr val="accent1"/>
+              </a:effectRef>
+              <a:fontRef idx="minor">
+                <a:schemeClr val="lt1"/>
+              </a:fontRef>
+            </p:style>
+            <p:txBody>
+              <a:bodyPr rtlCol="0" anchor="ctr"/>
+              <a:lstStyle/>
+              <a:p>
+                <a:pPr algn="ctr"/>
+                <a:endParaRPr lang="en-US"/>
+              </a:p>
+            </p:txBody>
+          </p:sp>
+          <p:sp>
+            <p:nvSpPr>
+              <p:cNvPr id="26" name="Oval 25"/>
+              <p:cNvSpPr/>
+              <p:nvPr/>
+            </p:nvSpPr>
+            <p:spPr>
+              <a:xfrm>
+                <a:off x="5414870" y="2758775"/>
+                <a:ext cx="154800" cy="154800"/>
+              </a:xfrm>
+              <a:prstGeom prst="ellipse">
+                <a:avLst/>
+              </a:prstGeom>
+              <a:solidFill>
+                <a:schemeClr val="bg1"/>
+              </a:solidFill>
+              <a:ln>
+                <a:solidFill>
+                  <a:schemeClr val="tx1"/>
+                </a:solidFill>
+              </a:ln>
+            </p:spPr>
+            <p:style>
+              <a:lnRef idx="2">
+                <a:schemeClr val="accent1">
+                  <a:shade val="50000"/>
+                </a:schemeClr>
+              </a:lnRef>
+              <a:fillRef idx="1">
+                <a:schemeClr val="accent1"/>
+              </a:fillRef>
+              <a:effectRef idx="0">
+                <a:schemeClr val="accent1"/>
+              </a:effectRef>
+              <a:fontRef idx="minor">
+                <a:schemeClr val="lt1"/>
+              </a:fontRef>
+            </p:style>
+            <p:txBody>
+              <a:bodyPr rtlCol="0" anchor="ctr"/>
+              <a:lstStyle/>
+              <a:p>
+                <a:pPr algn="ctr"/>
+                <a:endParaRPr lang="en-US"/>
+              </a:p>
+            </p:txBody>
+          </p:sp>
+          <p:cxnSp>
+            <p:nvCxnSpPr>
+              <p:cNvPr id="27" name="Straight Connector 26"/>
+              <p:cNvCxnSpPr/>
+              <p:nvPr/>
+            </p:nvCxnSpPr>
+            <p:spPr>
+              <a:xfrm>
+                <a:off x="5266605" y="3457620"/>
+                <a:ext cx="450000" cy="0"/>
+              </a:xfrm>
+              <a:prstGeom prst="line">
+                <a:avLst/>
+              </a:prstGeom>
+              <a:ln w="28575">
+                <a:solidFill>
+                  <a:schemeClr val="tx1"/>
+                </a:solidFill>
+                <a:prstDash val="solid"/>
+              </a:ln>
+            </p:spPr>
+            <p:style>
+              <a:lnRef idx="1">
+                <a:schemeClr val="accent1"/>
+              </a:lnRef>
+              <a:fillRef idx="0">
+                <a:schemeClr val="accent1"/>
+              </a:fillRef>
+              <a:effectRef idx="0">
+                <a:schemeClr val="accent1"/>
+              </a:effectRef>
+              <a:fontRef idx="minor">
+                <a:schemeClr val="tx1"/>
+              </a:fontRef>
+            </p:style>
+          </p:cxnSp>
+        </p:grpSp>
+        <p:sp>
+          <p:nvSpPr>
+            <p:cNvPr id="28" name="TextBox 27"/>
+            <p:cNvSpPr txBox="1"/>
+            <p:nvPr/>
+          </p:nvSpPr>
+          <p:spPr>
+            <a:xfrm>
+              <a:off x="4621314" y="9563100"/>
+              <a:ext cx="3154774" cy="338554"/>
+            </a:xfrm>
+            <a:prstGeom prst="rect">
+              <a:avLst/>
+            </a:prstGeom>
+            <a:solidFill>
+              <a:schemeClr val="bg1"/>
+            </a:solidFill>
+          </p:spPr>
+          <p:txBody>
+            <a:bodyPr wrap="none" rtlCol="0">
+              <a:spAutoFit/>
+            </a:bodyPr>
+            <a:lstStyle/>
+            <a:p>
+              <a:r>
+                <a:rPr lang="en-US" sz="1600" smtClean="0">
+                  <a:latin typeface="Helvetica" charset="0"/>
+                  <a:ea typeface="Helvetica" charset="0"/>
+                  <a:cs typeface="Helvetica" charset="0"/>
+                </a:rPr>
+                <a:t>Initial allele frequency (</a:t>
+              </a:r>
+              <a:r>
+                <a:rPr lang="en-US" sz="1600" i="1" smtClean="0">
+                  <a:latin typeface="Helvetica" charset="0"/>
+                  <a:ea typeface="Helvetica" charset="0"/>
+                  <a:cs typeface="Helvetica" charset="0"/>
+                </a:rPr>
+                <a:t>CYP – Li</a:t>
+              </a:r>
+              <a:r>
+                <a:rPr lang="en-US" sz="1600" smtClean="0">
+                  <a:latin typeface="Helvetica" charset="0"/>
+                  <a:ea typeface="Helvetica" charset="0"/>
+                  <a:cs typeface="Helvetica" charset="0"/>
+                </a:rPr>
+                <a:t>)</a:t>
+              </a:r>
+              <a:endParaRPr lang="en-US" sz="1600" dirty="0">
+                <a:latin typeface="Helvetica" charset="0"/>
+                <a:ea typeface="Helvetica" charset="0"/>
+                <a:cs typeface="Helvetica" charset="0"/>
+              </a:endParaRPr>
+            </a:p>
+          </p:txBody>
+        </p:sp>
+        <p:sp>
+          <p:nvSpPr>
+            <p:cNvPr id="29" name="TextBox 28"/>
+            <p:cNvSpPr txBox="1"/>
+            <p:nvPr/>
+          </p:nvSpPr>
+          <p:spPr>
+            <a:xfrm>
+              <a:off x="3651944" y="622774"/>
+              <a:ext cx="338554" cy="369332"/>
+            </a:xfrm>
+            <a:prstGeom prst="rect">
+              <a:avLst/>
+            </a:prstGeom>
+            <a:noFill/>
+          </p:spPr>
+          <p:txBody>
+            <a:bodyPr wrap="none" rtlCol="0">
+              <a:spAutoFit/>
+            </a:bodyPr>
+            <a:lstStyle/>
+            <a:p>
+              <a:r>
+                <a:rPr lang="en-US" sz="1800" dirty="0" smtClean="0">
+                  <a:latin typeface="Helvetica" charset="0"/>
+                  <a:ea typeface="Helvetica" charset="0"/>
+                  <a:cs typeface="Helvetica" charset="0"/>
+                </a:rPr>
+                <a:t>A</a:t>
+              </a:r>
+              <a:endParaRPr lang="en-US" sz="1800" dirty="0">
+                <a:latin typeface="Helvetica" charset="0"/>
+                <a:ea typeface="Helvetica" charset="0"/>
+                <a:cs typeface="Helvetica" charset="0"/>
+              </a:endParaRPr>
+            </a:p>
+          </p:txBody>
+        </p:sp>
+        <p:sp>
+          <p:nvSpPr>
+            <p:cNvPr id="30" name="TextBox 29"/>
+            <p:cNvSpPr txBox="1"/>
+            <p:nvPr/>
+          </p:nvSpPr>
+          <p:spPr>
+            <a:xfrm>
+              <a:off x="3653532" y="5093302"/>
+              <a:ext cx="351378" cy="369332"/>
+            </a:xfrm>
+            <a:prstGeom prst="rect">
+              <a:avLst/>
+            </a:prstGeom>
+            <a:noFill/>
+          </p:spPr>
+          <p:txBody>
+            <a:bodyPr wrap="none" rtlCol="0">
+              <a:spAutoFit/>
+            </a:bodyPr>
+            <a:lstStyle/>
+            <a:p>
+              <a:r>
+                <a:rPr lang="en-US" sz="1800" smtClean="0">
+                  <a:latin typeface="Helvetica" charset="0"/>
+                  <a:ea typeface="Helvetica" charset="0"/>
+                  <a:cs typeface="Helvetica" charset="0"/>
+                </a:rPr>
+                <a:t>B</a:t>
+              </a:r>
+              <a:endParaRPr lang="en-US" sz="1800" dirty="0">
+                <a:latin typeface="Helvetica" charset="0"/>
+                <a:ea typeface="Helvetica" charset="0"/>
+                <a:cs typeface="Helvetica" charset="0"/>
+              </a:endParaRPr>
+            </a:p>
+          </p:txBody>
+        </p:sp>
+      </p:grpSp>
+    </p:spTree>
+    <p:extLst>
+      <p:ext uri="{BB962C8B-B14F-4D97-AF65-F5344CB8AC3E}">
+        <p14:creationId xmlns:p14="http://schemas.microsoft.com/office/powerpoint/2010/main" val="1596855392"/>
+      </p:ext>
+    </p:extLst>
+  </p:cSld>
+  <p:clrMapOvr>
+    <a:masterClrMapping/>
+  </p:clrMapOvr>
+</p:sld>
+</file>
+
+<file path=ppt/slides/slide9.xml><?xml version="1.0" encoding="utf-8"?>
 <p:sld xmlns:a="http://schemas.openxmlformats.org/drawingml/2006/main" xmlns:r="http://schemas.openxmlformats.org/officeDocument/2006/relationships" xmlns:p="http://schemas.openxmlformats.org/presentationml/2006/main">
   <p:cSld>
     <p:spTree>

</xml_diff>

<commit_message>
Changed y-axis for figure
</commit_message>
<xml_diff>
--- a/SEC_Writings/SEC_Manuscript-Figures.pptx
+++ b/SEC_Writings/SEC_Manuscript-Figures.pptx
@@ -251,7 +251,7 @@
           <a:p>
             <a:fld id="{188A7F6E-218E-D540-B78C-2025F8A16802}" type="datetimeFigureOut">
               <a:rPr lang="en-US" smtClean="0"/>
-              <a:t>1/7/18</a:t>
+              <a:t>1/17/18</a:t>
             </a:fld>
             <a:endParaRPr lang="en-US"/>
           </a:p>
@@ -416,7 +416,7 @@
           <a:p>
             <a:fld id="{188A7F6E-218E-D540-B78C-2025F8A16802}" type="datetimeFigureOut">
               <a:rPr lang="en-US" smtClean="0"/>
-              <a:t>1/7/18</a:t>
+              <a:t>1/17/18</a:t>
             </a:fld>
             <a:endParaRPr lang="en-US"/>
           </a:p>
@@ -591,7 +591,7 @@
           <a:p>
             <a:fld id="{188A7F6E-218E-D540-B78C-2025F8A16802}" type="datetimeFigureOut">
               <a:rPr lang="en-US" smtClean="0"/>
-              <a:t>1/7/18</a:t>
+              <a:t>1/17/18</a:t>
             </a:fld>
             <a:endParaRPr lang="en-US"/>
           </a:p>
@@ -756,7 +756,7 @@
           <a:p>
             <a:fld id="{188A7F6E-218E-D540-B78C-2025F8A16802}" type="datetimeFigureOut">
               <a:rPr lang="en-US" smtClean="0"/>
-              <a:t>1/7/18</a:t>
+              <a:t>1/17/18</a:t>
             </a:fld>
             <a:endParaRPr lang="en-US"/>
           </a:p>
@@ -995,7 +995,7 @@
           <a:p>
             <a:fld id="{188A7F6E-218E-D540-B78C-2025F8A16802}" type="datetimeFigureOut">
               <a:rPr lang="en-US" smtClean="0"/>
-              <a:t>1/7/18</a:t>
+              <a:t>1/17/18</a:t>
             </a:fld>
             <a:endParaRPr lang="en-US"/>
           </a:p>
@@ -1222,7 +1222,7 @@
           <a:p>
             <a:fld id="{188A7F6E-218E-D540-B78C-2025F8A16802}" type="datetimeFigureOut">
               <a:rPr lang="en-US" smtClean="0"/>
-              <a:t>1/7/18</a:t>
+              <a:t>1/17/18</a:t>
             </a:fld>
             <a:endParaRPr lang="en-US"/>
           </a:p>
@@ -1584,7 +1584,7 @@
           <a:p>
             <a:fld id="{188A7F6E-218E-D540-B78C-2025F8A16802}" type="datetimeFigureOut">
               <a:rPr lang="en-US" smtClean="0"/>
-              <a:t>1/7/18</a:t>
+              <a:t>1/17/18</a:t>
             </a:fld>
             <a:endParaRPr lang="en-US"/>
           </a:p>
@@ -1697,7 +1697,7 @@
           <a:p>
             <a:fld id="{188A7F6E-218E-D540-B78C-2025F8A16802}" type="datetimeFigureOut">
               <a:rPr lang="en-US" smtClean="0"/>
-              <a:t>1/7/18</a:t>
+              <a:t>1/17/18</a:t>
             </a:fld>
             <a:endParaRPr lang="en-US"/>
           </a:p>
@@ -1787,7 +1787,7 @@
           <a:p>
             <a:fld id="{188A7F6E-218E-D540-B78C-2025F8A16802}" type="datetimeFigureOut">
               <a:rPr lang="en-US" smtClean="0"/>
-              <a:t>1/7/18</a:t>
+              <a:t>1/17/18</a:t>
             </a:fld>
             <a:endParaRPr lang="en-US"/>
           </a:p>
@@ -2059,7 +2059,7 @@
           <a:p>
             <a:fld id="{188A7F6E-218E-D540-B78C-2025F8A16802}" type="datetimeFigureOut">
               <a:rPr lang="en-US" smtClean="0"/>
-              <a:t>1/7/18</a:t>
+              <a:t>1/17/18</a:t>
             </a:fld>
             <a:endParaRPr lang="en-US"/>
           </a:p>
@@ -2311,7 +2311,7 @@
           <a:p>
             <a:fld id="{188A7F6E-218E-D540-B78C-2025F8A16802}" type="datetimeFigureOut">
               <a:rPr lang="en-US" smtClean="0"/>
-              <a:t>1/7/18</a:t>
+              <a:t>1/17/18</a:t>
             </a:fld>
             <a:endParaRPr lang="en-US"/>
           </a:p>
@@ -2519,7 +2519,7 @@
           <a:p>
             <a:fld id="{188A7F6E-218E-D540-B78C-2025F8A16802}" type="datetimeFigureOut">
               <a:rPr lang="en-US" smtClean="0"/>
-              <a:t>1/7/18</a:t>
+              <a:t>1/17/18</a:t>
             </a:fld>
             <a:endParaRPr lang="en-US"/>
           </a:p>
@@ -10360,11 +10360,6 @@
                 </a:rPr>
                 <a:t>B</a:t>
               </a:r>
-              <a:endParaRPr lang="en-US" sz="1800" dirty="0">
-                <a:latin typeface="Helvetica" charset="0"/>
-                <a:ea typeface="Helvetica" charset="0"/>
-                <a:cs typeface="Helvetica" charset="0"/>
-              </a:endParaRPr>
             </a:p>
           </p:txBody>
         </p:sp>
@@ -11014,8 +11009,8 @@
           </p:nvSpPr>
           <p:spPr>
             <a:xfrm rot="16200000">
-              <a:off x="5242454" y="8982142"/>
-              <a:ext cx="2589170" cy="615553"/>
+              <a:off x="5242454" y="9112947"/>
+              <a:ext cx="2589170" cy="353943"/>
             </a:xfrm>
             <a:prstGeom prst="rect">
               <a:avLst/>
@@ -11040,22 +11035,6 @@
                 <a:t>Mean frequency of HCN </a:t>
               </a:r>
             </a:p>
-            <a:p>
-              <a:pPr algn="ctr"/>
-              <a:r>
-                <a:rPr lang="en-US" sz="1700" dirty="0" smtClean="0">
-                  <a:latin typeface="Helvetica" charset="0"/>
-                  <a:ea typeface="Helvetica" charset="0"/>
-                  <a:cs typeface="Helvetica" charset="0"/>
-                </a:rPr>
-                <a:t>across 1000 sims</a:t>
-              </a:r>
-              <a:endParaRPr lang="en-US" sz="1700" dirty="0">
-                <a:latin typeface="Helvetica" charset="0"/>
-                <a:ea typeface="Helvetica" charset="0"/>
-                <a:cs typeface="Helvetica" charset="0"/>
-              </a:endParaRPr>
-            </a:p>
           </p:txBody>
         </p:sp>
         <p:sp>
@@ -11066,8 +11045,8 @@
           </p:nvSpPr>
           <p:spPr>
             <a:xfrm rot="16200000">
-              <a:off x="5242453" y="5017596"/>
-              <a:ext cx="2589170" cy="615553"/>
+              <a:off x="5242453" y="5148401"/>
+              <a:ext cx="2589170" cy="353943"/>
             </a:xfrm>
             <a:prstGeom prst="rect">
               <a:avLst/>
@@ -11092,22 +11071,6 @@
                 <a:t>Mean frequency of HCN </a:t>
               </a:r>
             </a:p>
-            <a:p>
-              <a:pPr algn="ctr"/>
-              <a:r>
-                <a:rPr lang="en-US" sz="1700" dirty="0" smtClean="0">
-                  <a:latin typeface="Helvetica" charset="0"/>
-                  <a:ea typeface="Helvetica" charset="0"/>
-                  <a:cs typeface="Helvetica" charset="0"/>
-                </a:rPr>
-                <a:t>across 1000 sims</a:t>
-              </a:r>
-              <a:endParaRPr lang="en-US" sz="1700" dirty="0">
-                <a:latin typeface="Helvetica" charset="0"/>
-                <a:ea typeface="Helvetica" charset="0"/>
-                <a:cs typeface="Helvetica" charset="0"/>
-              </a:endParaRPr>
-            </a:p>
           </p:txBody>
         </p:sp>
         <p:sp>
@@ -11118,8 +11081,8 @@
           </p:nvSpPr>
           <p:spPr>
             <a:xfrm rot="16200000">
-              <a:off x="-723054" y="5017597"/>
-              <a:ext cx="2553904" cy="615553"/>
+              <a:off x="-479398" y="5017597"/>
+              <a:ext cx="2066591" cy="615553"/>
             </a:xfrm>
             <a:prstGeom prst="rect">
               <a:avLst/>
@@ -11141,7 +11104,23 @@
                   <a:ea typeface="Helvetica" charset="0"/>
                   <a:cs typeface="Helvetica" charset="0"/>
                 </a:rPr>
-                <a:t>Proportion of 1000 sims </a:t>
+                <a:t>Proportion </a:t>
+              </a:r>
+              <a:r>
+                <a:rPr lang="en-US" sz="1700" dirty="0" smtClean="0">
+                  <a:latin typeface="Helvetica" charset="0"/>
+                  <a:ea typeface="Helvetica" charset="0"/>
+                  <a:cs typeface="Helvetica" charset="0"/>
+                </a:rPr>
+                <a:t>of </a:t>
+              </a:r>
+              <a:r>
+                <a:rPr lang="en-US" sz="1700" dirty="0" smtClean="0">
+                  <a:latin typeface="Helvetica" charset="0"/>
+                  <a:ea typeface="Helvetica" charset="0"/>
+                  <a:cs typeface="Helvetica" charset="0"/>
+                </a:rPr>
+                <a:t>sims </a:t>
               </a:r>
             </a:p>
             <a:p>
@@ -11358,8 +11337,8 @@
           </p:nvSpPr>
           <p:spPr>
             <a:xfrm rot="16200000">
-              <a:off x="-736785" y="8982143"/>
-              <a:ext cx="2589170" cy="615553"/>
+              <a:off x="-740687" y="9112948"/>
+              <a:ext cx="2589170" cy="353943"/>
             </a:xfrm>
             <a:prstGeom prst="rect">
               <a:avLst/>
@@ -11381,20 +11360,17 @@
                   <a:ea typeface="Helvetica" charset="0"/>
                   <a:cs typeface="Helvetica" charset="0"/>
                 </a:rPr>
-                <a:t>Mean frequency of HCN </a:t>
+                <a:t>Mean frequency of </a:t>
               </a:r>
-            </a:p>
-            <a:p>
-              <a:pPr algn="ctr"/>
               <a:r>
-                <a:rPr lang="en-US" sz="1700" dirty="0" smtClean="0">
+                <a:rPr lang="en-US" sz="1700" smtClean="0">
                   <a:latin typeface="Helvetica" charset="0"/>
                   <a:ea typeface="Helvetica" charset="0"/>
                   <a:cs typeface="Helvetica" charset="0"/>
                 </a:rPr>
-                <a:t>across 1000 sims</a:t>
+                <a:t>HCN </a:t>
               </a:r>
-              <a:endParaRPr lang="en-US" sz="1700" dirty="0">
+              <a:endParaRPr lang="en-US" sz="1700" dirty="0" smtClean="0">
                 <a:latin typeface="Helvetica" charset="0"/>
                 <a:ea typeface="Helvetica" charset="0"/>
                 <a:cs typeface="Helvetica" charset="0"/>

</xml_diff>

<commit_message>
Adding supplemental text and figure, S3, S4, S5
</commit_message>
<xml_diff>
--- a/SEC_Writings/SEC_Manuscript-Figures.pptx
+++ b/SEC_Writings/SEC_Manuscript-Figures.pptx
@@ -13,6 +13,8 @@
     <p:sldId id="260" r:id="rId7"/>
     <p:sldId id="266" r:id="rId8"/>
     <p:sldId id="267" r:id="rId9"/>
+    <p:sldId id="268" r:id="rId10"/>
+    <p:sldId id="269" r:id="rId11"/>
   </p:sldIdLst>
   <p:sldSz cx="14400213" cy="14400213"/>
   <p:notesSz cx="6858000" cy="9144000"/>
@@ -250,7 +252,7 @@
           <a:p>
             <a:fld id="{188A7F6E-218E-D540-B78C-2025F8A16802}" type="datetimeFigureOut">
               <a:rPr lang="en-US" smtClean="0"/>
-              <a:t>1/20/18</a:t>
+              <a:t>1/21/18</a:t>
             </a:fld>
             <a:endParaRPr lang="en-US"/>
           </a:p>
@@ -415,7 +417,7 @@
           <a:p>
             <a:fld id="{188A7F6E-218E-D540-B78C-2025F8A16802}" type="datetimeFigureOut">
               <a:rPr lang="en-US" smtClean="0"/>
-              <a:t>1/20/18</a:t>
+              <a:t>1/21/18</a:t>
             </a:fld>
             <a:endParaRPr lang="en-US"/>
           </a:p>
@@ -590,7 +592,7 @@
           <a:p>
             <a:fld id="{188A7F6E-218E-D540-B78C-2025F8A16802}" type="datetimeFigureOut">
               <a:rPr lang="en-US" smtClean="0"/>
-              <a:t>1/20/18</a:t>
+              <a:t>1/21/18</a:t>
             </a:fld>
             <a:endParaRPr lang="en-US"/>
           </a:p>
@@ -755,7 +757,7 @@
           <a:p>
             <a:fld id="{188A7F6E-218E-D540-B78C-2025F8A16802}" type="datetimeFigureOut">
               <a:rPr lang="en-US" smtClean="0"/>
-              <a:t>1/20/18</a:t>
+              <a:t>1/21/18</a:t>
             </a:fld>
             <a:endParaRPr lang="en-US"/>
           </a:p>
@@ -994,7 +996,7 @@
           <a:p>
             <a:fld id="{188A7F6E-218E-D540-B78C-2025F8A16802}" type="datetimeFigureOut">
               <a:rPr lang="en-US" smtClean="0"/>
-              <a:t>1/20/18</a:t>
+              <a:t>1/21/18</a:t>
             </a:fld>
             <a:endParaRPr lang="en-US"/>
           </a:p>
@@ -1221,7 +1223,7 @@
           <a:p>
             <a:fld id="{188A7F6E-218E-D540-B78C-2025F8A16802}" type="datetimeFigureOut">
               <a:rPr lang="en-US" smtClean="0"/>
-              <a:t>1/20/18</a:t>
+              <a:t>1/21/18</a:t>
             </a:fld>
             <a:endParaRPr lang="en-US"/>
           </a:p>
@@ -1583,7 +1585,7 @@
           <a:p>
             <a:fld id="{188A7F6E-218E-D540-B78C-2025F8A16802}" type="datetimeFigureOut">
               <a:rPr lang="en-US" smtClean="0"/>
-              <a:t>1/20/18</a:t>
+              <a:t>1/21/18</a:t>
             </a:fld>
             <a:endParaRPr lang="en-US"/>
           </a:p>
@@ -1696,7 +1698,7 @@
           <a:p>
             <a:fld id="{188A7F6E-218E-D540-B78C-2025F8A16802}" type="datetimeFigureOut">
               <a:rPr lang="en-US" smtClean="0"/>
-              <a:t>1/20/18</a:t>
+              <a:t>1/21/18</a:t>
             </a:fld>
             <a:endParaRPr lang="en-US"/>
           </a:p>
@@ -1786,7 +1788,7 @@
           <a:p>
             <a:fld id="{188A7F6E-218E-D540-B78C-2025F8A16802}" type="datetimeFigureOut">
               <a:rPr lang="en-US" smtClean="0"/>
-              <a:t>1/20/18</a:t>
+              <a:t>1/21/18</a:t>
             </a:fld>
             <a:endParaRPr lang="en-US"/>
           </a:p>
@@ -2058,7 +2060,7 @@
           <a:p>
             <a:fld id="{188A7F6E-218E-D540-B78C-2025F8A16802}" type="datetimeFigureOut">
               <a:rPr lang="en-US" smtClean="0"/>
-              <a:t>1/20/18</a:t>
+              <a:t>1/21/18</a:t>
             </a:fld>
             <a:endParaRPr lang="en-US"/>
           </a:p>
@@ -2310,7 +2312,7 @@
           <a:p>
             <a:fld id="{188A7F6E-218E-D540-B78C-2025F8A16802}" type="datetimeFigureOut">
               <a:rPr lang="en-US" smtClean="0"/>
-              <a:t>1/20/18</a:t>
+              <a:t>1/21/18</a:t>
             </a:fld>
             <a:endParaRPr lang="en-US"/>
           </a:p>
@@ -2518,7 +2520,7 @@
           <a:p>
             <a:fld id="{188A7F6E-218E-D540-B78C-2025F8A16802}" type="datetimeFigureOut">
               <a:rPr lang="en-US" smtClean="0"/>
-              <a:t>1/20/18</a:t>
+              <a:t>1/21/18</a:t>
             </a:fld>
             <a:endParaRPr lang="en-US"/>
           </a:p>
@@ -2988,6 +2990,384 @@
     <p:extLst>
       <p:ext uri="{BB962C8B-B14F-4D97-AF65-F5344CB8AC3E}">
         <p14:creationId xmlns:p14="http://schemas.microsoft.com/office/powerpoint/2010/main" val="878239843"/>
+      </p:ext>
+    </p:extLst>
+  </p:cSld>
+  <p:clrMapOvr>
+    <a:masterClrMapping/>
+  </p:clrMapOvr>
+</p:sld>
+</file>
+
+<file path=ppt/slides/slide10.xml><?xml version="1.0" encoding="utf-8"?>
+<p:sld xmlns:a="http://schemas.openxmlformats.org/drawingml/2006/main" xmlns:r="http://schemas.openxmlformats.org/officeDocument/2006/relationships" xmlns:p="http://schemas.openxmlformats.org/presentationml/2006/main">
+  <p:cSld>
+    <p:spTree>
+      <p:nvGrpSpPr>
+        <p:cNvPr id="1" name=""/>
+        <p:cNvGrpSpPr/>
+        <p:nvPr/>
+      </p:nvGrpSpPr>
+      <p:grpSpPr>
+        <a:xfrm>
+          <a:off x="0" y="0"/>
+          <a:ext cx="0" cy="0"/>
+          <a:chOff x="0" y="0"/>
+          <a:chExt cx="0" cy="0"/>
+        </a:xfrm>
+      </p:grpSpPr>
+      <p:grpSp>
+        <p:nvGrpSpPr>
+          <p:cNvPr id="17" name="Group 16">
+            <a:extLst>
+              <a:ext uri="{FF2B5EF4-FFF2-40B4-BE49-F238E27FC236}">
+                <a16:creationId xmlns:a16="http://schemas.microsoft.com/office/drawing/2014/main" id="{0D581D7A-496E-6944-8EDF-17639DA32EFF}"/>
+              </a:ext>
+            </a:extLst>
+          </p:cNvPr>
+          <p:cNvGrpSpPr/>
+          <p:nvPr/>
+        </p:nvGrpSpPr>
+        <p:grpSpPr>
+          <a:xfrm>
+            <a:off x="1119694" y="1855336"/>
+            <a:ext cx="8357521" cy="9355450"/>
+            <a:chOff x="1119694" y="1855336"/>
+            <a:chExt cx="8357521" cy="9355450"/>
+          </a:xfrm>
+        </p:grpSpPr>
+        <p:pic>
+          <p:nvPicPr>
+            <p:cNvPr id="5" name="Picture 4">
+              <a:extLst>
+                <a:ext uri="{FF2B5EF4-FFF2-40B4-BE49-F238E27FC236}">
+                  <a16:creationId xmlns:a16="http://schemas.microsoft.com/office/drawing/2014/main" id="{402C6F9D-8B08-754B-B060-2B435DDEB0F2}"/>
+                </a:ext>
+              </a:extLst>
+            </p:cNvPr>
+            <p:cNvPicPr>
+              <a:picLocks noChangeAspect="1"/>
+            </p:cNvPicPr>
+            <p:nvPr/>
+          </p:nvPicPr>
+          <p:blipFill rotWithShape="1">
+            <a:blip r:embed="rId2"/>
+            <a:srcRect l="4765" t="23612" r="25937" b="26889"/>
+            <a:stretch/>
+          </p:blipFill>
+          <p:spPr>
+            <a:xfrm>
+              <a:off x="1511300" y="2324100"/>
+              <a:ext cx="5600700" cy="4000500"/>
+            </a:xfrm>
+            <a:prstGeom prst="rect">
+              <a:avLst/>
+            </a:prstGeom>
+          </p:spPr>
+        </p:pic>
+        <p:pic>
+          <p:nvPicPr>
+            <p:cNvPr id="7" name="Picture 6">
+              <a:extLst>
+                <a:ext uri="{FF2B5EF4-FFF2-40B4-BE49-F238E27FC236}">
+                  <a16:creationId xmlns:a16="http://schemas.microsoft.com/office/drawing/2014/main" id="{96B89A8A-6279-D44D-8C1A-0E9192569A73}"/>
+                </a:ext>
+              </a:extLst>
+            </p:cNvPr>
+            <p:cNvPicPr>
+              <a:picLocks noChangeAspect="1"/>
+            </p:cNvPicPr>
+            <p:nvPr/>
+          </p:nvPicPr>
+          <p:blipFill rotWithShape="1">
+            <a:blip r:embed="rId3"/>
+            <a:srcRect l="4710" t="22452" r="25613" b="25935"/>
+            <a:stretch/>
+          </p:blipFill>
+          <p:spPr>
+            <a:xfrm>
+              <a:off x="1866900" y="6896100"/>
+              <a:ext cx="5245100" cy="3911600"/>
+            </a:xfrm>
+            <a:prstGeom prst="rect">
+              <a:avLst/>
+            </a:prstGeom>
+          </p:spPr>
+        </p:pic>
+        <p:pic>
+          <p:nvPicPr>
+            <p:cNvPr id="11" name="Picture 10">
+              <a:extLst>
+                <a:ext uri="{FF2B5EF4-FFF2-40B4-BE49-F238E27FC236}">
+                  <a16:creationId xmlns:a16="http://schemas.microsoft.com/office/drawing/2014/main" id="{F44F415D-BEFE-A84C-9A63-6B0DBF7E84F9}"/>
+                </a:ext>
+              </a:extLst>
+            </p:cNvPr>
+            <p:cNvPicPr>
+              <a:picLocks noChangeAspect="1"/>
+            </p:cNvPicPr>
+            <p:nvPr/>
+          </p:nvPicPr>
+          <p:blipFill>
+            <a:blip r:embed="rId4"/>
+            <a:stretch>
+              <a:fillRect/>
+            </a:stretch>
+          </p:blipFill>
+          <p:spPr>
+            <a:xfrm>
+              <a:off x="7474056" y="4490720"/>
+              <a:ext cx="2003159" cy="2920206"/>
+            </a:xfrm>
+            <a:prstGeom prst="rect">
+              <a:avLst/>
+            </a:prstGeom>
+            <a:ln w="19050">
+              <a:solidFill>
+                <a:schemeClr val="tx1"/>
+              </a:solidFill>
+            </a:ln>
+          </p:spPr>
+        </p:pic>
+        <p:sp>
+          <p:nvSpPr>
+            <p:cNvPr id="12" name="TextBox 11">
+              <a:extLst>
+                <a:ext uri="{FF2B5EF4-FFF2-40B4-BE49-F238E27FC236}">
+                  <a16:creationId xmlns:a16="http://schemas.microsoft.com/office/drawing/2014/main" id="{FEC7B9ED-82DE-A347-A6A2-4E541A5E824D}"/>
+                </a:ext>
+              </a:extLst>
+            </p:cNvPr>
+            <p:cNvSpPr txBox="1"/>
+            <p:nvPr/>
+          </p:nvSpPr>
+          <p:spPr>
+            <a:xfrm rot="16200000">
+              <a:off x="542934" y="3898417"/>
+              <a:ext cx="1553630" cy="400110"/>
+            </a:xfrm>
+            <a:prstGeom prst="rect">
+              <a:avLst/>
+            </a:prstGeom>
+            <a:solidFill>
+              <a:schemeClr val="bg1"/>
+            </a:solidFill>
+          </p:spPr>
+          <p:txBody>
+            <a:bodyPr wrap="none" rtlCol="0">
+              <a:spAutoFit/>
+            </a:bodyPr>
+            <a:lstStyle/>
+            <a:p>
+              <a:r>
+                <a:rPr lang="en-US" sz="2000" dirty="0">
+                  <a:latin typeface="Helvetica" charset="0"/>
+                  <a:ea typeface="Helvetica" charset="0"/>
+                  <a:cs typeface="Helvetica" charset="0"/>
+                </a:rPr>
+                <a:t>Mean Slope</a:t>
+              </a:r>
+            </a:p>
+          </p:txBody>
+        </p:sp>
+        <p:sp>
+          <p:nvSpPr>
+            <p:cNvPr id="13" name="TextBox 12">
+              <a:extLst>
+                <a:ext uri="{FF2B5EF4-FFF2-40B4-BE49-F238E27FC236}">
+                  <a16:creationId xmlns:a16="http://schemas.microsoft.com/office/drawing/2014/main" id="{18AB88FE-8FAD-4B40-960C-F50FDD459D8A}"/>
+                </a:ext>
+              </a:extLst>
+            </p:cNvPr>
+            <p:cNvSpPr txBox="1"/>
+            <p:nvPr/>
+          </p:nvSpPr>
+          <p:spPr>
+            <a:xfrm rot="16200000">
+              <a:off x="-617639" y="8378316"/>
+              <a:ext cx="3874779" cy="400110"/>
+            </a:xfrm>
+            <a:prstGeom prst="rect">
+              <a:avLst/>
+            </a:prstGeom>
+            <a:solidFill>
+              <a:schemeClr val="bg1"/>
+            </a:solidFill>
+          </p:spPr>
+          <p:txBody>
+            <a:bodyPr wrap="none" rtlCol="0">
+              <a:spAutoFit/>
+            </a:bodyPr>
+            <a:lstStyle/>
+            <a:p>
+              <a:r>
+                <a:rPr lang="en-US" sz="2000" dirty="0">
+                  <a:latin typeface="Helvetica" charset="0"/>
+                  <a:ea typeface="Helvetica" charset="0"/>
+                  <a:cs typeface="Helvetica" charset="0"/>
+                </a:rPr>
+                <a:t>Proportion of sig. positive slopes</a:t>
+              </a:r>
+            </a:p>
+          </p:txBody>
+        </p:sp>
+        <p:sp>
+          <p:nvSpPr>
+            <p:cNvPr id="14" name="TextBox 13">
+              <a:extLst>
+                <a:ext uri="{FF2B5EF4-FFF2-40B4-BE49-F238E27FC236}">
+                  <a16:creationId xmlns:a16="http://schemas.microsoft.com/office/drawing/2014/main" id="{56167691-F4EE-9347-B82F-60B9C66FBB22}"/>
+                </a:ext>
+              </a:extLst>
+            </p:cNvPr>
+            <p:cNvSpPr txBox="1"/>
+            <p:nvPr/>
+          </p:nvSpPr>
+          <p:spPr>
+            <a:xfrm>
+              <a:off x="3955720" y="10810676"/>
+              <a:ext cx="1452642" cy="400110"/>
+            </a:xfrm>
+            <a:prstGeom prst="rect">
+              <a:avLst/>
+            </a:prstGeom>
+            <a:solidFill>
+              <a:schemeClr val="bg1"/>
+            </a:solidFill>
+          </p:spPr>
+          <p:txBody>
+            <a:bodyPr wrap="none" rtlCol="0">
+              <a:spAutoFit/>
+            </a:bodyPr>
+            <a:lstStyle/>
+            <a:p>
+              <a:pPr algn="ctr"/>
+              <a:r>
+                <a:rPr lang="en-US" sz="2000" dirty="0">
+                  <a:latin typeface="Helvetica" charset="0"/>
+                  <a:ea typeface="Helvetica" charset="0"/>
+                  <a:cs typeface="Helvetica" charset="0"/>
+                </a:rPr>
+                <a:t>Generation</a:t>
+              </a:r>
+            </a:p>
+          </p:txBody>
+        </p:sp>
+        <p:sp>
+          <p:nvSpPr>
+            <p:cNvPr id="15" name="TextBox 14">
+              <a:extLst>
+                <a:ext uri="{FF2B5EF4-FFF2-40B4-BE49-F238E27FC236}">
+                  <a16:creationId xmlns:a16="http://schemas.microsoft.com/office/drawing/2014/main" id="{589BF1E2-BB7D-584B-BC9F-272F15F18B42}"/>
+                </a:ext>
+              </a:extLst>
+            </p:cNvPr>
+            <p:cNvSpPr txBox="1"/>
+            <p:nvPr/>
+          </p:nvSpPr>
+          <p:spPr>
+            <a:xfrm>
+              <a:off x="1962712" y="1855336"/>
+              <a:ext cx="497252" cy="400110"/>
+            </a:xfrm>
+            <a:prstGeom prst="rect">
+              <a:avLst/>
+            </a:prstGeom>
+            <a:noFill/>
+          </p:spPr>
+          <p:txBody>
+            <a:bodyPr wrap="none" rtlCol="0">
+              <a:spAutoFit/>
+            </a:bodyPr>
+            <a:lstStyle/>
+            <a:p>
+              <a:r>
+                <a:rPr lang="en-US" sz="2000" dirty="0">
+                  <a:latin typeface="Helvetica" charset="0"/>
+                  <a:ea typeface="Helvetica" charset="0"/>
+                  <a:cs typeface="Helvetica" charset="0"/>
+                </a:rPr>
+                <a:t>(</a:t>
+              </a:r>
+              <a:r>
+                <a:rPr lang="en-US" sz="2000" i="1" dirty="0">
+                  <a:latin typeface="Helvetica" charset="0"/>
+                  <a:ea typeface="Helvetica" charset="0"/>
+                  <a:cs typeface="Helvetica" charset="0"/>
+                </a:rPr>
+                <a:t>a</a:t>
+              </a:r>
+              <a:r>
+                <a:rPr lang="en-US" sz="2000" dirty="0">
+                  <a:latin typeface="Helvetica" charset="0"/>
+                  <a:ea typeface="Helvetica" charset="0"/>
+                  <a:cs typeface="Helvetica" charset="0"/>
+                </a:rPr>
+                <a:t>)</a:t>
+              </a:r>
+            </a:p>
+          </p:txBody>
+        </p:sp>
+        <p:sp>
+          <p:nvSpPr>
+            <p:cNvPr id="16" name="TextBox 15">
+              <a:extLst>
+                <a:ext uri="{FF2B5EF4-FFF2-40B4-BE49-F238E27FC236}">
+                  <a16:creationId xmlns:a16="http://schemas.microsoft.com/office/drawing/2014/main" id="{20C1976B-C403-854F-BD22-0E16E9DAF8EF}"/>
+                </a:ext>
+              </a:extLst>
+            </p:cNvPr>
+            <p:cNvSpPr txBox="1"/>
+            <p:nvPr/>
+          </p:nvSpPr>
+          <p:spPr>
+            <a:xfrm>
+              <a:off x="1962712" y="6411345"/>
+              <a:ext cx="497252" cy="400110"/>
+            </a:xfrm>
+            <a:prstGeom prst="rect">
+              <a:avLst/>
+            </a:prstGeom>
+            <a:noFill/>
+          </p:spPr>
+          <p:txBody>
+            <a:bodyPr wrap="none" rtlCol="0">
+              <a:spAutoFit/>
+            </a:bodyPr>
+            <a:lstStyle/>
+            <a:p>
+              <a:r>
+                <a:rPr lang="en-US" sz="2000" dirty="0">
+                  <a:latin typeface="Helvetica" charset="0"/>
+                  <a:ea typeface="Helvetica" charset="0"/>
+                  <a:cs typeface="Helvetica" charset="0"/>
+                </a:rPr>
+                <a:t>(</a:t>
+              </a:r>
+              <a:r>
+                <a:rPr lang="en-US" sz="2000" i="1" dirty="0">
+                  <a:latin typeface="Helvetica" charset="0"/>
+                  <a:ea typeface="Helvetica" charset="0"/>
+                  <a:cs typeface="Helvetica" charset="0"/>
+                </a:rPr>
+                <a:t>b</a:t>
+              </a:r>
+              <a:r>
+                <a:rPr lang="en-US" sz="2000" dirty="0">
+                  <a:latin typeface="Helvetica" charset="0"/>
+                  <a:ea typeface="Helvetica" charset="0"/>
+                  <a:cs typeface="Helvetica" charset="0"/>
+                </a:rPr>
+                <a:t>)</a:t>
+              </a:r>
+            </a:p>
+          </p:txBody>
+        </p:sp>
+      </p:grpSp>
+    </p:spTree>
+    <p:extLst>
+      <p:ext uri="{BB962C8B-B14F-4D97-AF65-F5344CB8AC3E}">
+        <p14:creationId xmlns:p14="http://schemas.microsoft.com/office/powerpoint/2010/main" val="641139941"/>
       </p:ext>
     </p:extLst>
   </p:cSld>
@@ -12246,7 +12626,7 @@
             <a:p>
               <a:pPr algn="ctr"/>
               <a:r>
-                <a:rPr lang="en-US" sz="1700">
+                <a:rPr lang="en-US" sz="1700" dirty="0">
                   <a:latin typeface="Helvetica" charset="0"/>
                   <a:ea typeface="Helvetica" charset="0"/>
                   <a:cs typeface="Helvetica" charset="0"/>
@@ -12254,7 +12634,7 @@
                 <a:t>Selection coefficient (</a:t>
               </a:r>
               <a:r>
-                <a:rPr lang="en-US" sz="1700" i="1">
+                <a:rPr lang="en-US" sz="1700" i="1" dirty="0">
                   <a:latin typeface="Helvetica" charset="0"/>
                   <a:ea typeface="Helvetica" charset="0"/>
                   <a:cs typeface="Helvetica" charset="0"/>
@@ -12262,18 +12642,13 @@
                 <a:t>s</a:t>
               </a:r>
               <a:r>
-                <a:rPr lang="en-US" sz="1700">
+                <a:rPr lang="en-US" sz="1700" dirty="0">
                   <a:latin typeface="Helvetica" charset="0"/>
                   <a:ea typeface="Helvetica" charset="0"/>
                   <a:cs typeface="Helvetica" charset="0"/>
                 </a:rPr>
                 <a:t>)</a:t>
               </a:r>
-              <a:endParaRPr lang="en-US" sz="1700" dirty="0">
-                <a:latin typeface="Helvetica" charset="0"/>
-                <a:ea typeface="Helvetica" charset="0"/>
-                <a:cs typeface="Helvetica" charset="0"/>
-              </a:endParaRPr>
             </a:p>
           </p:txBody>
         </p:sp>
@@ -14050,7 +14425,13 @@
       </p:grpSpPr>
       <p:grpSp>
         <p:nvGrpSpPr>
-          <p:cNvPr id="2" name="Group 1"/>
+          <p:cNvPr id="7" name="Group 6">
+            <a:extLst>
+              <a:ext uri="{FF2B5EF4-FFF2-40B4-BE49-F238E27FC236}">
+                <a16:creationId xmlns:a16="http://schemas.microsoft.com/office/drawing/2014/main" id="{A4B4FCD7-778B-0A42-A688-B495CD1D2A7F}"/>
+              </a:ext>
+            </a:extLst>
+          </p:cNvPr>
           <p:cNvGrpSpPr/>
           <p:nvPr/>
         </p:nvGrpSpPr>
@@ -14062,95 +14443,259 @@
             <a:chExt cx="5612237" cy="9315392"/>
           </a:xfrm>
         </p:grpSpPr>
+        <p:pic>
+          <p:nvPicPr>
+            <p:cNvPr id="4" name="Picture 3"/>
+            <p:cNvPicPr>
+              <a:picLocks noChangeAspect="1"/>
+            </p:cNvPicPr>
+            <p:nvPr/>
+          </p:nvPicPr>
+          <p:blipFill rotWithShape="1">
+            <a:blip r:embed="rId2">
+              <a:extLst>
+                <a:ext uri="{28A0092B-C50C-407E-A947-70E740481C1C}">
+                  <a14:useLocalDpi xmlns:a14="http://schemas.microsoft.com/office/drawing/2010/main" val="0"/>
+                </a:ext>
+              </a:extLst>
+            </a:blip>
+            <a:srcRect l="5093" t="12731" b="16436"/>
+            <a:stretch/>
+          </p:blipFill>
+          <p:spPr>
+            <a:xfrm>
+              <a:off x="3365500" y="1028700"/>
+              <a:ext cx="5207000" cy="3886200"/>
+            </a:xfrm>
+            <a:prstGeom prst="rect">
+              <a:avLst/>
+            </a:prstGeom>
+          </p:spPr>
+        </p:pic>
+        <p:pic>
+          <p:nvPicPr>
+            <p:cNvPr id="5" name="Picture 4"/>
+            <p:cNvPicPr>
+              <a:picLocks noChangeAspect="1"/>
+            </p:cNvPicPr>
+            <p:nvPr/>
+          </p:nvPicPr>
+          <p:blipFill rotWithShape="1">
+            <a:blip r:embed="rId3">
+              <a:extLst>
+                <a:ext uri="{28A0092B-C50C-407E-A947-70E740481C1C}">
+                  <a14:useLocalDpi xmlns:a14="http://schemas.microsoft.com/office/drawing/2010/main" val="0"/>
+                </a:ext>
+              </a:extLst>
+            </a:blip>
+            <a:srcRect l="4861" t="11575" b="14815"/>
+            <a:stretch/>
+          </p:blipFill>
+          <p:spPr>
+            <a:xfrm>
+              <a:off x="3568700" y="5511800"/>
+              <a:ext cx="5003800" cy="4038600"/>
+            </a:xfrm>
+            <a:prstGeom prst="rect">
+              <a:avLst/>
+            </a:prstGeom>
+          </p:spPr>
+        </p:pic>
+        <p:sp>
+          <p:nvSpPr>
+            <p:cNvPr id="8" name="TextBox 7"/>
+            <p:cNvSpPr txBox="1"/>
+            <p:nvPr/>
+          </p:nvSpPr>
+          <p:spPr>
+            <a:xfrm rot="16200000">
+              <a:off x="2474112" y="2676723"/>
+              <a:ext cx="1351652" cy="353943"/>
+            </a:xfrm>
+            <a:prstGeom prst="rect">
+              <a:avLst/>
+            </a:prstGeom>
+            <a:solidFill>
+              <a:schemeClr val="bg1"/>
+            </a:solidFill>
+          </p:spPr>
+          <p:txBody>
+            <a:bodyPr wrap="none" rtlCol="0">
+              <a:spAutoFit/>
+            </a:bodyPr>
+            <a:lstStyle/>
+            <a:p>
+              <a:r>
+                <a:rPr lang="en-US" sz="1700" dirty="0">
+                  <a:latin typeface="Helvetica" charset="0"/>
+                  <a:ea typeface="Helvetica" charset="0"/>
+                  <a:cs typeface="Helvetica" charset="0"/>
+                </a:rPr>
+                <a:t>Mean Slope</a:t>
+              </a:r>
+            </a:p>
+          </p:txBody>
+        </p:sp>
+        <p:sp>
+          <p:nvSpPr>
+            <p:cNvPr id="9" name="TextBox 8"/>
+            <p:cNvSpPr txBox="1"/>
+            <p:nvPr/>
+          </p:nvSpPr>
+          <p:spPr>
+            <a:xfrm rot="16200000">
+              <a:off x="1556513" y="7022139"/>
+              <a:ext cx="3161443" cy="353943"/>
+            </a:xfrm>
+            <a:prstGeom prst="rect">
+              <a:avLst/>
+            </a:prstGeom>
+            <a:solidFill>
+              <a:schemeClr val="bg1"/>
+            </a:solidFill>
+          </p:spPr>
+          <p:txBody>
+            <a:bodyPr wrap="none" rtlCol="0">
+              <a:spAutoFit/>
+            </a:bodyPr>
+            <a:lstStyle/>
+            <a:p>
+              <a:r>
+                <a:rPr lang="en-US" sz="1700" dirty="0">
+                  <a:latin typeface="Helvetica" charset="0"/>
+                  <a:ea typeface="Helvetica" charset="0"/>
+                  <a:cs typeface="Helvetica" charset="0"/>
+                </a:rPr>
+                <a:t>Proportion of significant slopes</a:t>
+              </a:r>
+            </a:p>
+          </p:txBody>
+        </p:sp>
         <p:grpSp>
           <p:nvGrpSpPr>
-            <p:cNvPr id="31" name="Group 30"/>
+            <p:cNvPr id="10" name="Group 9"/>
             <p:cNvGrpSpPr/>
             <p:nvPr/>
           </p:nvGrpSpPr>
           <p:grpSpPr>
             <a:xfrm>
-              <a:off x="2960263" y="1028700"/>
-              <a:ext cx="5612237" cy="8872954"/>
-              <a:chOff x="2960263" y="1028700"/>
-              <a:chExt cx="5612237" cy="8872954"/>
+              <a:off x="3880483" y="5485848"/>
+              <a:ext cx="1319592" cy="938624"/>
+              <a:chOff x="8497508" y="6819900"/>
+              <a:chExt cx="1319592" cy="938624"/>
             </a:xfrm>
           </p:grpSpPr>
-          <p:pic>
-            <p:nvPicPr>
-              <p:cNvPr id="4" name="Picture 3"/>
-              <p:cNvPicPr>
-                <a:picLocks noChangeAspect="1"/>
-              </p:cNvPicPr>
-              <p:nvPr/>
-            </p:nvPicPr>
-            <p:blipFill rotWithShape="1">
-              <a:blip r:embed="rId2">
-                <a:extLst>
-                  <a:ext uri="{28A0092B-C50C-407E-A947-70E740481C1C}">
-                    <a14:useLocalDpi xmlns:a14="http://schemas.microsoft.com/office/drawing/2010/main" val="0"/>
-                  </a:ext>
-                </a:extLst>
-              </a:blip>
-              <a:srcRect l="5093" t="12731" b="16436"/>
-              <a:stretch/>
-            </p:blipFill>
-            <p:spPr>
-              <a:xfrm>
-                <a:off x="3365500" y="1028700"/>
-                <a:ext cx="5207000" cy="3886200"/>
-              </a:xfrm>
-              <a:prstGeom prst="rect">
-                <a:avLst/>
-              </a:prstGeom>
-            </p:spPr>
-          </p:pic>
-          <p:pic>
-            <p:nvPicPr>
-              <p:cNvPr id="5" name="Picture 4"/>
-              <p:cNvPicPr>
-                <a:picLocks noChangeAspect="1"/>
-              </p:cNvPicPr>
-              <p:nvPr/>
-            </p:nvPicPr>
-            <p:blipFill rotWithShape="1">
-              <a:blip r:embed="rId3">
-                <a:extLst>
-                  <a:ext uri="{28A0092B-C50C-407E-A947-70E740481C1C}">
-                    <a14:useLocalDpi xmlns:a14="http://schemas.microsoft.com/office/drawing/2010/main" val="0"/>
-                  </a:ext>
-                </a:extLst>
-              </a:blip>
-              <a:srcRect l="4861" t="11575" b="14815"/>
-              <a:stretch/>
-            </p:blipFill>
-            <p:spPr>
-              <a:xfrm>
-                <a:off x="3568700" y="5511800"/>
-                <a:ext cx="5003800" cy="4038600"/>
-              </a:xfrm>
-              <a:prstGeom prst="rect">
-                <a:avLst/>
-              </a:prstGeom>
-            </p:spPr>
-          </p:pic>
           <p:sp>
             <p:nvSpPr>
-              <p:cNvPr id="8" name="TextBox 7"/>
-              <p:cNvSpPr txBox="1"/>
+              <p:cNvPr id="11" name="Triangle 10"/>
+              <p:cNvSpPr/>
               <p:nvPr/>
             </p:nvSpPr>
             <p:spPr>
-              <a:xfrm rot="16200000">
-                <a:off x="2474112" y="2676723"/>
-                <a:ext cx="1351652" cy="353943"/>
+              <a:xfrm>
+                <a:off x="8642026" y="7137901"/>
+                <a:ext cx="218072" cy="187993"/>
               </a:xfrm>
-              <a:prstGeom prst="rect">
+              <a:prstGeom prst="triangle">
                 <a:avLst/>
               </a:prstGeom>
               <a:solidFill>
                 <a:schemeClr val="bg1"/>
               </a:solidFill>
+              <a:ln>
+                <a:solidFill>
+                  <a:schemeClr val="tx1"/>
+                </a:solidFill>
+              </a:ln>
+            </p:spPr>
+            <p:style>
+              <a:lnRef idx="2">
+                <a:schemeClr val="accent1">
+                  <a:shade val="50000"/>
+                </a:schemeClr>
+              </a:lnRef>
+              <a:fillRef idx="1">
+                <a:schemeClr val="accent1"/>
+              </a:fillRef>
+              <a:effectRef idx="0">
+                <a:schemeClr val="accent1"/>
+              </a:effectRef>
+              <a:fontRef idx="minor">
+                <a:schemeClr val="lt1"/>
+              </a:fontRef>
+            </p:style>
+            <p:txBody>
+              <a:bodyPr rtlCol="0" anchor="ctr"/>
+              <a:lstStyle/>
+              <a:p>
+                <a:pPr algn="ctr"/>
+                <a:endParaRPr lang="en-US"/>
+              </a:p>
+            </p:txBody>
+          </p:sp>
+          <p:sp>
+            <p:nvSpPr>
+              <p:cNvPr id="12" name="Triangle 11"/>
+              <p:cNvSpPr/>
+              <p:nvPr/>
+            </p:nvSpPr>
+            <p:spPr>
+              <a:xfrm rot="10800000">
+                <a:off x="8638414" y="7461007"/>
+                <a:ext cx="219600" cy="187200"/>
+              </a:xfrm>
+              <a:prstGeom prst="triangle">
+                <a:avLst/>
+              </a:prstGeom>
+              <a:solidFill>
+                <a:schemeClr val="tx1"/>
+              </a:solidFill>
+              <a:ln>
+                <a:solidFill>
+                  <a:schemeClr val="tx1"/>
+                </a:solidFill>
+              </a:ln>
+            </p:spPr>
+            <p:style>
+              <a:lnRef idx="2">
+                <a:schemeClr val="accent1">
+                  <a:shade val="50000"/>
+                </a:schemeClr>
+              </a:lnRef>
+              <a:fillRef idx="1">
+                <a:schemeClr val="accent1"/>
+              </a:fillRef>
+              <a:effectRef idx="0">
+                <a:schemeClr val="accent1"/>
+              </a:effectRef>
+              <a:fontRef idx="minor">
+                <a:schemeClr val="lt1"/>
+              </a:fontRef>
+            </p:style>
+            <p:txBody>
+              <a:bodyPr rtlCol="0" anchor="ctr"/>
+              <a:lstStyle/>
+              <a:p>
+                <a:pPr algn="ctr"/>
+                <a:endParaRPr lang="en-US"/>
+              </a:p>
+            </p:txBody>
+          </p:sp>
+          <p:sp>
+            <p:nvSpPr>
+              <p:cNvPr id="13" name="TextBox 12"/>
+              <p:cNvSpPr txBox="1"/>
+              <p:nvPr/>
+            </p:nvSpPr>
+            <p:spPr>
+              <a:xfrm>
+                <a:off x="8871129" y="7087904"/>
+                <a:ext cx="721672" cy="276999"/>
+              </a:xfrm>
+              <a:prstGeom prst="rect">
+                <a:avLst/>
+              </a:prstGeom>
+              <a:noFill/>
             </p:spPr>
             <p:txBody>
               <a:bodyPr wrap="none" rtlCol="0">
@@ -14159,33 +14704,31 @@
               <a:lstStyle/>
               <a:p>
                 <a:r>
-                  <a:rPr lang="en-US" sz="1700" dirty="0">
+                  <a:rPr lang="en-US" sz="1200" dirty="0">
                     <a:latin typeface="Helvetica" charset="0"/>
                     <a:ea typeface="Helvetica" charset="0"/>
                     <a:cs typeface="Helvetica" charset="0"/>
                   </a:rPr>
-                  <a:t>Mean Slope</a:t>
+                  <a:t>Positive</a:t>
                 </a:r>
               </a:p>
             </p:txBody>
           </p:sp>
           <p:sp>
             <p:nvSpPr>
-              <p:cNvPr id="9" name="TextBox 8"/>
+              <p:cNvPr id="14" name="TextBox 13"/>
               <p:cNvSpPr txBox="1"/>
               <p:nvPr/>
             </p:nvSpPr>
             <p:spPr>
-              <a:xfrm rot="16200000">
-                <a:off x="1556513" y="7022139"/>
-                <a:ext cx="3161443" cy="353943"/>
+              <a:xfrm>
+                <a:off x="8883829" y="7420033"/>
+                <a:ext cx="788999" cy="276999"/>
               </a:xfrm>
               <a:prstGeom prst="rect">
                 <a:avLst/>
               </a:prstGeom>
-              <a:solidFill>
-                <a:schemeClr val="bg1"/>
-              </a:solidFill>
+              <a:noFill/>
             </p:spPr>
             <p:txBody>
               <a:bodyPr wrap="none" rtlCol="0">
@@ -14194,703 +14737,77 @@
               <a:lstStyle/>
               <a:p>
                 <a:r>
-                  <a:rPr lang="en-US" sz="1700" dirty="0">
+                  <a:rPr lang="en-US" sz="1200" dirty="0">
                     <a:latin typeface="Helvetica" charset="0"/>
                     <a:ea typeface="Helvetica" charset="0"/>
                     <a:cs typeface="Helvetica" charset="0"/>
                   </a:rPr>
-                  <a:t>Proportion of significant slopes</a:t>
+                  <a:t>Negative</a:t>
                 </a:r>
               </a:p>
             </p:txBody>
           </p:sp>
-          <p:grpSp>
-            <p:nvGrpSpPr>
-              <p:cNvPr id="10" name="Group 9"/>
-              <p:cNvGrpSpPr/>
+          <p:sp>
+            <p:nvSpPr>
+              <p:cNvPr id="15" name="Rectangle 14"/>
+              <p:cNvSpPr/>
               <p:nvPr/>
-            </p:nvGrpSpPr>
-            <p:grpSpPr>
+            </p:nvSpPr>
+            <p:spPr>
               <a:xfrm>
-                <a:off x="3880483" y="5499100"/>
-                <a:ext cx="1319592" cy="938624"/>
-                <a:chOff x="8497508" y="6819900"/>
-                <a:chExt cx="1319592" cy="938624"/>
+                <a:off x="8534999" y="6845739"/>
+                <a:ext cx="1231900" cy="912785"/>
               </a:xfrm>
-            </p:grpSpPr>
-            <p:sp>
-              <p:nvSpPr>
-                <p:cNvPr id="11" name="Triangle 10"/>
-                <p:cNvSpPr/>
-                <p:nvPr/>
-              </p:nvSpPr>
-              <p:spPr>
-                <a:xfrm>
-                  <a:off x="8642026" y="7137901"/>
-                  <a:ext cx="218072" cy="187993"/>
-                </a:xfrm>
-                <a:prstGeom prst="triangle">
-                  <a:avLst/>
-                </a:prstGeom>
-                <a:solidFill>
-                  <a:schemeClr val="bg1"/>
-                </a:solidFill>
-                <a:ln>
-                  <a:solidFill>
-                    <a:schemeClr val="tx1"/>
-                  </a:solidFill>
-                </a:ln>
-              </p:spPr>
-              <p:style>
-                <a:lnRef idx="2">
-                  <a:schemeClr val="accent1">
-                    <a:shade val="50000"/>
-                  </a:schemeClr>
-                </a:lnRef>
-                <a:fillRef idx="1">
-                  <a:schemeClr val="accent1"/>
-                </a:fillRef>
-                <a:effectRef idx="0">
-                  <a:schemeClr val="accent1"/>
-                </a:effectRef>
-                <a:fontRef idx="minor">
-                  <a:schemeClr val="lt1"/>
-                </a:fontRef>
-              </p:style>
-              <p:txBody>
-                <a:bodyPr rtlCol="0" anchor="ctr"/>
-                <a:lstStyle/>
-                <a:p>
-                  <a:pPr algn="ctr"/>
-                  <a:endParaRPr lang="en-US"/>
-                </a:p>
-              </p:txBody>
-            </p:sp>
-            <p:sp>
-              <p:nvSpPr>
-                <p:cNvPr id="12" name="Triangle 11"/>
-                <p:cNvSpPr/>
-                <p:nvPr/>
-              </p:nvSpPr>
-              <p:spPr>
-                <a:xfrm rot="10800000">
-                  <a:off x="8638414" y="7461007"/>
-                  <a:ext cx="219600" cy="187200"/>
-                </a:xfrm>
-                <a:prstGeom prst="triangle">
-                  <a:avLst/>
-                </a:prstGeom>
+              <a:prstGeom prst="rect">
+                <a:avLst/>
+              </a:prstGeom>
+              <a:noFill/>
+              <a:ln w="19050">
                 <a:solidFill>
                   <a:schemeClr val="tx1"/>
                 </a:solidFill>
-                <a:ln>
-                  <a:solidFill>
-                    <a:schemeClr val="tx1"/>
-                  </a:solidFill>
-                </a:ln>
-              </p:spPr>
-              <p:style>
-                <a:lnRef idx="2">
-                  <a:schemeClr val="accent1">
-                    <a:shade val="50000"/>
-                  </a:schemeClr>
-                </a:lnRef>
-                <a:fillRef idx="1">
-                  <a:schemeClr val="accent1"/>
-                </a:fillRef>
-                <a:effectRef idx="0">
-                  <a:schemeClr val="accent1"/>
-                </a:effectRef>
-                <a:fontRef idx="minor">
-                  <a:schemeClr val="lt1"/>
-                </a:fontRef>
-              </p:style>
-              <p:txBody>
-                <a:bodyPr rtlCol="0" anchor="ctr"/>
-                <a:lstStyle/>
-                <a:p>
-                  <a:pPr algn="ctr"/>
-                  <a:endParaRPr lang="en-US"/>
-                </a:p>
-              </p:txBody>
-            </p:sp>
-            <p:sp>
-              <p:nvSpPr>
-                <p:cNvPr id="13" name="TextBox 12"/>
-                <p:cNvSpPr txBox="1"/>
-                <p:nvPr/>
-              </p:nvSpPr>
-              <p:spPr>
-                <a:xfrm>
-                  <a:off x="8871129" y="7087904"/>
-                  <a:ext cx="721672" cy="276999"/>
-                </a:xfrm>
-                <a:prstGeom prst="rect">
-                  <a:avLst/>
-                </a:prstGeom>
-                <a:noFill/>
-              </p:spPr>
-              <p:txBody>
-                <a:bodyPr wrap="none" rtlCol="0">
-                  <a:spAutoFit/>
-                </a:bodyPr>
-                <a:lstStyle/>
-                <a:p>
-                  <a:r>
-                    <a:rPr lang="en-US" sz="1200" dirty="0">
-                      <a:latin typeface="Helvetica" charset="0"/>
-                      <a:ea typeface="Helvetica" charset="0"/>
-                      <a:cs typeface="Helvetica" charset="0"/>
-                    </a:rPr>
-                    <a:t>Positive</a:t>
-                  </a:r>
-                </a:p>
-              </p:txBody>
-            </p:sp>
-            <p:sp>
-              <p:nvSpPr>
-                <p:cNvPr id="14" name="TextBox 13"/>
-                <p:cNvSpPr txBox="1"/>
-                <p:nvPr/>
-              </p:nvSpPr>
-              <p:spPr>
-                <a:xfrm>
-                  <a:off x="8883829" y="7420033"/>
-                  <a:ext cx="788999" cy="276999"/>
-                </a:xfrm>
-                <a:prstGeom prst="rect">
-                  <a:avLst/>
-                </a:prstGeom>
-                <a:noFill/>
-              </p:spPr>
-              <p:txBody>
-                <a:bodyPr wrap="none" rtlCol="0">
-                  <a:spAutoFit/>
-                </a:bodyPr>
-                <a:lstStyle/>
-                <a:p>
-                  <a:r>
-                    <a:rPr lang="en-US" sz="1200" dirty="0">
-                      <a:latin typeface="Helvetica" charset="0"/>
-                      <a:ea typeface="Helvetica" charset="0"/>
-                      <a:cs typeface="Helvetica" charset="0"/>
-                    </a:rPr>
-                    <a:t>Negative</a:t>
-                  </a:r>
-                </a:p>
-              </p:txBody>
-            </p:sp>
-            <p:sp>
-              <p:nvSpPr>
-                <p:cNvPr id="15" name="Rectangle 14"/>
-                <p:cNvSpPr/>
-                <p:nvPr/>
-              </p:nvSpPr>
-              <p:spPr>
-                <a:xfrm>
-                  <a:off x="8534999" y="6845739"/>
-                  <a:ext cx="1231900" cy="912785"/>
-                </a:xfrm>
-                <a:prstGeom prst="rect">
-                  <a:avLst/>
-                </a:prstGeom>
-                <a:noFill/>
-                <a:ln w="19050">
-                  <a:solidFill>
-                    <a:schemeClr val="tx1"/>
-                  </a:solidFill>
-                </a:ln>
-              </p:spPr>
-              <p:style>
-                <a:lnRef idx="2">
-                  <a:schemeClr val="accent1">
-                    <a:shade val="50000"/>
-                  </a:schemeClr>
-                </a:lnRef>
-                <a:fillRef idx="1">
-                  <a:schemeClr val="accent1"/>
-                </a:fillRef>
-                <a:effectRef idx="0">
-                  <a:schemeClr val="accent1"/>
-                </a:effectRef>
-                <a:fontRef idx="minor">
-                  <a:schemeClr val="lt1"/>
-                </a:fontRef>
-              </p:style>
-              <p:txBody>
-                <a:bodyPr rtlCol="0" anchor="ctr"/>
-                <a:lstStyle/>
-                <a:p>
-                  <a:pPr algn="ctr"/>
-                  <a:endParaRPr lang="en-US"/>
-                </a:p>
-              </p:txBody>
-            </p:sp>
-            <p:sp>
-              <p:nvSpPr>
-                <p:cNvPr id="16" name="TextBox 15"/>
-                <p:cNvSpPr txBox="1"/>
-                <p:nvPr/>
-              </p:nvSpPr>
-              <p:spPr>
-                <a:xfrm>
-                  <a:off x="8497508" y="6819900"/>
-                  <a:ext cx="1319592" cy="307777"/>
-                </a:xfrm>
-                <a:prstGeom prst="rect">
-                  <a:avLst/>
-                </a:prstGeom>
-                <a:noFill/>
-              </p:spPr>
-              <p:txBody>
-                <a:bodyPr wrap="none" rtlCol="0">
-                  <a:spAutoFit/>
-                </a:bodyPr>
-                <a:lstStyle/>
-                <a:p>
-                  <a:r>
-                    <a:rPr lang="en-US" sz="1400" dirty="0">
-                      <a:latin typeface="Helvetica" charset="0"/>
-                      <a:ea typeface="Helvetica" charset="0"/>
-                      <a:cs typeface="Helvetica" charset="0"/>
-                    </a:rPr>
-                    <a:t>Cline direction</a:t>
-                  </a:r>
-                </a:p>
-              </p:txBody>
-            </p:sp>
-          </p:grpSp>
-          <p:grpSp>
-            <p:nvGrpSpPr>
-              <p:cNvPr id="17" name="Group 16"/>
-              <p:cNvGrpSpPr/>
-              <p:nvPr/>
-            </p:nvGrpSpPr>
-            <p:grpSpPr>
-              <a:xfrm>
-                <a:off x="3941632" y="1037751"/>
-                <a:ext cx="2411350" cy="970956"/>
-                <a:chOff x="5194300" y="2661244"/>
-                <a:chExt cx="2411350" cy="970956"/>
-              </a:xfrm>
-            </p:grpSpPr>
-            <p:cxnSp>
-              <p:nvCxnSpPr>
-                <p:cNvPr id="18" name="Straight Connector 17"/>
-                <p:cNvCxnSpPr/>
-                <p:nvPr/>
-              </p:nvCxnSpPr>
-              <p:spPr>
-                <a:xfrm>
-                  <a:off x="5266605" y="3133391"/>
-                  <a:ext cx="450000" cy="0"/>
-                </a:xfrm>
-                <a:prstGeom prst="line">
-                  <a:avLst/>
-                </a:prstGeom>
-                <a:ln w="28575">
-                  <a:solidFill>
-                    <a:schemeClr val="tx1"/>
-                  </a:solidFill>
-                  <a:prstDash val="dash"/>
-                </a:ln>
-              </p:spPr>
-              <p:style>
-                <a:lnRef idx="1">
-                  <a:schemeClr val="accent1"/>
-                </a:lnRef>
-                <a:fillRef idx="0">
-                  <a:schemeClr val="accent1"/>
-                </a:fillRef>
-                <a:effectRef idx="0">
-                  <a:schemeClr val="accent1"/>
-                </a:effectRef>
-                <a:fontRef idx="minor">
-                  <a:schemeClr val="tx1"/>
-                </a:fontRef>
-              </p:style>
-            </p:cxnSp>
-            <p:cxnSp>
-              <p:nvCxnSpPr>
-                <p:cNvPr id="19" name="Straight Connector 18"/>
-                <p:cNvCxnSpPr/>
-                <p:nvPr/>
-              </p:nvCxnSpPr>
-              <p:spPr>
-                <a:xfrm>
-                  <a:off x="5270740" y="2835945"/>
-                  <a:ext cx="450000" cy="0"/>
-                </a:xfrm>
-                <a:prstGeom prst="line">
-                  <a:avLst/>
-                </a:prstGeom>
-                <a:ln w="28575">
-                  <a:solidFill>
-                    <a:schemeClr val="tx1"/>
-                  </a:solidFill>
-                  <a:prstDash val="sysDot"/>
-                </a:ln>
-              </p:spPr>
-              <p:style>
-                <a:lnRef idx="1">
-                  <a:schemeClr val="accent1"/>
-                </a:lnRef>
-                <a:fillRef idx="0">
-                  <a:schemeClr val="accent1"/>
-                </a:fillRef>
-                <a:effectRef idx="0">
-                  <a:schemeClr val="accent1"/>
-                </a:effectRef>
-                <a:fontRef idx="minor">
-                  <a:schemeClr val="tx1"/>
-                </a:fontRef>
-              </p:style>
-            </p:cxnSp>
-            <p:sp>
-              <p:nvSpPr>
-                <p:cNvPr id="20" name="TextBox 19"/>
-                <p:cNvSpPr txBox="1"/>
-                <p:nvPr/>
-              </p:nvSpPr>
-              <p:spPr>
-                <a:xfrm>
-                  <a:off x="5687649" y="2697446"/>
-                  <a:ext cx="1588897" cy="276999"/>
-                </a:xfrm>
-                <a:prstGeom prst="rect">
-                  <a:avLst/>
-                </a:prstGeom>
-                <a:noFill/>
-              </p:spPr>
-              <p:txBody>
-                <a:bodyPr wrap="none" rtlCol="0">
-                  <a:spAutoFit/>
-                </a:bodyPr>
-                <a:lstStyle/>
-                <a:p>
-                  <a:r>
-                    <a:rPr lang="en-US" sz="1200" dirty="0">
-                      <a:latin typeface="Helvetica" charset="0"/>
-                      <a:ea typeface="Helvetica" charset="0"/>
-                      <a:cs typeface="Helvetica" charset="0"/>
-                    </a:rPr>
-                    <a:t>No migration (m = 0)</a:t>
-                  </a:r>
-                </a:p>
-              </p:txBody>
-            </p:sp>
-            <p:sp>
-              <p:nvSpPr>
-                <p:cNvPr id="21" name="TextBox 20"/>
-                <p:cNvSpPr txBox="1"/>
-                <p:nvPr/>
-              </p:nvSpPr>
-              <p:spPr>
-                <a:xfrm>
-                  <a:off x="5687649" y="2991263"/>
-                  <a:ext cx="1887055" cy="276999"/>
-                </a:xfrm>
-                <a:prstGeom prst="rect">
-                  <a:avLst/>
-                </a:prstGeom>
-                <a:noFill/>
-              </p:spPr>
-              <p:txBody>
-                <a:bodyPr wrap="none" rtlCol="0">
-                  <a:spAutoFit/>
-                </a:bodyPr>
-                <a:lstStyle/>
-                <a:p>
-                  <a:r>
-                    <a:rPr lang="en-US" sz="1200" dirty="0">
-                      <a:latin typeface="Helvetica" charset="0"/>
-                      <a:ea typeface="Helvetica" charset="0"/>
-                      <a:cs typeface="Helvetica" charset="0"/>
-                    </a:rPr>
-                    <a:t>Low migration (m = 0.01)</a:t>
-                  </a:r>
-                </a:p>
-              </p:txBody>
-            </p:sp>
-            <p:sp>
-              <p:nvSpPr>
-                <p:cNvPr id="22" name="TextBox 21"/>
-                <p:cNvSpPr txBox="1"/>
-                <p:nvPr/>
-              </p:nvSpPr>
-              <p:spPr>
-                <a:xfrm>
-                  <a:off x="5684931" y="3319121"/>
-                  <a:ext cx="1920719" cy="276999"/>
-                </a:xfrm>
-                <a:prstGeom prst="rect">
-                  <a:avLst/>
-                </a:prstGeom>
-                <a:noFill/>
-              </p:spPr>
-              <p:txBody>
-                <a:bodyPr wrap="none" rtlCol="0">
-                  <a:spAutoFit/>
-                </a:bodyPr>
-                <a:lstStyle/>
-                <a:p>
-                  <a:r>
-                    <a:rPr lang="en-US" sz="1200" dirty="0">
-                      <a:latin typeface="Helvetica" charset="0"/>
-                      <a:ea typeface="Helvetica" charset="0"/>
-                      <a:cs typeface="Helvetica" charset="0"/>
-                    </a:rPr>
-                    <a:t>High migration (m = 0.05)</a:t>
-                  </a:r>
-                </a:p>
-              </p:txBody>
-            </p:sp>
-            <p:sp>
-              <p:nvSpPr>
-                <p:cNvPr id="23" name="Rectangle 22"/>
-                <p:cNvSpPr/>
-                <p:nvPr/>
-              </p:nvSpPr>
-              <p:spPr>
-                <a:xfrm>
-                  <a:off x="5194300" y="2661244"/>
-                  <a:ext cx="2336800" cy="970956"/>
-                </a:xfrm>
-                <a:prstGeom prst="rect">
-                  <a:avLst/>
-                </a:prstGeom>
-                <a:noFill/>
-                <a:ln w="19050">
-                  <a:solidFill>
-                    <a:schemeClr val="tx1"/>
-                  </a:solidFill>
-                </a:ln>
-              </p:spPr>
-              <p:style>
-                <a:lnRef idx="2">
-                  <a:schemeClr val="accent1">
-                    <a:shade val="50000"/>
-                  </a:schemeClr>
-                </a:lnRef>
-                <a:fillRef idx="1">
-                  <a:schemeClr val="accent1"/>
-                </a:fillRef>
-                <a:effectRef idx="0">
-                  <a:schemeClr val="accent1"/>
-                </a:effectRef>
-                <a:fontRef idx="minor">
-                  <a:schemeClr val="lt1"/>
-                </a:fontRef>
-              </p:style>
-              <p:txBody>
-                <a:bodyPr rtlCol="0" anchor="ctr"/>
-                <a:lstStyle/>
-                <a:p>
-                  <a:pPr algn="ctr"/>
-                  <a:endParaRPr lang="en-US"/>
-                </a:p>
-              </p:txBody>
-            </p:sp>
-            <p:sp>
-              <p:nvSpPr>
-                <p:cNvPr id="24" name="Rectangle 23"/>
-                <p:cNvSpPr/>
-                <p:nvPr/>
-              </p:nvSpPr>
-              <p:spPr>
-                <a:xfrm>
-                  <a:off x="5420857" y="3056103"/>
-                  <a:ext cx="154379" cy="154379"/>
-                </a:xfrm>
-                <a:prstGeom prst="rect">
-                  <a:avLst/>
-                </a:prstGeom>
-                <a:solidFill>
-                  <a:schemeClr val="bg1">
-                    <a:lumMod val="75000"/>
-                  </a:schemeClr>
-                </a:solidFill>
-                <a:ln>
-                  <a:solidFill>
-                    <a:schemeClr val="tx1"/>
-                  </a:solidFill>
-                </a:ln>
-              </p:spPr>
-              <p:style>
-                <a:lnRef idx="2">
-                  <a:schemeClr val="accent1">
-                    <a:shade val="50000"/>
-                  </a:schemeClr>
-                </a:lnRef>
-                <a:fillRef idx="1">
-                  <a:schemeClr val="accent1"/>
-                </a:fillRef>
-                <a:effectRef idx="0">
-                  <a:schemeClr val="accent1"/>
-                </a:effectRef>
-                <a:fontRef idx="minor">
-                  <a:schemeClr val="lt1"/>
-                </a:fontRef>
-              </p:style>
-              <p:txBody>
-                <a:bodyPr rtlCol="0" anchor="ctr"/>
-                <a:lstStyle/>
-                <a:p>
-                  <a:pPr algn="ctr"/>
-                  <a:endParaRPr lang="en-US"/>
-                </a:p>
-              </p:txBody>
-            </p:sp>
-            <p:sp>
-              <p:nvSpPr>
-                <p:cNvPr id="25" name="Rectangle 24"/>
-                <p:cNvSpPr/>
-                <p:nvPr/>
-              </p:nvSpPr>
-              <p:spPr>
-                <a:xfrm rot="2700000">
-                  <a:off x="5432166" y="3385538"/>
-                  <a:ext cx="154800" cy="154800"/>
-                </a:xfrm>
-                <a:prstGeom prst="rect">
-                  <a:avLst/>
-                </a:prstGeom>
-                <a:solidFill>
-                  <a:schemeClr val="tx1"/>
-                </a:solidFill>
-                <a:ln>
-                  <a:solidFill>
-                    <a:schemeClr val="tx1"/>
-                  </a:solidFill>
-                </a:ln>
-              </p:spPr>
-              <p:style>
-                <a:lnRef idx="2">
-                  <a:schemeClr val="accent1">
-                    <a:shade val="50000"/>
-                  </a:schemeClr>
-                </a:lnRef>
-                <a:fillRef idx="1">
-                  <a:schemeClr val="accent1"/>
-                </a:fillRef>
-                <a:effectRef idx="0">
-                  <a:schemeClr val="accent1"/>
-                </a:effectRef>
-                <a:fontRef idx="minor">
-                  <a:schemeClr val="lt1"/>
-                </a:fontRef>
-              </p:style>
-              <p:txBody>
-                <a:bodyPr rtlCol="0" anchor="ctr"/>
-                <a:lstStyle/>
-                <a:p>
-                  <a:pPr algn="ctr"/>
-                  <a:endParaRPr lang="en-US"/>
-                </a:p>
-              </p:txBody>
-            </p:sp>
-            <p:sp>
-              <p:nvSpPr>
-                <p:cNvPr id="26" name="Oval 25"/>
-                <p:cNvSpPr/>
-                <p:nvPr/>
-              </p:nvSpPr>
-              <p:spPr>
-                <a:xfrm>
-                  <a:off x="5414870" y="2758775"/>
-                  <a:ext cx="154800" cy="154800"/>
-                </a:xfrm>
-                <a:prstGeom prst="ellipse">
-                  <a:avLst/>
-                </a:prstGeom>
-                <a:solidFill>
-                  <a:schemeClr val="bg1"/>
-                </a:solidFill>
-                <a:ln>
-                  <a:solidFill>
-                    <a:schemeClr val="tx1"/>
-                  </a:solidFill>
-                </a:ln>
-              </p:spPr>
-              <p:style>
-                <a:lnRef idx="2">
-                  <a:schemeClr val="accent1">
-                    <a:shade val="50000"/>
-                  </a:schemeClr>
-                </a:lnRef>
-                <a:fillRef idx="1">
-                  <a:schemeClr val="accent1"/>
-                </a:fillRef>
-                <a:effectRef idx="0">
-                  <a:schemeClr val="accent1"/>
-                </a:effectRef>
-                <a:fontRef idx="minor">
-                  <a:schemeClr val="lt1"/>
-                </a:fontRef>
-              </p:style>
-              <p:txBody>
-                <a:bodyPr rtlCol="0" anchor="ctr"/>
-                <a:lstStyle/>
-                <a:p>
-                  <a:pPr algn="ctr"/>
-                  <a:endParaRPr lang="en-US"/>
-                </a:p>
-              </p:txBody>
-            </p:sp>
-            <p:cxnSp>
-              <p:nvCxnSpPr>
-                <p:cNvPr id="27" name="Straight Connector 26"/>
-                <p:cNvCxnSpPr/>
-                <p:nvPr/>
-              </p:nvCxnSpPr>
-              <p:spPr>
-                <a:xfrm>
-                  <a:off x="5266605" y="3457620"/>
-                  <a:ext cx="450000" cy="0"/>
-                </a:xfrm>
-                <a:prstGeom prst="line">
-                  <a:avLst/>
-                </a:prstGeom>
-                <a:ln w="28575">
-                  <a:solidFill>
-                    <a:schemeClr val="tx1"/>
-                  </a:solidFill>
-                  <a:prstDash val="solid"/>
-                </a:ln>
-              </p:spPr>
-              <p:style>
-                <a:lnRef idx="1">
-                  <a:schemeClr val="accent1"/>
-                </a:lnRef>
-                <a:fillRef idx="0">
-                  <a:schemeClr val="accent1"/>
-                </a:fillRef>
-                <a:effectRef idx="0">
-                  <a:schemeClr val="accent1"/>
-                </a:effectRef>
-                <a:fontRef idx="minor">
-                  <a:schemeClr val="tx1"/>
-                </a:fontRef>
-              </p:style>
-            </p:cxnSp>
-          </p:grpSp>
+              </a:ln>
+            </p:spPr>
+            <p:style>
+              <a:lnRef idx="2">
+                <a:schemeClr val="accent1">
+                  <a:shade val="50000"/>
+                </a:schemeClr>
+              </a:lnRef>
+              <a:fillRef idx="1">
+                <a:schemeClr val="accent1"/>
+              </a:fillRef>
+              <a:effectRef idx="0">
+                <a:schemeClr val="accent1"/>
+              </a:effectRef>
+              <a:fontRef idx="minor">
+                <a:schemeClr val="lt1"/>
+              </a:fontRef>
+            </p:style>
+            <p:txBody>
+              <a:bodyPr rtlCol="0" anchor="ctr"/>
+              <a:lstStyle/>
+              <a:p>
+                <a:pPr algn="ctr"/>
+                <a:endParaRPr lang="en-US"/>
+              </a:p>
+            </p:txBody>
+          </p:sp>
           <p:sp>
             <p:nvSpPr>
-              <p:cNvPr id="28" name="TextBox 27"/>
+              <p:cNvPr id="16" name="TextBox 15"/>
               <p:cNvSpPr txBox="1"/>
               <p:nvPr/>
             </p:nvSpPr>
             <p:spPr>
               <a:xfrm>
-                <a:off x="4621314" y="9563100"/>
-                <a:ext cx="3154774" cy="338554"/>
+                <a:off x="8497508" y="6819900"/>
+                <a:ext cx="1319592" cy="307777"/>
               </a:xfrm>
               <a:prstGeom prst="rect">
                 <a:avLst/>
               </a:prstGeom>
-              <a:solidFill>
-                <a:schemeClr val="bg1"/>
-              </a:solidFill>
+              <a:noFill/>
             </p:spPr>
             <p:txBody>
               <a:bodyPr wrap="none" rtlCol="0">
@@ -14899,38 +14816,73 @@
               <a:lstStyle/>
               <a:p>
                 <a:r>
-                  <a:rPr lang="en-US" sz="1600">
+                  <a:rPr lang="en-US" sz="1400" dirty="0">
                     <a:latin typeface="Helvetica" charset="0"/>
                     <a:ea typeface="Helvetica" charset="0"/>
                     <a:cs typeface="Helvetica" charset="0"/>
                   </a:rPr>
-                  <a:t>Initial allele frequency (</a:t>
+                  <a:t>Cline direction</a:t>
                 </a:r>
-                <a:r>
-                  <a:rPr lang="en-US" sz="1600" i="1">
-                    <a:latin typeface="Helvetica" charset="0"/>
-                    <a:ea typeface="Helvetica" charset="0"/>
-                    <a:cs typeface="Helvetica" charset="0"/>
-                  </a:rPr>
-                  <a:t>CYP – Li</a:t>
-                </a:r>
-                <a:r>
-                  <a:rPr lang="en-US" sz="1600">
-                    <a:latin typeface="Helvetica" charset="0"/>
-                    <a:ea typeface="Helvetica" charset="0"/>
-                    <a:cs typeface="Helvetica" charset="0"/>
-                  </a:rPr>
-                  <a:t>)</a:t>
-                </a:r>
-                <a:endParaRPr lang="en-US" sz="1600" dirty="0">
-                  <a:latin typeface="Helvetica" charset="0"/>
-                  <a:ea typeface="Helvetica" charset="0"/>
-                  <a:cs typeface="Helvetica" charset="0"/>
-                </a:endParaRPr>
               </a:p>
             </p:txBody>
           </p:sp>
         </p:grpSp>
+        <p:sp>
+          <p:nvSpPr>
+            <p:cNvPr id="28" name="TextBox 27"/>
+            <p:cNvSpPr txBox="1"/>
+            <p:nvPr/>
+          </p:nvSpPr>
+          <p:spPr>
+            <a:xfrm>
+              <a:off x="4621314" y="9563100"/>
+              <a:ext cx="3154774" cy="338554"/>
+            </a:xfrm>
+            <a:prstGeom prst="rect">
+              <a:avLst/>
+            </a:prstGeom>
+            <a:solidFill>
+              <a:schemeClr val="bg1"/>
+            </a:solidFill>
+          </p:spPr>
+          <p:txBody>
+            <a:bodyPr wrap="none" rtlCol="0">
+              <a:spAutoFit/>
+            </a:bodyPr>
+            <a:lstStyle/>
+            <a:p>
+              <a:r>
+                <a:rPr lang="en-US" sz="1600">
+                  <a:latin typeface="Helvetica" charset="0"/>
+                  <a:ea typeface="Helvetica" charset="0"/>
+                  <a:cs typeface="Helvetica" charset="0"/>
+                </a:rPr>
+                <a:t>Initial allele frequency (</a:t>
+              </a:r>
+              <a:r>
+                <a:rPr lang="en-US" sz="1600" i="1">
+                  <a:latin typeface="Helvetica" charset="0"/>
+                  <a:ea typeface="Helvetica" charset="0"/>
+                  <a:cs typeface="Helvetica" charset="0"/>
+                </a:rPr>
+                <a:t>CYP – Li</a:t>
+              </a:r>
+              <a:r>
+                <a:rPr lang="en-US" sz="1600">
+                  <a:latin typeface="Helvetica" charset="0"/>
+                  <a:ea typeface="Helvetica" charset="0"/>
+                  <a:cs typeface="Helvetica" charset="0"/>
+                </a:rPr>
+                <a:t>)</a:t>
+              </a:r>
+              <a:endParaRPr lang="en-US" sz="1600" dirty="0">
+                <a:latin typeface="Helvetica" charset="0"/>
+                <a:ea typeface="Helvetica" charset="0"/>
+                <a:cs typeface="Helvetica" charset="0"/>
+              </a:endParaRPr>
+            </a:p>
+          </p:txBody>
+        </p:sp>
         <p:sp>
           <p:nvSpPr>
             <p:cNvPr id="32" name="TextBox 31"/>
@@ -15034,13 +14986,523 @@
             </a:p>
           </p:txBody>
         </p:sp>
+        <p:grpSp>
+          <p:nvGrpSpPr>
+            <p:cNvPr id="29" name="Group 28">
+              <a:extLst>
+                <a:ext uri="{FF2B5EF4-FFF2-40B4-BE49-F238E27FC236}">
+                  <a16:creationId xmlns:a16="http://schemas.microsoft.com/office/drawing/2014/main" id="{63210A02-1066-644C-AC67-E639524AE545}"/>
+                </a:ext>
+              </a:extLst>
+            </p:cNvPr>
+            <p:cNvGrpSpPr/>
+            <p:nvPr/>
+          </p:nvGrpSpPr>
+          <p:grpSpPr>
+            <a:xfrm>
+              <a:off x="3941314" y="1028700"/>
+              <a:ext cx="2417120" cy="970956"/>
+              <a:chOff x="5194300" y="2661244"/>
+              <a:chExt cx="2417120" cy="970956"/>
+            </a:xfrm>
+          </p:grpSpPr>
+          <p:cxnSp>
+            <p:nvCxnSpPr>
+              <p:cNvPr id="30" name="Straight Connector 29">
+                <a:extLst>
+                  <a:ext uri="{FF2B5EF4-FFF2-40B4-BE49-F238E27FC236}">
+                    <a16:creationId xmlns:a16="http://schemas.microsoft.com/office/drawing/2014/main" id="{C652C78B-36DD-504C-AB12-7136A64E065B}"/>
+                  </a:ext>
+                </a:extLst>
+              </p:cNvPr>
+              <p:cNvCxnSpPr/>
+              <p:nvPr/>
+            </p:nvCxnSpPr>
+            <p:spPr>
+              <a:xfrm>
+                <a:off x="5256666" y="3133391"/>
+                <a:ext cx="450000" cy="0"/>
+              </a:xfrm>
+              <a:prstGeom prst="line">
+                <a:avLst/>
+              </a:prstGeom>
+              <a:ln w="28575">
+                <a:solidFill>
+                  <a:schemeClr val="tx1"/>
+                </a:solidFill>
+                <a:prstDash val="dash"/>
+              </a:ln>
+            </p:spPr>
+            <p:style>
+              <a:lnRef idx="1">
+                <a:schemeClr val="accent1"/>
+              </a:lnRef>
+              <a:fillRef idx="0">
+                <a:schemeClr val="accent1"/>
+              </a:fillRef>
+              <a:effectRef idx="0">
+                <a:schemeClr val="accent1"/>
+              </a:effectRef>
+              <a:fontRef idx="minor">
+                <a:schemeClr val="tx1"/>
+              </a:fontRef>
+            </p:style>
+          </p:cxnSp>
+          <p:cxnSp>
+            <p:nvCxnSpPr>
+              <p:cNvPr id="34" name="Straight Connector 33">
+                <a:extLst>
+                  <a:ext uri="{FF2B5EF4-FFF2-40B4-BE49-F238E27FC236}">
+                    <a16:creationId xmlns:a16="http://schemas.microsoft.com/office/drawing/2014/main" id="{CDE48A94-6CAD-9E43-8D08-97B4840A5B0E}"/>
+                  </a:ext>
+                </a:extLst>
+              </p:cNvPr>
+              <p:cNvCxnSpPr/>
+              <p:nvPr/>
+            </p:nvCxnSpPr>
+            <p:spPr>
+              <a:xfrm>
+                <a:off x="5260801" y="2835945"/>
+                <a:ext cx="450000" cy="0"/>
+              </a:xfrm>
+              <a:prstGeom prst="line">
+                <a:avLst/>
+              </a:prstGeom>
+              <a:ln w="28575">
+                <a:solidFill>
+                  <a:schemeClr val="tx1"/>
+                </a:solidFill>
+                <a:prstDash val="sysDot"/>
+              </a:ln>
+            </p:spPr>
+            <p:style>
+              <a:lnRef idx="1">
+                <a:schemeClr val="accent1"/>
+              </a:lnRef>
+              <a:fillRef idx="0">
+                <a:schemeClr val="accent1"/>
+              </a:fillRef>
+              <a:effectRef idx="0">
+                <a:schemeClr val="accent1"/>
+              </a:effectRef>
+              <a:fontRef idx="minor">
+                <a:schemeClr val="tx1"/>
+              </a:fontRef>
+            </p:style>
+          </p:cxnSp>
+          <p:sp>
+            <p:nvSpPr>
+              <p:cNvPr id="35" name="TextBox 34">
+                <a:extLst>
+                  <a:ext uri="{FF2B5EF4-FFF2-40B4-BE49-F238E27FC236}">
+                    <a16:creationId xmlns:a16="http://schemas.microsoft.com/office/drawing/2014/main" id="{7D467C51-79FD-7142-A712-E6CD2028B1DA}"/>
+                  </a:ext>
+                </a:extLst>
+              </p:cNvPr>
+              <p:cNvSpPr txBox="1"/>
+              <p:nvPr/>
+            </p:nvSpPr>
+            <p:spPr>
+              <a:xfrm>
+                <a:off x="5667771" y="2697446"/>
+                <a:ext cx="1614545" cy="276999"/>
+              </a:xfrm>
+              <a:prstGeom prst="rect">
+                <a:avLst/>
+              </a:prstGeom>
+              <a:noFill/>
+            </p:spPr>
+            <p:txBody>
+              <a:bodyPr wrap="none" rtlCol="0">
+                <a:spAutoFit/>
+              </a:bodyPr>
+              <a:lstStyle/>
+              <a:p>
+                <a:r>
+                  <a:rPr lang="en-US" sz="1200" dirty="0">
+                    <a:latin typeface="Helvetica" charset="0"/>
+                    <a:ea typeface="Helvetica" charset="0"/>
+                    <a:cs typeface="Helvetica" charset="0"/>
+                  </a:rPr>
+                  <a:t>No gene flow (m = 0)</a:t>
+                </a:r>
+              </a:p>
+            </p:txBody>
+          </p:sp>
+          <p:sp>
+            <p:nvSpPr>
+              <p:cNvPr id="36" name="TextBox 35">
+                <a:extLst>
+                  <a:ext uri="{FF2B5EF4-FFF2-40B4-BE49-F238E27FC236}">
+                    <a16:creationId xmlns:a16="http://schemas.microsoft.com/office/drawing/2014/main" id="{0FD6C07B-01CE-104C-A80F-87BC0D0567B4}"/>
+                  </a:ext>
+                </a:extLst>
+              </p:cNvPr>
+              <p:cNvSpPr txBox="1"/>
+              <p:nvPr/>
+            </p:nvSpPr>
+            <p:spPr>
+              <a:xfrm>
+                <a:off x="5667771" y="2991263"/>
+                <a:ext cx="1912703" cy="276999"/>
+              </a:xfrm>
+              <a:prstGeom prst="rect">
+                <a:avLst/>
+              </a:prstGeom>
+              <a:noFill/>
+            </p:spPr>
+            <p:txBody>
+              <a:bodyPr wrap="none" rtlCol="0">
+                <a:spAutoFit/>
+              </a:bodyPr>
+              <a:lstStyle/>
+              <a:p>
+                <a:r>
+                  <a:rPr lang="en-US" sz="1200" dirty="0">
+                    <a:latin typeface="Helvetica" charset="0"/>
+                    <a:ea typeface="Helvetica" charset="0"/>
+                    <a:cs typeface="Helvetica" charset="0"/>
+                  </a:rPr>
+                  <a:t>Low gene flow (m = 0.01)</a:t>
+                </a:r>
+              </a:p>
+            </p:txBody>
+          </p:sp>
+          <p:sp>
+            <p:nvSpPr>
+              <p:cNvPr id="37" name="TextBox 36">
+                <a:extLst>
+                  <a:ext uri="{FF2B5EF4-FFF2-40B4-BE49-F238E27FC236}">
+                    <a16:creationId xmlns:a16="http://schemas.microsoft.com/office/drawing/2014/main" id="{2256CE28-BF40-9647-89D4-60B84EF5CB8D}"/>
+                  </a:ext>
+                </a:extLst>
+              </p:cNvPr>
+              <p:cNvSpPr txBox="1"/>
+              <p:nvPr/>
+            </p:nvSpPr>
+            <p:spPr>
+              <a:xfrm>
+                <a:off x="5665053" y="3319121"/>
+                <a:ext cx="1946367" cy="276999"/>
+              </a:xfrm>
+              <a:prstGeom prst="rect">
+                <a:avLst/>
+              </a:prstGeom>
+              <a:noFill/>
+            </p:spPr>
+            <p:txBody>
+              <a:bodyPr wrap="none" rtlCol="0">
+                <a:spAutoFit/>
+              </a:bodyPr>
+              <a:lstStyle/>
+              <a:p>
+                <a:r>
+                  <a:rPr lang="en-US" sz="1200" dirty="0">
+                    <a:latin typeface="Helvetica" charset="0"/>
+                    <a:ea typeface="Helvetica" charset="0"/>
+                    <a:cs typeface="Helvetica" charset="0"/>
+                  </a:rPr>
+                  <a:t>High gene flow (m = 0.05)</a:t>
+                </a:r>
+              </a:p>
+            </p:txBody>
+          </p:sp>
+          <p:sp>
+            <p:nvSpPr>
+              <p:cNvPr id="38" name="Rectangle 37">
+                <a:extLst>
+                  <a:ext uri="{FF2B5EF4-FFF2-40B4-BE49-F238E27FC236}">
+                    <a16:creationId xmlns:a16="http://schemas.microsoft.com/office/drawing/2014/main" id="{D4F32B58-1DD0-B947-94CE-062CCE527184}"/>
+                  </a:ext>
+                </a:extLst>
+              </p:cNvPr>
+              <p:cNvSpPr/>
+              <p:nvPr/>
+            </p:nvSpPr>
+            <p:spPr>
+              <a:xfrm>
+                <a:off x="5194300" y="2661244"/>
+                <a:ext cx="2336800" cy="970956"/>
+              </a:xfrm>
+              <a:prstGeom prst="rect">
+                <a:avLst/>
+              </a:prstGeom>
+              <a:noFill/>
+              <a:ln w="19050">
+                <a:solidFill>
+                  <a:schemeClr val="tx1"/>
+                </a:solidFill>
+              </a:ln>
+            </p:spPr>
+            <p:style>
+              <a:lnRef idx="2">
+                <a:schemeClr val="accent1">
+                  <a:shade val="50000"/>
+                </a:schemeClr>
+              </a:lnRef>
+              <a:fillRef idx="1">
+                <a:schemeClr val="accent1"/>
+              </a:fillRef>
+              <a:effectRef idx="0">
+                <a:schemeClr val="accent1"/>
+              </a:effectRef>
+              <a:fontRef idx="minor">
+                <a:schemeClr val="lt1"/>
+              </a:fontRef>
+            </p:style>
+            <p:txBody>
+              <a:bodyPr rtlCol="0" anchor="ctr"/>
+              <a:lstStyle/>
+              <a:p>
+                <a:pPr algn="ctr"/>
+                <a:endParaRPr lang="en-US"/>
+              </a:p>
+            </p:txBody>
+          </p:sp>
+          <p:sp>
+            <p:nvSpPr>
+              <p:cNvPr id="39" name="Rectangle 38">
+                <a:extLst>
+                  <a:ext uri="{FF2B5EF4-FFF2-40B4-BE49-F238E27FC236}">
+                    <a16:creationId xmlns:a16="http://schemas.microsoft.com/office/drawing/2014/main" id="{BCA886B9-53D1-2241-9AAC-52C13AC4315B}"/>
+                  </a:ext>
+                </a:extLst>
+              </p:cNvPr>
+              <p:cNvSpPr/>
+              <p:nvPr/>
+            </p:nvSpPr>
+            <p:spPr>
+              <a:xfrm>
+                <a:off x="5410918" y="3056103"/>
+                <a:ext cx="154379" cy="154379"/>
+              </a:xfrm>
+              <a:prstGeom prst="rect">
+                <a:avLst/>
+              </a:prstGeom>
+              <a:solidFill>
+                <a:schemeClr val="bg1">
+                  <a:lumMod val="75000"/>
+                </a:schemeClr>
+              </a:solidFill>
+              <a:ln>
+                <a:solidFill>
+                  <a:schemeClr val="tx1"/>
+                </a:solidFill>
+              </a:ln>
+            </p:spPr>
+            <p:style>
+              <a:lnRef idx="2">
+                <a:schemeClr val="accent1">
+                  <a:shade val="50000"/>
+                </a:schemeClr>
+              </a:lnRef>
+              <a:fillRef idx="1">
+                <a:schemeClr val="accent1"/>
+              </a:fillRef>
+              <a:effectRef idx="0">
+                <a:schemeClr val="accent1"/>
+              </a:effectRef>
+              <a:fontRef idx="minor">
+                <a:schemeClr val="lt1"/>
+              </a:fontRef>
+            </p:style>
+            <p:txBody>
+              <a:bodyPr rtlCol="0" anchor="ctr"/>
+              <a:lstStyle/>
+              <a:p>
+                <a:pPr algn="ctr"/>
+                <a:endParaRPr lang="en-US"/>
+              </a:p>
+            </p:txBody>
+          </p:sp>
+          <p:sp>
+            <p:nvSpPr>
+              <p:cNvPr id="40" name="Rectangle 39">
+                <a:extLst>
+                  <a:ext uri="{FF2B5EF4-FFF2-40B4-BE49-F238E27FC236}">
+                    <a16:creationId xmlns:a16="http://schemas.microsoft.com/office/drawing/2014/main" id="{3CA0517A-5B1F-824A-AE03-3C1CAAE3975D}"/>
+                  </a:ext>
+                </a:extLst>
+              </p:cNvPr>
+              <p:cNvSpPr/>
+              <p:nvPr/>
+            </p:nvSpPr>
+            <p:spPr>
+              <a:xfrm rot="2700000">
+                <a:off x="5422227" y="3385538"/>
+                <a:ext cx="154800" cy="154800"/>
+              </a:xfrm>
+              <a:prstGeom prst="rect">
+                <a:avLst/>
+              </a:prstGeom>
+              <a:solidFill>
+                <a:schemeClr val="tx1"/>
+              </a:solidFill>
+              <a:ln>
+                <a:solidFill>
+                  <a:schemeClr val="tx1"/>
+                </a:solidFill>
+              </a:ln>
+            </p:spPr>
+            <p:style>
+              <a:lnRef idx="2">
+                <a:schemeClr val="accent1">
+                  <a:shade val="50000"/>
+                </a:schemeClr>
+              </a:lnRef>
+              <a:fillRef idx="1">
+                <a:schemeClr val="accent1"/>
+              </a:fillRef>
+              <a:effectRef idx="0">
+                <a:schemeClr val="accent1"/>
+              </a:effectRef>
+              <a:fontRef idx="minor">
+                <a:schemeClr val="lt1"/>
+              </a:fontRef>
+            </p:style>
+            <p:txBody>
+              <a:bodyPr rtlCol="0" anchor="ctr"/>
+              <a:lstStyle/>
+              <a:p>
+                <a:pPr algn="ctr"/>
+                <a:endParaRPr lang="en-US"/>
+              </a:p>
+            </p:txBody>
+          </p:sp>
+          <p:sp>
+            <p:nvSpPr>
+              <p:cNvPr id="41" name="Oval 40">
+                <a:extLst>
+                  <a:ext uri="{FF2B5EF4-FFF2-40B4-BE49-F238E27FC236}">
+                    <a16:creationId xmlns:a16="http://schemas.microsoft.com/office/drawing/2014/main" id="{F635BA4D-0B0E-B34B-A37E-7ABCC7A11A04}"/>
+                  </a:ext>
+                </a:extLst>
+              </p:cNvPr>
+              <p:cNvSpPr/>
+              <p:nvPr/>
+            </p:nvSpPr>
+            <p:spPr>
+              <a:xfrm>
+                <a:off x="5404931" y="2758775"/>
+                <a:ext cx="154800" cy="154800"/>
+              </a:xfrm>
+              <a:prstGeom prst="ellipse">
+                <a:avLst/>
+              </a:prstGeom>
+              <a:solidFill>
+                <a:schemeClr val="bg1"/>
+              </a:solidFill>
+              <a:ln>
+                <a:solidFill>
+                  <a:schemeClr val="tx1"/>
+                </a:solidFill>
+              </a:ln>
+            </p:spPr>
+            <p:style>
+              <a:lnRef idx="2">
+                <a:schemeClr val="accent1">
+                  <a:shade val="50000"/>
+                </a:schemeClr>
+              </a:lnRef>
+              <a:fillRef idx="1">
+                <a:schemeClr val="accent1"/>
+              </a:fillRef>
+              <a:effectRef idx="0">
+                <a:schemeClr val="accent1"/>
+              </a:effectRef>
+              <a:fontRef idx="minor">
+                <a:schemeClr val="lt1"/>
+              </a:fontRef>
+            </p:style>
+            <p:txBody>
+              <a:bodyPr rtlCol="0" anchor="ctr"/>
+              <a:lstStyle/>
+              <a:p>
+                <a:pPr algn="ctr"/>
+                <a:endParaRPr lang="en-US"/>
+              </a:p>
+            </p:txBody>
+          </p:sp>
+          <p:cxnSp>
+            <p:nvCxnSpPr>
+              <p:cNvPr id="42" name="Straight Connector 41">
+                <a:extLst>
+                  <a:ext uri="{FF2B5EF4-FFF2-40B4-BE49-F238E27FC236}">
+                    <a16:creationId xmlns:a16="http://schemas.microsoft.com/office/drawing/2014/main" id="{CD9297BA-A6A5-7A4D-AA80-7DCE39862B93}"/>
+                  </a:ext>
+                </a:extLst>
+              </p:cNvPr>
+              <p:cNvCxnSpPr/>
+              <p:nvPr/>
+            </p:nvCxnSpPr>
+            <p:spPr>
+              <a:xfrm>
+                <a:off x="5256666" y="3457620"/>
+                <a:ext cx="450000" cy="0"/>
+              </a:xfrm>
+              <a:prstGeom prst="line">
+                <a:avLst/>
+              </a:prstGeom>
+              <a:ln w="28575">
+                <a:solidFill>
+                  <a:schemeClr val="tx1"/>
+                </a:solidFill>
+                <a:prstDash val="solid"/>
+              </a:ln>
+            </p:spPr>
+            <p:style>
+              <a:lnRef idx="1">
+                <a:schemeClr val="accent1"/>
+              </a:lnRef>
+              <a:fillRef idx="0">
+                <a:schemeClr val="accent1"/>
+              </a:fillRef>
+              <a:effectRef idx="0">
+                <a:schemeClr val="accent1"/>
+              </a:effectRef>
+              <a:fontRef idx="minor">
+                <a:schemeClr val="tx1"/>
+              </a:fontRef>
+            </p:style>
+          </p:cxnSp>
+        </p:grpSp>
       </p:grpSp>
+    </p:spTree>
+    <p:extLst>
+      <p:ext uri="{BB962C8B-B14F-4D97-AF65-F5344CB8AC3E}">
+        <p14:creationId xmlns:p14="http://schemas.microsoft.com/office/powerpoint/2010/main" val="1596855392"/>
+      </p:ext>
+    </p:extLst>
+  </p:cSld>
+  <p:clrMapOvr>
+    <a:masterClrMapping/>
+  </p:clrMapOvr>
+</p:sld>
+</file>
+
+<file path=ppt/slides/slide9.xml><?xml version="1.0" encoding="utf-8"?>
+<p:sld xmlns:a="http://schemas.openxmlformats.org/drawingml/2006/main" xmlns:r="http://schemas.openxmlformats.org/officeDocument/2006/relationships" xmlns:p="http://schemas.openxmlformats.org/presentationml/2006/main">
+  <p:cSld>
+    <p:spTree>
+      <p:nvGrpSpPr>
+        <p:cNvPr id="1" name=""/>
+        <p:cNvGrpSpPr/>
+        <p:nvPr/>
+      </p:nvGrpSpPr>
+      <p:grpSpPr>
+        <a:xfrm>
+          <a:off x="0" y="0"/>
+          <a:ext cx="0" cy="0"/>
+          <a:chOff x="0" y="0"/>
+          <a:chExt cx="0" cy="0"/>
+        </a:xfrm>
+      </p:grpSpPr>
       <p:grpSp>
         <p:nvGrpSpPr>
-          <p:cNvPr id="29" name="Group 28">
+          <p:cNvPr id="60" name="Group 59">
             <a:extLst>
               <a:ext uri="{FF2B5EF4-FFF2-40B4-BE49-F238E27FC236}">
-                <a16:creationId xmlns:a16="http://schemas.microsoft.com/office/drawing/2014/main" id="{63210A02-1066-644C-AC67-E639524AE545}"/>
+                <a16:creationId xmlns:a16="http://schemas.microsoft.com/office/drawing/2014/main" id="{00978B66-7E69-2847-BE13-15CC3997F077}"/>
               </a:ext>
             </a:extLst>
           </p:cNvPr>
@@ -15049,102 +15511,372 @@
         </p:nvGrpSpPr>
         <p:grpSpPr>
           <a:xfrm>
-            <a:off x="9065849" y="461654"/>
-            <a:ext cx="2417120" cy="970956"/>
-            <a:chOff x="5194300" y="2661244"/>
-            <a:chExt cx="2417120" cy="970956"/>
+            <a:off x="2371844" y="1183960"/>
+            <a:ext cx="8335927" cy="4935688"/>
+            <a:chOff x="2371844" y="1183960"/>
+            <a:chExt cx="8335927" cy="4935688"/>
           </a:xfrm>
         </p:grpSpPr>
-        <p:cxnSp>
-          <p:nvCxnSpPr>
-            <p:cNvPr id="30" name="Straight Connector 29">
+        <p:pic>
+          <p:nvPicPr>
+            <p:cNvPr id="5" name="Picture 4">
               <a:extLst>
                 <a:ext uri="{FF2B5EF4-FFF2-40B4-BE49-F238E27FC236}">
-                  <a16:creationId xmlns:a16="http://schemas.microsoft.com/office/drawing/2014/main" id="{C652C78B-36DD-504C-AB12-7136A64E065B}"/>
+                  <a16:creationId xmlns:a16="http://schemas.microsoft.com/office/drawing/2014/main" id="{E2C8E524-DF83-3D45-91D4-2FB57336D429}"/>
                 </a:ext>
               </a:extLst>
             </p:cNvPr>
-            <p:cNvCxnSpPr/>
-            <p:nvPr/>
-          </p:nvCxnSpPr>
+            <p:cNvPicPr>
+              <a:picLocks noChangeAspect="1"/>
+            </p:cNvPicPr>
+            <p:nvPr/>
+          </p:nvPicPr>
+          <p:blipFill rotWithShape="1">
+            <a:blip r:embed="rId2"/>
+            <a:srcRect l="4366" t="13027" b="16630"/>
+            <a:stretch/>
+          </p:blipFill>
           <p:spPr>
             <a:xfrm>
-              <a:off x="5256666" y="3133391"/>
-              <a:ext cx="450000" cy="0"/>
-            </a:xfrm>
-            <a:prstGeom prst="line">
+              <a:off x="2608728" y="1627094"/>
+              <a:ext cx="2623429" cy="1929653"/>
+            </a:xfrm>
+            <a:prstGeom prst="rect">
               <a:avLst/>
             </a:prstGeom>
-            <a:ln w="28575">
-              <a:solidFill>
-                <a:schemeClr val="tx1"/>
-              </a:solidFill>
-              <a:prstDash val="dash"/>
-            </a:ln>
           </p:spPr>
-          <p:style>
-            <a:lnRef idx="1">
-              <a:schemeClr val="accent1"/>
-            </a:lnRef>
-            <a:fillRef idx="0">
-              <a:schemeClr val="accent1"/>
-            </a:fillRef>
-            <a:effectRef idx="0">
-              <a:schemeClr val="accent1"/>
-            </a:effectRef>
-            <a:fontRef idx="minor">
-              <a:schemeClr val="tx1"/>
-            </a:fontRef>
-          </p:style>
-        </p:cxnSp>
-        <p:cxnSp>
-          <p:nvCxnSpPr>
-            <p:cNvPr id="34" name="Straight Connector 33">
+        </p:pic>
+        <p:pic>
+          <p:nvPicPr>
+            <p:cNvPr id="7" name="Picture 6">
               <a:extLst>
                 <a:ext uri="{FF2B5EF4-FFF2-40B4-BE49-F238E27FC236}">
-                  <a16:creationId xmlns:a16="http://schemas.microsoft.com/office/drawing/2014/main" id="{CDE48A94-6CAD-9E43-8D08-97B4840A5B0E}"/>
+                  <a16:creationId xmlns:a16="http://schemas.microsoft.com/office/drawing/2014/main" id="{881071AB-944D-4A42-833A-94A593EB4FB6}"/>
                 </a:ext>
               </a:extLst>
             </p:cNvPr>
-            <p:cNvCxnSpPr/>
-            <p:nvPr/>
-          </p:nvCxnSpPr>
+            <p:cNvPicPr>
+              <a:picLocks noChangeAspect="1"/>
+            </p:cNvPicPr>
+            <p:nvPr/>
+          </p:nvPicPr>
+          <p:blipFill rotWithShape="1">
+            <a:blip r:embed="rId3"/>
+            <a:srcRect l="4886" t="13781" b="17591"/>
+            <a:stretch/>
+          </p:blipFill>
           <p:spPr>
             <a:xfrm>
-              <a:off x="5260801" y="2835945"/>
-              <a:ext cx="450000" cy="0"/>
-            </a:xfrm>
-            <a:prstGeom prst="line">
+              <a:off x="5358654" y="1635072"/>
+              <a:ext cx="2609156" cy="1921676"/>
+            </a:xfrm>
+            <a:prstGeom prst="rect">
               <a:avLst/>
             </a:prstGeom>
-            <a:ln w="28575">
-              <a:solidFill>
-                <a:schemeClr val="tx1"/>
-              </a:solidFill>
-              <a:prstDash val="sysDot"/>
-            </a:ln>
           </p:spPr>
-          <p:style>
-            <a:lnRef idx="1">
-              <a:schemeClr val="accent1"/>
-            </a:lnRef>
-            <a:fillRef idx="0">
-              <a:schemeClr val="accent1"/>
-            </a:fillRef>
-            <a:effectRef idx="0">
-              <a:schemeClr val="accent1"/>
-            </a:effectRef>
-            <a:fontRef idx="minor">
-              <a:schemeClr val="tx1"/>
-            </a:fontRef>
-          </p:style>
-        </p:cxnSp>
+        </p:pic>
+        <p:pic>
+          <p:nvPicPr>
+            <p:cNvPr id="9" name="Picture 8">
+              <a:extLst>
+                <a:ext uri="{FF2B5EF4-FFF2-40B4-BE49-F238E27FC236}">
+                  <a16:creationId xmlns:a16="http://schemas.microsoft.com/office/drawing/2014/main" id="{9EF7F397-7703-2442-A14B-E47B6F36034D}"/>
+                </a:ext>
+              </a:extLst>
+            </p:cNvPr>
+            <p:cNvPicPr>
+              <a:picLocks noChangeAspect="1"/>
+            </p:cNvPicPr>
+            <p:nvPr/>
+          </p:nvPicPr>
+          <p:blipFill rotWithShape="1">
+            <a:blip r:embed="rId4"/>
+            <a:srcRect l="4729" t="13141" b="17496"/>
+            <a:stretch/>
+          </p:blipFill>
+          <p:spPr>
+            <a:xfrm>
+              <a:off x="8094307" y="1627322"/>
+              <a:ext cx="2613464" cy="1929425"/>
+            </a:xfrm>
+            <a:prstGeom prst="rect">
+              <a:avLst/>
+            </a:prstGeom>
+          </p:spPr>
+        </p:pic>
+        <p:pic>
+          <p:nvPicPr>
+            <p:cNvPr id="11" name="Picture 10">
+              <a:extLst>
+                <a:ext uri="{FF2B5EF4-FFF2-40B4-BE49-F238E27FC236}">
+                  <a16:creationId xmlns:a16="http://schemas.microsoft.com/office/drawing/2014/main" id="{078A2BE5-BE60-5543-8258-614D1BDAB68B}"/>
+                </a:ext>
+              </a:extLst>
+            </p:cNvPr>
+            <p:cNvPicPr>
+              <a:picLocks noChangeAspect="1"/>
+            </p:cNvPicPr>
+            <p:nvPr/>
+          </p:nvPicPr>
+          <p:blipFill rotWithShape="1">
+            <a:blip r:embed="rId5"/>
+            <a:srcRect l="4912" t="11631" b="15084"/>
+            <a:stretch/>
+          </p:blipFill>
+          <p:spPr>
+            <a:xfrm>
+              <a:off x="2743199" y="3854953"/>
+              <a:ext cx="2488957" cy="2010335"/>
+            </a:xfrm>
+            <a:prstGeom prst="rect">
+              <a:avLst/>
+            </a:prstGeom>
+          </p:spPr>
+        </p:pic>
+        <p:pic>
+          <p:nvPicPr>
+            <p:cNvPr id="13" name="Picture 12">
+              <a:extLst>
+                <a:ext uri="{FF2B5EF4-FFF2-40B4-BE49-F238E27FC236}">
+                  <a16:creationId xmlns:a16="http://schemas.microsoft.com/office/drawing/2014/main" id="{3275F373-CD23-5041-B4AB-A2E4EC02A885}"/>
+                </a:ext>
+              </a:extLst>
+            </p:cNvPr>
+            <p:cNvPicPr>
+              <a:picLocks noChangeAspect="1"/>
+            </p:cNvPicPr>
+            <p:nvPr/>
+          </p:nvPicPr>
+          <p:blipFill rotWithShape="1">
+            <a:blip r:embed="rId6"/>
+            <a:srcRect l="4667" t="11801" b="15650"/>
+            <a:stretch/>
+          </p:blipFill>
+          <p:spPr>
+            <a:xfrm>
+              <a:off x="5533465" y="3875122"/>
+              <a:ext cx="2434345" cy="1990166"/>
+            </a:xfrm>
+            <a:prstGeom prst="rect">
+              <a:avLst/>
+            </a:prstGeom>
+          </p:spPr>
+        </p:pic>
+        <p:pic>
+          <p:nvPicPr>
+            <p:cNvPr id="15" name="Picture 14">
+              <a:extLst>
+                <a:ext uri="{FF2B5EF4-FFF2-40B4-BE49-F238E27FC236}">
+                  <a16:creationId xmlns:a16="http://schemas.microsoft.com/office/drawing/2014/main" id="{CCBE8FD7-B97B-574F-BF36-DC1DFBD1382B}"/>
+                </a:ext>
+              </a:extLst>
+            </p:cNvPr>
+            <p:cNvPicPr>
+              <a:picLocks noChangeAspect="1"/>
+            </p:cNvPicPr>
+            <p:nvPr/>
+          </p:nvPicPr>
+          <p:blipFill rotWithShape="1">
+            <a:blip r:embed="rId7"/>
+            <a:srcRect l="4396" t="11434" b="15527"/>
+            <a:stretch/>
+          </p:blipFill>
+          <p:spPr>
+            <a:xfrm>
+              <a:off x="8263217" y="3858313"/>
+              <a:ext cx="2444553" cy="2003613"/>
+            </a:xfrm>
+            <a:prstGeom prst="rect">
+              <a:avLst/>
+            </a:prstGeom>
+          </p:spPr>
+        </p:pic>
+        <p:pic>
+          <p:nvPicPr>
+            <p:cNvPr id="38" name="Picture 37">
+              <a:extLst>
+                <a:ext uri="{FF2B5EF4-FFF2-40B4-BE49-F238E27FC236}">
+                  <a16:creationId xmlns:a16="http://schemas.microsoft.com/office/drawing/2014/main" id="{AE8E5DC0-5EEB-4742-B2A0-26657C49D73C}"/>
+                </a:ext>
+              </a:extLst>
+            </p:cNvPr>
+            <p:cNvPicPr>
+              <a:picLocks noChangeAspect="1"/>
+            </p:cNvPicPr>
+            <p:nvPr/>
+          </p:nvPicPr>
+          <p:blipFill>
+            <a:blip r:embed="rId8"/>
+            <a:stretch>
+              <a:fillRect/>
+            </a:stretch>
+          </p:blipFill>
+          <p:spPr>
+            <a:xfrm>
+              <a:off x="2907345" y="1640834"/>
+              <a:ext cx="1180213" cy="488151"/>
+            </a:xfrm>
+            <a:prstGeom prst="rect">
+              <a:avLst/>
+            </a:prstGeom>
+          </p:spPr>
+        </p:pic>
+        <p:pic>
+          <p:nvPicPr>
+            <p:cNvPr id="40" name="Picture 39">
+              <a:extLst>
+                <a:ext uri="{FF2B5EF4-FFF2-40B4-BE49-F238E27FC236}">
+                  <a16:creationId xmlns:a16="http://schemas.microsoft.com/office/drawing/2014/main" id="{06019A45-78E0-3C4B-B5BA-DE708C521AC0}"/>
+                </a:ext>
+              </a:extLst>
+            </p:cNvPr>
+            <p:cNvPicPr>
+              <a:picLocks noChangeAspect="1"/>
+            </p:cNvPicPr>
+            <p:nvPr/>
+          </p:nvPicPr>
+          <p:blipFill>
+            <a:blip r:embed="rId8"/>
+            <a:stretch>
+              <a:fillRect/>
+            </a:stretch>
+          </p:blipFill>
+          <p:spPr>
+            <a:xfrm>
+              <a:off x="5698214" y="1646000"/>
+              <a:ext cx="1180213" cy="488151"/>
+            </a:xfrm>
+            <a:prstGeom prst="rect">
+              <a:avLst/>
+            </a:prstGeom>
+          </p:spPr>
+        </p:pic>
+        <p:pic>
+          <p:nvPicPr>
+            <p:cNvPr id="41" name="Picture 40">
+              <a:extLst>
+                <a:ext uri="{FF2B5EF4-FFF2-40B4-BE49-F238E27FC236}">
+                  <a16:creationId xmlns:a16="http://schemas.microsoft.com/office/drawing/2014/main" id="{095F3846-FF76-CF49-B3B9-79C8DB9A7D7E}"/>
+                </a:ext>
+              </a:extLst>
+            </p:cNvPr>
+            <p:cNvPicPr>
+              <a:picLocks noChangeAspect="1"/>
+            </p:cNvPicPr>
+            <p:nvPr/>
+          </p:nvPicPr>
+          <p:blipFill>
+            <a:blip r:embed="rId8"/>
+            <a:stretch>
+              <a:fillRect/>
+            </a:stretch>
+          </p:blipFill>
+          <p:spPr>
+            <a:xfrm>
+              <a:off x="8434104" y="1636841"/>
+              <a:ext cx="1180213" cy="488151"/>
+            </a:xfrm>
+            <a:prstGeom prst="rect">
+              <a:avLst/>
+            </a:prstGeom>
+          </p:spPr>
+        </p:pic>
+        <p:pic>
+          <p:nvPicPr>
+            <p:cNvPr id="42" name="Picture 41">
+              <a:extLst>
+                <a:ext uri="{FF2B5EF4-FFF2-40B4-BE49-F238E27FC236}">
+                  <a16:creationId xmlns:a16="http://schemas.microsoft.com/office/drawing/2014/main" id="{99C15715-C10D-DC47-B870-0CF73A4BA028}"/>
+                </a:ext>
+              </a:extLst>
+            </p:cNvPr>
+            <p:cNvPicPr>
+              <a:picLocks noChangeAspect="1"/>
+            </p:cNvPicPr>
+            <p:nvPr/>
+          </p:nvPicPr>
+          <p:blipFill>
+            <a:blip r:embed="rId9"/>
+            <a:stretch>
+              <a:fillRect/>
+            </a:stretch>
+          </p:blipFill>
+          <p:spPr>
+            <a:xfrm>
+              <a:off x="2893016" y="3863449"/>
+              <a:ext cx="617464" cy="442710"/>
+            </a:xfrm>
+            <a:prstGeom prst="rect">
+              <a:avLst/>
+            </a:prstGeom>
+          </p:spPr>
+        </p:pic>
+        <p:pic>
+          <p:nvPicPr>
+            <p:cNvPr id="43" name="Picture 42">
+              <a:extLst>
+                <a:ext uri="{FF2B5EF4-FFF2-40B4-BE49-F238E27FC236}">
+                  <a16:creationId xmlns:a16="http://schemas.microsoft.com/office/drawing/2014/main" id="{9A795B9B-A2F9-1C4B-9457-A7F45921072F}"/>
+                </a:ext>
+              </a:extLst>
+            </p:cNvPr>
+            <p:cNvPicPr>
+              <a:picLocks noChangeAspect="1"/>
+            </p:cNvPicPr>
+            <p:nvPr/>
+          </p:nvPicPr>
+          <p:blipFill>
+            <a:blip r:embed="rId9"/>
+            <a:stretch>
+              <a:fillRect/>
+            </a:stretch>
+          </p:blipFill>
+          <p:spPr>
+            <a:xfrm>
+              <a:off x="7350346" y="3863237"/>
+              <a:ext cx="617464" cy="442710"/>
+            </a:xfrm>
+            <a:prstGeom prst="rect">
+              <a:avLst/>
+            </a:prstGeom>
+          </p:spPr>
+        </p:pic>
+        <p:pic>
+          <p:nvPicPr>
+            <p:cNvPr id="44" name="Picture 43">
+              <a:extLst>
+                <a:ext uri="{FF2B5EF4-FFF2-40B4-BE49-F238E27FC236}">
+                  <a16:creationId xmlns:a16="http://schemas.microsoft.com/office/drawing/2014/main" id="{B5211A7B-FED2-9C46-B2B0-187B80306791}"/>
+                </a:ext>
+              </a:extLst>
+            </p:cNvPr>
+            <p:cNvPicPr>
+              <a:picLocks noChangeAspect="1"/>
+            </p:cNvPicPr>
+            <p:nvPr/>
+          </p:nvPicPr>
+          <p:blipFill>
+            <a:blip r:embed="rId9"/>
+            <a:stretch>
+              <a:fillRect/>
+            </a:stretch>
+          </p:blipFill>
+          <p:spPr>
+            <a:xfrm>
+              <a:off x="10090306" y="3854518"/>
+              <a:ext cx="617464" cy="442710"/>
+            </a:xfrm>
+            <a:prstGeom prst="rect">
+              <a:avLst/>
+            </a:prstGeom>
+          </p:spPr>
+        </p:pic>
         <p:sp>
           <p:nvSpPr>
-            <p:cNvPr id="35" name="TextBox 34">
+            <p:cNvPr id="46" name="TextBox 45">
               <a:extLst>
                 <a:ext uri="{FF2B5EF4-FFF2-40B4-BE49-F238E27FC236}">
-                  <a16:creationId xmlns:a16="http://schemas.microsoft.com/office/drawing/2014/main" id="{7D467C51-79FD-7142-A712-E6CD2028B1DA}"/>
+                  <a16:creationId xmlns:a16="http://schemas.microsoft.com/office/drawing/2014/main" id="{D339BA17-5817-A749-A28A-89E638F89E32}"/>
                 </a:ext>
               </a:extLst>
             </p:cNvPr>
@@ -15153,8 +15885,8 @@
           </p:nvSpPr>
           <p:spPr>
             <a:xfrm>
-              <a:off x="5667771" y="2697446"/>
-              <a:ext cx="1614545" cy="276999"/>
+              <a:off x="2602792" y="1291456"/>
+              <a:ext cx="402674" cy="307777"/>
             </a:xfrm>
             <a:prstGeom prst="rect">
               <a:avLst/>
@@ -15168,22 +15900,38 @@
             <a:lstStyle/>
             <a:p>
               <a:r>
-                <a:rPr lang="en-US" sz="1200" dirty="0">
+                <a:rPr lang="en-US" sz="1400" dirty="0">
                   <a:latin typeface="Helvetica" charset="0"/>
                   <a:ea typeface="Helvetica" charset="0"/>
                   <a:cs typeface="Helvetica" charset="0"/>
                 </a:rPr>
-                <a:t>No gene flow (m = 0)</a:t>
+                <a:t>(</a:t>
+              </a:r>
+              <a:r>
+                <a:rPr lang="en-US" sz="1400" i="1" dirty="0">
+                  <a:latin typeface="Helvetica" charset="0"/>
+                  <a:ea typeface="Helvetica" charset="0"/>
+                  <a:cs typeface="Helvetica" charset="0"/>
+                </a:rPr>
+                <a:t>a</a:t>
+              </a:r>
+              <a:r>
+                <a:rPr lang="en-US" sz="1400" dirty="0">
+                  <a:latin typeface="Helvetica" charset="0"/>
+                  <a:ea typeface="Helvetica" charset="0"/>
+                  <a:cs typeface="Helvetica" charset="0"/>
+                </a:rPr>
+                <a:t>)</a:t>
               </a:r>
             </a:p>
           </p:txBody>
         </p:sp>
         <p:sp>
           <p:nvSpPr>
-            <p:cNvPr id="36" name="TextBox 35">
+            <p:cNvPr id="47" name="TextBox 46">
               <a:extLst>
                 <a:ext uri="{FF2B5EF4-FFF2-40B4-BE49-F238E27FC236}">
-                  <a16:creationId xmlns:a16="http://schemas.microsoft.com/office/drawing/2014/main" id="{0FD6C07B-01CE-104C-A80F-87BC0D0567B4}"/>
+                  <a16:creationId xmlns:a16="http://schemas.microsoft.com/office/drawing/2014/main" id="{852424D5-131D-DF4A-B69C-1059EA4DF529}"/>
                 </a:ext>
               </a:extLst>
             </p:cNvPr>
@@ -15192,8 +15940,8 @@
           </p:nvSpPr>
           <p:spPr>
             <a:xfrm>
-              <a:off x="5667771" y="2991263"/>
-              <a:ext cx="1912703" cy="276999"/>
+              <a:off x="5358654" y="1291455"/>
+              <a:ext cx="402674" cy="307777"/>
             </a:xfrm>
             <a:prstGeom prst="rect">
               <a:avLst/>
@@ -15207,22 +15955,38 @@
             <a:lstStyle/>
             <a:p>
               <a:r>
-                <a:rPr lang="en-US" sz="1200" dirty="0">
+                <a:rPr lang="en-US" sz="1400" dirty="0">
                   <a:latin typeface="Helvetica" charset="0"/>
                   <a:ea typeface="Helvetica" charset="0"/>
                   <a:cs typeface="Helvetica" charset="0"/>
                 </a:rPr>
-                <a:t>Low gene flow (m = 0.01)</a:t>
+                <a:t>(</a:t>
+              </a:r>
+              <a:r>
+                <a:rPr lang="en-US" sz="1400" i="1" dirty="0">
+                  <a:latin typeface="Helvetica" charset="0"/>
+                  <a:ea typeface="Helvetica" charset="0"/>
+                  <a:cs typeface="Helvetica" charset="0"/>
+                </a:rPr>
+                <a:t>b</a:t>
+              </a:r>
+              <a:r>
+                <a:rPr lang="en-US" sz="1400" dirty="0">
+                  <a:latin typeface="Helvetica" charset="0"/>
+                  <a:ea typeface="Helvetica" charset="0"/>
+                  <a:cs typeface="Helvetica" charset="0"/>
+                </a:rPr>
+                <a:t>)</a:t>
               </a:r>
             </a:p>
           </p:txBody>
         </p:sp>
         <p:sp>
           <p:nvSpPr>
-            <p:cNvPr id="37" name="TextBox 36">
+            <p:cNvPr id="48" name="TextBox 47">
               <a:extLst>
                 <a:ext uri="{FF2B5EF4-FFF2-40B4-BE49-F238E27FC236}">
-                  <a16:creationId xmlns:a16="http://schemas.microsoft.com/office/drawing/2014/main" id="{2256CE28-BF40-9647-89D4-60B84EF5CB8D}"/>
+                  <a16:creationId xmlns:a16="http://schemas.microsoft.com/office/drawing/2014/main" id="{D66091E7-DBD0-7846-A15C-E8FE95CE068A}"/>
                 </a:ext>
               </a:extLst>
             </p:cNvPr>
@@ -15231,8 +15995,8 @@
           </p:nvSpPr>
           <p:spPr>
             <a:xfrm>
-              <a:off x="5665053" y="3319121"/>
-              <a:ext cx="1946367" cy="276999"/>
+              <a:off x="8114516" y="1291454"/>
+              <a:ext cx="393056" cy="307777"/>
             </a:xfrm>
             <a:prstGeom prst="rect">
               <a:avLst/>
@@ -15246,279 +16010,608 @@
             <a:lstStyle/>
             <a:p>
               <a:r>
-                <a:rPr lang="en-US" sz="1200" dirty="0">
+                <a:rPr lang="en-US" sz="1400" dirty="0">
                   <a:latin typeface="Helvetica" charset="0"/>
                   <a:ea typeface="Helvetica" charset="0"/>
                   <a:cs typeface="Helvetica" charset="0"/>
                 </a:rPr>
-                <a:t>High gene flow (m = 0.05)</a:t>
+                <a:t>(</a:t>
+              </a:r>
+              <a:r>
+                <a:rPr lang="en-US" sz="1400" i="1" dirty="0">
+                  <a:latin typeface="Helvetica" charset="0"/>
+                  <a:ea typeface="Helvetica" charset="0"/>
+                  <a:cs typeface="Helvetica" charset="0"/>
+                </a:rPr>
+                <a:t>c</a:t>
+              </a:r>
+              <a:r>
+                <a:rPr lang="en-US" sz="1400" dirty="0">
+                  <a:latin typeface="Helvetica" charset="0"/>
+                  <a:ea typeface="Helvetica" charset="0"/>
+                  <a:cs typeface="Helvetica" charset="0"/>
+                </a:rPr>
+                <a:t>)</a:t>
               </a:r>
             </a:p>
           </p:txBody>
         </p:sp>
         <p:sp>
           <p:nvSpPr>
-            <p:cNvPr id="38" name="Rectangle 37">
+            <p:cNvPr id="49" name="TextBox 48">
               <a:extLst>
                 <a:ext uri="{FF2B5EF4-FFF2-40B4-BE49-F238E27FC236}">
-                  <a16:creationId xmlns:a16="http://schemas.microsoft.com/office/drawing/2014/main" id="{D4F32B58-1DD0-B947-94CE-062CCE527184}"/>
+                  <a16:creationId xmlns:a16="http://schemas.microsoft.com/office/drawing/2014/main" id="{DEEAC227-68FD-DB4E-B9EF-2A3407EC2785}"/>
                 </a:ext>
               </a:extLst>
             </p:cNvPr>
-            <p:cNvSpPr/>
+            <p:cNvSpPr txBox="1"/>
             <p:nvPr/>
           </p:nvSpPr>
           <p:spPr>
             <a:xfrm>
-              <a:off x="5194300" y="2661244"/>
-              <a:ext cx="2336800" cy="970956"/>
+              <a:off x="2602792" y="3515745"/>
+              <a:ext cx="402674" cy="307777"/>
             </a:xfrm>
             <a:prstGeom prst="rect">
               <a:avLst/>
             </a:prstGeom>
             <a:noFill/>
-            <a:ln w="19050">
-              <a:solidFill>
-                <a:schemeClr val="tx1"/>
-              </a:solidFill>
-            </a:ln>
           </p:spPr>
-          <p:style>
-            <a:lnRef idx="2">
-              <a:schemeClr val="accent1">
-                <a:shade val="50000"/>
-              </a:schemeClr>
-            </a:lnRef>
-            <a:fillRef idx="1">
-              <a:schemeClr val="accent1"/>
-            </a:fillRef>
-            <a:effectRef idx="0">
-              <a:schemeClr val="accent1"/>
-            </a:effectRef>
-            <a:fontRef idx="minor">
-              <a:schemeClr val="lt1"/>
-            </a:fontRef>
-          </p:style>
           <p:txBody>
-            <a:bodyPr rtlCol="0" anchor="ctr"/>
+            <a:bodyPr wrap="none" rtlCol="0">
+              <a:spAutoFit/>
+            </a:bodyPr>
             <a:lstStyle/>
             <a:p>
-              <a:pPr algn="ctr"/>
-              <a:endParaRPr lang="en-US"/>
+              <a:r>
+                <a:rPr lang="en-US" sz="1400" dirty="0">
+                  <a:latin typeface="Helvetica" charset="0"/>
+                  <a:ea typeface="Helvetica" charset="0"/>
+                  <a:cs typeface="Helvetica" charset="0"/>
+                </a:rPr>
+                <a:t>(</a:t>
+              </a:r>
+              <a:r>
+                <a:rPr lang="en-US" sz="1400" i="1" dirty="0">
+                  <a:latin typeface="Helvetica" charset="0"/>
+                  <a:ea typeface="Helvetica" charset="0"/>
+                  <a:cs typeface="Helvetica" charset="0"/>
+                </a:rPr>
+                <a:t>d</a:t>
+              </a:r>
+              <a:r>
+                <a:rPr lang="en-US" sz="1400" dirty="0">
+                  <a:latin typeface="Helvetica" charset="0"/>
+                  <a:ea typeface="Helvetica" charset="0"/>
+                  <a:cs typeface="Helvetica" charset="0"/>
+                </a:rPr>
+                <a:t>)</a:t>
+              </a:r>
             </a:p>
           </p:txBody>
         </p:sp>
         <p:sp>
           <p:nvSpPr>
-            <p:cNvPr id="39" name="Rectangle 38">
+            <p:cNvPr id="50" name="TextBox 49">
               <a:extLst>
                 <a:ext uri="{FF2B5EF4-FFF2-40B4-BE49-F238E27FC236}">
-                  <a16:creationId xmlns:a16="http://schemas.microsoft.com/office/drawing/2014/main" id="{BCA886B9-53D1-2241-9AAC-52C13AC4315B}"/>
+                  <a16:creationId xmlns:a16="http://schemas.microsoft.com/office/drawing/2014/main" id="{A58EBE39-4C0A-F349-B7E5-CA6D836832C7}"/>
                 </a:ext>
               </a:extLst>
             </p:cNvPr>
-            <p:cNvSpPr/>
+            <p:cNvSpPr txBox="1"/>
             <p:nvPr/>
           </p:nvSpPr>
           <p:spPr>
             <a:xfrm>
-              <a:off x="5410918" y="3056103"/>
-              <a:ext cx="154379" cy="154379"/>
+              <a:off x="5358654" y="3515744"/>
+              <a:ext cx="402674" cy="307777"/>
             </a:xfrm>
             <a:prstGeom prst="rect">
               <a:avLst/>
             </a:prstGeom>
-            <a:solidFill>
-              <a:schemeClr val="bg1">
-                <a:lumMod val="75000"/>
-              </a:schemeClr>
-            </a:solidFill>
-            <a:ln>
-              <a:solidFill>
-                <a:schemeClr val="tx1"/>
-              </a:solidFill>
-            </a:ln>
+            <a:noFill/>
           </p:spPr>
-          <p:style>
-            <a:lnRef idx="2">
-              <a:schemeClr val="accent1">
-                <a:shade val="50000"/>
-              </a:schemeClr>
-            </a:lnRef>
-            <a:fillRef idx="1">
-              <a:schemeClr val="accent1"/>
-            </a:fillRef>
-            <a:effectRef idx="0">
-              <a:schemeClr val="accent1"/>
-            </a:effectRef>
-            <a:fontRef idx="minor">
-              <a:schemeClr val="lt1"/>
-            </a:fontRef>
-          </p:style>
           <p:txBody>
-            <a:bodyPr rtlCol="0" anchor="ctr"/>
+            <a:bodyPr wrap="none" rtlCol="0">
+              <a:spAutoFit/>
+            </a:bodyPr>
             <a:lstStyle/>
             <a:p>
-              <a:pPr algn="ctr"/>
-              <a:endParaRPr lang="en-US"/>
+              <a:r>
+                <a:rPr lang="en-US" sz="1400" dirty="0">
+                  <a:latin typeface="Helvetica" charset="0"/>
+                  <a:ea typeface="Helvetica" charset="0"/>
+                  <a:cs typeface="Helvetica" charset="0"/>
+                </a:rPr>
+                <a:t>(</a:t>
+              </a:r>
+              <a:r>
+                <a:rPr lang="en-US" sz="1400" i="1" dirty="0">
+                  <a:latin typeface="Helvetica" charset="0"/>
+                  <a:ea typeface="Helvetica" charset="0"/>
+                  <a:cs typeface="Helvetica" charset="0"/>
+                </a:rPr>
+                <a:t>e</a:t>
+              </a:r>
+              <a:r>
+                <a:rPr lang="en-US" sz="1400" dirty="0">
+                  <a:latin typeface="Helvetica" charset="0"/>
+                  <a:ea typeface="Helvetica" charset="0"/>
+                  <a:cs typeface="Helvetica" charset="0"/>
+                </a:rPr>
+                <a:t>)</a:t>
+              </a:r>
             </a:p>
           </p:txBody>
         </p:sp>
         <p:sp>
           <p:nvSpPr>
-            <p:cNvPr id="40" name="Rectangle 39">
+            <p:cNvPr id="51" name="TextBox 50">
               <a:extLst>
                 <a:ext uri="{FF2B5EF4-FFF2-40B4-BE49-F238E27FC236}">
-                  <a16:creationId xmlns:a16="http://schemas.microsoft.com/office/drawing/2014/main" id="{3CA0517A-5B1F-824A-AE03-3C1CAAE3975D}"/>
+                  <a16:creationId xmlns:a16="http://schemas.microsoft.com/office/drawing/2014/main" id="{B61E857C-8DDE-0643-A963-A4C4600C8188}"/>
                 </a:ext>
               </a:extLst>
             </p:cNvPr>
-            <p:cNvSpPr/>
+            <p:cNvSpPr txBox="1"/>
             <p:nvPr/>
           </p:nvSpPr>
           <p:spPr>
-            <a:xfrm rot="2700000">
-              <a:off x="5422227" y="3385538"/>
-              <a:ext cx="154800" cy="154800"/>
+            <a:xfrm>
+              <a:off x="8114516" y="3515743"/>
+              <a:ext cx="352982" cy="307777"/>
             </a:xfrm>
             <a:prstGeom prst="rect">
               <a:avLst/>
             </a:prstGeom>
-            <a:solidFill>
-              <a:schemeClr val="tx1"/>
-            </a:solidFill>
-            <a:ln>
-              <a:solidFill>
-                <a:schemeClr val="tx1"/>
-              </a:solidFill>
-            </a:ln>
+            <a:noFill/>
           </p:spPr>
-          <p:style>
-            <a:lnRef idx="2">
-              <a:schemeClr val="accent1">
-                <a:shade val="50000"/>
-              </a:schemeClr>
-            </a:lnRef>
-            <a:fillRef idx="1">
-              <a:schemeClr val="accent1"/>
-            </a:fillRef>
-            <a:effectRef idx="0">
-              <a:schemeClr val="accent1"/>
-            </a:effectRef>
-            <a:fontRef idx="minor">
-              <a:schemeClr val="lt1"/>
-            </a:fontRef>
-          </p:style>
           <p:txBody>
-            <a:bodyPr rtlCol="0" anchor="ctr"/>
+            <a:bodyPr wrap="none" rtlCol="0">
+              <a:spAutoFit/>
+            </a:bodyPr>
             <a:lstStyle/>
             <a:p>
-              <a:pPr algn="ctr"/>
-              <a:endParaRPr lang="en-US"/>
+              <a:r>
+                <a:rPr lang="en-US" sz="1400" dirty="0">
+                  <a:latin typeface="Helvetica" charset="0"/>
+                  <a:ea typeface="Helvetica" charset="0"/>
+                  <a:cs typeface="Helvetica" charset="0"/>
+                </a:rPr>
+                <a:t>(</a:t>
+              </a:r>
+              <a:r>
+                <a:rPr lang="en-US" sz="1400" i="1" dirty="0">
+                  <a:latin typeface="Helvetica" charset="0"/>
+                  <a:ea typeface="Helvetica" charset="0"/>
+                  <a:cs typeface="Helvetica" charset="0"/>
+                </a:rPr>
+                <a:t>f</a:t>
+              </a:r>
+              <a:r>
+                <a:rPr lang="en-US" sz="1400" dirty="0">
+                  <a:latin typeface="Helvetica" charset="0"/>
+                  <a:ea typeface="Helvetica" charset="0"/>
+                  <a:cs typeface="Helvetica" charset="0"/>
+                </a:rPr>
+                <a:t>)</a:t>
+              </a:r>
             </a:p>
           </p:txBody>
         </p:sp>
         <p:sp>
           <p:nvSpPr>
-            <p:cNvPr id="41" name="Oval 40">
+            <p:cNvPr id="52" name="TextBox 51">
               <a:extLst>
                 <a:ext uri="{FF2B5EF4-FFF2-40B4-BE49-F238E27FC236}">
-                  <a16:creationId xmlns:a16="http://schemas.microsoft.com/office/drawing/2014/main" id="{F635BA4D-0B0E-B34B-A37E-7ABCC7A11A04}"/>
+                  <a16:creationId xmlns:a16="http://schemas.microsoft.com/office/drawing/2014/main" id="{5B1BB62D-B9BA-334F-95E1-41345CE15E2E}"/>
                 </a:ext>
               </a:extLst>
             </p:cNvPr>
-            <p:cNvSpPr/>
+            <p:cNvSpPr txBox="1"/>
             <p:nvPr/>
           </p:nvSpPr>
           <p:spPr>
             <a:xfrm>
-              <a:off x="5404931" y="2758775"/>
-              <a:ext cx="154800" cy="154800"/>
-            </a:xfrm>
-            <a:prstGeom prst="ellipse">
+              <a:off x="3510480" y="1183960"/>
+              <a:ext cx="1245855" cy="400110"/>
+            </a:xfrm>
+            <a:prstGeom prst="rect">
+              <a:avLst/>
+            </a:prstGeom>
+            <a:noFill/>
+          </p:spPr>
+          <p:txBody>
+            <a:bodyPr wrap="none" rtlCol="0">
+              <a:spAutoFit/>
+            </a:bodyPr>
+            <a:lstStyle/>
+            <a:p>
+              <a:pPr algn="ctr"/>
+              <a:r>
+                <a:rPr lang="en-CA" sz="1000" b="1" dirty="0">
+                  <a:latin typeface="Helvetica" pitchFamily="2" charset="0"/>
+                </a:rPr>
+                <a:t>No founder effect</a:t>
+              </a:r>
+            </a:p>
+            <a:p>
+              <a:pPr algn="ctr"/>
+              <a:r>
+                <a:rPr lang="en-CA" sz="1000" b="1" dirty="0">
+                  <a:latin typeface="Helvetica" pitchFamily="2" charset="0"/>
+                </a:rPr>
+                <a:t>(prop. = 1.0)</a:t>
+              </a:r>
+              <a:endParaRPr lang="en-US" sz="1000" b="1" dirty="0">
+                <a:latin typeface="Helvetica" pitchFamily="2" charset="0"/>
+              </a:endParaRPr>
+            </a:p>
+          </p:txBody>
+        </p:sp>
+        <p:sp>
+          <p:nvSpPr>
+            <p:cNvPr id="53" name="TextBox 52">
+              <a:extLst>
+                <a:ext uri="{FF2B5EF4-FFF2-40B4-BE49-F238E27FC236}">
+                  <a16:creationId xmlns:a16="http://schemas.microsoft.com/office/drawing/2014/main" id="{36946863-7727-5544-9972-78F59554756F}"/>
+                </a:ext>
+              </a:extLst>
+            </p:cNvPr>
+            <p:cNvSpPr txBox="1"/>
+            <p:nvPr/>
+          </p:nvSpPr>
+          <p:spPr>
+            <a:xfrm>
+              <a:off x="6020843" y="1183960"/>
+              <a:ext cx="1834156" cy="400110"/>
+            </a:xfrm>
+            <a:prstGeom prst="rect">
+              <a:avLst/>
+            </a:prstGeom>
+            <a:noFill/>
+          </p:spPr>
+          <p:txBody>
+            <a:bodyPr wrap="none" rtlCol="0">
+              <a:spAutoFit/>
+            </a:bodyPr>
+            <a:lstStyle/>
+            <a:p>
+              <a:pPr algn="ctr"/>
+              <a:r>
+                <a:rPr lang="en-CA" sz="1000" b="1" dirty="0">
+                  <a:latin typeface="Helvetica" pitchFamily="2" charset="0"/>
+                </a:rPr>
+                <a:t>Intermediate founder effect</a:t>
+              </a:r>
+            </a:p>
+            <a:p>
+              <a:pPr algn="ctr"/>
+              <a:r>
+                <a:rPr lang="en-CA" sz="1000" b="1" dirty="0">
+                  <a:latin typeface="Helvetica" pitchFamily="2" charset="0"/>
+                </a:rPr>
+                <a:t>(prop. = 0.2)</a:t>
+              </a:r>
+              <a:endParaRPr lang="en-US" sz="1000" b="1" dirty="0">
+                <a:latin typeface="Helvetica" pitchFamily="2" charset="0"/>
+              </a:endParaRPr>
+            </a:p>
+          </p:txBody>
+        </p:sp>
+        <p:sp>
+          <p:nvSpPr>
+            <p:cNvPr id="54" name="TextBox 53">
+              <a:extLst>
+                <a:ext uri="{FF2B5EF4-FFF2-40B4-BE49-F238E27FC236}">
+                  <a16:creationId xmlns:a16="http://schemas.microsoft.com/office/drawing/2014/main" id="{20316AEF-E1BD-BC4D-A1E7-D81173BDDDFA}"/>
+                </a:ext>
+              </a:extLst>
+            </p:cNvPr>
+            <p:cNvSpPr txBox="1"/>
+            <p:nvPr/>
+          </p:nvSpPr>
+          <p:spPr>
+            <a:xfrm>
+              <a:off x="8908634" y="1190050"/>
+              <a:ext cx="1473480" cy="400110"/>
+            </a:xfrm>
+            <a:prstGeom prst="rect">
+              <a:avLst/>
+            </a:prstGeom>
+            <a:noFill/>
+          </p:spPr>
+          <p:txBody>
+            <a:bodyPr wrap="none" rtlCol="0">
+              <a:spAutoFit/>
+            </a:bodyPr>
+            <a:lstStyle/>
+            <a:p>
+              <a:pPr algn="ctr"/>
+              <a:r>
+                <a:rPr lang="en-CA" sz="1000" b="1" dirty="0">
+                  <a:latin typeface="Helvetica" pitchFamily="2" charset="0"/>
+                </a:rPr>
+                <a:t>strong founder effect</a:t>
+              </a:r>
+            </a:p>
+            <a:p>
+              <a:pPr algn="ctr"/>
+              <a:r>
+                <a:rPr lang="en-CA" sz="1000" b="1" dirty="0">
+                  <a:latin typeface="Helvetica" pitchFamily="2" charset="0"/>
+                </a:rPr>
+                <a:t>(prop. = 0.01)</a:t>
+              </a:r>
+              <a:endParaRPr lang="en-US" sz="1000" b="1" dirty="0">
+                <a:latin typeface="Helvetica" pitchFamily="2" charset="0"/>
+              </a:endParaRPr>
+            </a:p>
+          </p:txBody>
+        </p:sp>
+        <p:sp>
+          <p:nvSpPr>
+            <p:cNvPr id="55" name="TextBox 54">
+              <a:extLst>
+                <a:ext uri="{FF2B5EF4-FFF2-40B4-BE49-F238E27FC236}">
+                  <a16:creationId xmlns:a16="http://schemas.microsoft.com/office/drawing/2014/main" id="{D7B44F8C-0459-EC43-BECF-A7C36D94EAC0}"/>
+                </a:ext>
+              </a:extLst>
+            </p:cNvPr>
+            <p:cNvSpPr txBox="1"/>
+            <p:nvPr/>
+          </p:nvSpPr>
+          <p:spPr>
+            <a:xfrm rot="16200000">
+              <a:off x="2066840" y="2312128"/>
+              <a:ext cx="864339" cy="246221"/>
+            </a:xfrm>
+            <a:prstGeom prst="rect">
               <a:avLst/>
             </a:prstGeom>
             <a:solidFill>
               <a:schemeClr val="bg1"/>
             </a:solidFill>
-            <a:ln>
-              <a:solidFill>
-                <a:schemeClr val="tx1"/>
-              </a:solidFill>
-            </a:ln>
           </p:spPr>
-          <p:style>
-            <a:lnRef idx="2">
-              <a:schemeClr val="accent1">
-                <a:shade val="50000"/>
-              </a:schemeClr>
-            </a:lnRef>
-            <a:fillRef idx="1">
-              <a:schemeClr val="accent1"/>
-            </a:fillRef>
-            <a:effectRef idx="0">
-              <a:schemeClr val="accent1"/>
-            </a:effectRef>
-            <a:fontRef idx="minor">
-              <a:schemeClr val="lt1"/>
-            </a:fontRef>
-          </p:style>
           <p:txBody>
-            <a:bodyPr rtlCol="0" anchor="ctr"/>
+            <a:bodyPr wrap="none" rtlCol="0">
+              <a:spAutoFit/>
+            </a:bodyPr>
+            <a:lstStyle/>
+            <a:p>
+              <a:r>
+                <a:rPr lang="en-US" sz="1000" dirty="0">
+                  <a:latin typeface="Helvetica" charset="0"/>
+                  <a:ea typeface="Helvetica" charset="0"/>
+                  <a:cs typeface="Helvetica" charset="0"/>
+                </a:rPr>
+                <a:t>Mean Slope</a:t>
+              </a:r>
+            </a:p>
+          </p:txBody>
+        </p:sp>
+        <p:sp>
+          <p:nvSpPr>
+            <p:cNvPr id="56" name="TextBox 55">
+              <a:extLst>
+                <a:ext uri="{FF2B5EF4-FFF2-40B4-BE49-F238E27FC236}">
+                  <a16:creationId xmlns:a16="http://schemas.microsoft.com/office/drawing/2014/main" id="{A20F012F-5A82-FE41-9988-DB4C54A4A759}"/>
+                </a:ext>
+              </a:extLst>
+            </p:cNvPr>
+            <p:cNvSpPr txBox="1"/>
+            <p:nvPr/>
+          </p:nvSpPr>
+          <p:spPr>
+            <a:xfrm rot="16200000">
+              <a:off x="1534595" y="4573022"/>
+              <a:ext cx="1920719" cy="246221"/>
+            </a:xfrm>
+            <a:prstGeom prst="rect">
+              <a:avLst/>
+            </a:prstGeom>
+            <a:solidFill>
+              <a:schemeClr val="bg1"/>
+            </a:solidFill>
+          </p:spPr>
+          <p:txBody>
+            <a:bodyPr wrap="none" rtlCol="0">
+              <a:spAutoFit/>
+            </a:bodyPr>
+            <a:lstStyle/>
+            <a:p>
+              <a:r>
+                <a:rPr lang="en-US" sz="1000" dirty="0">
+                  <a:latin typeface="Helvetica" charset="0"/>
+                  <a:ea typeface="Helvetica" charset="0"/>
+                  <a:cs typeface="Helvetica" charset="0"/>
+                </a:rPr>
+                <a:t>Proportion of significant slopes</a:t>
+              </a:r>
+            </a:p>
+          </p:txBody>
+        </p:sp>
+        <p:sp>
+          <p:nvSpPr>
+            <p:cNvPr id="57" name="TextBox 56">
+              <a:extLst>
+                <a:ext uri="{FF2B5EF4-FFF2-40B4-BE49-F238E27FC236}">
+                  <a16:creationId xmlns:a16="http://schemas.microsoft.com/office/drawing/2014/main" id="{88C956B4-2692-8046-9975-0300BC9FD958}"/>
+                </a:ext>
+              </a:extLst>
+            </p:cNvPr>
+            <p:cNvSpPr txBox="1"/>
+            <p:nvPr/>
+          </p:nvSpPr>
+          <p:spPr>
+            <a:xfrm>
+              <a:off x="3311011" y="5870843"/>
+              <a:ext cx="1503937" cy="246221"/>
+            </a:xfrm>
+            <a:prstGeom prst="rect">
+              <a:avLst/>
+            </a:prstGeom>
+            <a:solidFill>
+              <a:schemeClr val="bg1"/>
+            </a:solidFill>
+          </p:spPr>
+          <p:txBody>
+            <a:bodyPr wrap="none" rtlCol="0">
+              <a:spAutoFit/>
+            </a:bodyPr>
             <a:lstStyle/>
             <a:p>
               <a:pPr algn="ctr"/>
-              <a:endParaRPr lang="en-US"/>
+              <a:r>
+                <a:rPr lang="en-US" sz="1000" dirty="0">
+                  <a:latin typeface="Helvetica" charset="0"/>
+                  <a:ea typeface="Helvetica" charset="0"/>
+                  <a:cs typeface="Helvetica" charset="0"/>
+                </a:rPr>
+                <a:t>Selection coefficient (</a:t>
+              </a:r>
+              <a:r>
+                <a:rPr lang="en-US" sz="1000" i="1" dirty="0">
+                  <a:latin typeface="Helvetica" charset="0"/>
+                  <a:ea typeface="Helvetica" charset="0"/>
+                  <a:cs typeface="Helvetica" charset="0"/>
+                </a:rPr>
+                <a:t>s</a:t>
+              </a:r>
+              <a:r>
+                <a:rPr lang="en-US" sz="1000" dirty="0">
+                  <a:latin typeface="Helvetica" charset="0"/>
+                  <a:ea typeface="Helvetica" charset="0"/>
+                  <a:cs typeface="Helvetica" charset="0"/>
+                </a:rPr>
+                <a:t>)</a:t>
+              </a:r>
             </a:p>
           </p:txBody>
         </p:sp>
-        <p:cxnSp>
-          <p:nvCxnSpPr>
-            <p:cNvPr id="42" name="Straight Connector 41">
+        <p:sp>
+          <p:nvSpPr>
+            <p:cNvPr id="58" name="TextBox 57">
               <a:extLst>
                 <a:ext uri="{FF2B5EF4-FFF2-40B4-BE49-F238E27FC236}">
-                  <a16:creationId xmlns:a16="http://schemas.microsoft.com/office/drawing/2014/main" id="{CD9297BA-A6A5-7A4D-AA80-7DCE39862B93}"/>
+                  <a16:creationId xmlns:a16="http://schemas.microsoft.com/office/drawing/2014/main" id="{A4E33707-7F00-984B-A358-745B5B288B32}"/>
                 </a:ext>
               </a:extLst>
             </p:cNvPr>
-            <p:cNvCxnSpPr/>
-            <p:nvPr/>
-          </p:nvCxnSpPr>
+            <p:cNvSpPr txBox="1"/>
+            <p:nvPr/>
+          </p:nvSpPr>
           <p:spPr>
             <a:xfrm>
-              <a:off x="5256666" y="3457620"/>
-              <a:ext cx="450000" cy="0"/>
-            </a:xfrm>
-            <a:prstGeom prst="line">
+              <a:off x="6074875" y="5868261"/>
+              <a:ext cx="1503937" cy="246221"/>
+            </a:xfrm>
+            <a:prstGeom prst="rect">
               <a:avLst/>
             </a:prstGeom>
-            <a:ln w="28575">
-              <a:solidFill>
-                <a:schemeClr val="tx1"/>
-              </a:solidFill>
-              <a:prstDash val="solid"/>
-            </a:ln>
+            <a:solidFill>
+              <a:schemeClr val="bg1"/>
+            </a:solidFill>
           </p:spPr>
-          <p:style>
-            <a:lnRef idx="1">
-              <a:schemeClr val="accent1"/>
-            </a:lnRef>
-            <a:fillRef idx="0">
-              <a:schemeClr val="accent1"/>
-            </a:fillRef>
-            <a:effectRef idx="0">
-              <a:schemeClr val="accent1"/>
-            </a:effectRef>
-            <a:fontRef idx="minor">
-              <a:schemeClr val="tx1"/>
-            </a:fontRef>
-          </p:style>
-        </p:cxnSp>
+          <p:txBody>
+            <a:bodyPr wrap="none" rtlCol="0">
+              <a:spAutoFit/>
+            </a:bodyPr>
+            <a:lstStyle/>
+            <a:p>
+              <a:pPr algn="ctr"/>
+              <a:r>
+                <a:rPr lang="en-US" sz="1000" dirty="0">
+                  <a:latin typeface="Helvetica" charset="0"/>
+                  <a:ea typeface="Helvetica" charset="0"/>
+                  <a:cs typeface="Helvetica" charset="0"/>
+                </a:rPr>
+                <a:t>Selection coefficient (</a:t>
+              </a:r>
+              <a:r>
+                <a:rPr lang="en-US" sz="1000" i="1" dirty="0">
+                  <a:latin typeface="Helvetica" charset="0"/>
+                  <a:ea typeface="Helvetica" charset="0"/>
+                  <a:cs typeface="Helvetica" charset="0"/>
+                </a:rPr>
+                <a:t>s</a:t>
+              </a:r>
+              <a:r>
+                <a:rPr lang="en-US" sz="1000" dirty="0">
+                  <a:latin typeface="Helvetica" charset="0"/>
+                  <a:ea typeface="Helvetica" charset="0"/>
+                  <a:cs typeface="Helvetica" charset="0"/>
+                </a:rPr>
+                <a:t>)</a:t>
+              </a:r>
+            </a:p>
+          </p:txBody>
+        </p:sp>
+        <p:sp>
+          <p:nvSpPr>
+            <p:cNvPr id="59" name="TextBox 58">
+              <a:extLst>
+                <a:ext uri="{FF2B5EF4-FFF2-40B4-BE49-F238E27FC236}">
+                  <a16:creationId xmlns:a16="http://schemas.microsoft.com/office/drawing/2014/main" id="{F6329389-6622-5048-B8C5-C7B0C8F2F483}"/>
+                </a:ext>
+              </a:extLst>
+            </p:cNvPr>
+            <p:cNvSpPr txBox="1"/>
+            <p:nvPr/>
+          </p:nvSpPr>
+          <p:spPr>
+            <a:xfrm>
+              <a:off x="8823241" y="5873427"/>
+              <a:ext cx="1503937" cy="246221"/>
+            </a:xfrm>
+            <a:prstGeom prst="rect">
+              <a:avLst/>
+            </a:prstGeom>
+            <a:solidFill>
+              <a:schemeClr val="bg1"/>
+            </a:solidFill>
+          </p:spPr>
+          <p:txBody>
+            <a:bodyPr wrap="none" rtlCol="0">
+              <a:spAutoFit/>
+            </a:bodyPr>
+            <a:lstStyle/>
+            <a:p>
+              <a:pPr algn="ctr"/>
+              <a:r>
+                <a:rPr lang="en-US" sz="1000" dirty="0">
+                  <a:latin typeface="Helvetica" charset="0"/>
+                  <a:ea typeface="Helvetica" charset="0"/>
+                  <a:cs typeface="Helvetica" charset="0"/>
+                </a:rPr>
+                <a:t>Selection coefficient (</a:t>
+              </a:r>
+              <a:r>
+                <a:rPr lang="en-US" sz="1000" i="1" dirty="0">
+                  <a:latin typeface="Helvetica" charset="0"/>
+                  <a:ea typeface="Helvetica" charset="0"/>
+                  <a:cs typeface="Helvetica" charset="0"/>
+                </a:rPr>
+                <a:t>s</a:t>
+              </a:r>
+              <a:r>
+                <a:rPr lang="en-US" sz="1000" dirty="0">
+                  <a:latin typeface="Helvetica" charset="0"/>
+                  <a:ea typeface="Helvetica" charset="0"/>
+                  <a:cs typeface="Helvetica" charset="0"/>
+                </a:rPr>
+                <a:t>)</a:t>
+              </a:r>
+            </a:p>
+          </p:txBody>
+        </p:sp>
       </p:grpSp>
     </p:spTree>
     <p:extLst>
       <p:ext uri="{BB962C8B-B14F-4D97-AF65-F5344CB8AC3E}">
-        <p14:creationId xmlns:p14="http://schemas.microsoft.com/office/powerpoint/2010/main" val="1596855392"/>
+        <p14:creationId xmlns:p14="http://schemas.microsoft.com/office/powerpoint/2010/main" val="1556838570"/>
       </p:ext>
     </p:extLst>
   </p:cSld>

</xml_diff>

<commit_message>
Modified figures based on Marc's comments
</commit_message>
<xml_diff>
--- a/SEC_Writings/SEC_Manuscript-Figures.pptx
+++ b/SEC_Writings/SEC_Manuscript-Figures.pptx
@@ -15,6 +15,7 @@
     <p:sldId id="267" r:id="rId9"/>
     <p:sldId id="268" r:id="rId10"/>
     <p:sldId id="269" r:id="rId11"/>
+    <p:sldId id="270" r:id="rId12"/>
   </p:sldIdLst>
   <p:sldSz cx="14400213" cy="14400213"/>
   <p:notesSz cx="6858000" cy="9144000"/>
@@ -3018,10 +3019,10 @@
       </p:grpSpPr>
       <p:grpSp>
         <p:nvGrpSpPr>
-          <p:cNvPr id="17" name="Group 16">
+          <p:cNvPr id="20" name="Group 19">
             <a:extLst>
               <a:ext uri="{FF2B5EF4-FFF2-40B4-BE49-F238E27FC236}">
-                <a16:creationId xmlns:a16="http://schemas.microsoft.com/office/drawing/2014/main" id="{0D581D7A-496E-6944-8EDF-17639DA32EFF}"/>
+                <a16:creationId xmlns:a16="http://schemas.microsoft.com/office/drawing/2014/main" id="{34321D0F-D11A-4242-9830-D73F5C21F06F}"/>
               </a:ext>
             </a:extLst>
           </p:cNvPr>
@@ -3108,24 +3109,21 @@
             </p:cNvPicPr>
             <p:nvPr/>
           </p:nvPicPr>
-          <p:blipFill>
+          <p:blipFill rotWithShape="1">
             <a:blip r:embed="rId4"/>
-            <a:stretch>
-              <a:fillRect/>
-            </a:stretch>
+            <a:srcRect t="13313"/>
+            <a:stretch/>
           </p:blipFill>
           <p:spPr>
             <a:xfrm>
-              <a:off x="7474056" y="4490720"/>
-              <a:ext cx="2003159" cy="2920206"/>
+              <a:off x="7474056" y="4936646"/>
+              <a:ext cx="2003159" cy="2531429"/>
             </a:xfrm>
             <a:prstGeom prst="rect">
               <a:avLst/>
             </a:prstGeom>
             <a:ln w="19050">
-              <a:solidFill>
-                <a:schemeClr val="tx1"/>
-              </a:solidFill>
+              <a:noFill/>
             </a:ln>
           </p:spPr>
         </p:pic>
@@ -3363,11 +3361,1469 @@
             </a:p>
           </p:txBody>
         </p:sp>
+        <p:sp>
+          <p:nvSpPr>
+            <p:cNvPr id="18" name="TextBox 17">
+              <a:extLst>
+                <a:ext uri="{FF2B5EF4-FFF2-40B4-BE49-F238E27FC236}">
+                  <a16:creationId xmlns:a16="http://schemas.microsoft.com/office/drawing/2014/main" id="{FAB0938E-EB91-4445-BD21-95239AA573F2}"/>
+                </a:ext>
+              </a:extLst>
+            </p:cNvPr>
+            <p:cNvSpPr txBox="1"/>
+            <p:nvPr/>
+          </p:nvSpPr>
+          <p:spPr>
+            <a:xfrm>
+              <a:off x="7435054" y="4313561"/>
+              <a:ext cx="1249060" cy="646331"/>
+            </a:xfrm>
+            <a:prstGeom prst="rect">
+              <a:avLst/>
+            </a:prstGeom>
+            <a:noFill/>
+          </p:spPr>
+          <p:txBody>
+            <a:bodyPr wrap="none" rtlCol="0">
+              <a:spAutoFit/>
+            </a:bodyPr>
+            <a:lstStyle/>
+            <a:p>
+              <a:pPr algn="ctr"/>
+              <a:r>
+                <a:rPr lang="en-CA" sz="1800" b="1" dirty="0">
+                  <a:latin typeface="Helvetica" pitchFamily="2" charset="0"/>
+                </a:rPr>
+                <a:t>Level of </a:t>
+              </a:r>
+            </a:p>
+            <a:p>
+              <a:pPr algn="ctr"/>
+              <a:r>
+                <a:rPr lang="en-CA" sz="1800" b="1" dirty="0">
+                  <a:latin typeface="Helvetica" pitchFamily="2" charset="0"/>
+                </a:rPr>
+                <a:t>gene flow</a:t>
+              </a:r>
+              <a:endParaRPr lang="en-US" sz="1800" b="1" dirty="0">
+                <a:latin typeface="Helvetica" pitchFamily="2" charset="0"/>
+              </a:endParaRPr>
+            </a:p>
+          </p:txBody>
+        </p:sp>
+        <p:sp>
+          <p:nvSpPr>
+            <p:cNvPr id="19" name="Rectangle 18">
+              <a:extLst>
+                <a:ext uri="{FF2B5EF4-FFF2-40B4-BE49-F238E27FC236}">
+                  <a16:creationId xmlns:a16="http://schemas.microsoft.com/office/drawing/2014/main" id="{01B95E16-0308-E24C-A83E-2D7B02669A50}"/>
+                </a:ext>
+              </a:extLst>
+            </p:cNvPr>
+            <p:cNvSpPr/>
+            <p:nvPr/>
+          </p:nvSpPr>
+          <p:spPr>
+            <a:xfrm>
+              <a:off x="7435848" y="4317250"/>
+              <a:ext cx="1287268" cy="3150825"/>
+            </a:xfrm>
+            <a:prstGeom prst="rect">
+              <a:avLst/>
+            </a:prstGeom>
+            <a:noFill/>
+            <a:ln w="19050">
+              <a:solidFill>
+                <a:schemeClr val="tx1"/>
+              </a:solidFill>
+            </a:ln>
+          </p:spPr>
+          <p:style>
+            <a:lnRef idx="2">
+              <a:schemeClr val="accent1">
+                <a:shade val="50000"/>
+              </a:schemeClr>
+            </a:lnRef>
+            <a:fillRef idx="1">
+              <a:schemeClr val="accent1"/>
+            </a:fillRef>
+            <a:effectRef idx="0">
+              <a:schemeClr val="accent1"/>
+            </a:effectRef>
+            <a:fontRef idx="minor">
+              <a:schemeClr val="lt1"/>
+            </a:fontRef>
+          </p:style>
+          <p:txBody>
+            <a:bodyPr rtlCol="0" anchor="ctr"/>
+            <a:lstStyle/>
+            <a:p>
+              <a:pPr algn="ctr"/>
+              <a:endParaRPr lang="en-US"/>
+            </a:p>
+          </p:txBody>
+        </p:sp>
       </p:grpSp>
     </p:spTree>
     <p:extLst>
       <p:ext uri="{BB962C8B-B14F-4D97-AF65-F5344CB8AC3E}">
         <p14:creationId xmlns:p14="http://schemas.microsoft.com/office/powerpoint/2010/main" val="641139941"/>
+      </p:ext>
+    </p:extLst>
+  </p:cSld>
+  <p:clrMapOvr>
+    <a:masterClrMapping/>
+  </p:clrMapOvr>
+</p:sld>
+</file>
+
+<file path=ppt/slides/slide11.xml><?xml version="1.0" encoding="utf-8"?>
+<p:sld xmlns:a="http://schemas.openxmlformats.org/drawingml/2006/main" xmlns:r="http://schemas.openxmlformats.org/officeDocument/2006/relationships" xmlns:p="http://schemas.openxmlformats.org/presentationml/2006/main">
+  <p:cSld>
+    <p:spTree>
+      <p:nvGrpSpPr>
+        <p:cNvPr id="1" name=""/>
+        <p:cNvGrpSpPr/>
+        <p:nvPr/>
+      </p:nvGrpSpPr>
+      <p:grpSpPr>
+        <a:xfrm>
+          <a:off x="0" y="0"/>
+          <a:ext cx="0" cy="0"/>
+          <a:chOff x="0" y="0"/>
+          <a:chExt cx="0" cy="0"/>
+        </a:xfrm>
+      </p:grpSpPr>
+      <p:grpSp>
+        <p:nvGrpSpPr>
+          <p:cNvPr id="39" name="Group 38">
+            <a:extLst>
+              <a:ext uri="{FF2B5EF4-FFF2-40B4-BE49-F238E27FC236}">
+                <a16:creationId xmlns:a16="http://schemas.microsoft.com/office/drawing/2014/main" id="{BBAC69C9-CDF6-914B-836F-96787F371E2A}"/>
+              </a:ext>
+            </a:extLst>
+          </p:cNvPr>
+          <p:cNvGrpSpPr/>
+          <p:nvPr/>
+        </p:nvGrpSpPr>
+        <p:grpSpPr>
+          <a:xfrm>
+            <a:off x="1278955" y="2473445"/>
+            <a:ext cx="8010016" cy="10377301"/>
+            <a:chOff x="1278955" y="2473445"/>
+            <a:chExt cx="8010016" cy="10377301"/>
+          </a:xfrm>
+        </p:grpSpPr>
+        <p:pic>
+          <p:nvPicPr>
+            <p:cNvPr id="5" name="Picture 4">
+              <a:extLst>
+                <a:ext uri="{FF2B5EF4-FFF2-40B4-BE49-F238E27FC236}">
+                  <a16:creationId xmlns:a16="http://schemas.microsoft.com/office/drawing/2014/main" id="{5EC23B1A-8963-534C-A7BA-DE55E22AB43F}"/>
+                </a:ext>
+              </a:extLst>
+            </p:cNvPr>
+            <p:cNvPicPr>
+              <a:picLocks noChangeAspect="1"/>
+            </p:cNvPicPr>
+            <p:nvPr/>
+          </p:nvPicPr>
+          <p:blipFill rotWithShape="1">
+            <a:blip r:embed="rId2"/>
+            <a:srcRect l="4136" t="12189" b="15921"/>
+            <a:stretch/>
+          </p:blipFill>
+          <p:spPr>
+            <a:xfrm>
+              <a:off x="1636888" y="2935112"/>
+              <a:ext cx="3703157" cy="2777068"/>
+            </a:xfrm>
+            <a:prstGeom prst="rect">
+              <a:avLst/>
+            </a:prstGeom>
+          </p:spPr>
+        </p:pic>
+        <p:pic>
+          <p:nvPicPr>
+            <p:cNvPr id="7" name="Picture 6">
+              <a:extLst>
+                <a:ext uri="{FF2B5EF4-FFF2-40B4-BE49-F238E27FC236}">
+                  <a16:creationId xmlns:a16="http://schemas.microsoft.com/office/drawing/2014/main" id="{365C9FAC-B15C-2A41-91C1-B56F9201C1B6}"/>
+                </a:ext>
+              </a:extLst>
+            </p:cNvPr>
+            <p:cNvPicPr>
+              <a:picLocks noChangeAspect="1"/>
+            </p:cNvPicPr>
+            <p:nvPr/>
+          </p:nvPicPr>
+          <p:blipFill rotWithShape="1">
+            <a:blip r:embed="rId3"/>
+            <a:srcRect l="4193" t="12188" b="16506"/>
+            <a:stretch/>
+          </p:blipFill>
+          <p:spPr>
+            <a:xfrm>
+              <a:off x="5587998" y="2935111"/>
+              <a:ext cx="3700973" cy="2754490"/>
+            </a:xfrm>
+            <a:prstGeom prst="rect">
+              <a:avLst/>
+            </a:prstGeom>
+          </p:spPr>
+        </p:pic>
+        <p:pic>
+          <p:nvPicPr>
+            <p:cNvPr id="9" name="Picture 8">
+              <a:extLst>
+                <a:ext uri="{FF2B5EF4-FFF2-40B4-BE49-F238E27FC236}">
+                  <a16:creationId xmlns:a16="http://schemas.microsoft.com/office/drawing/2014/main" id="{264A2B09-616A-D24F-9262-AEE2AF696EB6}"/>
+                </a:ext>
+              </a:extLst>
+            </p:cNvPr>
+            <p:cNvPicPr>
+              <a:picLocks noChangeAspect="1"/>
+            </p:cNvPicPr>
+            <p:nvPr/>
+          </p:nvPicPr>
+          <p:blipFill rotWithShape="1">
+            <a:blip r:embed="rId4"/>
+            <a:srcRect l="4136" t="12163" b="16530"/>
+            <a:stretch/>
+          </p:blipFill>
+          <p:spPr>
+            <a:xfrm>
+              <a:off x="1636887" y="6333069"/>
+              <a:ext cx="3703157" cy="2754489"/>
+            </a:xfrm>
+            <a:prstGeom prst="rect">
+              <a:avLst/>
+            </a:prstGeom>
+          </p:spPr>
+        </p:pic>
+        <p:pic>
+          <p:nvPicPr>
+            <p:cNvPr id="11" name="Picture 10">
+              <a:extLst>
+                <a:ext uri="{FF2B5EF4-FFF2-40B4-BE49-F238E27FC236}">
+                  <a16:creationId xmlns:a16="http://schemas.microsoft.com/office/drawing/2014/main" id="{29153A60-81F0-4342-85DF-FC5C5F40A173}"/>
+                </a:ext>
+              </a:extLst>
+            </p:cNvPr>
+            <p:cNvPicPr>
+              <a:picLocks noChangeAspect="1"/>
+            </p:cNvPicPr>
+            <p:nvPr/>
+          </p:nvPicPr>
+          <p:blipFill rotWithShape="1">
+            <a:blip r:embed="rId5"/>
+            <a:srcRect l="4646" t="12514" b="17057"/>
+            <a:stretch/>
+          </p:blipFill>
+          <p:spPr>
+            <a:xfrm>
+              <a:off x="5531556" y="6366935"/>
+              <a:ext cx="3757415" cy="2720623"/>
+            </a:xfrm>
+            <a:prstGeom prst="rect">
+              <a:avLst/>
+            </a:prstGeom>
+          </p:spPr>
+        </p:pic>
+        <p:pic>
+          <p:nvPicPr>
+            <p:cNvPr id="13" name="Picture 12">
+              <a:extLst>
+                <a:ext uri="{FF2B5EF4-FFF2-40B4-BE49-F238E27FC236}">
+                  <a16:creationId xmlns:a16="http://schemas.microsoft.com/office/drawing/2014/main" id="{9AB1015F-DDBD-D946-84A8-884A801F3B2F}"/>
+                </a:ext>
+              </a:extLst>
+            </p:cNvPr>
+            <p:cNvPicPr>
+              <a:picLocks noChangeAspect="1"/>
+            </p:cNvPicPr>
+            <p:nvPr/>
+          </p:nvPicPr>
+          <p:blipFill rotWithShape="1">
+            <a:blip r:embed="rId6"/>
+            <a:srcRect l="4193" t="11525" b="16293"/>
+            <a:stretch/>
+          </p:blipFill>
+          <p:spPr>
+            <a:xfrm>
+              <a:off x="1704622" y="9708447"/>
+              <a:ext cx="3826934" cy="2788356"/>
+            </a:xfrm>
+            <a:prstGeom prst="rect">
+              <a:avLst/>
+            </a:prstGeom>
+          </p:spPr>
+        </p:pic>
+        <p:sp>
+          <p:nvSpPr>
+            <p:cNvPr id="14" name="TextBox 13">
+              <a:extLst>
+                <a:ext uri="{FF2B5EF4-FFF2-40B4-BE49-F238E27FC236}">
+                  <a16:creationId xmlns:a16="http://schemas.microsoft.com/office/drawing/2014/main" id="{5F0270E7-062B-024A-A2B2-F740C62FBFE0}"/>
+                </a:ext>
+              </a:extLst>
+            </p:cNvPr>
+            <p:cNvSpPr txBox="1"/>
+            <p:nvPr/>
+          </p:nvSpPr>
+          <p:spPr>
+            <a:xfrm rot="16200000">
+              <a:off x="1075837" y="4146674"/>
+              <a:ext cx="768159" cy="353943"/>
+            </a:xfrm>
+            <a:prstGeom prst="rect">
+              <a:avLst/>
+            </a:prstGeom>
+            <a:solidFill>
+              <a:schemeClr val="bg1"/>
+            </a:solidFill>
+          </p:spPr>
+          <p:txBody>
+            <a:bodyPr wrap="none" rtlCol="0">
+              <a:spAutoFit/>
+            </a:bodyPr>
+            <a:lstStyle/>
+            <a:p>
+              <a:r>
+                <a:rPr lang="en-US" sz="1700" dirty="0">
+                  <a:latin typeface="Helvetica" charset="0"/>
+                  <a:ea typeface="Helvetica" charset="0"/>
+                  <a:cs typeface="Helvetica" charset="0"/>
+                </a:rPr>
+                <a:t>Count</a:t>
+              </a:r>
+            </a:p>
+          </p:txBody>
+        </p:sp>
+        <p:sp>
+          <p:nvSpPr>
+            <p:cNvPr id="19" name="TextBox 18">
+              <a:extLst>
+                <a:ext uri="{FF2B5EF4-FFF2-40B4-BE49-F238E27FC236}">
+                  <a16:creationId xmlns:a16="http://schemas.microsoft.com/office/drawing/2014/main" id="{F4B8A501-51BC-4C48-AF9E-F4AE57DE7BB0}"/>
+                </a:ext>
+              </a:extLst>
+            </p:cNvPr>
+            <p:cNvSpPr txBox="1"/>
+            <p:nvPr/>
+          </p:nvSpPr>
+          <p:spPr>
+            <a:xfrm rot="16200000">
+              <a:off x="1071847" y="7457013"/>
+              <a:ext cx="768159" cy="353943"/>
+            </a:xfrm>
+            <a:prstGeom prst="rect">
+              <a:avLst/>
+            </a:prstGeom>
+            <a:solidFill>
+              <a:schemeClr val="bg1"/>
+            </a:solidFill>
+          </p:spPr>
+          <p:txBody>
+            <a:bodyPr wrap="none" rtlCol="0">
+              <a:spAutoFit/>
+            </a:bodyPr>
+            <a:lstStyle/>
+            <a:p>
+              <a:r>
+                <a:rPr lang="en-US" sz="1700" dirty="0">
+                  <a:latin typeface="Helvetica" charset="0"/>
+                  <a:ea typeface="Helvetica" charset="0"/>
+                  <a:cs typeface="Helvetica" charset="0"/>
+                </a:rPr>
+                <a:t>Count</a:t>
+              </a:r>
+            </a:p>
+          </p:txBody>
+        </p:sp>
+        <p:sp>
+          <p:nvSpPr>
+            <p:cNvPr id="20" name="TextBox 19">
+              <a:extLst>
+                <a:ext uri="{FF2B5EF4-FFF2-40B4-BE49-F238E27FC236}">
+                  <a16:creationId xmlns:a16="http://schemas.microsoft.com/office/drawing/2014/main" id="{67C7A3B4-6A82-3F42-805A-CFE088099993}"/>
+                </a:ext>
+              </a:extLst>
+            </p:cNvPr>
+            <p:cNvSpPr txBox="1"/>
+            <p:nvPr/>
+          </p:nvSpPr>
+          <p:spPr>
+            <a:xfrm rot="16200000">
+              <a:off x="1071847" y="10767353"/>
+              <a:ext cx="768159" cy="353943"/>
+            </a:xfrm>
+            <a:prstGeom prst="rect">
+              <a:avLst/>
+            </a:prstGeom>
+            <a:solidFill>
+              <a:schemeClr val="bg1"/>
+            </a:solidFill>
+          </p:spPr>
+          <p:txBody>
+            <a:bodyPr wrap="none" rtlCol="0">
+              <a:spAutoFit/>
+            </a:bodyPr>
+            <a:lstStyle/>
+            <a:p>
+              <a:r>
+                <a:rPr lang="en-US" sz="1700" dirty="0">
+                  <a:latin typeface="Helvetica" charset="0"/>
+                  <a:ea typeface="Helvetica" charset="0"/>
+                  <a:cs typeface="Helvetica" charset="0"/>
+                </a:rPr>
+                <a:t>Count</a:t>
+              </a:r>
+            </a:p>
+          </p:txBody>
+        </p:sp>
+        <p:sp>
+          <p:nvSpPr>
+            <p:cNvPr id="21" name="TextBox 20">
+              <a:extLst>
+                <a:ext uri="{FF2B5EF4-FFF2-40B4-BE49-F238E27FC236}">
+                  <a16:creationId xmlns:a16="http://schemas.microsoft.com/office/drawing/2014/main" id="{2F910511-754E-1F49-A7F1-9FF2CA98D089}"/>
+                </a:ext>
+              </a:extLst>
+            </p:cNvPr>
+            <p:cNvSpPr txBox="1"/>
+            <p:nvPr/>
+          </p:nvSpPr>
+          <p:spPr>
+            <a:xfrm>
+              <a:off x="3246032" y="12496803"/>
+              <a:ext cx="744114" cy="353943"/>
+            </a:xfrm>
+            <a:prstGeom prst="rect">
+              <a:avLst/>
+            </a:prstGeom>
+            <a:solidFill>
+              <a:schemeClr val="bg1"/>
+            </a:solidFill>
+          </p:spPr>
+          <p:txBody>
+            <a:bodyPr wrap="none" rtlCol="0">
+              <a:spAutoFit/>
+            </a:bodyPr>
+            <a:lstStyle/>
+            <a:p>
+              <a:r>
+                <a:rPr lang="en-US" sz="1700" dirty="0">
+                  <a:latin typeface="Helvetica" charset="0"/>
+                  <a:ea typeface="Helvetica" charset="0"/>
+                  <a:cs typeface="Helvetica" charset="0"/>
+                </a:rPr>
+                <a:t>Slope</a:t>
+              </a:r>
+            </a:p>
+          </p:txBody>
+        </p:sp>
+        <p:sp>
+          <p:nvSpPr>
+            <p:cNvPr id="22" name="TextBox 21">
+              <a:extLst>
+                <a:ext uri="{FF2B5EF4-FFF2-40B4-BE49-F238E27FC236}">
+                  <a16:creationId xmlns:a16="http://schemas.microsoft.com/office/drawing/2014/main" id="{D468D847-65E3-E341-9B6E-191670C49EAA}"/>
+                </a:ext>
+              </a:extLst>
+            </p:cNvPr>
+            <p:cNvSpPr txBox="1"/>
+            <p:nvPr/>
+          </p:nvSpPr>
+          <p:spPr>
+            <a:xfrm>
+              <a:off x="7247051" y="9087558"/>
+              <a:ext cx="744114" cy="353943"/>
+            </a:xfrm>
+            <a:prstGeom prst="rect">
+              <a:avLst/>
+            </a:prstGeom>
+            <a:solidFill>
+              <a:schemeClr val="bg1"/>
+            </a:solidFill>
+          </p:spPr>
+          <p:txBody>
+            <a:bodyPr wrap="none" rtlCol="0">
+              <a:spAutoFit/>
+            </a:bodyPr>
+            <a:lstStyle/>
+            <a:p>
+              <a:r>
+                <a:rPr lang="en-US" sz="1700" dirty="0">
+                  <a:latin typeface="Helvetica" charset="0"/>
+                  <a:ea typeface="Helvetica" charset="0"/>
+                  <a:cs typeface="Helvetica" charset="0"/>
+                </a:rPr>
+                <a:t>Slope</a:t>
+              </a:r>
+            </a:p>
+          </p:txBody>
+        </p:sp>
+        <p:sp>
+          <p:nvSpPr>
+            <p:cNvPr id="23" name="TextBox 22">
+              <a:extLst>
+                <a:ext uri="{FF2B5EF4-FFF2-40B4-BE49-F238E27FC236}">
+                  <a16:creationId xmlns:a16="http://schemas.microsoft.com/office/drawing/2014/main" id="{5F6676C7-E693-D847-A451-1F04B547BF5A}"/>
+                </a:ext>
+              </a:extLst>
+            </p:cNvPr>
+            <p:cNvSpPr txBox="1"/>
+            <p:nvPr/>
+          </p:nvSpPr>
+          <p:spPr>
+            <a:xfrm>
+              <a:off x="2405258" y="2473446"/>
+              <a:ext cx="2425664" cy="461665"/>
+            </a:xfrm>
+            <a:prstGeom prst="rect">
+              <a:avLst/>
+            </a:prstGeom>
+            <a:solidFill>
+              <a:schemeClr val="bg1"/>
+            </a:solidFill>
+          </p:spPr>
+          <p:txBody>
+            <a:bodyPr wrap="none" rtlCol="0">
+              <a:spAutoFit/>
+            </a:bodyPr>
+            <a:lstStyle/>
+            <a:p>
+              <a:pPr algn="ctr"/>
+              <a:r>
+                <a:rPr lang="en-US" sz="1200" dirty="0">
+                  <a:latin typeface="Helvetica" charset="0"/>
+                  <a:ea typeface="Helvetica" charset="0"/>
+                  <a:cs typeface="Helvetica" charset="0"/>
+                </a:rPr>
+                <a:t>Strong drift gradient (min </a:t>
+              </a:r>
+              <a:r>
+                <a:rPr lang="en-US" sz="1200" i="1" dirty="0">
+                  <a:latin typeface="Helvetica" charset="0"/>
+                  <a:ea typeface="Helvetica" charset="0"/>
+                  <a:cs typeface="Helvetica" charset="0"/>
+                </a:rPr>
+                <a:t>N</a:t>
+              </a:r>
+              <a:r>
+                <a:rPr lang="en-US" sz="1200" dirty="0">
+                  <a:latin typeface="Helvetica" charset="0"/>
+                  <a:ea typeface="Helvetica" charset="0"/>
+                  <a:cs typeface="Helvetica" charset="0"/>
+                </a:rPr>
+                <a:t> = 10)</a:t>
+              </a:r>
+            </a:p>
+            <a:p>
+              <a:pPr algn="ctr"/>
+              <a:r>
+                <a:rPr lang="en-CA" sz="1200" dirty="0">
+                  <a:latin typeface="Helvetica" charset="0"/>
+                  <a:ea typeface="Helvetica" charset="0"/>
+                  <a:cs typeface="Helvetica" charset="0"/>
+                </a:rPr>
+                <a:t>N</a:t>
+              </a:r>
+              <a:r>
+                <a:rPr lang="en-US" sz="1200" dirty="0">
+                  <a:latin typeface="Helvetica" charset="0"/>
+                  <a:ea typeface="Helvetica" charset="0"/>
+                  <a:cs typeface="Helvetica" charset="0"/>
+                </a:rPr>
+                <a:t>o gene flow (</a:t>
+              </a:r>
+              <a:r>
+                <a:rPr lang="en-US" sz="1200" i="1" dirty="0">
+                  <a:latin typeface="Helvetica" charset="0"/>
+                  <a:ea typeface="Helvetica" charset="0"/>
+                  <a:cs typeface="Helvetica" charset="0"/>
+                </a:rPr>
+                <a:t>m </a:t>
+              </a:r>
+              <a:r>
+                <a:rPr lang="en-US" sz="1200" dirty="0">
+                  <a:latin typeface="Helvetica" charset="0"/>
+                  <a:ea typeface="Helvetica" charset="0"/>
+                  <a:cs typeface="Helvetica" charset="0"/>
+                </a:rPr>
+                <a:t>= 0)</a:t>
+              </a:r>
+            </a:p>
+          </p:txBody>
+        </p:sp>
+        <p:sp>
+          <p:nvSpPr>
+            <p:cNvPr id="24" name="TextBox 23">
+              <a:extLst>
+                <a:ext uri="{FF2B5EF4-FFF2-40B4-BE49-F238E27FC236}">
+                  <a16:creationId xmlns:a16="http://schemas.microsoft.com/office/drawing/2014/main" id="{DAC923EA-45A9-1B46-B6BA-11C0EC6772CF}"/>
+                </a:ext>
+              </a:extLst>
+            </p:cNvPr>
+            <p:cNvSpPr txBox="1"/>
+            <p:nvPr/>
+          </p:nvSpPr>
+          <p:spPr>
+            <a:xfrm>
+              <a:off x="6163425" y="2473445"/>
+              <a:ext cx="2911374" cy="461665"/>
+            </a:xfrm>
+            <a:prstGeom prst="rect">
+              <a:avLst/>
+            </a:prstGeom>
+            <a:solidFill>
+              <a:schemeClr val="bg1"/>
+            </a:solidFill>
+          </p:spPr>
+          <p:txBody>
+            <a:bodyPr wrap="none" rtlCol="0">
+              <a:spAutoFit/>
+            </a:bodyPr>
+            <a:lstStyle/>
+            <a:p>
+              <a:pPr algn="ctr"/>
+              <a:r>
+                <a:rPr lang="en-US" sz="1200" dirty="0">
+                  <a:latin typeface="Helvetica" charset="0"/>
+                  <a:ea typeface="Helvetica" charset="0"/>
+                  <a:cs typeface="Helvetica" charset="0"/>
+                </a:rPr>
+                <a:t>Intermediate drift gradient (min </a:t>
+              </a:r>
+              <a:r>
+                <a:rPr lang="en-US" sz="1200" i="1" dirty="0">
+                  <a:latin typeface="Helvetica" charset="0"/>
+                  <a:ea typeface="Helvetica" charset="0"/>
+                  <a:cs typeface="Helvetica" charset="0"/>
+                </a:rPr>
+                <a:t>N</a:t>
+              </a:r>
+              <a:r>
+                <a:rPr lang="en-US" sz="1200" dirty="0">
+                  <a:latin typeface="Helvetica" charset="0"/>
+                  <a:ea typeface="Helvetica" charset="0"/>
+                  <a:cs typeface="Helvetica" charset="0"/>
+                </a:rPr>
+                <a:t> = 100)</a:t>
+              </a:r>
+            </a:p>
+            <a:p>
+              <a:pPr algn="ctr"/>
+              <a:r>
+                <a:rPr lang="en-CA" sz="1200" dirty="0">
+                  <a:latin typeface="Helvetica" charset="0"/>
+                  <a:ea typeface="Helvetica" charset="0"/>
+                  <a:cs typeface="Helvetica" charset="0"/>
+                </a:rPr>
+                <a:t>N</a:t>
+              </a:r>
+              <a:r>
+                <a:rPr lang="en-US" sz="1200" dirty="0">
+                  <a:latin typeface="Helvetica" charset="0"/>
+                  <a:ea typeface="Helvetica" charset="0"/>
+                  <a:cs typeface="Helvetica" charset="0"/>
+                </a:rPr>
+                <a:t>o gene flow (</a:t>
+              </a:r>
+              <a:r>
+                <a:rPr lang="en-US" sz="1200" i="1" dirty="0">
+                  <a:latin typeface="Helvetica" charset="0"/>
+                  <a:ea typeface="Helvetica" charset="0"/>
+                  <a:cs typeface="Helvetica" charset="0"/>
+                </a:rPr>
+                <a:t>m </a:t>
+              </a:r>
+              <a:r>
+                <a:rPr lang="en-US" sz="1200" dirty="0">
+                  <a:latin typeface="Helvetica" charset="0"/>
+                  <a:ea typeface="Helvetica" charset="0"/>
+                  <a:cs typeface="Helvetica" charset="0"/>
+                </a:rPr>
+                <a:t>= 0)</a:t>
+              </a:r>
+            </a:p>
+          </p:txBody>
+        </p:sp>
+        <p:sp>
+          <p:nvSpPr>
+            <p:cNvPr id="25" name="TextBox 24">
+              <a:extLst>
+                <a:ext uri="{FF2B5EF4-FFF2-40B4-BE49-F238E27FC236}">
+                  <a16:creationId xmlns:a16="http://schemas.microsoft.com/office/drawing/2014/main" id="{D7870C47-9CF8-C147-B5D2-112F86F4E659}"/>
+                </a:ext>
+              </a:extLst>
+            </p:cNvPr>
+            <p:cNvSpPr txBox="1"/>
+            <p:nvPr/>
+          </p:nvSpPr>
+          <p:spPr>
+            <a:xfrm>
+              <a:off x="2275633" y="5871404"/>
+              <a:ext cx="2425664" cy="461665"/>
+            </a:xfrm>
+            <a:prstGeom prst="rect">
+              <a:avLst/>
+            </a:prstGeom>
+            <a:solidFill>
+              <a:schemeClr val="bg1"/>
+            </a:solidFill>
+          </p:spPr>
+          <p:txBody>
+            <a:bodyPr wrap="none" rtlCol="0">
+              <a:spAutoFit/>
+            </a:bodyPr>
+            <a:lstStyle/>
+            <a:p>
+              <a:pPr algn="ctr"/>
+              <a:r>
+                <a:rPr lang="en-US" sz="1200" dirty="0">
+                  <a:latin typeface="Helvetica" charset="0"/>
+                  <a:ea typeface="Helvetica" charset="0"/>
+                  <a:cs typeface="Helvetica" charset="0"/>
+                </a:rPr>
+                <a:t>Strong drift gradient (min </a:t>
+              </a:r>
+              <a:r>
+                <a:rPr lang="en-US" sz="1200" i="1" dirty="0">
+                  <a:latin typeface="Helvetica" charset="0"/>
+                  <a:ea typeface="Helvetica" charset="0"/>
+                  <a:cs typeface="Helvetica" charset="0"/>
+                </a:rPr>
+                <a:t>N</a:t>
+              </a:r>
+              <a:r>
+                <a:rPr lang="en-US" sz="1200" dirty="0">
+                  <a:latin typeface="Helvetica" charset="0"/>
+                  <a:ea typeface="Helvetica" charset="0"/>
+                  <a:cs typeface="Helvetica" charset="0"/>
+                </a:rPr>
+                <a:t> = 10)</a:t>
+              </a:r>
+            </a:p>
+            <a:p>
+              <a:pPr algn="ctr"/>
+              <a:r>
+                <a:rPr lang="en-CA" sz="1200" dirty="0">
+                  <a:latin typeface="Helvetica" charset="0"/>
+                  <a:ea typeface="Helvetica" charset="0"/>
+                  <a:cs typeface="Helvetica" charset="0"/>
+                </a:rPr>
+                <a:t>High</a:t>
+              </a:r>
+              <a:r>
+                <a:rPr lang="en-US" sz="1200" dirty="0">
+                  <a:latin typeface="Helvetica" charset="0"/>
+                  <a:ea typeface="Helvetica" charset="0"/>
+                  <a:cs typeface="Helvetica" charset="0"/>
+                </a:rPr>
+                <a:t> gene flow (</a:t>
+              </a:r>
+              <a:r>
+                <a:rPr lang="en-US" sz="1200" i="1" dirty="0">
+                  <a:latin typeface="Helvetica" charset="0"/>
+                  <a:ea typeface="Helvetica" charset="0"/>
+                  <a:cs typeface="Helvetica" charset="0"/>
+                </a:rPr>
+                <a:t>m </a:t>
+              </a:r>
+              <a:r>
+                <a:rPr lang="en-US" sz="1200" dirty="0">
+                  <a:latin typeface="Helvetica" charset="0"/>
+                  <a:ea typeface="Helvetica" charset="0"/>
+                  <a:cs typeface="Helvetica" charset="0"/>
+                </a:rPr>
+                <a:t>= 0.05)</a:t>
+              </a:r>
+            </a:p>
+          </p:txBody>
+        </p:sp>
+        <p:sp>
+          <p:nvSpPr>
+            <p:cNvPr id="26" name="TextBox 25">
+              <a:extLst>
+                <a:ext uri="{FF2B5EF4-FFF2-40B4-BE49-F238E27FC236}">
+                  <a16:creationId xmlns:a16="http://schemas.microsoft.com/office/drawing/2014/main" id="{8BCEA28E-7975-4141-8948-7A416FCFD332}"/>
+                </a:ext>
+              </a:extLst>
+            </p:cNvPr>
+            <p:cNvSpPr txBox="1"/>
+            <p:nvPr/>
+          </p:nvSpPr>
+          <p:spPr>
+            <a:xfrm>
+              <a:off x="6163425" y="5905270"/>
+              <a:ext cx="2911374" cy="461665"/>
+            </a:xfrm>
+            <a:prstGeom prst="rect">
+              <a:avLst/>
+            </a:prstGeom>
+            <a:solidFill>
+              <a:schemeClr val="bg1"/>
+            </a:solidFill>
+          </p:spPr>
+          <p:txBody>
+            <a:bodyPr wrap="none" rtlCol="0">
+              <a:spAutoFit/>
+            </a:bodyPr>
+            <a:lstStyle/>
+            <a:p>
+              <a:pPr algn="ctr"/>
+              <a:r>
+                <a:rPr lang="en-US" sz="1200" dirty="0">
+                  <a:latin typeface="Helvetica" charset="0"/>
+                  <a:ea typeface="Helvetica" charset="0"/>
+                  <a:cs typeface="Helvetica" charset="0"/>
+                </a:rPr>
+                <a:t>Intermediate drift gradient (min </a:t>
+              </a:r>
+              <a:r>
+                <a:rPr lang="en-US" sz="1200" i="1" dirty="0">
+                  <a:latin typeface="Helvetica" charset="0"/>
+                  <a:ea typeface="Helvetica" charset="0"/>
+                  <a:cs typeface="Helvetica" charset="0"/>
+                </a:rPr>
+                <a:t>N</a:t>
+              </a:r>
+              <a:r>
+                <a:rPr lang="en-US" sz="1200" dirty="0">
+                  <a:latin typeface="Helvetica" charset="0"/>
+                  <a:ea typeface="Helvetica" charset="0"/>
+                  <a:cs typeface="Helvetica" charset="0"/>
+                </a:rPr>
+                <a:t> = 100)</a:t>
+              </a:r>
+            </a:p>
+            <a:p>
+              <a:pPr algn="ctr"/>
+              <a:r>
+                <a:rPr lang="en-CA" sz="1200" dirty="0">
+                  <a:latin typeface="Helvetica" charset="0"/>
+                  <a:ea typeface="Helvetica" charset="0"/>
+                  <a:cs typeface="Helvetica" charset="0"/>
+                </a:rPr>
+                <a:t>High</a:t>
+              </a:r>
+              <a:r>
+                <a:rPr lang="en-US" sz="1200" dirty="0">
+                  <a:latin typeface="Helvetica" charset="0"/>
+                  <a:ea typeface="Helvetica" charset="0"/>
+                  <a:cs typeface="Helvetica" charset="0"/>
+                </a:rPr>
+                <a:t> gene flow (</a:t>
+              </a:r>
+              <a:r>
+                <a:rPr lang="en-US" sz="1200" i="1" dirty="0">
+                  <a:latin typeface="Helvetica" charset="0"/>
+                  <a:ea typeface="Helvetica" charset="0"/>
+                  <a:cs typeface="Helvetica" charset="0"/>
+                </a:rPr>
+                <a:t>m </a:t>
+              </a:r>
+              <a:r>
+                <a:rPr lang="en-US" sz="1200" dirty="0">
+                  <a:latin typeface="Helvetica" charset="0"/>
+                  <a:ea typeface="Helvetica" charset="0"/>
+                  <a:cs typeface="Helvetica" charset="0"/>
+                </a:rPr>
+                <a:t>= 0.05)</a:t>
+              </a:r>
+            </a:p>
+          </p:txBody>
+        </p:sp>
+        <p:sp>
+          <p:nvSpPr>
+            <p:cNvPr id="27" name="TextBox 26">
+              <a:extLst>
+                <a:ext uri="{FF2B5EF4-FFF2-40B4-BE49-F238E27FC236}">
+                  <a16:creationId xmlns:a16="http://schemas.microsoft.com/office/drawing/2014/main" id="{D63B141B-8C85-B74F-98B5-0DB31FF8E4A3}"/>
+                </a:ext>
+              </a:extLst>
+            </p:cNvPr>
+            <p:cNvSpPr txBox="1"/>
+            <p:nvPr/>
+          </p:nvSpPr>
+          <p:spPr>
+            <a:xfrm>
+              <a:off x="2820654" y="9431401"/>
+              <a:ext cx="1335622" cy="276999"/>
+            </a:xfrm>
+            <a:prstGeom prst="rect">
+              <a:avLst/>
+            </a:prstGeom>
+            <a:solidFill>
+              <a:schemeClr val="bg1"/>
+            </a:solidFill>
+          </p:spPr>
+          <p:txBody>
+            <a:bodyPr wrap="none" rtlCol="0">
+              <a:spAutoFit/>
+            </a:bodyPr>
+            <a:lstStyle/>
+            <a:p>
+              <a:pPr algn="ctr"/>
+              <a:r>
+                <a:rPr lang="en-CA" sz="1200" dirty="0">
+                  <a:latin typeface="Helvetica" charset="0"/>
+                  <a:ea typeface="Helvetica" charset="0"/>
+                  <a:cs typeface="Helvetica" charset="0"/>
+                </a:rPr>
+                <a:t>Observed slopes</a:t>
+              </a:r>
+              <a:endParaRPr lang="en-US" sz="1200" dirty="0">
+                <a:latin typeface="Helvetica" charset="0"/>
+                <a:ea typeface="Helvetica" charset="0"/>
+                <a:cs typeface="Helvetica" charset="0"/>
+              </a:endParaRPr>
+            </a:p>
+          </p:txBody>
+        </p:sp>
+        <p:grpSp>
+          <p:nvGrpSpPr>
+            <p:cNvPr id="33" name="Group 32">
+              <a:extLst>
+                <a:ext uri="{FF2B5EF4-FFF2-40B4-BE49-F238E27FC236}">
+                  <a16:creationId xmlns:a16="http://schemas.microsoft.com/office/drawing/2014/main" id="{9054B670-69C0-AC4E-AEB5-41E541907269}"/>
+                </a:ext>
+              </a:extLst>
+            </p:cNvPr>
+            <p:cNvGrpSpPr/>
+            <p:nvPr/>
+          </p:nvGrpSpPr>
+          <p:grpSpPr>
+            <a:xfrm>
+              <a:off x="5587998" y="9708400"/>
+              <a:ext cx="1530059" cy="633687"/>
+              <a:chOff x="11157650" y="3468413"/>
+              <a:chExt cx="1530059" cy="633687"/>
+            </a:xfrm>
+          </p:grpSpPr>
+          <p:sp>
+            <p:nvSpPr>
+              <p:cNvPr id="28" name="Rectangle 27">
+                <a:extLst>
+                  <a:ext uri="{FF2B5EF4-FFF2-40B4-BE49-F238E27FC236}">
+                    <a16:creationId xmlns:a16="http://schemas.microsoft.com/office/drawing/2014/main" id="{C1FF9806-2124-B948-B65F-87FC44746D96}"/>
+                  </a:ext>
+                </a:extLst>
+              </p:cNvPr>
+              <p:cNvSpPr/>
+              <p:nvPr/>
+            </p:nvSpPr>
+            <p:spPr>
+              <a:xfrm>
+                <a:off x="11223357" y="3535625"/>
+                <a:ext cx="154379" cy="154379"/>
+              </a:xfrm>
+              <a:prstGeom prst="rect">
+                <a:avLst/>
+              </a:prstGeom>
+              <a:solidFill>
+                <a:schemeClr val="bg1"/>
+              </a:solidFill>
+              <a:ln>
+                <a:solidFill>
+                  <a:schemeClr val="tx1"/>
+                </a:solidFill>
+              </a:ln>
+            </p:spPr>
+            <p:style>
+              <a:lnRef idx="2">
+                <a:schemeClr val="accent1">
+                  <a:shade val="50000"/>
+                </a:schemeClr>
+              </a:lnRef>
+              <a:fillRef idx="1">
+                <a:schemeClr val="accent1"/>
+              </a:fillRef>
+              <a:effectRef idx="0">
+                <a:schemeClr val="accent1"/>
+              </a:effectRef>
+              <a:fontRef idx="minor">
+                <a:schemeClr val="lt1"/>
+              </a:fontRef>
+            </p:style>
+            <p:txBody>
+              <a:bodyPr rtlCol="0" anchor="ctr"/>
+              <a:lstStyle/>
+              <a:p>
+                <a:pPr algn="ctr"/>
+                <a:endParaRPr lang="en-US"/>
+              </a:p>
+            </p:txBody>
+          </p:sp>
+          <p:sp>
+            <p:nvSpPr>
+              <p:cNvPr id="29" name="Rectangle 28">
+                <a:extLst>
+                  <a:ext uri="{FF2B5EF4-FFF2-40B4-BE49-F238E27FC236}">
+                    <a16:creationId xmlns:a16="http://schemas.microsoft.com/office/drawing/2014/main" id="{50663F85-853C-B44B-B0B3-AF994F96156C}"/>
+                  </a:ext>
+                </a:extLst>
+              </p:cNvPr>
+              <p:cNvSpPr/>
+              <p:nvPr/>
+            </p:nvSpPr>
+            <p:spPr>
+              <a:xfrm>
+                <a:off x="11223356" y="3862376"/>
+                <a:ext cx="154379" cy="154379"/>
+              </a:xfrm>
+              <a:prstGeom prst="rect">
+                <a:avLst/>
+              </a:prstGeom>
+              <a:solidFill>
+                <a:srgbClr val="0632FF"/>
+              </a:solidFill>
+              <a:ln>
+                <a:solidFill>
+                  <a:schemeClr val="tx1"/>
+                </a:solidFill>
+              </a:ln>
+            </p:spPr>
+            <p:style>
+              <a:lnRef idx="2">
+                <a:schemeClr val="accent1">
+                  <a:shade val="50000"/>
+                </a:schemeClr>
+              </a:lnRef>
+              <a:fillRef idx="1">
+                <a:schemeClr val="accent1"/>
+              </a:fillRef>
+              <a:effectRef idx="0">
+                <a:schemeClr val="accent1"/>
+              </a:effectRef>
+              <a:fontRef idx="minor">
+                <a:schemeClr val="lt1"/>
+              </a:fontRef>
+            </p:style>
+            <p:txBody>
+              <a:bodyPr rtlCol="0" anchor="ctr"/>
+              <a:lstStyle/>
+              <a:p>
+                <a:pPr algn="ctr"/>
+                <a:endParaRPr lang="en-US"/>
+              </a:p>
+            </p:txBody>
+          </p:sp>
+          <p:sp>
+            <p:nvSpPr>
+              <p:cNvPr id="30" name="TextBox 29">
+                <a:extLst>
+                  <a:ext uri="{FF2B5EF4-FFF2-40B4-BE49-F238E27FC236}">
+                    <a16:creationId xmlns:a16="http://schemas.microsoft.com/office/drawing/2014/main" id="{00589F9E-539A-AA4E-BAF6-B012F4C13D15}"/>
+                  </a:ext>
+                </a:extLst>
+              </p:cNvPr>
+              <p:cNvSpPr txBox="1"/>
+              <p:nvPr/>
+            </p:nvSpPr>
+            <p:spPr>
+              <a:xfrm>
+                <a:off x="11377735" y="3790300"/>
+                <a:ext cx="1011815" cy="307777"/>
+              </a:xfrm>
+              <a:prstGeom prst="rect">
+                <a:avLst/>
+              </a:prstGeom>
+              <a:noFill/>
+            </p:spPr>
+            <p:txBody>
+              <a:bodyPr wrap="none" rtlCol="0">
+                <a:spAutoFit/>
+              </a:bodyPr>
+              <a:lstStyle/>
+              <a:p>
+                <a:r>
+                  <a:rPr lang="en-CA" sz="1400" dirty="0">
+                    <a:latin typeface="Helvetica" pitchFamily="2" charset="0"/>
+                  </a:rPr>
+                  <a:t>Significant</a:t>
+                </a:r>
+                <a:endParaRPr lang="en-US" sz="1400" dirty="0">
+                  <a:latin typeface="Helvetica" pitchFamily="2" charset="0"/>
+                </a:endParaRPr>
+              </a:p>
+            </p:txBody>
+          </p:sp>
+          <p:sp>
+            <p:nvSpPr>
+              <p:cNvPr id="31" name="TextBox 30">
+                <a:extLst>
+                  <a:ext uri="{FF2B5EF4-FFF2-40B4-BE49-F238E27FC236}">
+                    <a16:creationId xmlns:a16="http://schemas.microsoft.com/office/drawing/2014/main" id="{CCECE7DB-6B04-E845-97E7-FFEAE403A072}"/>
+                  </a:ext>
+                </a:extLst>
+              </p:cNvPr>
+              <p:cNvSpPr txBox="1"/>
+              <p:nvPr/>
+            </p:nvSpPr>
+            <p:spPr>
+              <a:xfrm>
+                <a:off x="11377735" y="3468413"/>
+                <a:ext cx="1309974" cy="307777"/>
+              </a:xfrm>
+              <a:prstGeom prst="rect">
+                <a:avLst/>
+              </a:prstGeom>
+              <a:noFill/>
+            </p:spPr>
+            <p:txBody>
+              <a:bodyPr wrap="none" rtlCol="0">
+                <a:spAutoFit/>
+              </a:bodyPr>
+              <a:lstStyle/>
+              <a:p>
+                <a:r>
+                  <a:rPr lang="en-CA" sz="1400" dirty="0">
+                    <a:latin typeface="Helvetica" pitchFamily="2" charset="0"/>
+                  </a:rPr>
+                  <a:t>Not significant</a:t>
+                </a:r>
+                <a:endParaRPr lang="en-US" sz="1400" dirty="0">
+                  <a:latin typeface="Helvetica" pitchFamily="2" charset="0"/>
+                </a:endParaRPr>
+              </a:p>
+            </p:txBody>
+          </p:sp>
+          <p:sp>
+            <p:nvSpPr>
+              <p:cNvPr id="32" name="Rectangle 31">
+                <a:extLst>
+                  <a:ext uri="{FF2B5EF4-FFF2-40B4-BE49-F238E27FC236}">
+                    <a16:creationId xmlns:a16="http://schemas.microsoft.com/office/drawing/2014/main" id="{B042D4A9-31EB-444D-926B-8FE071180EB6}"/>
+                  </a:ext>
+                </a:extLst>
+              </p:cNvPr>
+              <p:cNvSpPr/>
+              <p:nvPr/>
+            </p:nvSpPr>
+            <p:spPr>
+              <a:xfrm>
+                <a:off x="11157650" y="3468413"/>
+                <a:ext cx="1478850" cy="633687"/>
+              </a:xfrm>
+              <a:prstGeom prst="rect">
+                <a:avLst/>
+              </a:prstGeom>
+              <a:noFill/>
+              <a:ln w="19050">
+                <a:solidFill>
+                  <a:schemeClr val="tx1"/>
+                </a:solidFill>
+              </a:ln>
+            </p:spPr>
+            <p:style>
+              <a:lnRef idx="2">
+                <a:schemeClr val="accent1">
+                  <a:shade val="50000"/>
+                </a:schemeClr>
+              </a:lnRef>
+              <a:fillRef idx="1">
+                <a:schemeClr val="accent1"/>
+              </a:fillRef>
+              <a:effectRef idx="0">
+                <a:schemeClr val="accent1"/>
+              </a:effectRef>
+              <a:fontRef idx="minor">
+                <a:schemeClr val="lt1"/>
+              </a:fontRef>
+            </p:style>
+            <p:txBody>
+              <a:bodyPr rtlCol="0" anchor="ctr"/>
+              <a:lstStyle/>
+              <a:p>
+                <a:pPr algn="ctr"/>
+                <a:endParaRPr lang="en-US"/>
+              </a:p>
+            </p:txBody>
+          </p:sp>
+        </p:grpSp>
+        <p:sp>
+          <p:nvSpPr>
+            <p:cNvPr id="34" name="TextBox 33">
+              <a:extLst>
+                <a:ext uri="{FF2B5EF4-FFF2-40B4-BE49-F238E27FC236}">
+                  <a16:creationId xmlns:a16="http://schemas.microsoft.com/office/drawing/2014/main" id="{AB277F5A-F737-5643-8701-72B7923D300D}"/>
+                </a:ext>
+              </a:extLst>
+            </p:cNvPr>
+            <p:cNvSpPr txBox="1"/>
+            <p:nvPr/>
+          </p:nvSpPr>
+          <p:spPr>
+            <a:xfrm>
+              <a:off x="1467412" y="2504222"/>
+              <a:ext cx="497252" cy="400110"/>
+            </a:xfrm>
+            <a:prstGeom prst="rect">
+              <a:avLst/>
+            </a:prstGeom>
+            <a:noFill/>
+          </p:spPr>
+          <p:txBody>
+            <a:bodyPr wrap="none" rtlCol="0">
+              <a:spAutoFit/>
+            </a:bodyPr>
+            <a:lstStyle/>
+            <a:p>
+              <a:r>
+                <a:rPr lang="en-US" sz="2000" dirty="0">
+                  <a:latin typeface="Helvetica" charset="0"/>
+                  <a:ea typeface="Helvetica" charset="0"/>
+                  <a:cs typeface="Helvetica" charset="0"/>
+                </a:rPr>
+                <a:t>(</a:t>
+              </a:r>
+              <a:r>
+                <a:rPr lang="en-US" sz="2000" i="1" dirty="0">
+                  <a:latin typeface="Helvetica" charset="0"/>
+                  <a:ea typeface="Helvetica" charset="0"/>
+                  <a:cs typeface="Helvetica" charset="0"/>
+                </a:rPr>
+                <a:t>a</a:t>
+              </a:r>
+              <a:r>
+                <a:rPr lang="en-US" sz="2000" dirty="0">
+                  <a:latin typeface="Helvetica" charset="0"/>
+                  <a:ea typeface="Helvetica" charset="0"/>
+                  <a:cs typeface="Helvetica" charset="0"/>
+                </a:rPr>
+                <a:t>)</a:t>
+              </a:r>
+            </a:p>
+          </p:txBody>
+        </p:sp>
+        <p:sp>
+          <p:nvSpPr>
+            <p:cNvPr id="35" name="TextBox 34">
+              <a:extLst>
+                <a:ext uri="{FF2B5EF4-FFF2-40B4-BE49-F238E27FC236}">
+                  <a16:creationId xmlns:a16="http://schemas.microsoft.com/office/drawing/2014/main" id="{C73B09E2-F0AF-684C-8388-060E8932AED7}"/>
+                </a:ext>
+              </a:extLst>
+            </p:cNvPr>
+            <p:cNvSpPr txBox="1"/>
+            <p:nvPr/>
+          </p:nvSpPr>
+          <p:spPr>
+            <a:xfrm>
+              <a:off x="5405078" y="2504222"/>
+              <a:ext cx="497252" cy="400110"/>
+            </a:xfrm>
+            <a:prstGeom prst="rect">
+              <a:avLst/>
+            </a:prstGeom>
+            <a:noFill/>
+          </p:spPr>
+          <p:txBody>
+            <a:bodyPr wrap="none" rtlCol="0">
+              <a:spAutoFit/>
+            </a:bodyPr>
+            <a:lstStyle/>
+            <a:p>
+              <a:r>
+                <a:rPr lang="en-US" sz="2000" dirty="0">
+                  <a:latin typeface="Helvetica" charset="0"/>
+                  <a:ea typeface="Helvetica" charset="0"/>
+                  <a:cs typeface="Helvetica" charset="0"/>
+                </a:rPr>
+                <a:t>(</a:t>
+              </a:r>
+              <a:r>
+                <a:rPr lang="en-US" sz="2000" i="1" dirty="0">
+                  <a:latin typeface="Helvetica" charset="0"/>
+                  <a:ea typeface="Helvetica" charset="0"/>
+                  <a:cs typeface="Helvetica" charset="0"/>
+                </a:rPr>
+                <a:t>b</a:t>
+              </a:r>
+              <a:r>
+                <a:rPr lang="en-US" sz="2000" dirty="0">
+                  <a:latin typeface="Helvetica" charset="0"/>
+                  <a:ea typeface="Helvetica" charset="0"/>
+                  <a:cs typeface="Helvetica" charset="0"/>
+                </a:rPr>
+                <a:t>)</a:t>
+              </a:r>
+            </a:p>
+          </p:txBody>
+        </p:sp>
+        <p:sp>
+          <p:nvSpPr>
+            <p:cNvPr id="36" name="TextBox 35">
+              <a:extLst>
+                <a:ext uri="{FF2B5EF4-FFF2-40B4-BE49-F238E27FC236}">
+                  <a16:creationId xmlns:a16="http://schemas.microsoft.com/office/drawing/2014/main" id="{F4E242FE-1E95-5346-9919-0F028CEE270B}"/>
+                </a:ext>
+              </a:extLst>
+            </p:cNvPr>
+            <p:cNvSpPr txBox="1"/>
+            <p:nvPr/>
+          </p:nvSpPr>
+          <p:spPr>
+            <a:xfrm>
+              <a:off x="1467412" y="5880878"/>
+              <a:ext cx="482824" cy="400110"/>
+            </a:xfrm>
+            <a:prstGeom prst="rect">
+              <a:avLst/>
+            </a:prstGeom>
+            <a:noFill/>
+          </p:spPr>
+          <p:txBody>
+            <a:bodyPr wrap="none" rtlCol="0">
+              <a:spAutoFit/>
+            </a:bodyPr>
+            <a:lstStyle/>
+            <a:p>
+              <a:r>
+                <a:rPr lang="en-US" sz="2000" dirty="0">
+                  <a:latin typeface="Helvetica" charset="0"/>
+                  <a:ea typeface="Helvetica" charset="0"/>
+                  <a:cs typeface="Helvetica" charset="0"/>
+                </a:rPr>
+                <a:t>(</a:t>
+              </a:r>
+              <a:r>
+                <a:rPr lang="en-US" sz="2000" i="1" dirty="0">
+                  <a:latin typeface="Helvetica" charset="0"/>
+                  <a:ea typeface="Helvetica" charset="0"/>
+                  <a:cs typeface="Helvetica" charset="0"/>
+                </a:rPr>
+                <a:t>c</a:t>
+              </a:r>
+              <a:r>
+                <a:rPr lang="en-US" sz="2000" dirty="0">
+                  <a:latin typeface="Helvetica" charset="0"/>
+                  <a:ea typeface="Helvetica" charset="0"/>
+                  <a:cs typeface="Helvetica" charset="0"/>
+                </a:rPr>
+                <a:t>)</a:t>
+              </a:r>
+            </a:p>
+          </p:txBody>
+        </p:sp>
+        <p:sp>
+          <p:nvSpPr>
+            <p:cNvPr id="37" name="TextBox 36">
+              <a:extLst>
+                <a:ext uri="{FF2B5EF4-FFF2-40B4-BE49-F238E27FC236}">
+                  <a16:creationId xmlns:a16="http://schemas.microsoft.com/office/drawing/2014/main" id="{A999D510-A82A-EE4D-AD2B-36875C333BE9}"/>
+                </a:ext>
+              </a:extLst>
+            </p:cNvPr>
+            <p:cNvSpPr txBox="1"/>
+            <p:nvPr/>
+          </p:nvSpPr>
+          <p:spPr>
+            <a:xfrm>
+              <a:off x="5405078" y="5880878"/>
+              <a:ext cx="497252" cy="400110"/>
+            </a:xfrm>
+            <a:prstGeom prst="rect">
+              <a:avLst/>
+            </a:prstGeom>
+            <a:noFill/>
+          </p:spPr>
+          <p:txBody>
+            <a:bodyPr wrap="none" rtlCol="0">
+              <a:spAutoFit/>
+            </a:bodyPr>
+            <a:lstStyle/>
+            <a:p>
+              <a:r>
+                <a:rPr lang="en-US" sz="2000" dirty="0">
+                  <a:latin typeface="Helvetica" charset="0"/>
+                  <a:ea typeface="Helvetica" charset="0"/>
+                  <a:cs typeface="Helvetica" charset="0"/>
+                </a:rPr>
+                <a:t>(</a:t>
+              </a:r>
+              <a:r>
+                <a:rPr lang="en-US" sz="2000" i="1" dirty="0">
+                  <a:latin typeface="Helvetica" charset="0"/>
+                  <a:ea typeface="Helvetica" charset="0"/>
+                  <a:cs typeface="Helvetica" charset="0"/>
+                </a:rPr>
+                <a:t>d</a:t>
+              </a:r>
+              <a:r>
+                <a:rPr lang="en-US" sz="2000" dirty="0">
+                  <a:latin typeface="Helvetica" charset="0"/>
+                  <a:ea typeface="Helvetica" charset="0"/>
+                  <a:cs typeface="Helvetica" charset="0"/>
+                </a:rPr>
+                <a:t>)</a:t>
+              </a:r>
+            </a:p>
+          </p:txBody>
+        </p:sp>
+        <p:sp>
+          <p:nvSpPr>
+            <p:cNvPr id="38" name="TextBox 37">
+              <a:extLst>
+                <a:ext uri="{FF2B5EF4-FFF2-40B4-BE49-F238E27FC236}">
+                  <a16:creationId xmlns:a16="http://schemas.microsoft.com/office/drawing/2014/main" id="{F5C4E410-F520-5946-AB5E-87FF75C6325A}"/>
+                </a:ext>
+              </a:extLst>
+            </p:cNvPr>
+            <p:cNvSpPr txBox="1"/>
+            <p:nvPr/>
+          </p:nvSpPr>
+          <p:spPr>
+            <a:xfrm>
+              <a:off x="1467412" y="9308314"/>
+              <a:ext cx="497252" cy="400110"/>
+            </a:xfrm>
+            <a:prstGeom prst="rect">
+              <a:avLst/>
+            </a:prstGeom>
+            <a:noFill/>
+          </p:spPr>
+          <p:txBody>
+            <a:bodyPr wrap="none" rtlCol="0">
+              <a:spAutoFit/>
+            </a:bodyPr>
+            <a:lstStyle/>
+            <a:p>
+              <a:r>
+                <a:rPr lang="en-US" sz="2000" dirty="0">
+                  <a:latin typeface="Helvetica" charset="0"/>
+                  <a:ea typeface="Helvetica" charset="0"/>
+                  <a:cs typeface="Helvetica" charset="0"/>
+                </a:rPr>
+                <a:t>(</a:t>
+              </a:r>
+              <a:r>
+                <a:rPr lang="en-US" sz="2000" i="1" dirty="0">
+                  <a:latin typeface="Helvetica" charset="0"/>
+                  <a:ea typeface="Helvetica" charset="0"/>
+                  <a:cs typeface="Helvetica" charset="0"/>
+                </a:rPr>
+                <a:t>e</a:t>
+              </a:r>
+              <a:r>
+                <a:rPr lang="en-US" sz="2000" dirty="0">
+                  <a:latin typeface="Helvetica" charset="0"/>
+                  <a:ea typeface="Helvetica" charset="0"/>
+                  <a:cs typeface="Helvetica" charset="0"/>
+                </a:rPr>
+                <a:t>)</a:t>
+              </a:r>
+            </a:p>
+          </p:txBody>
+        </p:sp>
+      </p:grpSp>
+    </p:spTree>
+    <p:extLst>
+      <p:ext uri="{BB962C8B-B14F-4D97-AF65-F5344CB8AC3E}">
+        <p14:creationId xmlns:p14="http://schemas.microsoft.com/office/powerpoint/2010/main" val="2947255510"/>
       </p:ext>
     </p:extLst>
   </p:cSld>

</xml_diff>

<commit_message>
Incorporated Marc's comments (saved on other branch) intro main text
</commit_message>
<xml_diff>
--- a/SEC_Writings/SEC_Manuscript-Figures.pptx
+++ b/SEC_Writings/SEC_Manuscript-Figures.pptx
@@ -253,7 +253,7 @@
           <a:p>
             <a:fld id="{188A7F6E-218E-D540-B78C-2025F8A16802}" type="datetimeFigureOut">
               <a:rPr lang="en-US" smtClean="0"/>
-              <a:t>1/21/18</a:t>
+              <a:t>1/25/18</a:t>
             </a:fld>
             <a:endParaRPr lang="en-US"/>
           </a:p>
@@ -418,7 +418,7 @@
           <a:p>
             <a:fld id="{188A7F6E-218E-D540-B78C-2025F8A16802}" type="datetimeFigureOut">
               <a:rPr lang="en-US" smtClean="0"/>
-              <a:t>1/21/18</a:t>
+              <a:t>1/25/18</a:t>
             </a:fld>
             <a:endParaRPr lang="en-US"/>
           </a:p>
@@ -593,7 +593,7 @@
           <a:p>
             <a:fld id="{188A7F6E-218E-D540-B78C-2025F8A16802}" type="datetimeFigureOut">
               <a:rPr lang="en-US" smtClean="0"/>
-              <a:t>1/21/18</a:t>
+              <a:t>1/25/18</a:t>
             </a:fld>
             <a:endParaRPr lang="en-US"/>
           </a:p>
@@ -758,7 +758,7 @@
           <a:p>
             <a:fld id="{188A7F6E-218E-D540-B78C-2025F8A16802}" type="datetimeFigureOut">
               <a:rPr lang="en-US" smtClean="0"/>
-              <a:t>1/21/18</a:t>
+              <a:t>1/25/18</a:t>
             </a:fld>
             <a:endParaRPr lang="en-US"/>
           </a:p>
@@ -997,7 +997,7 @@
           <a:p>
             <a:fld id="{188A7F6E-218E-D540-B78C-2025F8A16802}" type="datetimeFigureOut">
               <a:rPr lang="en-US" smtClean="0"/>
-              <a:t>1/21/18</a:t>
+              <a:t>1/25/18</a:t>
             </a:fld>
             <a:endParaRPr lang="en-US"/>
           </a:p>
@@ -1224,7 +1224,7 @@
           <a:p>
             <a:fld id="{188A7F6E-218E-D540-B78C-2025F8A16802}" type="datetimeFigureOut">
               <a:rPr lang="en-US" smtClean="0"/>
-              <a:t>1/21/18</a:t>
+              <a:t>1/25/18</a:t>
             </a:fld>
             <a:endParaRPr lang="en-US"/>
           </a:p>
@@ -1586,7 +1586,7 @@
           <a:p>
             <a:fld id="{188A7F6E-218E-D540-B78C-2025F8A16802}" type="datetimeFigureOut">
               <a:rPr lang="en-US" smtClean="0"/>
-              <a:t>1/21/18</a:t>
+              <a:t>1/25/18</a:t>
             </a:fld>
             <a:endParaRPr lang="en-US"/>
           </a:p>
@@ -1699,7 +1699,7 @@
           <a:p>
             <a:fld id="{188A7F6E-218E-D540-B78C-2025F8A16802}" type="datetimeFigureOut">
               <a:rPr lang="en-US" smtClean="0"/>
-              <a:t>1/21/18</a:t>
+              <a:t>1/25/18</a:t>
             </a:fld>
             <a:endParaRPr lang="en-US"/>
           </a:p>
@@ -1789,7 +1789,7 @@
           <a:p>
             <a:fld id="{188A7F6E-218E-D540-B78C-2025F8A16802}" type="datetimeFigureOut">
               <a:rPr lang="en-US" smtClean="0"/>
-              <a:t>1/21/18</a:t>
+              <a:t>1/25/18</a:t>
             </a:fld>
             <a:endParaRPr lang="en-US"/>
           </a:p>
@@ -2061,7 +2061,7 @@
           <a:p>
             <a:fld id="{188A7F6E-218E-D540-B78C-2025F8A16802}" type="datetimeFigureOut">
               <a:rPr lang="en-US" smtClean="0"/>
-              <a:t>1/21/18</a:t>
+              <a:t>1/25/18</a:t>
             </a:fld>
             <a:endParaRPr lang="en-US"/>
           </a:p>
@@ -2313,7 +2313,7 @@
           <a:p>
             <a:fld id="{188A7F6E-218E-D540-B78C-2025F8A16802}" type="datetimeFigureOut">
               <a:rPr lang="en-US" smtClean="0"/>
-              <a:t>1/21/18</a:t>
+              <a:t>1/25/18</a:t>
             </a:fld>
             <a:endParaRPr lang="en-US"/>
           </a:p>
@@ -2521,7 +2521,7 @@
           <a:p>
             <a:fld id="{188A7F6E-218E-D540-B78C-2025F8A16802}" type="datetimeFigureOut">
               <a:rPr lang="en-US" smtClean="0"/>
-              <a:t>1/21/18</a:t>
+              <a:t>1/25/18</a:t>
             </a:fld>
             <a:endParaRPr lang="en-US"/>
           </a:p>
@@ -10860,8 +10860,8 @@
             </p:nvSpPr>
             <p:spPr>
               <a:xfrm>
-                <a:off x="9137554" y="11185369"/>
-                <a:ext cx="1906291" cy="353943"/>
+                <a:off x="8972664" y="11185369"/>
+                <a:ext cx="2334293" cy="353943"/>
               </a:xfrm>
               <a:prstGeom prst="rect">
                 <a:avLst/>
@@ -10877,15 +10877,15 @@
               <a:lstStyle/>
               <a:p>
                 <a:r>
-                  <a:rPr lang="en-US" sz="1700">
+                  <a:rPr lang="en-US" sz="1700" dirty="0">
                     <a:latin typeface="Helvetica" charset="0"/>
                     <a:ea typeface="Helvetica" charset="0"/>
                     <a:cs typeface="Helvetica" charset="0"/>
                   </a:rPr>
-                  <a:t>Migration rate (</a:t>
+                  <a:t>Level of gene flow (</a:t>
                 </a:r>
                 <a:r>
-                  <a:rPr lang="en-US" sz="1700" i="1">
+                  <a:rPr lang="en-US" sz="1700" i="1" dirty="0">
                     <a:latin typeface="Helvetica" charset="0"/>
                     <a:ea typeface="Helvetica" charset="0"/>
                     <a:cs typeface="Helvetica" charset="0"/>
@@ -10893,18 +10893,13 @@
                   <a:t>m</a:t>
                 </a:r>
                 <a:r>
-                  <a:rPr lang="en-US" sz="1700">
+                  <a:rPr lang="en-US" sz="1700" dirty="0">
                     <a:latin typeface="Helvetica" charset="0"/>
                     <a:ea typeface="Helvetica" charset="0"/>
                     <a:cs typeface="Helvetica" charset="0"/>
                   </a:rPr>
                   <a:t>)</a:t>
                 </a:r>
-                <a:endParaRPr lang="en-US" sz="1700" dirty="0">
-                  <a:latin typeface="Helvetica" charset="0"/>
-                  <a:ea typeface="Helvetica" charset="0"/>
-                  <a:cs typeface="Helvetica" charset="0"/>
-                </a:endParaRPr>
               </a:p>
             </p:txBody>
           </p:sp>
@@ -12374,10 +12369,10 @@
       </p:grpSpPr>
       <p:grpSp>
         <p:nvGrpSpPr>
-          <p:cNvPr id="85" name="Group 84">
+          <p:cNvPr id="3" name="Group 2">
             <a:extLst>
               <a:ext uri="{FF2B5EF4-FFF2-40B4-BE49-F238E27FC236}">
-                <a16:creationId xmlns:a16="http://schemas.microsoft.com/office/drawing/2014/main" id="{57A4DB34-A84E-064B-98DD-2B80EB3F6ED6}"/>
+                <a16:creationId xmlns:a16="http://schemas.microsoft.com/office/drawing/2014/main" id="{96F6DEBF-877D-9944-8355-2F3016CA5B97}"/>
               </a:ext>
             </a:extLst>
           </p:cNvPr>
@@ -12386,10 +12381,10 @@
         </p:nvGrpSpPr>
         <p:grpSpPr>
           <a:xfrm>
-            <a:off x="460631" y="2642524"/>
-            <a:ext cx="11748254" cy="5174749"/>
-            <a:chOff x="460631" y="2642524"/>
-            <a:chExt cx="11748254" cy="5174749"/>
+            <a:off x="492477" y="2643143"/>
+            <a:ext cx="11354215" cy="5174130"/>
+            <a:chOff x="492477" y="2643143"/>
+            <a:chExt cx="11354215" cy="5174130"/>
           </a:xfrm>
         </p:grpSpPr>
         <p:pic>
@@ -12513,8 +12508,8 @@
           </p:nvSpPr>
           <p:spPr>
             <a:xfrm rot="16200000">
-              <a:off x="-203974" y="5006994"/>
-              <a:ext cx="1944763" cy="615553"/>
+              <a:off x="-524788" y="5131193"/>
+              <a:ext cx="2650084" cy="615553"/>
             </a:xfrm>
             <a:prstGeom prst="rect">
               <a:avLst/>
@@ -12536,7 +12531,7 @@
                   <a:ea typeface="Helvetica" charset="0"/>
                   <a:cs typeface="Helvetica" charset="0"/>
                 </a:rPr>
-                <a:t>Proportion of sims</a:t>
+                <a:t>Proportion of simulations </a:t>
               </a:r>
             </a:p>
             <a:p>
@@ -12547,7 +12542,7 @@
                   <a:ea typeface="Helvetica" charset="0"/>
                   <a:cs typeface="Helvetica" charset="0"/>
                 </a:rPr>
-                <a:t>where HCN is lost</a:t>
+                <a:t>in which HCN is lost</a:t>
               </a:r>
             </a:p>
           </p:txBody>
@@ -12575,7 +12570,7 @@
             <a:lstStyle/>
             <a:p>
               <a:r>
-                <a:rPr lang="en-US" sz="2000">
+                <a:rPr lang="en-US" sz="2000" dirty="0">
                   <a:latin typeface="Helvetica" charset="0"/>
                   <a:ea typeface="Helvetica" charset="0"/>
                   <a:cs typeface="Helvetica" charset="0"/>
@@ -12736,13 +12731,277 @@
         </p:sp>
         <p:sp>
           <p:nvSpPr>
-            <p:cNvPr id="46" name="Rectangle 45"/>
+            <p:cNvPr id="40" name="TextBox 39"/>
+            <p:cNvSpPr txBox="1"/>
+            <p:nvPr/>
+          </p:nvSpPr>
+          <p:spPr>
+            <a:xfrm>
+              <a:off x="1137345" y="3189762"/>
+              <a:ext cx="466794" cy="369332"/>
+            </a:xfrm>
+            <a:prstGeom prst="rect">
+              <a:avLst/>
+            </a:prstGeom>
+            <a:noFill/>
+          </p:spPr>
+          <p:txBody>
+            <a:bodyPr wrap="none" rtlCol="0">
+              <a:spAutoFit/>
+            </a:bodyPr>
+            <a:lstStyle/>
+            <a:p>
+              <a:r>
+                <a:rPr lang="en-US" sz="1800" dirty="0">
+                  <a:latin typeface="Helvetica" charset="0"/>
+                  <a:ea typeface="Helvetica" charset="0"/>
+                  <a:cs typeface="Helvetica" charset="0"/>
+                </a:rPr>
+                <a:t>(</a:t>
+              </a:r>
+              <a:r>
+                <a:rPr lang="en-US" sz="1800" i="1" dirty="0">
+                  <a:latin typeface="Helvetica" charset="0"/>
+                  <a:ea typeface="Helvetica" charset="0"/>
+                  <a:cs typeface="Helvetica" charset="0"/>
+                </a:rPr>
+                <a:t>a</a:t>
+              </a:r>
+              <a:r>
+                <a:rPr lang="en-US" sz="1800" dirty="0">
+                  <a:latin typeface="Helvetica" charset="0"/>
+                  <a:ea typeface="Helvetica" charset="0"/>
+                  <a:cs typeface="Helvetica" charset="0"/>
+                </a:rPr>
+                <a:t>)</a:t>
+              </a:r>
+            </a:p>
+          </p:txBody>
+        </p:sp>
+        <p:sp>
+          <p:nvSpPr>
+            <p:cNvPr id="41" name="TextBox 40"/>
+            <p:cNvSpPr txBox="1"/>
+            <p:nvPr/>
+          </p:nvSpPr>
+          <p:spPr>
+            <a:xfrm>
+              <a:off x="6811559" y="3119904"/>
+              <a:ext cx="466794" cy="369332"/>
+            </a:xfrm>
+            <a:prstGeom prst="rect">
+              <a:avLst/>
+            </a:prstGeom>
+            <a:noFill/>
+          </p:spPr>
+          <p:txBody>
+            <a:bodyPr wrap="none" rtlCol="0">
+              <a:spAutoFit/>
+            </a:bodyPr>
+            <a:lstStyle/>
+            <a:p>
+              <a:r>
+                <a:rPr lang="en-US" sz="1800">
+                  <a:latin typeface="Helvetica" charset="0"/>
+                  <a:ea typeface="Helvetica" charset="0"/>
+                  <a:cs typeface="Helvetica" charset="0"/>
+                </a:rPr>
+                <a:t>(</a:t>
+              </a:r>
+              <a:r>
+                <a:rPr lang="en-US" sz="1800" i="1" dirty="0">
+                  <a:latin typeface="Helvetica" charset="0"/>
+                  <a:ea typeface="Helvetica" charset="0"/>
+                  <a:cs typeface="Helvetica" charset="0"/>
+                </a:rPr>
+                <a:t>b</a:t>
+              </a:r>
+              <a:r>
+                <a:rPr lang="en-US" sz="1800">
+                  <a:latin typeface="Helvetica" charset="0"/>
+                  <a:ea typeface="Helvetica" charset="0"/>
+                  <a:cs typeface="Helvetica" charset="0"/>
+                </a:rPr>
+                <a:t>)</a:t>
+              </a:r>
+              <a:endParaRPr lang="en-US" sz="1800" dirty="0">
+                <a:latin typeface="Helvetica" charset="0"/>
+                <a:ea typeface="Helvetica" charset="0"/>
+                <a:cs typeface="Helvetica" charset="0"/>
+              </a:endParaRPr>
+            </a:p>
+          </p:txBody>
+        </p:sp>
+        <p:pic>
+          <p:nvPicPr>
+            <p:cNvPr id="13" name="Picture 12">
+              <a:extLst>
+                <a:ext uri="{FF2B5EF4-FFF2-40B4-BE49-F238E27FC236}">
+                  <a16:creationId xmlns:a16="http://schemas.microsoft.com/office/drawing/2014/main" id="{0C40DC33-8772-4D46-BF8E-7266BE58D35F}"/>
+                </a:ext>
+              </a:extLst>
+            </p:cNvPr>
+            <p:cNvPicPr>
+              <a:picLocks noChangeAspect="1"/>
+            </p:cNvPicPr>
+            <p:nvPr/>
+          </p:nvPicPr>
+          <p:blipFill rotWithShape="1">
+            <a:blip r:embed="rId3"/>
+            <a:srcRect l="8138" t="16703" b="20325"/>
+            <a:stretch/>
+          </p:blipFill>
+          <p:spPr>
+            <a:xfrm>
+              <a:off x="6677786" y="3658420"/>
+              <a:ext cx="5168906" cy="3543300"/>
+            </a:xfrm>
+            <a:prstGeom prst="rect">
+              <a:avLst/>
+            </a:prstGeom>
+          </p:spPr>
+        </p:pic>
+        <p:cxnSp>
+          <p:nvCxnSpPr>
+            <p:cNvPr id="11" name="Straight Connector 10">
+              <a:extLst>
+                <a:ext uri="{FF2B5EF4-FFF2-40B4-BE49-F238E27FC236}">
+                  <a16:creationId xmlns:a16="http://schemas.microsoft.com/office/drawing/2014/main" id="{9B85A084-8945-0A48-A21A-3D7887E57076}"/>
+                </a:ext>
+              </a:extLst>
+            </p:cNvPr>
+            <p:cNvCxnSpPr/>
+            <p:nvPr/>
+          </p:nvCxnSpPr>
+          <p:spPr>
+            <a:xfrm>
+              <a:off x="8935944" y="2859604"/>
+              <a:ext cx="450000" cy="0"/>
+            </a:xfrm>
+            <a:prstGeom prst="line">
+              <a:avLst/>
+            </a:prstGeom>
+            <a:ln w="28575">
+              <a:solidFill>
+                <a:schemeClr val="tx1"/>
+              </a:solidFill>
+              <a:prstDash val="dash"/>
+            </a:ln>
+          </p:spPr>
+          <p:style>
+            <a:lnRef idx="1">
+              <a:schemeClr val="accent1"/>
+            </a:lnRef>
+            <a:fillRef idx="0">
+              <a:schemeClr val="accent1"/>
+            </a:fillRef>
+            <a:effectRef idx="0">
+              <a:schemeClr val="accent1"/>
+            </a:effectRef>
+            <a:fontRef idx="minor">
+              <a:schemeClr val="tx1"/>
+            </a:fontRef>
+          </p:style>
+        </p:cxnSp>
+        <p:cxnSp>
+          <p:nvCxnSpPr>
+            <p:cNvPr id="69" name="Straight Connector 68">
+              <a:extLst>
+                <a:ext uri="{FF2B5EF4-FFF2-40B4-BE49-F238E27FC236}">
+                  <a16:creationId xmlns:a16="http://schemas.microsoft.com/office/drawing/2014/main" id="{24540CA2-2D52-1D4F-89EB-A7FE6E623BE5}"/>
+                </a:ext>
+              </a:extLst>
+            </p:cNvPr>
+            <p:cNvCxnSpPr/>
+            <p:nvPr/>
+          </p:nvCxnSpPr>
+          <p:spPr>
+            <a:xfrm>
+              <a:off x="4986615" y="2856517"/>
+              <a:ext cx="450000" cy="0"/>
+            </a:xfrm>
+            <a:prstGeom prst="line">
+              <a:avLst/>
+            </a:prstGeom>
+            <a:ln w="28575">
+              <a:solidFill>
+                <a:schemeClr val="tx1"/>
+              </a:solidFill>
+              <a:prstDash val="solid"/>
+            </a:ln>
+          </p:spPr>
+          <p:style>
+            <a:lnRef idx="1">
+              <a:schemeClr val="accent1"/>
+            </a:lnRef>
+            <a:fillRef idx="0">
+              <a:schemeClr val="accent1"/>
+            </a:fillRef>
+            <a:effectRef idx="0">
+              <a:schemeClr val="accent1"/>
+            </a:effectRef>
+            <a:fontRef idx="minor">
+              <a:schemeClr val="tx1"/>
+            </a:fontRef>
+          </p:style>
+        </p:cxnSp>
+        <p:cxnSp>
+          <p:nvCxnSpPr>
+            <p:cNvPr id="70" name="Straight Connector 69">
+              <a:extLst>
+                <a:ext uri="{FF2B5EF4-FFF2-40B4-BE49-F238E27FC236}">
+                  <a16:creationId xmlns:a16="http://schemas.microsoft.com/office/drawing/2014/main" id="{44A2C94A-83D6-A941-853F-EDDFDC786CFA}"/>
+                </a:ext>
+              </a:extLst>
+            </p:cNvPr>
+            <p:cNvCxnSpPr/>
+            <p:nvPr/>
+          </p:nvCxnSpPr>
+          <p:spPr>
+            <a:xfrm>
+              <a:off x="1388738" y="2857026"/>
+              <a:ext cx="450000" cy="0"/>
+            </a:xfrm>
+            <a:prstGeom prst="line">
+              <a:avLst/>
+            </a:prstGeom>
+            <a:ln w="28575">
+              <a:solidFill>
+                <a:schemeClr val="tx1"/>
+              </a:solidFill>
+              <a:prstDash val="sysDot"/>
+            </a:ln>
+          </p:spPr>
+          <p:style>
+            <a:lnRef idx="1">
+              <a:schemeClr val="accent1"/>
+            </a:lnRef>
+            <a:fillRef idx="0">
+              <a:schemeClr val="accent1"/>
+            </a:fillRef>
+            <a:effectRef idx="0">
+              <a:schemeClr val="accent1"/>
+            </a:effectRef>
+            <a:fontRef idx="minor">
+              <a:schemeClr val="tx1"/>
+            </a:fontRef>
+          </p:style>
+        </p:cxnSp>
+        <p:sp>
+          <p:nvSpPr>
+            <p:cNvPr id="43" name="Rectangle 42">
+              <a:extLst>
+                <a:ext uri="{FF2B5EF4-FFF2-40B4-BE49-F238E27FC236}">
+                  <a16:creationId xmlns:a16="http://schemas.microsoft.com/office/drawing/2014/main" id="{06C68DD2-124F-3B41-AA90-74B3CF407A55}"/>
+                </a:ext>
+              </a:extLst>
+            </p:cNvPr>
             <p:cNvSpPr/>
             <p:nvPr/>
           </p:nvSpPr>
           <p:spPr>
             <a:xfrm>
-              <a:off x="1573707" y="5149834"/>
+              <a:off x="1539221" y="2769748"/>
               <a:ext cx="154379" cy="154379"/>
             </a:xfrm>
             <a:prstGeom prst="rect">
@@ -12786,13 +13045,19 @@
         </p:sp>
         <p:sp>
           <p:nvSpPr>
-            <p:cNvPr id="56" name="Oval 55"/>
+            <p:cNvPr id="44" name="Oval 43">
+              <a:extLst>
+                <a:ext uri="{FF2B5EF4-FFF2-40B4-BE49-F238E27FC236}">
+                  <a16:creationId xmlns:a16="http://schemas.microsoft.com/office/drawing/2014/main" id="{5F567DBC-DB02-A34B-9CF6-0EAC85525335}"/>
+                </a:ext>
+              </a:extLst>
+            </p:cNvPr>
             <p:cNvSpPr/>
             <p:nvPr/>
           </p:nvSpPr>
           <p:spPr>
             <a:xfrm>
-              <a:off x="1573707" y="5596358"/>
+              <a:off x="5137098" y="2772418"/>
               <a:ext cx="154800" cy="154800"/>
             </a:xfrm>
             <a:prstGeom prst="ellipse">
@@ -12834,13 +13099,19 @@
         </p:sp>
         <p:sp>
           <p:nvSpPr>
-            <p:cNvPr id="64" name="Triangle 63"/>
+            <p:cNvPr id="45" name="Triangle 44">
+              <a:extLst>
+                <a:ext uri="{FF2B5EF4-FFF2-40B4-BE49-F238E27FC236}">
+                  <a16:creationId xmlns:a16="http://schemas.microsoft.com/office/drawing/2014/main" id="{74B2F091-1904-AE4E-8FE3-1C63CABF4666}"/>
+                </a:ext>
+              </a:extLst>
+            </p:cNvPr>
             <p:cNvSpPr/>
             <p:nvPr/>
           </p:nvSpPr>
           <p:spPr>
             <a:xfrm>
-              <a:off x="1541860" y="6007364"/>
+              <a:off x="9054581" y="2743166"/>
               <a:ext cx="218072" cy="187993"/>
             </a:xfrm>
             <a:prstGeom prst="triangle">
@@ -12882,14 +13153,20 @@
         </p:sp>
         <p:sp>
           <p:nvSpPr>
-            <p:cNvPr id="65" name="TextBox 64"/>
+            <p:cNvPr id="57" name="TextBox 56">
+              <a:extLst>
+                <a:ext uri="{FF2B5EF4-FFF2-40B4-BE49-F238E27FC236}">
+                  <a16:creationId xmlns:a16="http://schemas.microsoft.com/office/drawing/2014/main" id="{E0FC8400-E435-D749-93C5-E58834AAC516}"/>
+                </a:ext>
+              </a:extLst>
+            </p:cNvPr>
             <p:cNvSpPr txBox="1"/>
             <p:nvPr/>
           </p:nvSpPr>
           <p:spPr>
             <a:xfrm>
-              <a:off x="1769501" y="4998174"/>
-              <a:ext cx="1528560" cy="461665"/>
+              <a:off x="1813928" y="2646739"/>
+              <a:ext cx="2586477" cy="461665"/>
             </a:xfrm>
             <a:prstGeom prst="rect">
               <a:avLst/>
@@ -12904,35 +13181,56 @@
             <a:p>
               <a:r>
                 <a:rPr lang="en-US" sz="1200" dirty="0">
-                  <a:latin typeface="Helvetica" charset="0"/>
+                  <a:latin typeface="Helvetica" pitchFamily="2" charset="0"/>
                   <a:ea typeface="Helvetica" charset="0"/>
                   <a:cs typeface="Helvetica" charset="0"/>
                 </a:rPr>
-                <a:t>Strong founder </a:t>
+                <a:t>Strong founder effect (prop. = 0.01)</a:t>
               </a:r>
             </a:p>
             <a:p>
               <a:r>
                 <a:rPr lang="en-US" sz="1200" dirty="0">
-                  <a:latin typeface="Helvetica" charset="0"/>
-                  <a:ea typeface="Helvetica" charset="0"/>
-                  <a:cs typeface="Helvetica" charset="0"/>
-                </a:rPr>
-                <a:t>effect (prop. = 0.01)</a:t>
-              </a:r>
+                  <a:latin typeface="Helvetica" pitchFamily="2" charset="0"/>
+                </a:rPr>
+                <a:t>β = 0.003; P = 0.002; R</a:t>
+              </a:r>
+              <a:r>
+                <a:rPr lang="en-US" sz="1200" baseline="30000" dirty="0">
+                  <a:latin typeface="Helvetica" pitchFamily="2" charset="0"/>
+                </a:rPr>
+                <a:t>2</a:t>
+              </a:r>
+              <a:r>
+                <a:rPr lang="en-US" sz="1200" dirty="0">
+                  <a:latin typeface="Helvetica" pitchFamily="2" charset="0"/>
+                </a:rPr>
+                <a:t> = 0.22</a:t>
+              </a:r>
+              <a:endParaRPr lang="en-US" sz="1200" dirty="0">
+                <a:latin typeface="Helvetica" pitchFamily="2" charset="0"/>
+                <a:ea typeface="Helvetica" charset="0"/>
+                <a:cs typeface="Helvetica" charset="0"/>
+              </a:endParaRPr>
             </a:p>
           </p:txBody>
         </p:sp>
         <p:sp>
           <p:nvSpPr>
-            <p:cNvPr id="66" name="TextBox 65"/>
+            <p:cNvPr id="58" name="TextBox 57">
+              <a:extLst>
+                <a:ext uri="{FF2B5EF4-FFF2-40B4-BE49-F238E27FC236}">
+                  <a16:creationId xmlns:a16="http://schemas.microsoft.com/office/drawing/2014/main" id="{1CE7CAD1-205C-A446-A3A3-E6A4790AE50B}"/>
+                </a:ext>
+              </a:extLst>
+            </p:cNvPr>
             <p:cNvSpPr txBox="1"/>
             <p:nvPr/>
           </p:nvSpPr>
           <p:spPr>
             <a:xfrm>
-              <a:off x="1769501" y="5438969"/>
-              <a:ext cx="1643399" cy="461665"/>
+              <a:off x="5415619" y="2643143"/>
+              <a:ext cx="2902269" cy="461665"/>
             </a:xfrm>
             <a:prstGeom prst="rect">
               <a:avLst/>
@@ -12947,35 +13245,51 @@
             <a:p>
               <a:r>
                 <a:rPr lang="en-US" sz="1200" dirty="0">
-                  <a:latin typeface="Helvetica" charset="0"/>
+                  <a:latin typeface="Helvetica" pitchFamily="2" charset="0"/>
                   <a:ea typeface="Helvetica" charset="0"/>
                   <a:cs typeface="Helvetica" charset="0"/>
                 </a:rPr>
-                <a:t>Intermediate founder </a:t>
+                <a:t>Intermediate founder effect (prop. = 0.2)</a:t>
               </a:r>
             </a:p>
             <a:p>
               <a:r>
                 <a:rPr lang="en-US" sz="1200" dirty="0">
-                  <a:latin typeface="Helvetica" charset="0"/>
-                  <a:ea typeface="Helvetica" charset="0"/>
-                  <a:cs typeface="Helvetica" charset="0"/>
-                </a:rPr>
-                <a:t>effect (prop. = 0.2)</a:t>
+                  <a:latin typeface="Helvetica" pitchFamily="2" charset="0"/>
+                </a:rPr>
+                <a:t>β = 0.007; P &lt; 0.001; R</a:t>
+              </a:r>
+              <a:r>
+                <a:rPr lang="en-US" sz="1200" baseline="30000" dirty="0">
+                  <a:latin typeface="Helvetica" pitchFamily="2" charset="0"/>
+                </a:rPr>
+                <a:t>2</a:t>
+              </a:r>
+              <a:r>
+                <a:rPr lang="en-US" sz="1200" dirty="0">
+                  <a:latin typeface="Helvetica" pitchFamily="2" charset="0"/>
+                </a:rPr>
+                <a:t> = 0.93</a:t>
               </a:r>
             </a:p>
           </p:txBody>
         </p:sp>
         <p:sp>
           <p:nvSpPr>
-            <p:cNvPr id="67" name="TextBox 66"/>
+            <p:cNvPr id="61" name="TextBox 60">
+              <a:extLst>
+                <a:ext uri="{FF2B5EF4-FFF2-40B4-BE49-F238E27FC236}">
+                  <a16:creationId xmlns:a16="http://schemas.microsoft.com/office/drawing/2014/main" id="{F290DE89-81F0-F64A-8101-2F464C41FF03}"/>
+                </a:ext>
+              </a:extLst>
+            </p:cNvPr>
             <p:cNvSpPr txBox="1"/>
             <p:nvPr/>
           </p:nvSpPr>
           <p:spPr>
             <a:xfrm>
-              <a:off x="1769501" y="5865094"/>
-              <a:ext cx="1443600" cy="461665"/>
+              <a:off x="9367466" y="2643143"/>
+              <a:ext cx="2442207" cy="461665"/>
             </a:xfrm>
             <a:prstGeom prst="rect">
               <a:avLst/>
@@ -12990,704 +13304,43 @@
             <a:p>
               <a:r>
                 <a:rPr lang="en-US" sz="1200" dirty="0">
-                  <a:latin typeface="Helvetica" charset="0"/>
+                  <a:latin typeface="Helvetica" pitchFamily="2" charset="0"/>
                   <a:ea typeface="Helvetica" charset="0"/>
                   <a:cs typeface="Helvetica" charset="0"/>
                 </a:rPr>
-                <a:t>No founder </a:t>
+                <a:t>No founder effect (prop. = 1.0)</a:t>
               </a:r>
             </a:p>
             <a:p>
               <a:r>
                 <a:rPr lang="en-US" sz="1200" dirty="0">
-                  <a:latin typeface="Helvetica" charset="0"/>
+                  <a:latin typeface="Helvetica" pitchFamily="2" charset="0"/>
+                </a:rPr>
+                <a:t>β = 0.0009; P &lt; 0.001; R</a:t>
+              </a:r>
+              <a:r>
+                <a:rPr lang="en-US" sz="1200" baseline="30000" dirty="0">
+                  <a:latin typeface="Helvetica" pitchFamily="2" charset="0"/>
+                </a:rPr>
+                <a:t>2</a:t>
+              </a:r>
+              <a:r>
+                <a:rPr lang="en-US" sz="1200" dirty="0">
+                  <a:latin typeface="Helvetica" pitchFamily="2" charset="0"/>
+                </a:rPr>
+                <a:t> = 0.99</a:t>
+              </a:r>
+              <a:r>
+                <a:rPr lang="en-US" sz="1200" dirty="0">
+                  <a:latin typeface="Helvetica" pitchFamily="2" charset="0"/>
                   <a:ea typeface="Helvetica" charset="0"/>
                   <a:cs typeface="Helvetica" charset="0"/>
                 </a:rPr>
-                <a:t>effect (prop. = 1.0)</a:t>
+                <a:t> </a:t>
               </a:r>
             </a:p>
           </p:txBody>
         </p:sp>
-        <p:sp>
-          <p:nvSpPr>
-            <p:cNvPr id="68" name="Rectangle 67"/>
-            <p:cNvSpPr/>
-            <p:nvPr/>
-          </p:nvSpPr>
-          <p:spPr>
-            <a:xfrm>
-              <a:off x="1495315" y="5003493"/>
-              <a:ext cx="1831227" cy="1323266"/>
-            </a:xfrm>
-            <a:prstGeom prst="rect">
-              <a:avLst/>
-            </a:prstGeom>
-            <a:noFill/>
-            <a:ln w="19050">
-              <a:solidFill>
-                <a:schemeClr val="tx1"/>
-              </a:solidFill>
-            </a:ln>
-          </p:spPr>
-          <p:style>
-            <a:lnRef idx="2">
-              <a:schemeClr val="accent1">
-                <a:shade val="50000"/>
-              </a:schemeClr>
-            </a:lnRef>
-            <a:fillRef idx="1">
-              <a:schemeClr val="accent1"/>
-            </a:fillRef>
-            <a:effectRef idx="0">
-              <a:schemeClr val="accent1"/>
-            </a:effectRef>
-            <a:fontRef idx="minor">
-              <a:schemeClr val="lt1"/>
-            </a:fontRef>
-          </p:style>
-          <p:txBody>
-            <a:bodyPr rtlCol="0" anchor="ctr"/>
-            <a:lstStyle/>
-            <a:p>
-              <a:pPr algn="ctr"/>
-              <a:endParaRPr lang="en-US"/>
-            </a:p>
-          </p:txBody>
-        </p:sp>
-        <p:sp>
-          <p:nvSpPr>
-            <p:cNvPr id="40" name="TextBox 39"/>
-            <p:cNvSpPr txBox="1"/>
-            <p:nvPr/>
-          </p:nvSpPr>
-          <p:spPr>
-            <a:xfrm>
-              <a:off x="1137345" y="3189762"/>
-              <a:ext cx="466794" cy="369332"/>
-            </a:xfrm>
-            <a:prstGeom prst="rect">
-              <a:avLst/>
-            </a:prstGeom>
-            <a:noFill/>
-          </p:spPr>
-          <p:txBody>
-            <a:bodyPr wrap="none" rtlCol="0">
-              <a:spAutoFit/>
-            </a:bodyPr>
-            <a:lstStyle/>
-            <a:p>
-              <a:r>
-                <a:rPr lang="en-US" sz="1800" dirty="0">
-                  <a:latin typeface="Helvetica" charset="0"/>
-                  <a:ea typeface="Helvetica" charset="0"/>
-                  <a:cs typeface="Helvetica" charset="0"/>
-                </a:rPr>
-                <a:t>(</a:t>
-              </a:r>
-              <a:r>
-                <a:rPr lang="en-US" sz="1800" i="1" dirty="0">
-                  <a:latin typeface="Helvetica" charset="0"/>
-                  <a:ea typeface="Helvetica" charset="0"/>
-                  <a:cs typeface="Helvetica" charset="0"/>
-                </a:rPr>
-                <a:t>a</a:t>
-              </a:r>
-              <a:r>
-                <a:rPr lang="en-US" sz="1800" dirty="0">
-                  <a:latin typeface="Helvetica" charset="0"/>
-                  <a:ea typeface="Helvetica" charset="0"/>
-                  <a:cs typeface="Helvetica" charset="0"/>
-                </a:rPr>
-                <a:t>)</a:t>
-              </a:r>
-            </a:p>
-          </p:txBody>
-        </p:sp>
-        <p:sp>
-          <p:nvSpPr>
-            <p:cNvPr id="41" name="TextBox 40"/>
-            <p:cNvSpPr txBox="1"/>
-            <p:nvPr/>
-          </p:nvSpPr>
-          <p:spPr>
-            <a:xfrm>
-              <a:off x="6811559" y="3119904"/>
-              <a:ext cx="466794" cy="369332"/>
-            </a:xfrm>
-            <a:prstGeom prst="rect">
-              <a:avLst/>
-            </a:prstGeom>
-            <a:noFill/>
-          </p:spPr>
-          <p:txBody>
-            <a:bodyPr wrap="none" rtlCol="0">
-              <a:spAutoFit/>
-            </a:bodyPr>
-            <a:lstStyle/>
-            <a:p>
-              <a:r>
-                <a:rPr lang="en-US" sz="1800">
-                  <a:latin typeface="Helvetica" charset="0"/>
-                  <a:ea typeface="Helvetica" charset="0"/>
-                  <a:cs typeface="Helvetica" charset="0"/>
-                </a:rPr>
-                <a:t>(</a:t>
-              </a:r>
-              <a:r>
-                <a:rPr lang="en-US" sz="1800" i="1" dirty="0">
-                  <a:latin typeface="Helvetica" charset="0"/>
-                  <a:ea typeface="Helvetica" charset="0"/>
-                  <a:cs typeface="Helvetica" charset="0"/>
-                </a:rPr>
-                <a:t>b</a:t>
-              </a:r>
-              <a:r>
-                <a:rPr lang="en-US" sz="1800">
-                  <a:latin typeface="Helvetica" charset="0"/>
-                  <a:ea typeface="Helvetica" charset="0"/>
-                  <a:cs typeface="Helvetica" charset="0"/>
-                </a:rPr>
-                <a:t>)</a:t>
-              </a:r>
-              <a:endParaRPr lang="en-US" sz="1800" dirty="0">
-                <a:latin typeface="Helvetica" charset="0"/>
-                <a:ea typeface="Helvetica" charset="0"/>
-                <a:cs typeface="Helvetica" charset="0"/>
-              </a:endParaRPr>
-            </a:p>
-          </p:txBody>
-        </p:sp>
-        <p:pic>
-          <p:nvPicPr>
-            <p:cNvPr id="13" name="Picture 12">
-              <a:extLst>
-                <a:ext uri="{FF2B5EF4-FFF2-40B4-BE49-F238E27FC236}">
-                  <a16:creationId xmlns:a16="http://schemas.microsoft.com/office/drawing/2014/main" id="{0C40DC33-8772-4D46-BF8E-7266BE58D35F}"/>
-                </a:ext>
-              </a:extLst>
-            </p:cNvPr>
-            <p:cNvPicPr>
-              <a:picLocks noChangeAspect="1"/>
-            </p:cNvPicPr>
-            <p:nvPr/>
-          </p:nvPicPr>
-          <p:blipFill rotWithShape="1">
-            <a:blip r:embed="rId3"/>
-            <a:srcRect l="8138" t="16703" b="20325"/>
-            <a:stretch/>
-          </p:blipFill>
-          <p:spPr>
-            <a:xfrm>
-              <a:off x="6677786" y="3658420"/>
-              <a:ext cx="5168906" cy="3543300"/>
-            </a:xfrm>
-            <a:prstGeom prst="rect">
-              <a:avLst/>
-            </a:prstGeom>
-          </p:spPr>
-        </p:pic>
-        <p:grpSp>
-          <p:nvGrpSpPr>
-            <p:cNvPr id="73" name="Group 72">
-              <a:extLst>
-                <a:ext uri="{FF2B5EF4-FFF2-40B4-BE49-F238E27FC236}">
-                  <a16:creationId xmlns:a16="http://schemas.microsoft.com/office/drawing/2014/main" id="{7CA7273D-33B4-2044-A3FB-CA6064975FB8}"/>
-                </a:ext>
-              </a:extLst>
-            </p:cNvPr>
-            <p:cNvGrpSpPr/>
-            <p:nvPr/>
-          </p:nvGrpSpPr>
-          <p:grpSpPr>
-            <a:xfrm>
-              <a:off x="6706326" y="2642524"/>
-              <a:ext cx="5502559" cy="975852"/>
-              <a:chOff x="6419654" y="1582716"/>
-              <a:chExt cx="5502559" cy="975852"/>
-            </a:xfrm>
-          </p:grpSpPr>
-          <p:cxnSp>
-            <p:nvCxnSpPr>
-              <p:cNvPr id="11" name="Straight Connector 10">
-                <a:extLst>
-                  <a:ext uri="{FF2B5EF4-FFF2-40B4-BE49-F238E27FC236}">
-                    <a16:creationId xmlns:a16="http://schemas.microsoft.com/office/drawing/2014/main" id="{9B85A084-8945-0A48-A21A-3D7887E57076}"/>
-                  </a:ext>
-                </a:extLst>
-              </p:cNvPr>
-              <p:cNvCxnSpPr/>
-              <p:nvPr/>
-            </p:nvCxnSpPr>
-            <p:spPr>
-              <a:xfrm>
-                <a:off x="7762624" y="2313364"/>
-                <a:ext cx="450000" cy="0"/>
-              </a:xfrm>
-              <a:prstGeom prst="line">
-                <a:avLst/>
-              </a:prstGeom>
-              <a:ln w="28575">
-                <a:solidFill>
-                  <a:schemeClr val="tx1"/>
-                </a:solidFill>
-                <a:prstDash val="dash"/>
-              </a:ln>
-            </p:spPr>
-            <p:style>
-              <a:lnRef idx="1">
-                <a:schemeClr val="accent1"/>
-              </a:lnRef>
-              <a:fillRef idx="0">
-                <a:schemeClr val="accent1"/>
-              </a:fillRef>
-              <a:effectRef idx="0">
-                <a:schemeClr val="accent1"/>
-              </a:effectRef>
-              <a:fontRef idx="minor">
-                <a:schemeClr val="tx1"/>
-              </a:fontRef>
-            </p:style>
-          </p:cxnSp>
-          <p:cxnSp>
-            <p:nvCxnSpPr>
-              <p:cNvPr id="69" name="Straight Connector 68">
-                <a:extLst>
-                  <a:ext uri="{FF2B5EF4-FFF2-40B4-BE49-F238E27FC236}">
-                    <a16:creationId xmlns:a16="http://schemas.microsoft.com/office/drawing/2014/main" id="{24540CA2-2D52-1D4F-89EB-A7FE6E623BE5}"/>
-                  </a:ext>
-                </a:extLst>
-              </p:cNvPr>
-              <p:cNvCxnSpPr/>
-              <p:nvPr/>
-            </p:nvCxnSpPr>
-            <p:spPr>
-              <a:xfrm>
-                <a:off x="9179242" y="1796090"/>
-                <a:ext cx="450000" cy="0"/>
-              </a:xfrm>
-              <a:prstGeom prst="line">
-                <a:avLst/>
-              </a:prstGeom>
-              <a:ln w="28575">
-                <a:solidFill>
-                  <a:schemeClr val="tx1"/>
-                </a:solidFill>
-                <a:prstDash val="solid"/>
-              </a:ln>
-            </p:spPr>
-            <p:style>
-              <a:lnRef idx="1">
-                <a:schemeClr val="accent1"/>
-              </a:lnRef>
-              <a:fillRef idx="0">
-                <a:schemeClr val="accent1"/>
-              </a:fillRef>
-              <a:effectRef idx="0">
-                <a:schemeClr val="accent1"/>
-              </a:effectRef>
-              <a:fontRef idx="minor">
-                <a:schemeClr val="tx1"/>
-              </a:fontRef>
-            </p:style>
-          </p:cxnSp>
-          <p:cxnSp>
-            <p:nvCxnSpPr>
-              <p:cNvPr id="70" name="Straight Connector 69">
-                <a:extLst>
-                  <a:ext uri="{FF2B5EF4-FFF2-40B4-BE49-F238E27FC236}">
-                    <a16:creationId xmlns:a16="http://schemas.microsoft.com/office/drawing/2014/main" id="{44A2C94A-83D6-A941-853F-EDDFDC786CFA}"/>
-                  </a:ext>
-                </a:extLst>
-              </p:cNvPr>
-              <p:cNvCxnSpPr/>
-              <p:nvPr/>
-            </p:nvCxnSpPr>
-            <p:spPr>
-              <a:xfrm>
-                <a:off x="6419654" y="1797218"/>
-                <a:ext cx="450000" cy="0"/>
-              </a:xfrm>
-              <a:prstGeom prst="line">
-                <a:avLst/>
-              </a:prstGeom>
-              <a:ln w="28575">
-                <a:solidFill>
-                  <a:schemeClr val="tx1"/>
-                </a:solidFill>
-                <a:prstDash val="sysDot"/>
-              </a:ln>
-            </p:spPr>
-            <p:style>
-              <a:lnRef idx="1">
-                <a:schemeClr val="accent1"/>
-              </a:lnRef>
-              <a:fillRef idx="0">
-                <a:schemeClr val="accent1"/>
-              </a:fillRef>
-              <a:effectRef idx="0">
-                <a:schemeClr val="accent1"/>
-              </a:effectRef>
-              <a:fontRef idx="minor">
-                <a:schemeClr val="tx1"/>
-              </a:fontRef>
-            </p:style>
-          </p:cxnSp>
-          <p:sp>
-            <p:nvSpPr>
-              <p:cNvPr id="43" name="Rectangle 42">
-                <a:extLst>
-                  <a:ext uri="{FF2B5EF4-FFF2-40B4-BE49-F238E27FC236}">
-                    <a16:creationId xmlns:a16="http://schemas.microsoft.com/office/drawing/2014/main" id="{06C68DD2-124F-3B41-AA90-74B3CF407A55}"/>
-                  </a:ext>
-                </a:extLst>
-              </p:cNvPr>
-              <p:cNvSpPr/>
-              <p:nvPr/>
-            </p:nvSpPr>
-            <p:spPr>
-              <a:xfrm>
-                <a:off x="6570137" y="1709940"/>
-                <a:ext cx="154379" cy="154379"/>
-              </a:xfrm>
-              <a:prstGeom prst="rect">
-                <a:avLst/>
-              </a:prstGeom>
-              <a:solidFill>
-                <a:schemeClr val="bg1">
-                  <a:lumMod val="50000"/>
-                </a:schemeClr>
-              </a:solidFill>
-              <a:ln>
-                <a:solidFill>
-                  <a:schemeClr val="tx1"/>
-                </a:solidFill>
-              </a:ln>
-            </p:spPr>
-            <p:style>
-              <a:lnRef idx="2">
-                <a:schemeClr val="accent1">
-                  <a:shade val="50000"/>
-                </a:schemeClr>
-              </a:lnRef>
-              <a:fillRef idx="1">
-                <a:schemeClr val="accent1"/>
-              </a:fillRef>
-              <a:effectRef idx="0">
-                <a:schemeClr val="accent1"/>
-              </a:effectRef>
-              <a:fontRef idx="minor">
-                <a:schemeClr val="lt1"/>
-              </a:fontRef>
-            </p:style>
-            <p:txBody>
-              <a:bodyPr rtlCol="0" anchor="ctr"/>
-              <a:lstStyle/>
-              <a:p>
-                <a:pPr algn="ctr"/>
-                <a:endParaRPr lang="en-US"/>
-              </a:p>
-            </p:txBody>
-          </p:sp>
-          <p:sp>
-            <p:nvSpPr>
-              <p:cNvPr id="44" name="Oval 43">
-                <a:extLst>
-                  <a:ext uri="{FF2B5EF4-FFF2-40B4-BE49-F238E27FC236}">
-                    <a16:creationId xmlns:a16="http://schemas.microsoft.com/office/drawing/2014/main" id="{5F567DBC-DB02-A34B-9CF6-0EAC85525335}"/>
-                  </a:ext>
-                </a:extLst>
-              </p:cNvPr>
-              <p:cNvSpPr/>
-              <p:nvPr/>
-            </p:nvSpPr>
-            <p:spPr>
-              <a:xfrm>
-                <a:off x="9329725" y="1711991"/>
-                <a:ext cx="154800" cy="154800"/>
-              </a:xfrm>
-              <a:prstGeom prst="ellipse">
-                <a:avLst/>
-              </a:prstGeom>
-              <a:solidFill>
-                <a:schemeClr val="tx1"/>
-              </a:solidFill>
-              <a:ln>
-                <a:solidFill>
-                  <a:schemeClr val="tx1"/>
-                </a:solidFill>
-              </a:ln>
-            </p:spPr>
-            <p:style>
-              <a:lnRef idx="2">
-                <a:schemeClr val="accent1">
-                  <a:shade val="50000"/>
-                </a:schemeClr>
-              </a:lnRef>
-              <a:fillRef idx="1">
-                <a:schemeClr val="accent1"/>
-              </a:fillRef>
-              <a:effectRef idx="0">
-                <a:schemeClr val="accent1"/>
-              </a:effectRef>
-              <a:fontRef idx="minor">
-                <a:schemeClr val="lt1"/>
-              </a:fontRef>
-            </p:style>
-            <p:txBody>
-              <a:bodyPr rtlCol="0" anchor="ctr"/>
-              <a:lstStyle/>
-              <a:p>
-                <a:pPr algn="ctr"/>
-                <a:endParaRPr lang="en-US"/>
-              </a:p>
-            </p:txBody>
-          </p:sp>
-          <p:sp>
-            <p:nvSpPr>
-              <p:cNvPr id="45" name="Triangle 44">
-                <a:extLst>
-                  <a:ext uri="{FF2B5EF4-FFF2-40B4-BE49-F238E27FC236}">
-                    <a16:creationId xmlns:a16="http://schemas.microsoft.com/office/drawing/2014/main" id="{74B2F091-1904-AE4E-8FE3-1C63CABF4666}"/>
-                  </a:ext>
-                </a:extLst>
-              </p:cNvPr>
-              <p:cNvSpPr/>
-              <p:nvPr/>
-            </p:nvSpPr>
-            <p:spPr>
-              <a:xfrm>
-                <a:off x="7881261" y="2196926"/>
-                <a:ext cx="218072" cy="187993"/>
-              </a:xfrm>
-              <a:prstGeom prst="triangle">
-                <a:avLst/>
-              </a:prstGeom>
-              <a:solidFill>
-                <a:schemeClr val="bg1"/>
-              </a:solidFill>
-              <a:ln>
-                <a:solidFill>
-                  <a:schemeClr val="tx1"/>
-                </a:solidFill>
-              </a:ln>
-            </p:spPr>
-            <p:style>
-              <a:lnRef idx="2">
-                <a:schemeClr val="accent1">
-                  <a:shade val="50000"/>
-                </a:schemeClr>
-              </a:lnRef>
-              <a:fillRef idx="1">
-                <a:schemeClr val="accent1"/>
-              </a:fillRef>
-              <a:effectRef idx="0">
-                <a:schemeClr val="accent1"/>
-              </a:effectRef>
-              <a:fontRef idx="minor">
-                <a:schemeClr val="lt1"/>
-              </a:fontRef>
-            </p:style>
-            <p:txBody>
-              <a:bodyPr rtlCol="0" anchor="ctr"/>
-              <a:lstStyle/>
-              <a:p>
-                <a:pPr algn="ctr"/>
-                <a:endParaRPr lang="en-US"/>
-              </a:p>
-            </p:txBody>
-          </p:sp>
-          <p:sp>
-            <p:nvSpPr>
-              <p:cNvPr id="57" name="TextBox 56">
-                <a:extLst>
-                  <a:ext uri="{FF2B5EF4-FFF2-40B4-BE49-F238E27FC236}">
-                    <a16:creationId xmlns:a16="http://schemas.microsoft.com/office/drawing/2014/main" id="{E0FC8400-E435-D749-93C5-E58834AAC516}"/>
-                  </a:ext>
-                </a:extLst>
-              </p:cNvPr>
-              <p:cNvSpPr txBox="1"/>
-              <p:nvPr/>
-            </p:nvSpPr>
-            <p:spPr>
-              <a:xfrm>
-                <a:off x="6844844" y="1586931"/>
-                <a:ext cx="2313967" cy="461665"/>
-              </a:xfrm>
-              <a:prstGeom prst="rect">
-                <a:avLst/>
-              </a:prstGeom>
-              <a:noFill/>
-            </p:spPr>
-            <p:txBody>
-              <a:bodyPr wrap="none" rtlCol="0">
-                <a:spAutoFit/>
-              </a:bodyPr>
-              <a:lstStyle/>
-              <a:p>
-                <a:r>
-                  <a:rPr lang="en-US" sz="1200" dirty="0">
-                    <a:latin typeface="Helvetica" pitchFamily="2" charset="0"/>
-                    <a:ea typeface="Helvetica" charset="0"/>
-                    <a:cs typeface="Helvetica" charset="0"/>
-                  </a:rPr>
-                  <a:t>Strong founder effect</a:t>
-                </a:r>
-              </a:p>
-              <a:p>
-                <a:r>
-                  <a:rPr lang="en-US" sz="1200" dirty="0">
-                    <a:latin typeface="Helvetica" pitchFamily="2" charset="0"/>
-                  </a:rPr>
-                  <a:t>β = 0.003; P = 0.002; R</a:t>
-                </a:r>
-                <a:r>
-                  <a:rPr lang="en-US" sz="1200" baseline="30000" dirty="0">
-                    <a:latin typeface="Helvetica" pitchFamily="2" charset="0"/>
-                  </a:rPr>
-                  <a:t>2</a:t>
-                </a:r>
-                <a:r>
-                  <a:rPr lang="en-US" sz="1200" dirty="0">
-                    <a:latin typeface="Helvetica" pitchFamily="2" charset="0"/>
-                  </a:rPr>
-                  <a:t> = 0.22</a:t>
-                </a:r>
-                <a:endParaRPr lang="en-US" sz="1200" dirty="0">
-                  <a:latin typeface="Helvetica" pitchFamily="2" charset="0"/>
-                  <a:ea typeface="Helvetica" charset="0"/>
-                  <a:cs typeface="Helvetica" charset="0"/>
-                </a:endParaRPr>
-              </a:p>
-            </p:txBody>
-          </p:sp>
-          <p:sp>
-            <p:nvSpPr>
-              <p:cNvPr id="58" name="TextBox 57">
-                <a:extLst>
-                  <a:ext uri="{FF2B5EF4-FFF2-40B4-BE49-F238E27FC236}">
-                    <a16:creationId xmlns:a16="http://schemas.microsoft.com/office/drawing/2014/main" id="{1CE7CAD1-205C-A446-A3A3-E6A4790AE50B}"/>
-                  </a:ext>
-                </a:extLst>
-              </p:cNvPr>
-              <p:cNvSpPr txBox="1"/>
-              <p:nvPr/>
-            </p:nvSpPr>
-            <p:spPr>
-              <a:xfrm>
-                <a:off x="9608246" y="1582716"/>
-                <a:ext cx="2313967" cy="461665"/>
-              </a:xfrm>
-              <a:prstGeom prst="rect">
-                <a:avLst/>
-              </a:prstGeom>
-              <a:noFill/>
-            </p:spPr>
-            <p:txBody>
-              <a:bodyPr wrap="none" rtlCol="0">
-                <a:spAutoFit/>
-              </a:bodyPr>
-              <a:lstStyle/>
-              <a:p>
-                <a:r>
-                  <a:rPr lang="en-US" sz="1200" dirty="0">
-                    <a:latin typeface="Helvetica" pitchFamily="2" charset="0"/>
-                    <a:ea typeface="Helvetica" charset="0"/>
-                    <a:cs typeface="Helvetica" charset="0"/>
-                  </a:rPr>
-                  <a:t>Intermediate founder effect</a:t>
-                </a:r>
-              </a:p>
-              <a:p>
-                <a:r>
-                  <a:rPr lang="en-US" sz="1200" dirty="0">
-                    <a:latin typeface="Helvetica" pitchFamily="2" charset="0"/>
-                  </a:rPr>
-                  <a:t>β = 0.007; P &lt; 0.001; R</a:t>
-                </a:r>
-                <a:r>
-                  <a:rPr lang="en-US" sz="1200" baseline="30000" dirty="0">
-                    <a:latin typeface="Helvetica" pitchFamily="2" charset="0"/>
-                  </a:rPr>
-                  <a:t>2</a:t>
-                </a:r>
-                <a:r>
-                  <a:rPr lang="en-US" sz="1200" dirty="0">
-                    <a:latin typeface="Helvetica" pitchFamily="2" charset="0"/>
-                  </a:rPr>
-                  <a:t> = 0.93</a:t>
-                </a:r>
-              </a:p>
-            </p:txBody>
-          </p:sp>
-          <p:sp>
-            <p:nvSpPr>
-              <p:cNvPr id="61" name="TextBox 60">
-                <a:extLst>
-                  <a:ext uri="{FF2B5EF4-FFF2-40B4-BE49-F238E27FC236}">
-                    <a16:creationId xmlns:a16="http://schemas.microsoft.com/office/drawing/2014/main" id="{F290DE89-81F0-F64A-8101-2F464C41FF03}"/>
-                  </a:ext>
-                </a:extLst>
-              </p:cNvPr>
-              <p:cNvSpPr txBox="1"/>
-              <p:nvPr/>
-            </p:nvSpPr>
-            <p:spPr>
-              <a:xfrm>
-                <a:off x="8194146" y="2096903"/>
-                <a:ext cx="2442207" cy="461665"/>
-              </a:xfrm>
-              <a:prstGeom prst="rect">
-                <a:avLst/>
-              </a:prstGeom>
-              <a:noFill/>
-            </p:spPr>
-            <p:txBody>
-              <a:bodyPr wrap="none" rtlCol="0">
-                <a:spAutoFit/>
-              </a:bodyPr>
-              <a:lstStyle/>
-              <a:p>
-                <a:r>
-                  <a:rPr lang="en-US" sz="1200" dirty="0">
-                    <a:latin typeface="Helvetica" pitchFamily="2" charset="0"/>
-                    <a:ea typeface="Helvetica" charset="0"/>
-                    <a:cs typeface="Helvetica" charset="0"/>
-                  </a:rPr>
-                  <a:t>No founder effect </a:t>
-                </a:r>
-              </a:p>
-              <a:p>
-                <a:r>
-                  <a:rPr lang="en-US" sz="1200" dirty="0">
-                    <a:latin typeface="Helvetica" pitchFamily="2" charset="0"/>
-                  </a:rPr>
-                  <a:t>β = 0.0009; P &lt; 0.001; R</a:t>
-                </a:r>
-                <a:r>
-                  <a:rPr lang="en-US" sz="1200" baseline="30000" dirty="0">
-                    <a:latin typeface="Helvetica" pitchFamily="2" charset="0"/>
-                  </a:rPr>
-                  <a:t>2</a:t>
-                </a:r>
-                <a:r>
-                  <a:rPr lang="en-US" sz="1200" dirty="0">
-                    <a:latin typeface="Helvetica" pitchFamily="2" charset="0"/>
-                  </a:rPr>
-                  <a:t> = 0.99</a:t>
-                </a:r>
-                <a:r>
-                  <a:rPr lang="en-US" sz="1200" dirty="0">
-                    <a:latin typeface="Helvetica" pitchFamily="2" charset="0"/>
-                    <a:ea typeface="Helvetica" charset="0"/>
-                    <a:cs typeface="Helvetica" charset="0"/>
-                  </a:rPr>
-                  <a:t> </a:t>
-                </a:r>
-              </a:p>
-            </p:txBody>
-          </p:sp>
-        </p:grpSp>
         <p:sp>
           <p:nvSpPr>
             <p:cNvPr id="82" name="TextBox 81">

</xml_diff>

<commit_message>
Added oneFill_Bottlenecks_Allele freq results to supplemental
</commit_message>
<xml_diff>
--- a/SEC_Writings/SEC_Manuscript-Figures.pptx
+++ b/SEC_Writings/SEC_Manuscript-Figures.pptx
@@ -17424,8 +17424,8 @@
           </p:nvSpPr>
           <p:spPr>
             <a:xfrm>
-              <a:off x="8908634" y="1190050"/>
-              <a:ext cx="1473480" cy="400110"/>
+              <a:off x="8901420" y="1190050"/>
+              <a:ext cx="1487908" cy="400110"/>
             </a:xfrm>
             <a:prstGeom prst="rect">
               <a:avLst/>
@@ -17443,7 +17443,7 @@
                 <a:rPr lang="en-CA" sz="1000" b="1" dirty="0">
                   <a:latin typeface="Helvetica" pitchFamily="2" charset="0"/>
                 </a:rPr>
-                <a:t>strong founder effect</a:t>
+                <a:t>Strong founder effect</a:t>
               </a:r>
             </a:p>
             <a:p>
@@ -17474,8 +17474,8 @@
           </p:nvSpPr>
           <p:spPr>
             <a:xfrm rot="16200000">
-              <a:off x="2066840" y="2312128"/>
-              <a:ext cx="864339" cy="246221"/>
+              <a:off x="2077259" y="2312128"/>
+              <a:ext cx="843501" cy="246221"/>
             </a:xfrm>
             <a:prstGeom prst="rect">
               <a:avLst/>
@@ -17496,7 +17496,7 @@
                   <a:ea typeface="Helvetica" charset="0"/>
                   <a:cs typeface="Helvetica" charset="0"/>
                 </a:rPr>
-                <a:t>Mean Slope</a:t>
+                <a:t>Mean slope</a:t>
               </a:r>
             </a:p>
           </p:txBody>

</xml_diff>

<commit_message>
Began moving text from main to supplement since over page limit
</commit_message>
<xml_diff>
--- a/SEC_Writings/SEC_Manuscript-Figures.pptx
+++ b/SEC_Writings/SEC_Manuscript-Figures.pptx
@@ -14,8 +14,9 @@
     <p:sldId id="266" r:id="rId8"/>
     <p:sldId id="267" r:id="rId9"/>
     <p:sldId id="268" r:id="rId10"/>
-    <p:sldId id="269" r:id="rId11"/>
-    <p:sldId id="270" r:id="rId12"/>
+    <p:sldId id="271" r:id="rId11"/>
+    <p:sldId id="269" r:id="rId12"/>
+    <p:sldId id="270" r:id="rId13"/>
   </p:sldIdLst>
   <p:sldSz cx="14400213" cy="14400213"/>
   <p:notesSz cx="6858000" cy="9144000"/>
@@ -3019,6 +3020,1270 @@
       </p:grpSpPr>
       <p:grpSp>
         <p:nvGrpSpPr>
+          <p:cNvPr id="65" name="Group 64">
+            <a:extLst>
+              <a:ext uri="{FF2B5EF4-FFF2-40B4-BE49-F238E27FC236}">
+                <a16:creationId xmlns:a16="http://schemas.microsoft.com/office/drawing/2014/main" id="{8059CF1D-FE87-204E-973A-06B84B6C1454}"/>
+              </a:ext>
+            </a:extLst>
+          </p:cNvPr>
+          <p:cNvGrpSpPr/>
+          <p:nvPr/>
+        </p:nvGrpSpPr>
+        <p:grpSpPr>
+          <a:xfrm>
+            <a:off x="3197165" y="4587697"/>
+            <a:ext cx="8359355" cy="4971068"/>
+            <a:chOff x="3197165" y="4587697"/>
+            <a:chExt cx="8359355" cy="4971068"/>
+          </a:xfrm>
+        </p:grpSpPr>
+        <p:sp>
+          <p:nvSpPr>
+            <p:cNvPr id="32" name="TextBox 31">
+              <a:extLst>
+                <a:ext uri="{FF2B5EF4-FFF2-40B4-BE49-F238E27FC236}">
+                  <a16:creationId xmlns:a16="http://schemas.microsoft.com/office/drawing/2014/main" id="{92CCF5A8-A8E8-914F-A004-766E1FC8E4B2}"/>
+                </a:ext>
+              </a:extLst>
+            </p:cNvPr>
+            <p:cNvSpPr txBox="1"/>
+            <p:nvPr/>
+          </p:nvSpPr>
+          <p:spPr>
+            <a:xfrm rot="16200000">
+              <a:off x="2898525" y="5783460"/>
+              <a:ext cx="843501" cy="246221"/>
+            </a:xfrm>
+            <a:prstGeom prst="rect">
+              <a:avLst/>
+            </a:prstGeom>
+            <a:solidFill>
+              <a:schemeClr val="bg1"/>
+            </a:solidFill>
+          </p:spPr>
+          <p:txBody>
+            <a:bodyPr wrap="none" rtlCol="0">
+              <a:spAutoFit/>
+            </a:bodyPr>
+            <a:lstStyle/>
+            <a:p>
+              <a:r>
+                <a:rPr lang="en-US" sz="1000" dirty="0">
+                  <a:latin typeface="Helvetica" charset="0"/>
+                  <a:ea typeface="Helvetica" charset="0"/>
+                  <a:cs typeface="Helvetica" charset="0"/>
+                </a:rPr>
+                <a:t>Mean slope</a:t>
+              </a:r>
+            </a:p>
+          </p:txBody>
+        </p:sp>
+        <p:sp>
+          <p:nvSpPr>
+            <p:cNvPr id="33" name="TextBox 32">
+              <a:extLst>
+                <a:ext uri="{FF2B5EF4-FFF2-40B4-BE49-F238E27FC236}">
+                  <a16:creationId xmlns:a16="http://schemas.microsoft.com/office/drawing/2014/main" id="{E16BE2BB-3EA2-E24D-A86D-C056C448C0E5}"/>
+                </a:ext>
+              </a:extLst>
+            </p:cNvPr>
+            <p:cNvSpPr txBox="1"/>
+            <p:nvPr/>
+          </p:nvSpPr>
+          <p:spPr>
+            <a:xfrm rot="16200000">
+              <a:off x="2364328" y="7934288"/>
+              <a:ext cx="1920719" cy="246221"/>
+            </a:xfrm>
+            <a:prstGeom prst="rect">
+              <a:avLst/>
+            </a:prstGeom>
+            <a:solidFill>
+              <a:schemeClr val="bg1"/>
+            </a:solidFill>
+          </p:spPr>
+          <p:txBody>
+            <a:bodyPr wrap="none" rtlCol="0">
+              <a:spAutoFit/>
+            </a:bodyPr>
+            <a:lstStyle/>
+            <a:p>
+              <a:r>
+                <a:rPr lang="en-US" sz="1000" dirty="0">
+                  <a:latin typeface="Helvetica" charset="0"/>
+                  <a:ea typeface="Helvetica" charset="0"/>
+                  <a:cs typeface="Helvetica" charset="0"/>
+                </a:rPr>
+                <a:t>Proportion of significant slopes</a:t>
+              </a:r>
+            </a:p>
+          </p:txBody>
+        </p:sp>
+        <p:grpSp>
+          <p:nvGrpSpPr>
+            <p:cNvPr id="53" name="Group 52">
+              <a:extLst>
+                <a:ext uri="{FF2B5EF4-FFF2-40B4-BE49-F238E27FC236}">
+                  <a16:creationId xmlns:a16="http://schemas.microsoft.com/office/drawing/2014/main" id="{9093722F-8B3E-404B-B56A-A2A22EF05BC8}"/>
+                </a:ext>
+              </a:extLst>
+            </p:cNvPr>
+            <p:cNvGrpSpPr/>
+            <p:nvPr/>
+          </p:nvGrpSpPr>
+          <p:grpSpPr>
+            <a:xfrm>
+              <a:off x="8941055" y="5010568"/>
+              <a:ext cx="2614839" cy="1906699"/>
+              <a:chOff x="3438666" y="5010568"/>
+              <a:chExt cx="2614839" cy="1906699"/>
+            </a:xfrm>
+          </p:grpSpPr>
+          <p:pic>
+            <p:nvPicPr>
+              <p:cNvPr id="21" name="Picture 20">
+                <a:extLst>
+                  <a:ext uri="{FF2B5EF4-FFF2-40B4-BE49-F238E27FC236}">
+                    <a16:creationId xmlns:a16="http://schemas.microsoft.com/office/drawing/2014/main" id="{957FA3BA-50C9-FE40-99E4-A6FB24E9A130}"/>
+                  </a:ext>
+                </a:extLst>
+              </p:cNvPr>
+              <p:cNvPicPr>
+                <a:picLocks noChangeAspect="1"/>
+              </p:cNvPicPr>
+              <p:nvPr/>
+            </p:nvPicPr>
+            <p:blipFill rotWithShape="1">
+              <a:blip r:embed="rId2"/>
+              <a:srcRect l="4679" t="13630" b="16926"/>
+              <a:stretch/>
+            </p:blipFill>
+            <p:spPr>
+              <a:xfrm>
+                <a:off x="3438666" y="5012267"/>
+                <a:ext cx="2614839" cy="1905000"/>
+              </a:xfrm>
+              <a:prstGeom prst="rect">
+                <a:avLst/>
+              </a:prstGeom>
+            </p:spPr>
+          </p:pic>
+          <p:pic>
+            <p:nvPicPr>
+              <p:cNvPr id="37" name="Picture 36">
+                <a:extLst>
+                  <a:ext uri="{FF2B5EF4-FFF2-40B4-BE49-F238E27FC236}">
+                    <a16:creationId xmlns:a16="http://schemas.microsoft.com/office/drawing/2014/main" id="{4F570EA2-467A-E64C-A7A1-9DD7313D2079}"/>
+                  </a:ext>
+                </a:extLst>
+              </p:cNvPr>
+              <p:cNvPicPr>
+                <a:picLocks noChangeAspect="1"/>
+              </p:cNvPicPr>
+              <p:nvPr/>
+            </p:nvPicPr>
+            <p:blipFill>
+              <a:blip r:embed="rId3"/>
+              <a:stretch>
+                <a:fillRect/>
+              </a:stretch>
+            </p:blipFill>
+            <p:spPr>
+              <a:xfrm>
+                <a:off x="3779411" y="5010568"/>
+                <a:ext cx="1180213" cy="488151"/>
+              </a:xfrm>
+              <a:prstGeom prst="rect">
+                <a:avLst/>
+              </a:prstGeom>
+            </p:spPr>
+          </p:pic>
+        </p:grpSp>
+        <p:grpSp>
+          <p:nvGrpSpPr>
+            <p:cNvPr id="54" name="Group 53">
+              <a:extLst>
+                <a:ext uri="{FF2B5EF4-FFF2-40B4-BE49-F238E27FC236}">
+                  <a16:creationId xmlns:a16="http://schemas.microsoft.com/office/drawing/2014/main" id="{3BA52CB1-8E15-D245-B3CB-E389A954343E}"/>
+                </a:ext>
+              </a:extLst>
+            </p:cNvPr>
+            <p:cNvGrpSpPr/>
+            <p:nvPr/>
+          </p:nvGrpSpPr>
+          <p:grpSpPr>
+            <a:xfrm>
+              <a:off x="6189130" y="4961467"/>
+              <a:ext cx="2612125" cy="1955800"/>
+              <a:chOff x="6189130" y="4961467"/>
+              <a:chExt cx="2612125" cy="1955800"/>
+            </a:xfrm>
+          </p:grpSpPr>
+          <p:pic>
+            <p:nvPicPr>
+              <p:cNvPr id="19" name="Picture 18">
+                <a:extLst>
+                  <a:ext uri="{FF2B5EF4-FFF2-40B4-BE49-F238E27FC236}">
+                    <a16:creationId xmlns:a16="http://schemas.microsoft.com/office/drawing/2014/main" id="{2A56C812-1CEA-8844-AD43-9C384C87E62F}"/>
+                  </a:ext>
+                </a:extLst>
+              </p:cNvPr>
+              <p:cNvPicPr>
+                <a:picLocks noChangeAspect="1"/>
+              </p:cNvPicPr>
+              <p:nvPr/>
+            </p:nvPicPr>
+            <p:blipFill rotWithShape="1">
+              <a:blip r:embed="rId4"/>
+              <a:srcRect l="4778" t="12488" b="16215"/>
+              <a:stretch/>
+            </p:blipFill>
+            <p:spPr>
+              <a:xfrm>
+                <a:off x="6189130" y="4961467"/>
+                <a:ext cx="2612125" cy="1955800"/>
+              </a:xfrm>
+              <a:prstGeom prst="rect">
+                <a:avLst/>
+              </a:prstGeom>
+            </p:spPr>
+          </p:pic>
+          <p:pic>
+            <p:nvPicPr>
+              <p:cNvPr id="38" name="Picture 37">
+                <a:extLst>
+                  <a:ext uri="{FF2B5EF4-FFF2-40B4-BE49-F238E27FC236}">
+                    <a16:creationId xmlns:a16="http://schemas.microsoft.com/office/drawing/2014/main" id="{091F5B77-CE15-0C4F-AC24-6E490FD9EF84}"/>
+                  </a:ext>
+                </a:extLst>
+              </p:cNvPr>
+              <p:cNvPicPr>
+                <a:picLocks noChangeAspect="1"/>
+              </p:cNvPicPr>
+              <p:nvPr/>
+            </p:nvPicPr>
+            <p:blipFill>
+              <a:blip r:embed="rId3"/>
+              <a:stretch>
+                <a:fillRect/>
+              </a:stretch>
+            </p:blipFill>
+            <p:spPr>
+              <a:xfrm>
+                <a:off x="6480278" y="4976701"/>
+                <a:ext cx="1180213" cy="488151"/>
+              </a:xfrm>
+              <a:prstGeom prst="rect">
+                <a:avLst/>
+              </a:prstGeom>
+            </p:spPr>
+          </p:pic>
+        </p:grpSp>
+        <p:grpSp>
+          <p:nvGrpSpPr>
+            <p:cNvPr id="55" name="Group 54">
+              <a:extLst>
+                <a:ext uri="{FF2B5EF4-FFF2-40B4-BE49-F238E27FC236}">
+                  <a16:creationId xmlns:a16="http://schemas.microsoft.com/office/drawing/2014/main" id="{354E32F9-3880-124C-B8BC-E42BBDAF9015}"/>
+                </a:ext>
+              </a:extLst>
+            </p:cNvPr>
+            <p:cNvGrpSpPr/>
+            <p:nvPr/>
+          </p:nvGrpSpPr>
+          <p:grpSpPr>
+            <a:xfrm>
+              <a:off x="3441725" y="5022782"/>
+              <a:ext cx="2619640" cy="1905001"/>
+              <a:chOff x="8936880" y="5003800"/>
+              <a:chExt cx="2619640" cy="1905001"/>
+            </a:xfrm>
+          </p:grpSpPr>
+          <p:pic>
+            <p:nvPicPr>
+              <p:cNvPr id="17" name="Picture 16">
+                <a:extLst>
+                  <a:ext uri="{FF2B5EF4-FFF2-40B4-BE49-F238E27FC236}">
+                    <a16:creationId xmlns:a16="http://schemas.microsoft.com/office/drawing/2014/main" id="{76DFBB32-3AFF-D240-9067-462A955268D9}"/>
+                  </a:ext>
+                </a:extLst>
+              </p:cNvPr>
+              <p:cNvPicPr>
+                <a:picLocks noChangeAspect="1"/>
+              </p:cNvPicPr>
+              <p:nvPr/>
+            </p:nvPicPr>
+            <p:blipFill rotWithShape="1">
+              <a:blip r:embed="rId5"/>
+              <a:srcRect l="4504" t="13414" b="17142"/>
+              <a:stretch/>
+            </p:blipFill>
+            <p:spPr>
+              <a:xfrm>
+                <a:off x="8936880" y="5003800"/>
+                <a:ext cx="2619640" cy="1905001"/>
+              </a:xfrm>
+              <a:prstGeom prst="rect">
+                <a:avLst/>
+              </a:prstGeom>
+            </p:spPr>
+          </p:pic>
+          <p:pic>
+            <p:nvPicPr>
+              <p:cNvPr id="39" name="Picture 38">
+                <a:extLst>
+                  <a:ext uri="{FF2B5EF4-FFF2-40B4-BE49-F238E27FC236}">
+                    <a16:creationId xmlns:a16="http://schemas.microsoft.com/office/drawing/2014/main" id="{CE01BBF6-FB00-D140-A65E-D5DA550843F8}"/>
+                  </a:ext>
+                </a:extLst>
+              </p:cNvPr>
+              <p:cNvPicPr>
+                <a:picLocks noChangeAspect="1"/>
+              </p:cNvPicPr>
+              <p:nvPr/>
+            </p:nvPicPr>
+            <p:blipFill>
+              <a:blip r:embed="rId3"/>
+              <a:stretch>
+                <a:fillRect/>
+              </a:stretch>
+            </p:blipFill>
+            <p:spPr>
+              <a:xfrm>
+                <a:off x="9281927" y="5010568"/>
+                <a:ext cx="1180213" cy="488151"/>
+              </a:xfrm>
+              <a:prstGeom prst="rect">
+                <a:avLst/>
+              </a:prstGeom>
+            </p:spPr>
+          </p:pic>
+        </p:grpSp>
+        <p:grpSp>
+          <p:nvGrpSpPr>
+            <p:cNvPr id="58" name="Group 57">
+              <a:extLst>
+                <a:ext uri="{FF2B5EF4-FFF2-40B4-BE49-F238E27FC236}">
+                  <a16:creationId xmlns:a16="http://schemas.microsoft.com/office/drawing/2014/main" id="{B263293B-B377-CD4C-B4F9-A22DD7F59D13}"/>
+                </a:ext>
+              </a:extLst>
+            </p:cNvPr>
+            <p:cNvGrpSpPr/>
+            <p:nvPr/>
+          </p:nvGrpSpPr>
+          <p:grpSpPr>
+            <a:xfrm>
+              <a:off x="9118282" y="7227092"/>
+              <a:ext cx="2438238" cy="2020886"/>
+              <a:chOff x="3615267" y="7241649"/>
+              <a:chExt cx="2438238" cy="2020886"/>
+            </a:xfrm>
+          </p:grpSpPr>
+          <p:pic>
+            <p:nvPicPr>
+              <p:cNvPr id="27" name="Picture 26">
+                <a:extLst>
+                  <a:ext uri="{FF2B5EF4-FFF2-40B4-BE49-F238E27FC236}">
+                    <a16:creationId xmlns:a16="http://schemas.microsoft.com/office/drawing/2014/main" id="{9713F8EF-7C94-A04A-9347-172E19F0EC9B}"/>
+                  </a:ext>
+                </a:extLst>
+              </p:cNvPr>
+              <p:cNvPicPr>
+                <a:picLocks noChangeAspect="1"/>
+              </p:cNvPicPr>
+              <p:nvPr/>
+            </p:nvPicPr>
+            <p:blipFill rotWithShape="1">
+              <a:blip r:embed="rId6"/>
+              <a:srcRect l="4944" t="11644" b="14899"/>
+              <a:stretch/>
+            </p:blipFill>
+            <p:spPr>
+              <a:xfrm>
+                <a:off x="3615267" y="7247467"/>
+                <a:ext cx="2438238" cy="2015068"/>
+              </a:xfrm>
+              <a:prstGeom prst="rect">
+                <a:avLst/>
+              </a:prstGeom>
+            </p:spPr>
+          </p:pic>
+          <p:pic>
+            <p:nvPicPr>
+              <p:cNvPr id="40" name="Picture 39">
+                <a:extLst>
+                  <a:ext uri="{FF2B5EF4-FFF2-40B4-BE49-F238E27FC236}">
+                    <a16:creationId xmlns:a16="http://schemas.microsoft.com/office/drawing/2014/main" id="{6784FBE5-1F6E-2E4F-98DD-F24C04115186}"/>
+                  </a:ext>
+                </a:extLst>
+              </p:cNvPr>
+              <p:cNvPicPr>
+                <a:picLocks noChangeAspect="1"/>
+              </p:cNvPicPr>
+              <p:nvPr/>
+            </p:nvPicPr>
+            <p:blipFill>
+              <a:blip r:embed="rId7"/>
+              <a:stretch>
+                <a:fillRect/>
+              </a:stretch>
+            </p:blipFill>
+            <p:spPr>
+              <a:xfrm>
+                <a:off x="3756616" y="7241649"/>
+                <a:ext cx="617464" cy="442710"/>
+              </a:xfrm>
+              <a:prstGeom prst="rect">
+                <a:avLst/>
+              </a:prstGeom>
+            </p:spPr>
+          </p:pic>
+        </p:grpSp>
+        <p:grpSp>
+          <p:nvGrpSpPr>
+            <p:cNvPr id="56" name="Group 55">
+              <a:extLst>
+                <a:ext uri="{FF2B5EF4-FFF2-40B4-BE49-F238E27FC236}">
+                  <a16:creationId xmlns:a16="http://schemas.microsoft.com/office/drawing/2014/main" id="{43BE2A4A-4F40-0447-B11C-479CB8AD83B8}"/>
+                </a:ext>
+              </a:extLst>
+            </p:cNvPr>
+            <p:cNvGrpSpPr/>
+            <p:nvPr/>
+          </p:nvGrpSpPr>
+          <p:grpSpPr>
+            <a:xfrm>
+              <a:off x="3615585" y="7259376"/>
+              <a:ext cx="2437920" cy="2023534"/>
+              <a:chOff x="9118600" y="7239001"/>
+              <a:chExt cx="2437920" cy="2023534"/>
+            </a:xfrm>
+          </p:grpSpPr>
+          <p:pic>
+            <p:nvPicPr>
+              <p:cNvPr id="23" name="Picture 22">
+                <a:extLst>
+                  <a:ext uri="{FF2B5EF4-FFF2-40B4-BE49-F238E27FC236}">
+                    <a16:creationId xmlns:a16="http://schemas.microsoft.com/office/drawing/2014/main" id="{4C229410-2705-504F-A9C8-C1790D61B925}"/>
+                  </a:ext>
+                </a:extLst>
+              </p:cNvPr>
+              <p:cNvPicPr>
+                <a:picLocks noChangeAspect="1"/>
+              </p:cNvPicPr>
+              <p:nvPr/>
+            </p:nvPicPr>
+            <p:blipFill rotWithShape="1">
+              <a:blip r:embed="rId8"/>
+              <a:srcRect l="4905" t="11335" b="14899"/>
+              <a:stretch/>
+            </p:blipFill>
+            <p:spPr>
+              <a:xfrm>
+                <a:off x="9118600" y="7239001"/>
+                <a:ext cx="2437920" cy="2023534"/>
+              </a:xfrm>
+              <a:prstGeom prst="rect">
+                <a:avLst/>
+              </a:prstGeom>
+            </p:spPr>
+          </p:pic>
+          <p:pic>
+            <p:nvPicPr>
+              <p:cNvPr id="41" name="Picture 40">
+                <a:extLst>
+                  <a:ext uri="{FF2B5EF4-FFF2-40B4-BE49-F238E27FC236}">
+                    <a16:creationId xmlns:a16="http://schemas.microsoft.com/office/drawing/2014/main" id="{35667F95-12DA-514E-8AFB-19511F511EEE}"/>
+                  </a:ext>
+                </a:extLst>
+              </p:cNvPr>
+              <p:cNvPicPr>
+                <a:picLocks noChangeAspect="1"/>
+              </p:cNvPicPr>
+              <p:nvPr/>
+            </p:nvPicPr>
+            <p:blipFill>
+              <a:blip r:embed="rId7"/>
+              <a:stretch>
+                <a:fillRect/>
+              </a:stretch>
+            </p:blipFill>
+            <p:spPr>
+              <a:xfrm>
+                <a:off x="10939056" y="7247467"/>
+                <a:ext cx="617464" cy="442710"/>
+              </a:xfrm>
+              <a:prstGeom prst="rect">
+                <a:avLst/>
+              </a:prstGeom>
+            </p:spPr>
+          </p:pic>
+        </p:grpSp>
+        <p:grpSp>
+          <p:nvGrpSpPr>
+            <p:cNvPr id="57" name="Group 56">
+              <a:extLst>
+                <a:ext uri="{FF2B5EF4-FFF2-40B4-BE49-F238E27FC236}">
+                  <a16:creationId xmlns:a16="http://schemas.microsoft.com/office/drawing/2014/main" id="{BAAD716F-8FEB-4946-9A73-42BA0FAA58D4}"/>
+                </a:ext>
+              </a:extLst>
+            </p:cNvPr>
+            <p:cNvGrpSpPr/>
+            <p:nvPr/>
+          </p:nvGrpSpPr>
+          <p:grpSpPr>
+            <a:xfrm>
+              <a:off x="6299199" y="7239002"/>
+              <a:ext cx="2502055" cy="2023533"/>
+              <a:chOff x="6299199" y="7239002"/>
+              <a:chExt cx="2502055" cy="2023533"/>
+            </a:xfrm>
+          </p:grpSpPr>
+          <p:pic>
+            <p:nvPicPr>
+              <p:cNvPr id="25" name="Picture 24">
+                <a:extLst>
+                  <a:ext uri="{FF2B5EF4-FFF2-40B4-BE49-F238E27FC236}">
+                    <a16:creationId xmlns:a16="http://schemas.microsoft.com/office/drawing/2014/main" id="{A0DE79F8-4BAC-1F46-9944-6A8CFF9866A8}"/>
+                  </a:ext>
+                </a:extLst>
+              </p:cNvPr>
+              <p:cNvPicPr>
+                <a:picLocks noChangeAspect="1"/>
+              </p:cNvPicPr>
+              <p:nvPr/>
+            </p:nvPicPr>
+            <p:blipFill rotWithShape="1">
+              <a:blip r:embed="rId9"/>
+              <a:srcRect l="4462" t="11335" b="14900"/>
+              <a:stretch/>
+            </p:blipFill>
+            <p:spPr>
+              <a:xfrm>
+                <a:off x="6299199" y="7239002"/>
+                <a:ext cx="2502055" cy="2023533"/>
+              </a:xfrm>
+              <a:prstGeom prst="rect">
+                <a:avLst/>
+              </a:prstGeom>
+            </p:spPr>
+          </p:pic>
+          <p:pic>
+            <p:nvPicPr>
+              <p:cNvPr id="42" name="Picture 41">
+                <a:extLst>
+                  <a:ext uri="{FF2B5EF4-FFF2-40B4-BE49-F238E27FC236}">
+                    <a16:creationId xmlns:a16="http://schemas.microsoft.com/office/drawing/2014/main" id="{C5A89C59-FDB6-3B48-A732-BE85FB77F0AE}"/>
+                  </a:ext>
+                </a:extLst>
+              </p:cNvPr>
+              <p:cNvPicPr>
+                <a:picLocks noChangeAspect="1"/>
+              </p:cNvPicPr>
+              <p:nvPr/>
+            </p:nvPicPr>
+            <p:blipFill>
+              <a:blip r:embed="rId7"/>
+              <a:stretch>
+                <a:fillRect/>
+              </a:stretch>
+            </p:blipFill>
+            <p:spPr>
+              <a:xfrm>
+                <a:off x="7946361" y="7247467"/>
+                <a:ext cx="617464" cy="442710"/>
+              </a:xfrm>
+              <a:prstGeom prst="rect">
+                <a:avLst/>
+              </a:prstGeom>
+            </p:spPr>
+          </p:pic>
+        </p:grpSp>
+        <p:sp>
+          <p:nvSpPr>
+            <p:cNvPr id="43" name="TextBox 42">
+              <a:extLst>
+                <a:ext uri="{FF2B5EF4-FFF2-40B4-BE49-F238E27FC236}">
+                  <a16:creationId xmlns:a16="http://schemas.microsoft.com/office/drawing/2014/main" id="{C6B31450-8B82-7049-90D6-7CAE1FEEAEDE}"/>
+                </a:ext>
+              </a:extLst>
+            </p:cNvPr>
+            <p:cNvSpPr txBox="1"/>
+            <p:nvPr/>
+          </p:nvSpPr>
+          <p:spPr>
+            <a:xfrm>
+              <a:off x="3515864" y="4654464"/>
+              <a:ext cx="402674" cy="307777"/>
+            </a:xfrm>
+            <a:prstGeom prst="rect">
+              <a:avLst/>
+            </a:prstGeom>
+            <a:noFill/>
+          </p:spPr>
+          <p:txBody>
+            <a:bodyPr wrap="none" rtlCol="0">
+              <a:spAutoFit/>
+            </a:bodyPr>
+            <a:lstStyle/>
+            <a:p>
+              <a:r>
+                <a:rPr lang="en-US" sz="1400" dirty="0">
+                  <a:latin typeface="Helvetica" charset="0"/>
+                  <a:ea typeface="Helvetica" charset="0"/>
+                  <a:cs typeface="Helvetica" charset="0"/>
+                </a:rPr>
+                <a:t>(</a:t>
+              </a:r>
+              <a:r>
+                <a:rPr lang="en-US" sz="1400" i="1" dirty="0">
+                  <a:latin typeface="Helvetica" charset="0"/>
+                  <a:ea typeface="Helvetica" charset="0"/>
+                  <a:cs typeface="Helvetica" charset="0"/>
+                </a:rPr>
+                <a:t>a</a:t>
+              </a:r>
+              <a:r>
+                <a:rPr lang="en-US" sz="1400" dirty="0">
+                  <a:latin typeface="Helvetica" charset="0"/>
+                  <a:ea typeface="Helvetica" charset="0"/>
+                  <a:cs typeface="Helvetica" charset="0"/>
+                </a:rPr>
+                <a:t>)</a:t>
+              </a:r>
+            </a:p>
+          </p:txBody>
+        </p:sp>
+        <p:sp>
+          <p:nvSpPr>
+            <p:cNvPr id="44" name="TextBox 43">
+              <a:extLst>
+                <a:ext uri="{FF2B5EF4-FFF2-40B4-BE49-F238E27FC236}">
+                  <a16:creationId xmlns:a16="http://schemas.microsoft.com/office/drawing/2014/main" id="{2B63A923-231C-2442-8100-69555A0536B8}"/>
+                </a:ext>
+              </a:extLst>
+            </p:cNvPr>
+            <p:cNvSpPr txBox="1"/>
+            <p:nvPr/>
+          </p:nvSpPr>
+          <p:spPr>
+            <a:xfrm>
+              <a:off x="6203661" y="4652666"/>
+              <a:ext cx="402674" cy="307777"/>
+            </a:xfrm>
+            <a:prstGeom prst="rect">
+              <a:avLst/>
+            </a:prstGeom>
+            <a:noFill/>
+          </p:spPr>
+          <p:txBody>
+            <a:bodyPr wrap="none" rtlCol="0">
+              <a:spAutoFit/>
+            </a:bodyPr>
+            <a:lstStyle/>
+            <a:p>
+              <a:r>
+                <a:rPr lang="en-US" sz="1400" dirty="0">
+                  <a:latin typeface="Helvetica" charset="0"/>
+                  <a:ea typeface="Helvetica" charset="0"/>
+                  <a:cs typeface="Helvetica" charset="0"/>
+                </a:rPr>
+                <a:t>(</a:t>
+              </a:r>
+              <a:r>
+                <a:rPr lang="en-US" sz="1400" i="1" dirty="0">
+                  <a:latin typeface="Helvetica" charset="0"/>
+                  <a:ea typeface="Helvetica" charset="0"/>
+                  <a:cs typeface="Helvetica" charset="0"/>
+                </a:rPr>
+                <a:t>b</a:t>
+              </a:r>
+              <a:r>
+                <a:rPr lang="en-US" sz="1400" dirty="0">
+                  <a:latin typeface="Helvetica" charset="0"/>
+                  <a:ea typeface="Helvetica" charset="0"/>
+                  <a:cs typeface="Helvetica" charset="0"/>
+                </a:rPr>
+                <a:t>)</a:t>
+              </a:r>
+            </a:p>
+          </p:txBody>
+        </p:sp>
+        <p:sp>
+          <p:nvSpPr>
+            <p:cNvPr id="45" name="TextBox 44">
+              <a:extLst>
+                <a:ext uri="{FF2B5EF4-FFF2-40B4-BE49-F238E27FC236}">
+                  <a16:creationId xmlns:a16="http://schemas.microsoft.com/office/drawing/2014/main" id="{7CED953D-2B69-DC41-B102-D6A39E2BA522}"/>
+                </a:ext>
+              </a:extLst>
+            </p:cNvPr>
+            <p:cNvSpPr txBox="1"/>
+            <p:nvPr/>
+          </p:nvSpPr>
+          <p:spPr>
+            <a:xfrm>
+              <a:off x="9026689" y="4652666"/>
+              <a:ext cx="393056" cy="307777"/>
+            </a:xfrm>
+            <a:prstGeom prst="rect">
+              <a:avLst/>
+            </a:prstGeom>
+            <a:noFill/>
+          </p:spPr>
+          <p:txBody>
+            <a:bodyPr wrap="none" rtlCol="0">
+              <a:spAutoFit/>
+            </a:bodyPr>
+            <a:lstStyle/>
+            <a:p>
+              <a:r>
+                <a:rPr lang="en-US" sz="1400" dirty="0">
+                  <a:latin typeface="Helvetica" charset="0"/>
+                  <a:ea typeface="Helvetica" charset="0"/>
+                  <a:cs typeface="Helvetica" charset="0"/>
+                </a:rPr>
+                <a:t>(</a:t>
+              </a:r>
+              <a:r>
+                <a:rPr lang="en-US" sz="1400" i="1" dirty="0">
+                  <a:latin typeface="Helvetica" charset="0"/>
+                  <a:ea typeface="Helvetica" charset="0"/>
+                  <a:cs typeface="Helvetica" charset="0"/>
+                </a:rPr>
+                <a:t>c</a:t>
+              </a:r>
+              <a:r>
+                <a:rPr lang="en-US" sz="1400" dirty="0">
+                  <a:latin typeface="Helvetica" charset="0"/>
+                  <a:ea typeface="Helvetica" charset="0"/>
+                  <a:cs typeface="Helvetica" charset="0"/>
+                </a:rPr>
+                <a:t>)</a:t>
+              </a:r>
+            </a:p>
+          </p:txBody>
+        </p:sp>
+        <p:sp>
+          <p:nvSpPr>
+            <p:cNvPr id="46" name="TextBox 45">
+              <a:extLst>
+                <a:ext uri="{FF2B5EF4-FFF2-40B4-BE49-F238E27FC236}">
+                  <a16:creationId xmlns:a16="http://schemas.microsoft.com/office/drawing/2014/main" id="{A99E8434-1052-1345-92C2-E3CE434BE7C1}"/>
+                </a:ext>
+              </a:extLst>
+            </p:cNvPr>
+            <p:cNvSpPr txBox="1"/>
+            <p:nvPr/>
+          </p:nvSpPr>
+          <p:spPr>
+            <a:xfrm>
+              <a:off x="3515066" y="6927783"/>
+              <a:ext cx="402674" cy="307777"/>
+            </a:xfrm>
+            <a:prstGeom prst="rect">
+              <a:avLst/>
+            </a:prstGeom>
+            <a:noFill/>
+          </p:spPr>
+          <p:txBody>
+            <a:bodyPr wrap="none" rtlCol="0">
+              <a:spAutoFit/>
+            </a:bodyPr>
+            <a:lstStyle/>
+            <a:p>
+              <a:r>
+                <a:rPr lang="en-US" sz="1400" dirty="0">
+                  <a:latin typeface="Helvetica" charset="0"/>
+                  <a:ea typeface="Helvetica" charset="0"/>
+                  <a:cs typeface="Helvetica" charset="0"/>
+                </a:rPr>
+                <a:t>(</a:t>
+              </a:r>
+              <a:r>
+                <a:rPr lang="en-US" sz="1400" i="1" dirty="0">
+                  <a:latin typeface="Helvetica" charset="0"/>
+                  <a:ea typeface="Helvetica" charset="0"/>
+                  <a:cs typeface="Helvetica" charset="0"/>
+                </a:rPr>
+                <a:t>d</a:t>
+              </a:r>
+              <a:r>
+                <a:rPr lang="en-US" sz="1400" dirty="0">
+                  <a:latin typeface="Helvetica" charset="0"/>
+                  <a:ea typeface="Helvetica" charset="0"/>
+                  <a:cs typeface="Helvetica" charset="0"/>
+                </a:rPr>
+                <a:t>)</a:t>
+              </a:r>
+            </a:p>
+          </p:txBody>
+        </p:sp>
+        <p:sp>
+          <p:nvSpPr>
+            <p:cNvPr id="47" name="TextBox 46">
+              <a:extLst>
+                <a:ext uri="{FF2B5EF4-FFF2-40B4-BE49-F238E27FC236}">
+                  <a16:creationId xmlns:a16="http://schemas.microsoft.com/office/drawing/2014/main" id="{EB10CBF7-500D-3644-AC6A-4F404203AE7F}"/>
+                </a:ext>
+              </a:extLst>
+            </p:cNvPr>
+            <p:cNvSpPr txBox="1"/>
+            <p:nvPr/>
+          </p:nvSpPr>
+          <p:spPr>
+            <a:xfrm>
+              <a:off x="6206939" y="6919315"/>
+              <a:ext cx="402674" cy="307777"/>
+            </a:xfrm>
+            <a:prstGeom prst="rect">
+              <a:avLst/>
+            </a:prstGeom>
+            <a:noFill/>
+          </p:spPr>
+          <p:txBody>
+            <a:bodyPr wrap="none" rtlCol="0">
+              <a:spAutoFit/>
+            </a:bodyPr>
+            <a:lstStyle/>
+            <a:p>
+              <a:r>
+                <a:rPr lang="en-US" sz="1400" dirty="0">
+                  <a:latin typeface="Helvetica" charset="0"/>
+                  <a:ea typeface="Helvetica" charset="0"/>
+                  <a:cs typeface="Helvetica" charset="0"/>
+                </a:rPr>
+                <a:t>(</a:t>
+              </a:r>
+              <a:r>
+                <a:rPr lang="en-US" sz="1400" i="1" dirty="0">
+                  <a:latin typeface="Helvetica" charset="0"/>
+                  <a:ea typeface="Helvetica" charset="0"/>
+                  <a:cs typeface="Helvetica" charset="0"/>
+                </a:rPr>
+                <a:t>e</a:t>
+              </a:r>
+              <a:r>
+                <a:rPr lang="en-US" sz="1400" dirty="0">
+                  <a:latin typeface="Helvetica" charset="0"/>
+                  <a:ea typeface="Helvetica" charset="0"/>
+                  <a:cs typeface="Helvetica" charset="0"/>
+                </a:rPr>
+                <a:t>)</a:t>
+              </a:r>
+            </a:p>
+          </p:txBody>
+        </p:sp>
+        <p:sp>
+          <p:nvSpPr>
+            <p:cNvPr id="48" name="TextBox 47">
+              <a:extLst>
+                <a:ext uri="{FF2B5EF4-FFF2-40B4-BE49-F238E27FC236}">
+                  <a16:creationId xmlns:a16="http://schemas.microsoft.com/office/drawing/2014/main" id="{F4054982-C773-074C-A4C5-682885EA738E}"/>
+                </a:ext>
+              </a:extLst>
+            </p:cNvPr>
+            <p:cNvSpPr txBox="1"/>
+            <p:nvPr/>
+          </p:nvSpPr>
+          <p:spPr>
+            <a:xfrm>
+              <a:off x="9038173" y="6927783"/>
+              <a:ext cx="352982" cy="307777"/>
+            </a:xfrm>
+            <a:prstGeom prst="rect">
+              <a:avLst/>
+            </a:prstGeom>
+            <a:noFill/>
+          </p:spPr>
+          <p:txBody>
+            <a:bodyPr wrap="none" rtlCol="0">
+              <a:spAutoFit/>
+            </a:bodyPr>
+            <a:lstStyle/>
+            <a:p>
+              <a:r>
+                <a:rPr lang="en-US" sz="1400" dirty="0">
+                  <a:latin typeface="Helvetica" charset="0"/>
+                  <a:ea typeface="Helvetica" charset="0"/>
+                  <a:cs typeface="Helvetica" charset="0"/>
+                </a:rPr>
+                <a:t>(</a:t>
+              </a:r>
+              <a:r>
+                <a:rPr lang="en-US" sz="1400" i="1" dirty="0">
+                  <a:latin typeface="Helvetica" charset="0"/>
+                  <a:ea typeface="Helvetica" charset="0"/>
+                  <a:cs typeface="Helvetica" charset="0"/>
+                </a:rPr>
+                <a:t>f</a:t>
+              </a:r>
+              <a:r>
+                <a:rPr lang="en-US" sz="1400" dirty="0">
+                  <a:latin typeface="Helvetica" charset="0"/>
+                  <a:ea typeface="Helvetica" charset="0"/>
+                  <a:cs typeface="Helvetica" charset="0"/>
+                </a:rPr>
+                <a:t>)</a:t>
+              </a:r>
+            </a:p>
+          </p:txBody>
+        </p:sp>
+        <p:sp>
+          <p:nvSpPr>
+            <p:cNvPr id="49" name="TextBox 48">
+              <a:extLst>
+                <a:ext uri="{FF2B5EF4-FFF2-40B4-BE49-F238E27FC236}">
+                  <a16:creationId xmlns:a16="http://schemas.microsoft.com/office/drawing/2014/main" id="{2F7C96C9-6D26-8749-BBEA-A58553DE6CEC}"/>
+                </a:ext>
+              </a:extLst>
+            </p:cNvPr>
+            <p:cNvSpPr txBox="1"/>
+            <p:nvPr/>
+          </p:nvSpPr>
+          <p:spPr>
+            <a:xfrm>
+              <a:off x="4364960" y="4593621"/>
+              <a:ext cx="1245855" cy="400110"/>
+            </a:xfrm>
+            <a:prstGeom prst="rect">
+              <a:avLst/>
+            </a:prstGeom>
+            <a:noFill/>
+          </p:spPr>
+          <p:txBody>
+            <a:bodyPr wrap="none" rtlCol="0">
+              <a:spAutoFit/>
+            </a:bodyPr>
+            <a:lstStyle/>
+            <a:p>
+              <a:pPr algn="ctr"/>
+              <a:r>
+                <a:rPr lang="en-CA" sz="1000" b="1" dirty="0">
+                  <a:latin typeface="Helvetica" pitchFamily="2" charset="0"/>
+                </a:rPr>
+                <a:t>No founder effect</a:t>
+              </a:r>
+            </a:p>
+            <a:p>
+              <a:pPr algn="ctr"/>
+              <a:r>
+                <a:rPr lang="en-CA" sz="1000" b="1" dirty="0">
+                  <a:latin typeface="Helvetica" pitchFamily="2" charset="0"/>
+                </a:rPr>
+                <a:t>(prop. = 1.0)</a:t>
+              </a:r>
+              <a:endParaRPr lang="en-US" sz="1000" b="1" dirty="0">
+                <a:latin typeface="Helvetica" pitchFamily="2" charset="0"/>
+              </a:endParaRPr>
+            </a:p>
+          </p:txBody>
+        </p:sp>
+        <p:sp>
+          <p:nvSpPr>
+            <p:cNvPr id="50" name="TextBox 49">
+              <a:extLst>
+                <a:ext uri="{FF2B5EF4-FFF2-40B4-BE49-F238E27FC236}">
+                  <a16:creationId xmlns:a16="http://schemas.microsoft.com/office/drawing/2014/main" id="{52288C76-C3D3-AA49-952B-FA3D272AFA5D}"/>
+                </a:ext>
+              </a:extLst>
+            </p:cNvPr>
+            <p:cNvSpPr txBox="1"/>
+            <p:nvPr/>
+          </p:nvSpPr>
+          <p:spPr>
+            <a:xfrm>
+              <a:off x="6786810" y="4587697"/>
+              <a:ext cx="1834156" cy="400110"/>
+            </a:xfrm>
+            <a:prstGeom prst="rect">
+              <a:avLst/>
+            </a:prstGeom>
+            <a:noFill/>
+          </p:spPr>
+          <p:txBody>
+            <a:bodyPr wrap="none" rtlCol="0">
+              <a:spAutoFit/>
+            </a:bodyPr>
+            <a:lstStyle/>
+            <a:p>
+              <a:pPr algn="ctr"/>
+              <a:r>
+                <a:rPr lang="en-CA" sz="1000" b="1" dirty="0">
+                  <a:latin typeface="Helvetica" pitchFamily="2" charset="0"/>
+                </a:rPr>
+                <a:t>Intermediate founder effect</a:t>
+              </a:r>
+            </a:p>
+            <a:p>
+              <a:pPr algn="ctr"/>
+              <a:r>
+                <a:rPr lang="en-CA" sz="1000" b="1" dirty="0">
+                  <a:latin typeface="Helvetica" pitchFamily="2" charset="0"/>
+                </a:rPr>
+                <a:t>(prop. = 0.2)</a:t>
+              </a:r>
+              <a:endParaRPr lang="en-US" sz="1000" b="1" dirty="0">
+                <a:latin typeface="Helvetica" pitchFamily="2" charset="0"/>
+              </a:endParaRPr>
+            </a:p>
+          </p:txBody>
+        </p:sp>
+        <p:sp>
+          <p:nvSpPr>
+            <p:cNvPr id="51" name="TextBox 50">
+              <a:extLst>
+                <a:ext uri="{FF2B5EF4-FFF2-40B4-BE49-F238E27FC236}">
+                  <a16:creationId xmlns:a16="http://schemas.microsoft.com/office/drawing/2014/main" id="{5430B097-1BEC-0C4E-BA39-568D6AB174C2}"/>
+                </a:ext>
+              </a:extLst>
+            </p:cNvPr>
+            <p:cNvSpPr txBox="1"/>
+            <p:nvPr/>
+          </p:nvSpPr>
+          <p:spPr>
+            <a:xfrm>
+              <a:off x="9721780" y="4593621"/>
+              <a:ext cx="1487908" cy="400110"/>
+            </a:xfrm>
+            <a:prstGeom prst="rect">
+              <a:avLst/>
+            </a:prstGeom>
+            <a:noFill/>
+          </p:spPr>
+          <p:txBody>
+            <a:bodyPr wrap="none" rtlCol="0">
+              <a:spAutoFit/>
+            </a:bodyPr>
+            <a:lstStyle/>
+            <a:p>
+              <a:pPr algn="ctr"/>
+              <a:r>
+                <a:rPr lang="en-CA" sz="1000" b="1" dirty="0">
+                  <a:latin typeface="Helvetica" pitchFamily="2" charset="0"/>
+                </a:rPr>
+                <a:t>Strong founder effect</a:t>
+              </a:r>
+            </a:p>
+            <a:p>
+              <a:pPr algn="ctr"/>
+              <a:r>
+                <a:rPr lang="en-CA" sz="1000" b="1" dirty="0">
+                  <a:latin typeface="Helvetica" pitchFamily="2" charset="0"/>
+                </a:rPr>
+                <a:t>(prop. = 0.01)</a:t>
+              </a:r>
+              <a:endParaRPr lang="en-US" sz="1000" b="1" dirty="0">
+                <a:latin typeface="Helvetica" pitchFamily="2" charset="0"/>
+              </a:endParaRPr>
+            </a:p>
+          </p:txBody>
+        </p:sp>
+        <p:sp>
+          <p:nvSpPr>
+            <p:cNvPr id="62" name="TextBox 61">
+              <a:extLst>
+                <a:ext uri="{FF2B5EF4-FFF2-40B4-BE49-F238E27FC236}">
+                  <a16:creationId xmlns:a16="http://schemas.microsoft.com/office/drawing/2014/main" id="{CFC5A6AF-29BB-FF4F-8E36-72EA5410972C}"/>
+                </a:ext>
+              </a:extLst>
+            </p:cNvPr>
+            <p:cNvSpPr txBox="1"/>
+            <p:nvPr/>
+          </p:nvSpPr>
+          <p:spPr>
+            <a:xfrm>
+              <a:off x="3861897" y="9307378"/>
+              <a:ext cx="2036135" cy="246221"/>
+            </a:xfrm>
+            <a:prstGeom prst="rect">
+              <a:avLst/>
+            </a:prstGeom>
+            <a:solidFill>
+              <a:schemeClr val="bg1"/>
+            </a:solidFill>
+          </p:spPr>
+          <p:txBody>
+            <a:bodyPr wrap="none" rtlCol="0">
+              <a:spAutoFit/>
+            </a:bodyPr>
+            <a:lstStyle/>
+            <a:p>
+              <a:r>
+                <a:rPr lang="en-US" sz="1000" dirty="0">
+                  <a:latin typeface="Helvetica" charset="0"/>
+                  <a:ea typeface="Helvetica" charset="0"/>
+                  <a:cs typeface="Helvetica" charset="0"/>
+                </a:rPr>
+                <a:t>Initial allele frequency (</a:t>
+              </a:r>
+              <a:r>
+                <a:rPr lang="en-US" sz="1000" i="1" dirty="0">
+                  <a:latin typeface="Helvetica" charset="0"/>
+                  <a:ea typeface="Helvetica" charset="0"/>
+                  <a:cs typeface="Helvetica" charset="0"/>
+                </a:rPr>
+                <a:t>CYP – Li</a:t>
+              </a:r>
+              <a:r>
+                <a:rPr lang="en-US" sz="1000" dirty="0">
+                  <a:latin typeface="Helvetica" charset="0"/>
+                  <a:ea typeface="Helvetica" charset="0"/>
+                  <a:cs typeface="Helvetica" charset="0"/>
+                </a:rPr>
+                <a:t>)</a:t>
+              </a:r>
+            </a:p>
+          </p:txBody>
+        </p:sp>
+        <p:sp>
+          <p:nvSpPr>
+            <p:cNvPr id="63" name="TextBox 62">
+              <a:extLst>
+                <a:ext uri="{FF2B5EF4-FFF2-40B4-BE49-F238E27FC236}">
+                  <a16:creationId xmlns:a16="http://schemas.microsoft.com/office/drawing/2014/main" id="{0669FD30-42A8-304E-B0E9-39EF29DFE003}"/>
+                </a:ext>
+              </a:extLst>
+            </p:cNvPr>
+            <p:cNvSpPr txBox="1"/>
+            <p:nvPr/>
+          </p:nvSpPr>
+          <p:spPr>
+            <a:xfrm>
+              <a:off x="6602514" y="9312544"/>
+              <a:ext cx="2036135" cy="246221"/>
+            </a:xfrm>
+            <a:prstGeom prst="rect">
+              <a:avLst/>
+            </a:prstGeom>
+            <a:solidFill>
+              <a:schemeClr val="bg1"/>
+            </a:solidFill>
+          </p:spPr>
+          <p:txBody>
+            <a:bodyPr wrap="none" rtlCol="0">
+              <a:spAutoFit/>
+            </a:bodyPr>
+            <a:lstStyle/>
+            <a:p>
+              <a:r>
+                <a:rPr lang="en-US" sz="1000" dirty="0">
+                  <a:latin typeface="Helvetica" charset="0"/>
+                  <a:ea typeface="Helvetica" charset="0"/>
+                  <a:cs typeface="Helvetica" charset="0"/>
+                </a:rPr>
+                <a:t>Initial allele frequency (</a:t>
+              </a:r>
+              <a:r>
+                <a:rPr lang="en-US" sz="1000" i="1" dirty="0">
+                  <a:latin typeface="Helvetica" charset="0"/>
+                  <a:ea typeface="Helvetica" charset="0"/>
+                  <a:cs typeface="Helvetica" charset="0"/>
+                </a:rPr>
+                <a:t>CYP – Li</a:t>
+              </a:r>
+              <a:r>
+                <a:rPr lang="en-US" sz="1000" dirty="0">
+                  <a:latin typeface="Helvetica" charset="0"/>
+                  <a:ea typeface="Helvetica" charset="0"/>
+                  <a:cs typeface="Helvetica" charset="0"/>
+                </a:rPr>
+                <a:t>)</a:t>
+              </a:r>
+            </a:p>
+          </p:txBody>
+        </p:sp>
+        <p:sp>
+          <p:nvSpPr>
+            <p:cNvPr id="64" name="TextBox 63">
+              <a:extLst>
+                <a:ext uri="{FF2B5EF4-FFF2-40B4-BE49-F238E27FC236}">
+                  <a16:creationId xmlns:a16="http://schemas.microsoft.com/office/drawing/2014/main" id="{375E2A01-AA1B-6740-9651-050B972FA93E}"/>
+                </a:ext>
+              </a:extLst>
+            </p:cNvPr>
+            <p:cNvSpPr txBox="1"/>
+            <p:nvPr/>
+          </p:nvSpPr>
+          <p:spPr>
+            <a:xfrm>
+              <a:off x="9343131" y="9309961"/>
+              <a:ext cx="2036135" cy="246221"/>
+            </a:xfrm>
+            <a:prstGeom prst="rect">
+              <a:avLst/>
+            </a:prstGeom>
+            <a:solidFill>
+              <a:schemeClr val="bg1"/>
+            </a:solidFill>
+          </p:spPr>
+          <p:txBody>
+            <a:bodyPr wrap="none" rtlCol="0">
+              <a:spAutoFit/>
+            </a:bodyPr>
+            <a:lstStyle/>
+            <a:p>
+              <a:r>
+                <a:rPr lang="en-US" sz="1000" dirty="0">
+                  <a:latin typeface="Helvetica" charset="0"/>
+                  <a:ea typeface="Helvetica" charset="0"/>
+                  <a:cs typeface="Helvetica" charset="0"/>
+                </a:rPr>
+                <a:t>Initial allele frequency (</a:t>
+              </a:r>
+              <a:r>
+                <a:rPr lang="en-US" sz="1000" i="1" dirty="0">
+                  <a:latin typeface="Helvetica" charset="0"/>
+                  <a:ea typeface="Helvetica" charset="0"/>
+                  <a:cs typeface="Helvetica" charset="0"/>
+                </a:rPr>
+                <a:t>CYP – Li</a:t>
+              </a:r>
+              <a:r>
+                <a:rPr lang="en-US" sz="1000" dirty="0">
+                  <a:latin typeface="Helvetica" charset="0"/>
+                  <a:ea typeface="Helvetica" charset="0"/>
+                  <a:cs typeface="Helvetica" charset="0"/>
+                </a:rPr>
+                <a:t>)</a:t>
+              </a:r>
+            </a:p>
+          </p:txBody>
+        </p:sp>
+      </p:grpSp>
+    </p:spTree>
+    <p:extLst>
+      <p:ext uri="{BB962C8B-B14F-4D97-AF65-F5344CB8AC3E}">
+        <p14:creationId xmlns:p14="http://schemas.microsoft.com/office/powerpoint/2010/main" val="77756905"/>
+      </p:ext>
+    </p:extLst>
+  </p:cSld>
+  <p:clrMapOvr>
+    <a:masterClrMapping/>
+  </p:clrMapOvr>
+</p:sld>
+</file>
+
+<file path=ppt/slides/slide11.xml><?xml version="1.0" encoding="utf-8"?>
+<p:sld xmlns:a="http://schemas.openxmlformats.org/drawingml/2006/main" xmlns:r="http://schemas.openxmlformats.org/officeDocument/2006/relationships" xmlns:p="http://schemas.openxmlformats.org/presentationml/2006/main">
+  <p:cSld>
+    <p:spTree>
+      <p:nvGrpSpPr>
+        <p:cNvPr id="1" name=""/>
+        <p:cNvGrpSpPr/>
+        <p:nvPr/>
+      </p:nvGrpSpPr>
+      <p:grpSpPr>
+        <a:xfrm>
+          <a:off x="0" y="0"/>
+          <a:ext cx="0" cy="0"/>
+          <a:chOff x="0" y="0"/>
+          <a:chExt cx="0" cy="0"/>
+        </a:xfrm>
+      </p:grpSpPr>
+      <p:grpSp>
+        <p:nvGrpSpPr>
           <p:cNvPr id="20" name="Group 19">
             <a:extLst>
               <a:ext uri="{FF2B5EF4-FFF2-40B4-BE49-F238E27FC236}">
@@ -3477,7 +4742,7 @@
 </p:sld>
 </file>
 
-<file path=ppt/slides/slide11.xml><?xml version="1.0" encoding="utf-8"?>
+<file path=ppt/slides/slide12.xml><?xml version="1.0" encoding="utf-8"?>
 <p:sld xmlns:a="http://schemas.openxmlformats.org/drawingml/2006/main" xmlns:r="http://schemas.openxmlformats.org/officeDocument/2006/relationships" xmlns:p="http://schemas.openxmlformats.org/presentationml/2006/main">
   <p:cSld>
     <p:spTree>
@@ -15961,7 +17226,7 @@
             <a:lstStyle/>
             <a:p>
               <a:r>
-                <a:rPr lang="en-US" sz="1600">
+                <a:rPr lang="en-US" sz="1600" dirty="0">
                   <a:latin typeface="Helvetica" charset="0"/>
                   <a:ea typeface="Helvetica" charset="0"/>
                   <a:cs typeface="Helvetica" charset="0"/>
@@ -15969,7 +17234,7 @@
                 <a:t>Initial allele frequency (</a:t>
               </a:r>
               <a:r>
-                <a:rPr lang="en-US" sz="1600" i="1">
+                <a:rPr lang="en-US" sz="1600" i="1" dirty="0">
                   <a:latin typeface="Helvetica" charset="0"/>
                   <a:ea typeface="Helvetica" charset="0"/>
                   <a:cs typeface="Helvetica" charset="0"/>
@@ -15977,18 +17242,13 @@
                 <a:t>CYP – Li</a:t>
               </a:r>
               <a:r>
-                <a:rPr lang="en-US" sz="1600">
+                <a:rPr lang="en-US" sz="1600" dirty="0">
                   <a:latin typeface="Helvetica" charset="0"/>
                   <a:ea typeface="Helvetica" charset="0"/>
                   <a:cs typeface="Helvetica" charset="0"/>
                 </a:rPr>
                 <a:t>)</a:t>
               </a:r>
-              <a:endParaRPr lang="en-US" sz="1600" dirty="0">
-                <a:latin typeface="Helvetica" charset="0"/>
-                <a:ea typeface="Helvetica" charset="0"/>
-                <a:cs typeface="Helvetica" charset="0"/>
-              </a:endParaRPr>
             </a:p>
           </p:txBody>
         </p:sp>

</xml_diff>